<commit_message>
more of the PowerPoint completed
</commit_message>
<xml_diff>
--- a/buildPC.pptx
+++ b/buildPC.pptx
@@ -5,10 +5,10 @@
     <p:sldMasterId id="2147483660" r:id="rId4"/>
   </p:sldMasterIdLst>
   <p:notesMasterIdLst>
-    <p:notesMasterId r:id="rId18"/>
+    <p:notesMasterId r:id="rId21"/>
   </p:notesMasterIdLst>
   <p:handoutMasterIdLst>
-    <p:handoutMasterId r:id="rId19"/>
+    <p:handoutMasterId r:id="rId22"/>
   </p:handoutMasterIdLst>
   <p:sldIdLst>
     <p:sldId id="257" r:id="rId5"/>
@@ -24,6 +24,9 @@
     <p:sldId id="277" r:id="rId15"/>
     <p:sldId id="278" r:id="rId16"/>
     <p:sldId id="261" r:id="rId17"/>
+    <p:sldId id="279" r:id="rId18"/>
+    <p:sldId id="281" r:id="rId19"/>
+    <p:sldId id="280" r:id="rId20"/>
   </p:sldIdLst>
   <p:sldSz cx="12188825" cy="6858000"/>
   <p:notesSz cx="6858000" cy="9144000"/>
@@ -5267,13 +5270,13 @@
         </p:nvSpPr>
         <p:spPr>
           <a:xfrm>
-            <a:off x="1751012" y="228600"/>
-            <a:ext cx="3324541" cy="690563"/>
+            <a:off x="989012" y="228600"/>
+            <a:ext cx="4267200" cy="690563"/>
           </a:xfrm>
         </p:spPr>
         <p:txBody>
           <a:bodyPr anchor="b">
-            <a:normAutofit fontScale="90000"/>
+            <a:normAutofit/>
           </a:bodyPr>
           <a:lstStyle/>
           <a:p>
@@ -5286,7 +5289,7 @@
                   </a:schemeClr>
                 </a:solidFill>
               </a:rPr>
-              <a:t>Storage Device 01</a:t>
+              <a:t>Storage Device 01- C:</a:t>
             </a:r>
           </a:p>
         </p:txBody>
@@ -5452,7 +5455,7 @@
         </p:blipFill>
         <p:spPr>
           <a:xfrm>
-            <a:off x="4418012" y="3200400"/>
+            <a:off x="4341812" y="2209800"/>
             <a:ext cx="7162800" cy="3104147"/>
           </a:xfrm>
           <a:noFill/>
@@ -5468,13 +5471,13 @@
   <p:clrMapOvr>
     <a:masterClrMapping/>
   </p:clrMapOvr>
-  <mc:AlternateContent xmlns:mc="http://schemas.openxmlformats.org/markup-compatibility/2006">
-    <mc:Choice xmlns:p14="http://schemas.microsoft.com/office/powerpoint/2010/main" Requires="p14">
+  <mc:AlternateContent xmlns:mc="http://schemas.openxmlformats.org/markup-compatibility/2006" xmlns:p14="http://schemas.microsoft.com/office/powerpoint/2010/main">
+    <mc:Choice Requires="p14">
       <p:transition spd="med" p14:dur="700">
         <p:fade/>
       </p:transition>
     </mc:Choice>
-    <mc:Fallback>
+    <mc:Fallback xmlns="">
       <p:transition spd="med">
         <p:fade/>
       </p:transition>
@@ -5513,7 +5516,7 @@
         <p:spPr>
           <a:xfrm>
             <a:off x="1497972" y="609600"/>
-            <a:ext cx="3992062" cy="914400"/>
+            <a:ext cx="4977440" cy="914400"/>
           </a:xfrm>
         </p:spPr>
         <p:txBody>
@@ -5531,7 +5534,7 @@
                   </a:schemeClr>
                 </a:solidFill>
               </a:rPr>
-              <a:t>Storage Device 02</a:t>
+              <a:t>Storage Device 02-  S:</a:t>
             </a:r>
           </a:p>
         </p:txBody>
@@ -5548,8 +5551,8 @@
         </p:nvSpPr>
         <p:spPr>
           <a:xfrm>
-            <a:off x="7008812" y="2362200"/>
-            <a:ext cx="4177718" cy="1220933"/>
+            <a:off x="7466012" y="1371600"/>
+            <a:ext cx="4177718" cy="762000"/>
           </a:xfrm>
         </p:spPr>
         <p:txBody>
@@ -5633,8 +5636,8 @@
         </p:nvSpPr>
         <p:spPr>
           <a:xfrm>
-            <a:off x="7350879" y="3352800"/>
-            <a:ext cx="3810000" cy="1815882"/>
+            <a:off x="7856526" y="2142744"/>
+            <a:ext cx="3810000" cy="3970318"/>
           </a:xfrm>
           <a:prstGeom prst="rect">
             <a:avLst/>
@@ -5708,6 +5711,86 @@
             <a:r>
               <a:rPr lang="en-US" sz="2800" dirty="0"/>
               <a:t>6Gb/s SATA 3</a:t>
+            </a:r>
+          </a:p>
+          <a:p>
+            <a:pPr marL="1066693" lvl="1" indent="-457200">
+              <a:buClr>
+                <a:schemeClr val="accent1">
+                  <a:lumMod val="40000"/>
+                  <a:lumOff val="60000"/>
+                </a:schemeClr>
+              </a:buClr>
+              <a:buFont typeface="Arial" panose="020B0604020202020204" pitchFamily="34" charset="0"/>
+              <a:buChar char="•"/>
+            </a:pPr>
+            <a:r>
+              <a:rPr lang="en-US" sz="2800" dirty="0"/>
+              <a:t>Application Data</a:t>
+            </a:r>
+          </a:p>
+          <a:p>
+            <a:pPr marL="1066693" lvl="1" indent="-457200">
+              <a:buClr>
+                <a:schemeClr val="accent1">
+                  <a:lumMod val="40000"/>
+                  <a:lumOff val="60000"/>
+                </a:schemeClr>
+              </a:buClr>
+              <a:buFont typeface="Arial" panose="020B0604020202020204" pitchFamily="34" charset="0"/>
+              <a:buChar char="•"/>
+            </a:pPr>
+            <a:r>
+              <a:rPr lang="en-US" sz="2800" dirty="0"/>
+              <a:t>Virtual Machines</a:t>
+            </a:r>
+          </a:p>
+          <a:p>
+            <a:pPr marL="1066693" lvl="1" indent="-457200">
+              <a:buClr>
+                <a:schemeClr val="accent1">
+                  <a:lumMod val="40000"/>
+                  <a:lumOff val="60000"/>
+                </a:schemeClr>
+              </a:buClr>
+              <a:buFont typeface="Arial" panose="020B0604020202020204" pitchFamily="34" charset="0"/>
+              <a:buChar char="•"/>
+            </a:pPr>
+            <a:r>
+              <a:rPr lang="en-US" sz="2800" dirty="0"/>
+              <a:t>Images</a:t>
+            </a:r>
+          </a:p>
+          <a:p>
+            <a:pPr marL="1066693" lvl="1" indent="-457200">
+              <a:buClr>
+                <a:schemeClr val="accent1">
+                  <a:lumMod val="40000"/>
+                  <a:lumOff val="60000"/>
+                </a:schemeClr>
+              </a:buClr>
+              <a:buFont typeface="Arial" panose="020B0604020202020204" pitchFamily="34" charset="0"/>
+              <a:buChar char="•"/>
+            </a:pPr>
+            <a:r>
+              <a:rPr lang="en-US" sz="2800" dirty="0"/>
+              <a:t>Movies &amp; Music</a:t>
+            </a:r>
+          </a:p>
+          <a:p>
+            <a:pPr marL="1066693" lvl="1" indent="-457200">
+              <a:buClr>
+                <a:schemeClr val="accent1">
+                  <a:lumMod val="40000"/>
+                  <a:lumOff val="60000"/>
+                </a:schemeClr>
+              </a:buClr>
+              <a:buFont typeface="Arial" panose="020B0604020202020204" pitchFamily="34" charset="0"/>
+              <a:buChar char="•"/>
+            </a:pPr>
+            <a:r>
+              <a:rPr lang="en-US" sz="2800" dirty="0"/>
+              <a:t>Games</a:t>
             </a:r>
           </a:p>
         </p:txBody>
@@ -5722,13 +5805,13 @@
   <p:clrMapOvr>
     <a:masterClrMapping/>
   </p:clrMapOvr>
-  <mc:AlternateContent xmlns:mc="http://schemas.openxmlformats.org/markup-compatibility/2006">
-    <mc:Choice xmlns:p14="http://schemas.microsoft.com/office/powerpoint/2010/main" Requires="p14">
+  <mc:AlternateContent xmlns:mc="http://schemas.openxmlformats.org/markup-compatibility/2006" xmlns:p14="http://schemas.microsoft.com/office/powerpoint/2010/main">
+    <mc:Choice Requires="p14">
       <p:transition spd="med" p14:dur="700">
         <p:fade/>
       </p:transition>
     </mc:Choice>
-    <mc:Fallback>
+    <mc:Fallback xmlns="">
       <p:transition spd="med">
         <p:fade/>
       </p:transition>
@@ -5766,8 +5849,8 @@
         </p:nvSpPr>
         <p:spPr>
           <a:xfrm>
-            <a:off x="912812" y="1331118"/>
-            <a:ext cx="3324541" cy="690563"/>
+            <a:off x="912812" y="809151"/>
+            <a:ext cx="3962400" cy="901540"/>
           </a:xfrm>
         </p:spPr>
         <p:txBody>
@@ -5776,8 +5859,9 @@
           </a:bodyPr>
           <a:lstStyle/>
           <a:p>
-            <a:r>
-              <a:rPr lang="en-US" dirty="0">
+            <a:pPr algn="ctr"/>
+            <a:r>
+              <a:rPr lang="en-US" sz="4400" dirty="0">
                 <a:solidFill>
                   <a:schemeClr val="accent1">
                     <a:lumMod val="40000"/>
@@ -5791,8 +5875,8 @@
               <a:rPr lang="en-US" dirty="0">
                 <a:solidFill>
                   <a:schemeClr val="accent1">
-                    <a:lumMod val="40000"/>
-                    <a:lumOff val="60000"/>
+                    <a:lumMod val="20000"/>
+                    <a:lumOff val="80000"/>
                   </a:schemeClr>
                 </a:solidFill>
               </a:rPr>
@@ -5801,8 +5885,8 @@
               <a:rPr lang="en-US" sz="2400" dirty="0">
                 <a:solidFill>
                   <a:schemeClr val="accent1">
-                    <a:lumMod val="40000"/>
-                    <a:lumOff val="60000"/>
+                    <a:lumMod val="20000"/>
+                    <a:lumOff val="80000"/>
                   </a:schemeClr>
                 </a:solidFill>
               </a:rPr>
@@ -5811,8 +5895,8 @@
             <a:endParaRPr lang="en-US" dirty="0">
               <a:solidFill>
                 <a:schemeClr val="accent1">
-                  <a:lumMod val="40000"/>
-                  <a:lumOff val="60000"/>
+                  <a:lumMod val="20000"/>
+                  <a:lumOff val="80000"/>
                 </a:schemeClr>
               </a:solidFill>
             </a:endParaRPr>
@@ -5927,8 +6011,8 @@
         </p:blipFill>
         <p:spPr>
           <a:xfrm>
-            <a:off x="4875212" y="1676400"/>
-            <a:ext cx="7162800" cy="3104147"/>
+            <a:off x="4374357" y="2133600"/>
+            <a:ext cx="7449684" cy="3505200"/>
           </a:xfrm>
           <a:noFill/>
         </p:spPr>
@@ -5943,13 +6027,13 @@
   <p:clrMapOvr>
     <a:masterClrMapping/>
   </p:clrMapOvr>
-  <mc:AlternateContent xmlns:mc="http://schemas.openxmlformats.org/markup-compatibility/2006">
-    <mc:Choice xmlns:p14="http://schemas.microsoft.com/office/powerpoint/2010/main" Requires="p14">
+  <mc:AlternateContent xmlns:mc="http://schemas.openxmlformats.org/markup-compatibility/2006" xmlns:p14="http://schemas.microsoft.com/office/powerpoint/2010/main">
+    <mc:Choice Requires="p14">
       <p:transition spd="med" p14:dur="700">
         <p:fade/>
       </p:transition>
     </mc:Choice>
-    <mc:Fallback>
+    <mc:Fallback xmlns="">
       <p:transition spd="med">
         <p:fade/>
       </p:transition>
@@ -5982,43 +6066,1367 @@
             <a:spLocks noGrp="1"/>
           </p:cNvSpPr>
           <p:nvPr>
+            <p:ph type="ctrTitle"/>
+          </p:nvPr>
+        </p:nvSpPr>
+        <p:spPr>
+          <a:xfrm>
+            <a:off x="1726749" y="34212"/>
+            <a:ext cx="8735325" cy="1136651"/>
+          </a:xfrm>
+        </p:spPr>
+        <p:txBody>
+          <a:bodyPr anchor="ctr">
+            <a:normAutofit/>
+          </a:bodyPr>
+          <a:lstStyle/>
+          <a:p>
+            <a:pPr algn="ctr"/>
+            <a:r>
+              <a:rPr lang="en-US" sz="4800" dirty="0"/>
+              <a:t>Monitor</a:t>
+            </a:r>
+          </a:p>
+        </p:txBody>
+      </p:sp>
+      <p:sp>
+        <p:nvSpPr>
+          <p:cNvPr id="16" name="Subtitle 2">
+            <a:extLst>
+              <a:ext uri="{FF2B5EF4-FFF2-40B4-BE49-F238E27FC236}">
+                <a16:creationId xmlns:a16="http://schemas.microsoft.com/office/drawing/2014/main" id="{042F798A-13CD-0BC8-E44E-438158AA101B}"/>
+              </a:ext>
+            </a:extLst>
+          </p:cNvPr>
+          <p:cNvSpPr>
+            <a:spLocks noGrp="1"/>
+          </p:cNvSpPr>
+          <p:nvPr>
+            <p:ph type="subTitle" idx="1"/>
+          </p:nvPr>
+        </p:nvSpPr>
+        <p:spPr>
+          <a:xfrm>
+            <a:off x="989012" y="1135742"/>
+            <a:ext cx="4038600" cy="1066800"/>
+          </a:xfrm>
+        </p:spPr>
+        <p:txBody>
+          <a:bodyPr anchor="ctr"/>
+          <a:lstStyle/>
+          <a:p>
+            <a:pPr algn="ctr"/>
+            <a:r>
+              <a:rPr lang="en-US" dirty="0">
+                <a:solidFill>
+                  <a:schemeClr val="accent1">
+                    <a:lumMod val="40000"/>
+                    <a:lumOff val="60000"/>
+                  </a:schemeClr>
+                </a:solidFill>
+              </a:rPr>
+              <a:t>MSI </a:t>
+            </a:r>
+            <a:r>
+              <a:rPr lang="en-US" dirty="0" err="1">
+                <a:solidFill>
+                  <a:schemeClr val="accent1">
+                    <a:lumMod val="40000"/>
+                    <a:lumOff val="60000"/>
+                  </a:schemeClr>
+                </a:solidFill>
+              </a:rPr>
+              <a:t>Optix</a:t>
+            </a:r>
+            <a:r>
+              <a:rPr lang="en-US" dirty="0">
+                <a:solidFill>
+                  <a:schemeClr val="accent1">
+                    <a:lumMod val="40000"/>
+                    <a:lumOff val="60000"/>
+                  </a:schemeClr>
+                </a:solidFill>
+              </a:rPr>
+              <a:t> G27c4 27”</a:t>
+            </a:r>
+          </a:p>
+          <a:p>
+            <a:pPr algn="ctr"/>
+            <a:r>
+              <a:rPr lang="en-US" dirty="0">
+                <a:solidFill>
+                  <a:schemeClr val="accent1">
+                    <a:lumMod val="40000"/>
+                    <a:lumOff val="60000"/>
+                  </a:schemeClr>
+                </a:solidFill>
+              </a:rPr>
+              <a:t>Curved Monitor</a:t>
+            </a:r>
+          </a:p>
+        </p:txBody>
+      </p:sp>
+      <p:sp>
+        <p:nvSpPr>
+          <p:cNvPr id="2" name="Subtitle 2">
+            <a:extLst>
+              <a:ext uri="{FF2B5EF4-FFF2-40B4-BE49-F238E27FC236}">
+                <a16:creationId xmlns:a16="http://schemas.microsoft.com/office/drawing/2014/main" id="{95F6CC94-4ED3-28C0-C445-6D2FEA4E3948}"/>
+              </a:ext>
+            </a:extLst>
+          </p:cNvPr>
+          <p:cNvSpPr txBox="1">
+            <a:spLocks/>
+          </p:cNvSpPr>
+          <p:nvPr/>
+        </p:nvSpPr>
+        <p:spPr>
+          <a:xfrm>
+            <a:off x="912812" y="2258786"/>
+            <a:ext cx="3962400" cy="3684814"/>
+          </a:xfrm>
+          <a:prstGeom prst="rect">
+            <a:avLst/>
+          </a:prstGeom>
+        </p:spPr>
+        <p:txBody>
+          <a:bodyPr vert="horz" lIns="121899" tIns="60949" rIns="121899" bIns="60949" rtlCol="0" anchor="ctr">
+            <a:normAutofit/>
+          </a:bodyPr>
+          <a:lstStyle>
+            <a:lvl1pPr marL="0" indent="0" algn="l" defTabSz="1218987" rtl="0" eaLnBrk="1" latinLnBrk="0" hangingPunct="1">
+              <a:lnSpc>
+                <a:spcPct val="90000"/>
+              </a:lnSpc>
+              <a:spcBef>
+                <a:spcPts val="0"/>
+              </a:spcBef>
+              <a:buClr>
+                <a:schemeClr val="accent1"/>
+              </a:buClr>
+              <a:buSzPct val="100000"/>
+              <a:buFont typeface="Arial" pitchFamily="34" charset="0"/>
+              <a:buNone/>
+              <a:defRPr sz="2800" kern="1200" cap="all" spc="200" baseline="0">
+                <a:solidFill>
+                  <a:schemeClr val="accent1"/>
+                </a:solidFill>
+                <a:latin typeface="+mn-lt"/>
+                <a:ea typeface="+mn-ea"/>
+                <a:cs typeface="+mn-cs"/>
+              </a:defRPr>
+            </a:lvl1pPr>
+            <a:lvl2pPr marL="609493" indent="0" algn="ctr" defTabSz="1218987" rtl="0" eaLnBrk="1" latinLnBrk="0" hangingPunct="1">
+              <a:lnSpc>
+                <a:spcPct val="90000"/>
+              </a:lnSpc>
+              <a:spcBef>
+                <a:spcPts val="800"/>
+              </a:spcBef>
+              <a:buClr>
+                <a:schemeClr val="accent1"/>
+              </a:buClr>
+              <a:buSzPct val="80000"/>
+              <a:buFont typeface="Arial" pitchFamily="34" charset="0"/>
+              <a:buNone/>
+              <a:defRPr sz="2400" kern="1200">
+                <a:solidFill>
+                  <a:schemeClr val="tx1">
+                    <a:tint val="75000"/>
+                  </a:schemeClr>
+                </a:solidFill>
+                <a:latin typeface="+mn-lt"/>
+                <a:ea typeface="+mn-ea"/>
+                <a:cs typeface="+mn-cs"/>
+              </a:defRPr>
+            </a:lvl2pPr>
+            <a:lvl3pPr marL="1218987" indent="0" algn="ctr" defTabSz="1218987" rtl="0" eaLnBrk="1" latinLnBrk="0" hangingPunct="1">
+              <a:lnSpc>
+                <a:spcPct val="90000"/>
+              </a:lnSpc>
+              <a:spcBef>
+                <a:spcPts val="800"/>
+              </a:spcBef>
+              <a:buClr>
+                <a:schemeClr val="accent1"/>
+              </a:buClr>
+              <a:buSzPct val="80000"/>
+              <a:buFont typeface="Arial" pitchFamily="34" charset="0"/>
+              <a:buNone/>
+              <a:defRPr sz="2000" kern="1200">
+                <a:solidFill>
+                  <a:schemeClr val="tx1">
+                    <a:tint val="75000"/>
+                  </a:schemeClr>
+                </a:solidFill>
+                <a:latin typeface="+mn-lt"/>
+                <a:ea typeface="+mn-ea"/>
+                <a:cs typeface="+mn-cs"/>
+              </a:defRPr>
+            </a:lvl3pPr>
+            <a:lvl4pPr marL="1828480" indent="0" algn="ctr" defTabSz="1218987" rtl="0" eaLnBrk="1" latinLnBrk="0" hangingPunct="1">
+              <a:lnSpc>
+                <a:spcPct val="90000"/>
+              </a:lnSpc>
+              <a:spcBef>
+                <a:spcPts val="800"/>
+              </a:spcBef>
+              <a:buClr>
+                <a:schemeClr val="accent1"/>
+              </a:buClr>
+              <a:buSzPct val="80000"/>
+              <a:buFont typeface="Arial" pitchFamily="34" charset="0"/>
+              <a:buNone/>
+              <a:defRPr sz="2000" kern="1200">
+                <a:solidFill>
+                  <a:schemeClr val="tx1">
+                    <a:tint val="75000"/>
+                  </a:schemeClr>
+                </a:solidFill>
+                <a:latin typeface="+mn-lt"/>
+                <a:ea typeface="+mn-ea"/>
+                <a:cs typeface="+mn-cs"/>
+              </a:defRPr>
+            </a:lvl4pPr>
+            <a:lvl5pPr marL="2437973" indent="0" algn="ctr" defTabSz="1218987" rtl="0" eaLnBrk="1" latinLnBrk="0" hangingPunct="1">
+              <a:lnSpc>
+                <a:spcPct val="90000"/>
+              </a:lnSpc>
+              <a:spcBef>
+                <a:spcPts val="800"/>
+              </a:spcBef>
+              <a:buClr>
+                <a:schemeClr val="accent1"/>
+              </a:buClr>
+              <a:buSzPct val="80000"/>
+              <a:buFont typeface="Arial" pitchFamily="34" charset="0"/>
+              <a:buNone/>
+              <a:defRPr sz="2000" kern="1200">
+                <a:solidFill>
+                  <a:schemeClr val="tx1">
+                    <a:tint val="75000"/>
+                  </a:schemeClr>
+                </a:solidFill>
+                <a:latin typeface="+mn-lt"/>
+                <a:ea typeface="+mn-ea"/>
+                <a:cs typeface="+mn-cs"/>
+              </a:defRPr>
+            </a:lvl5pPr>
+            <a:lvl6pPr marL="3047467" indent="0" algn="ctr" defTabSz="1218987" rtl="0" eaLnBrk="1" latinLnBrk="0" hangingPunct="1">
+              <a:lnSpc>
+                <a:spcPct val="90000"/>
+              </a:lnSpc>
+              <a:spcBef>
+                <a:spcPts val="800"/>
+              </a:spcBef>
+              <a:buClr>
+                <a:schemeClr val="accent1"/>
+              </a:buClr>
+              <a:buSzPct val="80000"/>
+              <a:buFont typeface="Arial" pitchFamily="34" charset="0"/>
+              <a:buNone/>
+              <a:defRPr sz="2000" kern="1200">
+                <a:solidFill>
+                  <a:schemeClr val="tx1">
+                    <a:tint val="75000"/>
+                  </a:schemeClr>
+                </a:solidFill>
+                <a:latin typeface="+mn-lt"/>
+                <a:ea typeface="+mn-ea"/>
+                <a:cs typeface="+mn-cs"/>
+              </a:defRPr>
+            </a:lvl6pPr>
+            <a:lvl7pPr marL="3656960" indent="0" algn="ctr" defTabSz="1218987" rtl="0" eaLnBrk="1" latinLnBrk="0" hangingPunct="1">
+              <a:lnSpc>
+                <a:spcPct val="90000"/>
+              </a:lnSpc>
+              <a:spcBef>
+                <a:spcPts val="800"/>
+              </a:spcBef>
+              <a:buClr>
+                <a:schemeClr val="accent1"/>
+              </a:buClr>
+              <a:buSzPct val="80000"/>
+              <a:buFont typeface="Arial" pitchFamily="34" charset="0"/>
+              <a:buNone/>
+              <a:defRPr sz="2000" kern="1200">
+                <a:solidFill>
+                  <a:schemeClr val="tx1">
+                    <a:tint val="75000"/>
+                  </a:schemeClr>
+                </a:solidFill>
+                <a:latin typeface="+mn-lt"/>
+                <a:ea typeface="+mn-ea"/>
+                <a:cs typeface="+mn-cs"/>
+              </a:defRPr>
+            </a:lvl7pPr>
+            <a:lvl8pPr marL="4266453" indent="0" algn="ctr" defTabSz="1218987" rtl="0" eaLnBrk="1" latinLnBrk="0" hangingPunct="1">
+              <a:lnSpc>
+                <a:spcPct val="90000"/>
+              </a:lnSpc>
+              <a:spcBef>
+                <a:spcPts val="800"/>
+              </a:spcBef>
+              <a:buClr>
+                <a:schemeClr val="accent1"/>
+              </a:buClr>
+              <a:buSzPct val="80000"/>
+              <a:buFont typeface="Arial" pitchFamily="34" charset="0"/>
+              <a:buNone/>
+              <a:defRPr sz="2000" kern="1200" baseline="0">
+                <a:solidFill>
+                  <a:schemeClr val="tx1">
+                    <a:tint val="75000"/>
+                  </a:schemeClr>
+                </a:solidFill>
+                <a:latin typeface="+mn-lt"/>
+                <a:ea typeface="+mn-ea"/>
+                <a:cs typeface="+mn-cs"/>
+              </a:defRPr>
+            </a:lvl8pPr>
+            <a:lvl9pPr marL="4875947" indent="0" algn="ctr" defTabSz="1218987" rtl="0" eaLnBrk="1" latinLnBrk="0" hangingPunct="1">
+              <a:lnSpc>
+                <a:spcPct val="90000"/>
+              </a:lnSpc>
+              <a:spcBef>
+                <a:spcPts val="800"/>
+              </a:spcBef>
+              <a:buClr>
+                <a:schemeClr val="accent1"/>
+              </a:buClr>
+              <a:buSzPct val="80000"/>
+              <a:buFont typeface="Arial" pitchFamily="34" charset="0"/>
+              <a:buNone/>
+              <a:defRPr sz="2000" kern="1200" baseline="0">
+                <a:solidFill>
+                  <a:schemeClr val="tx1">
+                    <a:tint val="75000"/>
+                  </a:schemeClr>
+                </a:solidFill>
+                <a:latin typeface="+mn-lt"/>
+                <a:ea typeface="+mn-ea"/>
+                <a:cs typeface="+mn-cs"/>
+              </a:defRPr>
+            </a:lvl9pPr>
+          </a:lstStyle>
+          <a:p>
+            <a:pPr marL="457200" indent="-457200">
+              <a:buClr>
+                <a:schemeClr val="accent1">
+                  <a:lumMod val="40000"/>
+                  <a:lumOff val="60000"/>
+                </a:schemeClr>
+              </a:buClr>
+              <a:buFont typeface="Arial" panose="020B0604020202020204" pitchFamily="34" charset="0"/>
+              <a:buChar char="•"/>
+            </a:pPr>
+            <a:r>
+              <a:rPr lang="en-US" sz="2400" dirty="0">
+                <a:solidFill>
+                  <a:schemeClr val="tx1"/>
+                </a:solidFill>
+              </a:rPr>
+              <a:t>27” Curved Display</a:t>
+            </a:r>
+          </a:p>
+          <a:p>
+            <a:pPr marL="457200" indent="-457200">
+              <a:buClr>
+                <a:schemeClr val="accent1">
+                  <a:lumMod val="40000"/>
+                  <a:lumOff val="60000"/>
+                </a:schemeClr>
+              </a:buClr>
+              <a:buFont typeface="Arial" panose="020B0604020202020204" pitchFamily="34" charset="0"/>
+              <a:buChar char="•"/>
+            </a:pPr>
+            <a:r>
+              <a:rPr lang="en-US" sz="2400" dirty="0">
+                <a:solidFill>
+                  <a:schemeClr val="tx1"/>
+                </a:solidFill>
+              </a:rPr>
+              <a:t>1920 x 1080 </a:t>
+            </a:r>
+          </a:p>
+          <a:p>
+            <a:pPr marL="457200" indent="-457200">
+              <a:buClr>
+                <a:schemeClr val="accent1">
+                  <a:lumMod val="40000"/>
+                  <a:lumOff val="60000"/>
+                </a:schemeClr>
+              </a:buClr>
+              <a:buFont typeface="Arial" panose="020B0604020202020204" pitchFamily="34" charset="0"/>
+              <a:buChar char="•"/>
+            </a:pPr>
+            <a:r>
+              <a:rPr lang="en-US" sz="2400" dirty="0">
+                <a:solidFill>
+                  <a:schemeClr val="tx1"/>
+                </a:solidFill>
+              </a:rPr>
+              <a:t>170 Hz Refresh Rate</a:t>
+            </a:r>
+          </a:p>
+          <a:p>
+            <a:pPr marL="457200" indent="-457200">
+              <a:buClr>
+                <a:schemeClr val="accent1">
+                  <a:lumMod val="40000"/>
+                  <a:lumOff val="60000"/>
+                </a:schemeClr>
+              </a:buClr>
+              <a:buFont typeface="Arial" panose="020B0604020202020204" pitchFamily="34" charset="0"/>
+              <a:buChar char="•"/>
+            </a:pPr>
+            <a:r>
+              <a:rPr lang="en-US" sz="2400" dirty="0">
+                <a:solidFill>
+                  <a:schemeClr val="tx1"/>
+                </a:solidFill>
+              </a:rPr>
+              <a:t>1ms Response Time</a:t>
+            </a:r>
+          </a:p>
+          <a:p>
+            <a:pPr marL="457200" indent="-457200">
+              <a:buClr>
+                <a:schemeClr val="accent1">
+                  <a:lumMod val="40000"/>
+                  <a:lumOff val="60000"/>
+                </a:schemeClr>
+              </a:buClr>
+              <a:buFont typeface="Arial" panose="020B0604020202020204" pitchFamily="34" charset="0"/>
+              <a:buChar char="•"/>
+            </a:pPr>
+            <a:r>
+              <a:rPr lang="en-US" sz="2400" dirty="0">
+                <a:solidFill>
+                  <a:schemeClr val="tx1"/>
+                </a:solidFill>
+              </a:rPr>
+              <a:t>AMD </a:t>
+            </a:r>
+            <a:r>
+              <a:rPr lang="en-US" sz="2400" dirty="0" err="1">
+                <a:solidFill>
+                  <a:schemeClr val="tx1"/>
+                </a:solidFill>
+              </a:rPr>
+              <a:t>Freesync</a:t>
+            </a:r>
+            <a:endParaRPr lang="en-US" sz="2400" dirty="0">
+              <a:solidFill>
+                <a:schemeClr val="tx1"/>
+              </a:solidFill>
+            </a:endParaRPr>
+          </a:p>
+          <a:p>
+            <a:pPr marL="457200" indent="-457200">
+              <a:buClr>
+                <a:schemeClr val="accent1">
+                  <a:lumMod val="40000"/>
+                  <a:lumOff val="60000"/>
+                </a:schemeClr>
+              </a:buClr>
+              <a:buFont typeface="Arial" panose="020B0604020202020204" pitchFamily="34" charset="0"/>
+              <a:buChar char="•"/>
+            </a:pPr>
+            <a:r>
+              <a:rPr lang="en-US" sz="2400" dirty="0">
+                <a:solidFill>
+                  <a:schemeClr val="tx1"/>
+                </a:solidFill>
+              </a:rPr>
+              <a:t>Wide Color Gamut</a:t>
+            </a:r>
+          </a:p>
+          <a:p>
+            <a:pPr marL="457200" indent="-457200">
+              <a:buClr>
+                <a:schemeClr val="accent1">
+                  <a:lumMod val="40000"/>
+                  <a:lumOff val="60000"/>
+                </a:schemeClr>
+              </a:buClr>
+              <a:buFont typeface="Arial" panose="020B0604020202020204" pitchFamily="34" charset="0"/>
+              <a:buChar char="•"/>
+            </a:pPr>
+            <a:r>
+              <a:rPr lang="en-US" sz="2400" dirty="0">
+                <a:solidFill>
+                  <a:schemeClr val="tx1"/>
+                </a:solidFill>
+              </a:rPr>
+              <a:t>Frameless Design</a:t>
+            </a:r>
+          </a:p>
+        </p:txBody>
+      </p:sp>
+      <p:pic>
+        <p:nvPicPr>
+          <p:cNvPr id="4" name="Picture 3" descr="A picture containing text, electronics, monitor, display&#10;&#10;Description automatically generated">
+            <a:extLst>
+              <a:ext uri="{FF2B5EF4-FFF2-40B4-BE49-F238E27FC236}">
+                <a16:creationId xmlns:a16="http://schemas.microsoft.com/office/drawing/2014/main" id="{9A4AA86B-64DD-3049-B511-805595E67A64}"/>
+              </a:ext>
+            </a:extLst>
+          </p:cNvPr>
+          <p:cNvPicPr>
+            <a:picLocks noChangeAspect="1"/>
+          </p:cNvPicPr>
+          <p:nvPr/>
+        </p:nvPicPr>
+        <p:blipFill>
+          <a:blip r:embed="rId2">
+            <a:extLst>
+              <a:ext uri="{28A0092B-C50C-407E-A947-70E740481C1C}">
+                <a14:useLocalDpi xmlns:a14="http://schemas.microsoft.com/office/drawing/2010/main" val="0"/>
+              </a:ext>
+            </a:extLst>
+          </a:blip>
+          <a:stretch>
+            <a:fillRect/>
+          </a:stretch>
+        </p:blipFill>
+        <p:spPr>
+          <a:xfrm>
+            <a:off x="5027612" y="914400"/>
+            <a:ext cx="6724524" cy="5046306"/>
+          </a:xfrm>
+          <a:prstGeom prst="rect">
+            <a:avLst/>
+          </a:prstGeom>
+          <a:effectLst>
+            <a:glow rad="152400">
+              <a:schemeClr val="accent1">
+                <a:lumMod val="20000"/>
+                <a:lumOff val="80000"/>
+                <a:alpha val="40000"/>
+              </a:schemeClr>
+            </a:glow>
+          </a:effectLst>
+        </p:spPr>
+      </p:pic>
+    </p:spTree>
+    <p:extLst>
+      <p:ext uri="{BB962C8B-B14F-4D97-AF65-F5344CB8AC3E}">
+        <p14:creationId xmlns:p14="http://schemas.microsoft.com/office/powerpoint/2010/main" val="2672039197"/>
+      </p:ext>
+    </p:extLst>
+  </p:cSld>
+  <p:clrMapOvr>
+    <a:masterClrMapping/>
+  </p:clrMapOvr>
+  <mc:AlternateContent xmlns:mc="http://schemas.openxmlformats.org/markup-compatibility/2006" xmlns:p14="http://schemas.microsoft.com/office/powerpoint/2010/main">
+    <mc:Choice Requires="p14">
+      <p:transition spd="med" p14:dur="700">
+        <p:fade/>
+      </p:transition>
+    </mc:Choice>
+    <mc:Fallback xmlns="">
+      <p:transition spd="med">
+        <p:fade/>
+      </p:transition>
+    </mc:Fallback>
+  </mc:AlternateContent>
+</p:sld>
+</file>
+
+<file path=ppt/slides/slide14.xml><?xml version="1.0" encoding="utf-8"?>
+<p:sld xmlns:a="http://schemas.openxmlformats.org/drawingml/2006/main" xmlns:r="http://schemas.openxmlformats.org/officeDocument/2006/relationships" xmlns:p="http://schemas.openxmlformats.org/presentationml/2006/main">
+  <p:cSld>
+    <p:spTree>
+      <p:nvGrpSpPr>
+        <p:cNvPr id="1" name=""/>
+        <p:cNvGrpSpPr/>
+        <p:nvPr/>
+      </p:nvGrpSpPr>
+      <p:grpSpPr>
+        <a:xfrm>
+          <a:off x="0" y="0"/>
+          <a:ext cx="0" cy="0"/>
+          <a:chOff x="0" y="0"/>
+          <a:chExt cx="0" cy="0"/>
+        </a:xfrm>
+      </p:grpSpPr>
+      <p:sp>
+        <p:nvSpPr>
+          <p:cNvPr id="2" name="Title 1">
+            <a:extLst>
+              <a:ext uri="{FF2B5EF4-FFF2-40B4-BE49-F238E27FC236}">
+                <a16:creationId xmlns:a16="http://schemas.microsoft.com/office/drawing/2014/main" id="{9572945E-2E22-33C7-6E5F-15FE93861519}"/>
+              </a:ext>
+            </a:extLst>
+          </p:cNvPr>
+          <p:cNvSpPr>
+            <a:spLocks noGrp="1"/>
+          </p:cNvSpPr>
+          <p:nvPr>
+            <p:ph type="title"/>
+          </p:nvPr>
+        </p:nvSpPr>
+        <p:spPr>
+          <a:xfrm>
+            <a:off x="1357841" y="323934"/>
+            <a:ext cx="5053542" cy="1219200"/>
+          </a:xfrm>
+        </p:spPr>
+        <p:txBody>
+          <a:bodyPr>
+            <a:normAutofit/>
+          </a:bodyPr>
+          <a:lstStyle/>
+          <a:p>
+            <a:r>
+              <a:rPr lang="en-US" sz="3600" dirty="0">
+                <a:solidFill>
+                  <a:schemeClr val="accent1">
+                    <a:lumMod val="20000"/>
+                    <a:lumOff val="80000"/>
+                  </a:schemeClr>
+                </a:solidFill>
+              </a:rPr>
+              <a:t>Operating System &amp;</a:t>
+            </a:r>
+            <a:br>
+              <a:rPr lang="en-US" sz="3600" dirty="0">
+                <a:solidFill>
+                  <a:schemeClr val="accent1">
+                    <a:lumMod val="20000"/>
+                    <a:lumOff val="80000"/>
+                  </a:schemeClr>
+                </a:solidFill>
+              </a:rPr>
+            </a:br>
+            <a:r>
+              <a:rPr lang="en-US" sz="3600" dirty="0">
+                <a:solidFill>
+                  <a:schemeClr val="accent1">
+                    <a:lumMod val="20000"/>
+                    <a:lumOff val="80000"/>
+                  </a:schemeClr>
+                </a:solidFill>
+              </a:rPr>
+              <a:t>Additional Apps</a:t>
+            </a:r>
+          </a:p>
+        </p:txBody>
+      </p:sp>
+      <p:sp>
+        <p:nvSpPr>
+          <p:cNvPr id="3" name="Text Placeholder 2">
+            <a:extLst>
+              <a:ext uri="{FF2B5EF4-FFF2-40B4-BE49-F238E27FC236}">
+                <a16:creationId xmlns:a16="http://schemas.microsoft.com/office/drawing/2014/main" id="{12F1E938-4303-D61C-0DA1-17706B5A6376}"/>
+              </a:ext>
+            </a:extLst>
+          </p:cNvPr>
+          <p:cNvSpPr>
+            <a:spLocks noGrp="1"/>
+          </p:cNvSpPr>
+          <p:nvPr>
+            <p:ph type="body" sz="half" idx="2"/>
+          </p:nvPr>
+        </p:nvSpPr>
+        <p:spPr>
+          <a:xfrm>
+            <a:off x="5966336" y="3337860"/>
+            <a:ext cx="6053595" cy="3369971"/>
+          </a:xfrm>
+        </p:spPr>
+        <p:txBody>
+          <a:bodyPr/>
+          <a:lstStyle/>
+          <a:p>
+            <a:pPr marL="342900" indent="-342900">
+              <a:buClr>
+                <a:schemeClr val="accent1">
+                  <a:lumMod val="40000"/>
+                  <a:lumOff val="60000"/>
+                </a:schemeClr>
+              </a:buClr>
+              <a:buFont typeface="Arial" panose="020B0604020202020204" pitchFamily="34" charset="0"/>
+              <a:buChar char="•"/>
+            </a:pPr>
+            <a:r>
+              <a:rPr lang="en-US" dirty="0"/>
+              <a:t>Ubuntu OS</a:t>
+            </a:r>
+          </a:p>
+          <a:p>
+            <a:pPr marL="342900" indent="-342900">
+              <a:buClr>
+                <a:schemeClr val="accent1">
+                  <a:lumMod val="40000"/>
+                  <a:lumOff val="60000"/>
+                </a:schemeClr>
+              </a:buClr>
+              <a:buFont typeface="Arial" panose="020B0604020202020204" pitchFamily="34" charset="0"/>
+              <a:buChar char="•"/>
+            </a:pPr>
+            <a:r>
+              <a:rPr lang="en-US" dirty="0"/>
+              <a:t>LibreOffice</a:t>
+            </a:r>
+          </a:p>
+          <a:p>
+            <a:pPr marL="342900" indent="-342900">
+              <a:buClr>
+                <a:schemeClr val="accent1">
+                  <a:lumMod val="40000"/>
+                  <a:lumOff val="60000"/>
+                </a:schemeClr>
+              </a:buClr>
+              <a:buFont typeface="Arial" panose="020B0604020202020204" pitchFamily="34" charset="0"/>
+              <a:buChar char="•"/>
+            </a:pPr>
+            <a:r>
+              <a:rPr lang="en-US" dirty="0" err="1"/>
+              <a:t>Krita</a:t>
+            </a:r>
+            <a:r>
+              <a:rPr lang="en-US" dirty="0"/>
+              <a:t> (for Digital Art)</a:t>
+            </a:r>
+          </a:p>
+          <a:p>
+            <a:pPr marL="342900" indent="-342900">
+              <a:buClr>
+                <a:schemeClr val="accent1">
+                  <a:lumMod val="40000"/>
+                  <a:lumOff val="60000"/>
+                </a:schemeClr>
+              </a:buClr>
+              <a:buFont typeface="Arial" panose="020B0604020202020204" pitchFamily="34" charset="0"/>
+              <a:buChar char="•"/>
+            </a:pPr>
+            <a:r>
+              <a:rPr lang="en-US" dirty="0"/>
+              <a:t>GIMP (for Digital Photography)</a:t>
+            </a:r>
+          </a:p>
+          <a:p>
+            <a:pPr marL="342900" indent="-342900">
+              <a:buClr>
+                <a:schemeClr val="accent1">
+                  <a:lumMod val="40000"/>
+                  <a:lumOff val="60000"/>
+                </a:schemeClr>
+              </a:buClr>
+              <a:buFont typeface="Arial" panose="020B0604020202020204" pitchFamily="34" charset="0"/>
+              <a:buChar char="•"/>
+            </a:pPr>
+            <a:r>
+              <a:rPr lang="en-US" dirty="0"/>
+              <a:t>VMWare Workstation Pro (Virtualization)</a:t>
+            </a:r>
+          </a:p>
+          <a:p>
+            <a:pPr marL="342900" indent="-342900">
+              <a:buClr>
+                <a:schemeClr val="accent1">
+                  <a:lumMod val="40000"/>
+                  <a:lumOff val="60000"/>
+                </a:schemeClr>
+              </a:buClr>
+              <a:buFont typeface="Arial" panose="020B0604020202020204" pitchFamily="34" charset="0"/>
+              <a:buChar char="•"/>
+            </a:pPr>
+            <a:r>
+              <a:rPr lang="en-US" dirty="0"/>
+              <a:t>Docker (Container Deployment)</a:t>
+            </a:r>
+          </a:p>
+          <a:p>
+            <a:pPr marL="342900" indent="-342900">
+              <a:buClr>
+                <a:schemeClr val="accent1">
+                  <a:lumMod val="40000"/>
+                  <a:lumOff val="60000"/>
+                </a:schemeClr>
+              </a:buClr>
+              <a:buFont typeface="Arial" panose="020B0604020202020204" pitchFamily="34" charset="0"/>
+              <a:buChar char="•"/>
+            </a:pPr>
+            <a:r>
+              <a:rPr lang="en-US" dirty="0"/>
+              <a:t>+ Steam, Epic and GoG for Gaming</a:t>
+            </a:r>
+          </a:p>
+        </p:txBody>
+      </p:sp>
+      <p:pic>
+        <p:nvPicPr>
+          <p:cNvPr id="12" name="Content Placeholder 11" descr="A picture containing pool ball">
+            <a:extLst>
+              <a:ext uri="{FF2B5EF4-FFF2-40B4-BE49-F238E27FC236}">
+                <a16:creationId xmlns:a16="http://schemas.microsoft.com/office/drawing/2014/main" id="{3CC016BD-8B7B-3D9C-2BA6-3352AFE35C66}"/>
+              </a:ext>
+            </a:extLst>
+          </p:cNvPr>
+          <p:cNvPicPr>
+            <a:picLocks noGrp="1" noChangeAspect="1"/>
+          </p:cNvPicPr>
+          <p:nvPr>
+            <p:ph idx="1"/>
+          </p:nvPr>
+        </p:nvPicPr>
+        <p:blipFill>
+          <a:blip r:embed="rId2">
+            <a:extLst>
+              <a:ext uri="{28A0092B-C50C-407E-A947-70E740481C1C}">
+                <a14:useLocalDpi xmlns:a14="http://schemas.microsoft.com/office/drawing/2010/main" val="0"/>
+              </a:ext>
+              <a:ext uri="{837473B0-CC2E-450A-ABE3-18F120FF3D39}">
+                <a1611:picAttrSrcUrl xmlns:a1611="http://schemas.microsoft.com/office/drawing/2016/11/main" r:id="rId3"/>
+              </a:ext>
+            </a:extLst>
+          </a:blip>
+          <a:stretch>
+            <a:fillRect/>
+          </a:stretch>
+        </p:blipFill>
+        <p:spPr>
+          <a:xfrm>
+            <a:off x="-990600" y="2361691"/>
+            <a:ext cx="6094412" cy="4308559"/>
+          </a:xfrm>
+        </p:spPr>
+      </p:pic>
+      <p:sp>
+        <p:nvSpPr>
+          <p:cNvPr id="13" name="TextBox 12">
+            <a:extLst>
+              <a:ext uri="{FF2B5EF4-FFF2-40B4-BE49-F238E27FC236}">
+                <a16:creationId xmlns:a16="http://schemas.microsoft.com/office/drawing/2014/main" id="{C4632073-1E98-1155-164E-53B1C564FDFF}"/>
+              </a:ext>
+            </a:extLst>
+          </p:cNvPr>
+          <p:cNvSpPr txBox="1"/>
+          <p:nvPr/>
+        </p:nvSpPr>
+        <p:spPr>
+          <a:xfrm>
+            <a:off x="150812" y="6477000"/>
+            <a:ext cx="6053595" cy="230832"/>
+          </a:xfrm>
+          <a:prstGeom prst="rect">
+            <a:avLst/>
+          </a:prstGeom>
+          <a:noFill/>
+        </p:spPr>
+        <p:txBody>
+          <a:bodyPr wrap="square" rtlCol="0">
+            <a:spAutoFit/>
+          </a:bodyPr>
+          <a:lstStyle/>
+          <a:p>
+            <a:r>
+              <a:rPr lang="en-US" sz="900">
+                <a:hlinkClick r:id="rId3" tooltip="https://www.marcus-povey.co.uk/2016/10/27/ubuntu-16-04-sound-fixes-for-intel-hda-azalia/"/>
+              </a:rPr>
+              <a:t>This Photo</a:t>
+            </a:r>
+            <a:r>
+              <a:rPr lang="en-US" sz="900"/>
+              <a:t> by Unknown Author is licensed under </a:t>
+            </a:r>
+            <a:r>
+              <a:rPr lang="en-US" sz="900">
+                <a:hlinkClick r:id="rId4" tooltip="https://creativecommons.org/licenses/by-nc-sa/3.0/"/>
+              </a:rPr>
+              <a:t>CC BY-SA-NC</a:t>
+            </a:r>
+            <a:endParaRPr lang="en-US" sz="900"/>
+          </a:p>
+        </p:txBody>
+      </p:sp>
+      <p:pic>
+        <p:nvPicPr>
+          <p:cNvPr id="15" name="Picture 14" descr="Icon&#10;&#10;Description automatically generated">
+            <a:extLst>
+              <a:ext uri="{FF2B5EF4-FFF2-40B4-BE49-F238E27FC236}">
+                <a16:creationId xmlns:a16="http://schemas.microsoft.com/office/drawing/2014/main" id="{C52AEBD3-82D9-31D4-A411-398D1105F4DE}"/>
+              </a:ext>
+            </a:extLst>
+          </p:cNvPr>
+          <p:cNvPicPr>
+            <a:picLocks noChangeAspect="1"/>
+          </p:cNvPicPr>
+          <p:nvPr/>
+        </p:nvPicPr>
+        <p:blipFill>
+          <a:blip r:embed="rId5" cstate="print">
+            <a:extLst>
+              <a:ext uri="{28A0092B-C50C-407E-A947-70E740481C1C}">
+                <a14:useLocalDpi xmlns:a14="http://schemas.microsoft.com/office/drawing/2010/main" val="0"/>
+              </a:ext>
+              <a:ext uri="{837473B0-CC2E-450A-ABE3-18F120FF3D39}">
+                <a1611:picAttrSrcUrl xmlns:a1611="http://schemas.microsoft.com/office/drawing/2016/11/main" r:id="rId6"/>
+              </a:ext>
+            </a:extLst>
+          </a:blip>
+          <a:stretch>
+            <a:fillRect/>
+          </a:stretch>
+        </p:blipFill>
+        <p:spPr>
+          <a:xfrm>
+            <a:off x="3503612" y="1921543"/>
+            <a:ext cx="1752600" cy="1749302"/>
+          </a:xfrm>
+          <a:prstGeom prst="rect">
+            <a:avLst/>
+          </a:prstGeom>
+        </p:spPr>
+      </p:pic>
+      <p:pic>
+        <p:nvPicPr>
+          <p:cNvPr id="18" name="Picture 17" descr="Logo&#10;&#10;Description automatically generated">
+            <a:extLst>
+              <a:ext uri="{FF2B5EF4-FFF2-40B4-BE49-F238E27FC236}">
+                <a16:creationId xmlns:a16="http://schemas.microsoft.com/office/drawing/2014/main" id="{7703426D-2A1E-AD9C-44CA-12B7F8FCB081}"/>
+              </a:ext>
+            </a:extLst>
+          </p:cNvPr>
+          <p:cNvPicPr>
+            <a:picLocks noChangeAspect="1"/>
+          </p:cNvPicPr>
+          <p:nvPr/>
+        </p:nvPicPr>
+        <p:blipFill>
+          <a:blip r:embed="rId7" cstate="print">
+            <a:extLst>
+              <a:ext uri="{28A0092B-C50C-407E-A947-70E740481C1C}">
+                <a14:useLocalDpi xmlns:a14="http://schemas.microsoft.com/office/drawing/2010/main" val="0"/>
+              </a:ext>
+              <a:ext uri="{837473B0-CC2E-450A-ABE3-18F120FF3D39}">
+                <a1611:picAttrSrcUrl xmlns:a1611="http://schemas.microsoft.com/office/drawing/2016/11/main" r:id="rId8"/>
+              </a:ext>
+            </a:extLst>
+          </a:blip>
+          <a:stretch>
+            <a:fillRect/>
+          </a:stretch>
+        </p:blipFill>
+        <p:spPr>
+          <a:xfrm>
+            <a:off x="7085012" y="121725"/>
+            <a:ext cx="4037012" cy="886124"/>
+          </a:xfrm>
+          <a:prstGeom prst="rect">
+            <a:avLst/>
+          </a:prstGeom>
+        </p:spPr>
+      </p:pic>
+      <p:pic>
+        <p:nvPicPr>
+          <p:cNvPr id="21" name="Picture 20">
+            <a:extLst>
+              <a:ext uri="{FF2B5EF4-FFF2-40B4-BE49-F238E27FC236}">
+                <a16:creationId xmlns:a16="http://schemas.microsoft.com/office/drawing/2014/main" id="{6B756D78-965C-20D1-DDDA-ECCF088C8B02}"/>
+              </a:ext>
+            </a:extLst>
+          </p:cNvPr>
+          <p:cNvPicPr>
+            <a:picLocks noChangeAspect="1"/>
+          </p:cNvPicPr>
+          <p:nvPr/>
+        </p:nvPicPr>
+        <p:blipFill>
+          <a:blip r:embed="rId9">
+            <a:extLst>
+              <a:ext uri="{28A0092B-C50C-407E-A947-70E740481C1C}">
+                <a14:useLocalDpi xmlns:a14="http://schemas.microsoft.com/office/drawing/2010/main" val="0"/>
+              </a:ext>
+              <a:ext uri="{837473B0-CC2E-450A-ABE3-18F120FF3D39}">
+                <a1611:picAttrSrcUrl xmlns:a1611="http://schemas.microsoft.com/office/drawing/2016/11/main" r:id="rId10"/>
+              </a:ext>
+            </a:extLst>
+          </a:blip>
+          <a:stretch>
+            <a:fillRect/>
+          </a:stretch>
+        </p:blipFill>
+        <p:spPr>
+          <a:xfrm>
+            <a:off x="3028067" y="3899772"/>
+            <a:ext cx="2938269" cy="2276037"/>
+          </a:xfrm>
+          <a:prstGeom prst="rect">
+            <a:avLst/>
+          </a:prstGeom>
+        </p:spPr>
+      </p:pic>
+      <p:pic>
+        <p:nvPicPr>
+          <p:cNvPr id="24" name="Picture 23" descr="Logo, company name">
+            <a:extLst>
+              <a:ext uri="{FF2B5EF4-FFF2-40B4-BE49-F238E27FC236}">
+                <a16:creationId xmlns:a16="http://schemas.microsoft.com/office/drawing/2014/main" id="{6F70E139-01A4-BA82-D1B4-CF57326BDDA2}"/>
+              </a:ext>
+            </a:extLst>
+          </p:cNvPr>
+          <p:cNvPicPr>
+            <a:picLocks noChangeAspect="1"/>
+          </p:cNvPicPr>
+          <p:nvPr/>
+        </p:nvPicPr>
+        <p:blipFill>
+          <a:blip r:embed="rId11" cstate="print">
+            <a:extLst>
+              <a:ext uri="{28A0092B-C50C-407E-A947-70E740481C1C}">
+                <a14:useLocalDpi xmlns:a14="http://schemas.microsoft.com/office/drawing/2010/main" val="0"/>
+              </a:ext>
+              <a:ext uri="{837473B0-CC2E-450A-ABE3-18F120FF3D39}">
+                <a1611:picAttrSrcUrl xmlns:a1611="http://schemas.microsoft.com/office/drawing/2016/11/main" r:id="rId12"/>
+              </a:ext>
+            </a:extLst>
+          </a:blip>
+          <a:stretch>
+            <a:fillRect/>
+          </a:stretch>
+        </p:blipFill>
+        <p:spPr>
+          <a:xfrm>
+            <a:off x="8966933" y="1208267"/>
+            <a:ext cx="3042266" cy="1749303"/>
+          </a:xfrm>
+          <a:prstGeom prst="rect">
+            <a:avLst/>
+          </a:prstGeom>
+        </p:spPr>
+      </p:pic>
+      <p:pic>
+        <p:nvPicPr>
+          <p:cNvPr id="30" name="Picture 29" descr="Icon">
+            <a:extLst>
+              <a:ext uri="{FF2B5EF4-FFF2-40B4-BE49-F238E27FC236}">
+                <a16:creationId xmlns:a16="http://schemas.microsoft.com/office/drawing/2014/main" id="{DC00071C-3B16-3687-C12A-FF9F39251E66}"/>
+              </a:ext>
+            </a:extLst>
+          </p:cNvPr>
+          <p:cNvPicPr>
+            <a:picLocks noChangeAspect="1"/>
+          </p:cNvPicPr>
+          <p:nvPr/>
+        </p:nvPicPr>
+        <p:blipFill>
+          <a:blip r:embed="rId13">
+            <a:extLst>
+              <a:ext uri="{28A0092B-C50C-407E-A947-70E740481C1C}">
+                <a14:useLocalDpi xmlns:a14="http://schemas.microsoft.com/office/drawing/2010/main" val="0"/>
+              </a:ext>
+              <a:ext uri="{837473B0-CC2E-450A-ABE3-18F120FF3D39}">
+                <a1611:picAttrSrcUrl xmlns:a1611="http://schemas.microsoft.com/office/drawing/2016/11/main" r:id="rId14"/>
+              </a:ext>
+            </a:extLst>
+          </a:blip>
+          <a:stretch>
+            <a:fillRect/>
+          </a:stretch>
+        </p:blipFill>
+        <p:spPr>
+          <a:xfrm>
+            <a:off x="6204407" y="1152830"/>
+            <a:ext cx="2002176" cy="2002176"/>
+          </a:xfrm>
+          <a:prstGeom prst="rect">
+            <a:avLst/>
+          </a:prstGeom>
+        </p:spPr>
+      </p:pic>
+    </p:spTree>
+    <p:extLst>
+      <p:ext uri="{BB962C8B-B14F-4D97-AF65-F5344CB8AC3E}">
+        <p14:creationId xmlns:p14="http://schemas.microsoft.com/office/powerpoint/2010/main" val="1230774018"/>
+      </p:ext>
+    </p:extLst>
+  </p:cSld>
+  <p:clrMapOvr>
+    <a:masterClrMapping/>
+  </p:clrMapOvr>
+  <mc:AlternateContent xmlns:mc="http://schemas.openxmlformats.org/markup-compatibility/2006" xmlns:p14="http://schemas.microsoft.com/office/powerpoint/2010/main">
+    <mc:Choice Requires="p14">
+      <p:transition spd="med" p14:dur="700">
+        <p:fade/>
+      </p:transition>
+    </mc:Choice>
+    <mc:Fallback xmlns="">
+      <p:transition spd="med">
+        <p:fade/>
+      </p:transition>
+    </mc:Fallback>
+  </mc:AlternateContent>
+</p:sld>
+</file>
+
+<file path=ppt/slides/slide15.xml><?xml version="1.0" encoding="utf-8"?>
+<p:sld xmlns:a="http://schemas.openxmlformats.org/drawingml/2006/main" xmlns:r="http://schemas.openxmlformats.org/officeDocument/2006/relationships" xmlns:p="http://schemas.openxmlformats.org/presentationml/2006/main">
+  <p:cSld>
+    <p:spTree>
+      <p:nvGrpSpPr>
+        <p:cNvPr id="1" name=""/>
+        <p:cNvGrpSpPr/>
+        <p:nvPr/>
+      </p:nvGrpSpPr>
+      <p:grpSpPr>
+        <a:xfrm>
+          <a:off x="0" y="0"/>
+          <a:ext cx="0" cy="0"/>
+          <a:chOff x="0" y="0"/>
+          <a:chExt cx="0" cy="0"/>
+        </a:xfrm>
+      </p:grpSpPr>
+      <p:sp>
+        <p:nvSpPr>
+          <p:cNvPr id="2" name="Title 1">
+            <a:extLst>
+              <a:ext uri="{FF2B5EF4-FFF2-40B4-BE49-F238E27FC236}">
+                <a16:creationId xmlns:a16="http://schemas.microsoft.com/office/drawing/2014/main" id="{6900ADE3-7C65-54A7-3FA1-737250C587AD}"/>
+              </a:ext>
+            </a:extLst>
+          </p:cNvPr>
+          <p:cNvSpPr>
+            <a:spLocks noGrp="1"/>
+          </p:cNvSpPr>
+          <p:nvPr>
             <p:ph type="title"/>
           </p:nvPr>
         </p:nvSpPr>
         <p:spPr/>
         <p:txBody>
-          <a:bodyPr/>
+          <a:bodyPr anchor="ctr">
+            <a:normAutofit/>
+          </a:bodyPr>
           <a:lstStyle/>
           <a:p>
-            <a:r>
-              <a:rPr lang="en-US" dirty="0"/>
-              <a:t>Add a Slide Title - 2</a:t>
+            <a:pPr algn="ctr"/>
+            <a:r>
+              <a:rPr lang="en-US" sz="7200" dirty="0">
+                <a:solidFill>
+                  <a:schemeClr val="accent1">
+                    <a:lumMod val="60000"/>
+                    <a:lumOff val="40000"/>
+                  </a:schemeClr>
+                </a:solidFill>
+              </a:rPr>
+              <a:t>Final Budget</a:t>
             </a:r>
           </a:p>
         </p:txBody>
       </p:sp>
       <p:sp>
         <p:nvSpPr>
-          <p:cNvPr id="8" name="Text Placeholder 7"/>
+          <p:cNvPr id="3" name="Content Placeholder 2">
+            <a:extLst>
+              <a:ext uri="{FF2B5EF4-FFF2-40B4-BE49-F238E27FC236}">
+                <a16:creationId xmlns:a16="http://schemas.microsoft.com/office/drawing/2014/main" id="{FBFBBD5D-016D-79DF-1C75-122DFA146159}"/>
+              </a:ext>
+            </a:extLst>
+          </p:cNvPr>
           <p:cNvSpPr>
             <a:spLocks noGrp="1"/>
           </p:cNvSpPr>
           <p:nvPr>
-            <p:ph type="body" idx="1"/>
+            <p:ph sz="half" idx="1"/>
           </p:nvPr>
         </p:nvSpPr>
         <p:spPr/>
         <p:txBody>
-          <a:bodyPr/>
+          <a:bodyPr anchor="ctr">
+            <a:normAutofit fontScale="92500" lnSpcReduction="10000"/>
+          </a:bodyPr>
           <a:lstStyle/>
           <a:p>
-            <a:endParaRPr lang="en-US" dirty="0"/>
+            <a:pPr>
+              <a:buClr>
+                <a:schemeClr val="accent1">
+                  <a:lumMod val="60000"/>
+                  <a:lumOff val="40000"/>
+                </a:schemeClr>
+              </a:buClr>
+            </a:pPr>
+            <a:r>
+              <a:rPr lang="en-US" sz="2000" dirty="0"/>
+              <a:t>Motherboard: </a:t>
+            </a:r>
+          </a:p>
+          <a:p>
+            <a:pPr lvl="1">
+              <a:buClr>
+                <a:schemeClr val="accent1">
+                  <a:lumMod val="60000"/>
+                  <a:lumOff val="40000"/>
+                </a:schemeClr>
+              </a:buClr>
+            </a:pPr>
+            <a:r>
+              <a:rPr lang="en-US" sz="1600" dirty="0"/>
+              <a:t>MSI B550 Tomahawk  		$169.99</a:t>
+            </a:r>
+          </a:p>
+          <a:p>
+            <a:pPr>
+              <a:buClr>
+                <a:schemeClr val="accent1">
+                  <a:lumMod val="60000"/>
+                  <a:lumOff val="40000"/>
+                </a:schemeClr>
+              </a:buClr>
+            </a:pPr>
+            <a:r>
+              <a:rPr lang="en-US" sz="2000" dirty="0"/>
+              <a:t>PC Case: </a:t>
+            </a:r>
+          </a:p>
+          <a:p>
+            <a:pPr lvl="1">
+              <a:buClr>
+                <a:schemeClr val="accent1">
+                  <a:lumMod val="60000"/>
+                  <a:lumOff val="40000"/>
+                </a:schemeClr>
+              </a:buClr>
+            </a:pPr>
+            <a:r>
+              <a:rPr lang="en-US" sz="1600" dirty="0"/>
+              <a:t>Fractal Pop XL Black     		$109.99</a:t>
+            </a:r>
+          </a:p>
+          <a:p>
+            <a:pPr>
+              <a:buClr>
+                <a:schemeClr val="accent1">
+                  <a:lumMod val="60000"/>
+                  <a:lumOff val="40000"/>
+                </a:schemeClr>
+              </a:buClr>
+            </a:pPr>
+            <a:r>
+              <a:rPr lang="en-US" sz="2000" dirty="0"/>
+              <a:t>Processor: </a:t>
+            </a:r>
+          </a:p>
+          <a:p>
+            <a:pPr lvl="1">
+              <a:buClr>
+                <a:schemeClr val="accent1">
+                  <a:lumMod val="60000"/>
+                  <a:lumOff val="40000"/>
+                </a:schemeClr>
+              </a:buClr>
+            </a:pPr>
+            <a:r>
+              <a:rPr lang="en-US" sz="1600" dirty="0"/>
+              <a:t>AMD Ryzen 7 5800x 8-core	$248.00	</a:t>
+            </a:r>
+          </a:p>
+          <a:p>
+            <a:pPr>
+              <a:buClr>
+                <a:schemeClr val="accent1">
+                  <a:lumMod val="60000"/>
+                  <a:lumOff val="40000"/>
+                </a:schemeClr>
+              </a:buClr>
+            </a:pPr>
+            <a:r>
+              <a:rPr lang="en-US" sz="2000" dirty="0"/>
+              <a:t>RAM: </a:t>
+            </a:r>
+          </a:p>
+          <a:p>
+            <a:pPr lvl="1">
+              <a:buClr>
+                <a:schemeClr val="accent1">
+                  <a:lumMod val="60000"/>
+                  <a:lumOff val="40000"/>
+                </a:schemeClr>
+              </a:buClr>
+            </a:pPr>
+            <a:r>
+              <a:rPr lang="en-US" sz="1600" dirty="0"/>
+              <a:t>G.SKILL </a:t>
+            </a:r>
+            <a:r>
+              <a:rPr lang="en-US" sz="1600" dirty="0" err="1"/>
+              <a:t>Ripjaw</a:t>
+            </a:r>
+            <a:r>
+              <a:rPr lang="en-US" sz="1600" dirty="0"/>
+              <a:t> V Series 32 GB                  $89.78</a:t>
+            </a:r>
+          </a:p>
+          <a:p>
+            <a:pPr>
+              <a:buClr>
+                <a:schemeClr val="accent1">
+                  <a:lumMod val="60000"/>
+                  <a:lumOff val="40000"/>
+                </a:schemeClr>
+              </a:buClr>
+            </a:pPr>
+            <a:r>
+              <a:rPr lang="en-US" sz="2000" dirty="0"/>
+              <a:t>Cooling:</a:t>
+            </a:r>
+          </a:p>
+          <a:p>
+            <a:pPr lvl="1">
+              <a:buClr>
+                <a:schemeClr val="accent1">
+                  <a:lumMod val="60000"/>
+                  <a:lumOff val="40000"/>
+                </a:schemeClr>
+              </a:buClr>
+            </a:pPr>
+            <a:r>
+              <a:rPr lang="en-US" sz="1600" dirty="0"/>
+              <a:t>Cooler Master Hyper 212 Black	$54.99</a:t>
+            </a:r>
+          </a:p>
+          <a:p>
+            <a:pPr>
+              <a:buClr>
+                <a:schemeClr val="accent1">
+                  <a:lumMod val="60000"/>
+                  <a:lumOff val="40000"/>
+                </a:schemeClr>
+              </a:buClr>
+            </a:pPr>
+            <a:r>
+              <a:rPr lang="en-US" sz="2000" dirty="0"/>
+              <a:t>Power Supply:</a:t>
+            </a:r>
+          </a:p>
+          <a:p>
+            <a:pPr lvl="1">
+              <a:buClr>
+                <a:schemeClr val="accent1">
+                  <a:lumMod val="60000"/>
+                  <a:lumOff val="40000"/>
+                </a:schemeClr>
+              </a:buClr>
+            </a:pPr>
+            <a:r>
+              <a:rPr lang="en-US" sz="1600" dirty="0"/>
+              <a:t>Corsair RM850 850 Watt	$114.99 </a:t>
+            </a:r>
           </a:p>
         </p:txBody>
       </p:sp>
       <p:sp>
         <p:nvSpPr>
-          <p:cNvPr id="10" name="Content Placeholder 9"/>
+          <p:cNvPr id="4" name="Content Placeholder 3">
+            <a:extLst>
+              <a:ext uri="{FF2B5EF4-FFF2-40B4-BE49-F238E27FC236}">
+                <a16:creationId xmlns:a16="http://schemas.microsoft.com/office/drawing/2014/main" id="{DDA8F52E-ED9B-B5FC-696D-3B7EA43A522D}"/>
+              </a:ext>
+            </a:extLst>
+          </p:cNvPr>
           <p:cNvSpPr>
             <a:spLocks noGrp="1"/>
           </p:cNvSpPr>
@@ -6028,46 +7436,176 @@
         </p:nvSpPr>
         <p:spPr/>
         <p:txBody>
-          <a:bodyPr/>
+          <a:bodyPr anchor="t">
+            <a:normAutofit fontScale="92500" lnSpcReduction="10000"/>
+          </a:bodyPr>
           <a:lstStyle/>
           <a:p>
-            <a:endParaRPr lang="en-US" dirty="0"/>
-          </a:p>
-        </p:txBody>
-      </p:sp>
-      <p:sp>
-        <p:nvSpPr>
-          <p:cNvPr id="9" name="Text Placeholder 8"/>
-          <p:cNvSpPr>
-            <a:spLocks noGrp="1"/>
-          </p:cNvSpPr>
-          <p:nvPr>
-            <p:ph type="body" sz="quarter" idx="3"/>
-          </p:nvPr>
-        </p:nvSpPr>
-        <p:spPr/>
-        <p:txBody>
-          <a:bodyPr/>
-          <a:lstStyle/>
-          <a:p>
-            <a:endParaRPr lang="en-US" dirty="0"/>
-          </a:p>
-        </p:txBody>
-      </p:sp>
-      <p:sp>
-        <p:nvSpPr>
-          <p:cNvPr id="11" name="Content Placeholder 10"/>
-          <p:cNvSpPr>
-            <a:spLocks noGrp="1"/>
-          </p:cNvSpPr>
-          <p:nvPr>
-            <p:ph sz="quarter" idx="4"/>
-          </p:nvPr>
-        </p:nvSpPr>
-        <p:spPr/>
-        <p:txBody>
-          <a:bodyPr/>
-          <a:lstStyle/>
+            <a:pPr>
+              <a:buClr>
+                <a:schemeClr val="accent1">
+                  <a:lumMod val="60000"/>
+                  <a:lumOff val="40000"/>
+                </a:schemeClr>
+              </a:buClr>
+            </a:pPr>
+            <a:r>
+              <a:rPr lang="en-US" sz="2000" dirty="0"/>
+              <a:t>SSD: </a:t>
+            </a:r>
+          </a:p>
+          <a:p>
+            <a:pPr lvl="1">
+              <a:buClr>
+                <a:schemeClr val="accent1">
+                  <a:lumMod val="60000"/>
+                  <a:lumOff val="40000"/>
+                </a:schemeClr>
+              </a:buClr>
+            </a:pPr>
+            <a:r>
+              <a:rPr lang="en-US" sz="1600" dirty="0"/>
+              <a:t>Western Digital Black SN850 500 GB	$69.99</a:t>
+            </a:r>
+          </a:p>
+          <a:p>
+            <a:pPr>
+              <a:buClr>
+                <a:schemeClr val="accent1">
+                  <a:lumMod val="60000"/>
+                  <a:lumOff val="40000"/>
+                </a:schemeClr>
+              </a:buClr>
+            </a:pPr>
+            <a:r>
+              <a:rPr lang="en-US" sz="2000" dirty="0"/>
+              <a:t>HDD: </a:t>
+            </a:r>
+          </a:p>
+          <a:p>
+            <a:pPr lvl="1">
+              <a:buClr>
+                <a:schemeClr val="accent1">
+                  <a:lumMod val="60000"/>
+                  <a:lumOff val="40000"/>
+                </a:schemeClr>
+              </a:buClr>
+            </a:pPr>
+            <a:r>
+              <a:rPr lang="en-US" sz="1600" dirty="0"/>
+              <a:t>Toshiba X300 6 TB 		$144.99</a:t>
+            </a:r>
+          </a:p>
+          <a:p>
+            <a:pPr>
+              <a:buClr>
+                <a:schemeClr val="accent1">
+                  <a:lumMod val="60000"/>
+                  <a:lumOff val="40000"/>
+                </a:schemeClr>
+              </a:buClr>
+            </a:pPr>
+            <a:r>
+              <a:rPr lang="en-US" sz="2000" dirty="0"/>
+              <a:t>Video Card</a:t>
+            </a:r>
+          </a:p>
+          <a:p>
+            <a:pPr lvl="1">
+              <a:buClr>
+                <a:schemeClr val="accent1">
+                  <a:lumMod val="60000"/>
+                  <a:lumOff val="40000"/>
+                </a:schemeClr>
+              </a:buClr>
+            </a:pPr>
+            <a:r>
+              <a:rPr lang="en-US" sz="1600" dirty="0"/>
+              <a:t>GIGABYTE Radeon RX 6600	$219.99</a:t>
+            </a:r>
+          </a:p>
+          <a:p>
+            <a:pPr>
+              <a:buClr>
+                <a:schemeClr val="accent1">
+                  <a:lumMod val="60000"/>
+                  <a:lumOff val="40000"/>
+                </a:schemeClr>
+              </a:buClr>
+            </a:pPr>
+            <a:r>
+              <a:rPr lang="en-US" sz="2000" dirty="0"/>
+              <a:t>Monitor</a:t>
+            </a:r>
+          </a:p>
+          <a:p>
+            <a:pPr lvl="1">
+              <a:buClr>
+                <a:schemeClr val="accent1">
+                  <a:lumMod val="60000"/>
+                  <a:lumOff val="40000"/>
+                </a:schemeClr>
+              </a:buClr>
+            </a:pPr>
+            <a:r>
+              <a:rPr lang="en-US" sz="1600" dirty="0"/>
+              <a:t>2x MSI </a:t>
+            </a:r>
+            <a:r>
+              <a:rPr lang="en-US" sz="1600" dirty="0" err="1"/>
+              <a:t>Optix</a:t>
+            </a:r>
+            <a:r>
+              <a:rPr lang="en-US" sz="1600" dirty="0"/>
+              <a:t> 27” Curved	$399.98</a:t>
+            </a:r>
+          </a:p>
+          <a:p>
+            <a:pPr>
+              <a:buClr>
+                <a:schemeClr val="accent1">
+                  <a:lumMod val="60000"/>
+                  <a:lumOff val="40000"/>
+                </a:schemeClr>
+              </a:buClr>
+            </a:pPr>
+            <a:r>
+              <a:rPr lang="en-US" sz="2000" dirty="0"/>
+              <a:t>OS &amp; Additional Software: 	FREE</a:t>
+            </a:r>
+          </a:p>
+          <a:p>
+            <a:pPr marL="0" indent="0">
+              <a:buClr>
+                <a:schemeClr val="accent1">
+                  <a:lumMod val="60000"/>
+                  <a:lumOff val="40000"/>
+                </a:schemeClr>
+              </a:buClr>
+              <a:buNone/>
+            </a:pPr>
+            <a:endParaRPr lang="en-US" sz="3000" dirty="0"/>
+          </a:p>
+          <a:p>
+            <a:pPr marL="0" indent="0">
+              <a:buClr>
+                <a:schemeClr val="accent1">
+                  <a:lumMod val="60000"/>
+                  <a:lumOff val="40000"/>
+                </a:schemeClr>
+              </a:buClr>
+              <a:buNone/>
+            </a:pPr>
+            <a:r>
+              <a:rPr lang="en-US" sz="3000" dirty="0"/>
+              <a:t>Subtotal		          </a:t>
+            </a:r>
+            <a:r>
+              <a:rPr lang="en-US" sz="3000"/>
+              <a:t>$1622.69</a:t>
+            </a:r>
+            <a:endParaRPr lang="en-US" sz="3000" dirty="0"/>
+          </a:p>
           <a:p>
             <a:endParaRPr lang="en-US" dirty="0"/>
           </a:p>
@@ -6076,7 +7614,123 @@
     </p:spTree>
     <p:extLst>
       <p:ext uri="{BB962C8B-B14F-4D97-AF65-F5344CB8AC3E}">
-        <p14:creationId xmlns:p14="http://schemas.microsoft.com/office/powerpoint/2010/main" val="2672039197"/>
+        <p14:creationId xmlns:p14="http://schemas.microsoft.com/office/powerpoint/2010/main" val="1382052635"/>
+      </p:ext>
+    </p:extLst>
+  </p:cSld>
+  <p:clrMapOvr>
+    <a:masterClrMapping/>
+  </p:clrMapOvr>
+  <mc:AlternateContent xmlns:mc="http://schemas.openxmlformats.org/markup-compatibility/2006" xmlns:p14="http://schemas.microsoft.com/office/powerpoint/2010/main">
+    <mc:Choice Requires="p14">
+      <p:transition spd="med" p14:dur="700">
+        <p:fade/>
+      </p:transition>
+    </mc:Choice>
+    <mc:Fallback xmlns="">
+      <p:transition spd="med">
+        <p:fade/>
+      </p:transition>
+    </mc:Fallback>
+  </mc:AlternateContent>
+</p:sld>
+</file>
+
+<file path=ppt/slides/slide16.xml><?xml version="1.0" encoding="utf-8"?>
+<p:sld xmlns:a="http://schemas.openxmlformats.org/drawingml/2006/main" xmlns:r="http://schemas.openxmlformats.org/officeDocument/2006/relationships" xmlns:p="http://schemas.openxmlformats.org/presentationml/2006/main">
+  <p:cSld>
+    <p:spTree>
+      <p:nvGrpSpPr>
+        <p:cNvPr id="1" name=""/>
+        <p:cNvGrpSpPr/>
+        <p:nvPr/>
+      </p:nvGrpSpPr>
+      <p:grpSpPr>
+        <a:xfrm>
+          <a:off x="0" y="0"/>
+          <a:ext cx="0" cy="0"/>
+          <a:chOff x="0" y="0"/>
+          <a:chExt cx="0" cy="0"/>
+        </a:xfrm>
+      </p:grpSpPr>
+      <p:sp>
+        <p:nvSpPr>
+          <p:cNvPr id="2" name="Title 1">
+            <a:extLst>
+              <a:ext uri="{FF2B5EF4-FFF2-40B4-BE49-F238E27FC236}">
+                <a16:creationId xmlns:a16="http://schemas.microsoft.com/office/drawing/2014/main" id="{63DC8C4B-1474-10E6-DDBE-91F17072B77D}"/>
+              </a:ext>
+            </a:extLst>
+          </p:cNvPr>
+          <p:cNvSpPr>
+            <a:spLocks noGrp="1"/>
+          </p:cNvSpPr>
+          <p:nvPr>
+            <p:ph type="ctrTitle"/>
+          </p:nvPr>
+        </p:nvSpPr>
+        <p:spPr>
+          <a:xfrm>
+            <a:off x="836612" y="152400"/>
+            <a:ext cx="3631036" cy="863600"/>
+          </a:xfrm>
+        </p:spPr>
+        <p:txBody>
+          <a:bodyPr anchor="t">
+            <a:normAutofit/>
+          </a:bodyPr>
+          <a:lstStyle/>
+          <a:p>
+            <a:r>
+              <a:rPr lang="en-US" dirty="0">
+                <a:solidFill>
+                  <a:schemeClr val="accent1">
+                    <a:lumMod val="40000"/>
+                    <a:lumOff val="60000"/>
+                  </a:schemeClr>
+                </a:solidFill>
+              </a:rPr>
+              <a:t>Conclusion:</a:t>
+            </a:r>
+          </a:p>
+        </p:txBody>
+      </p:sp>
+      <p:sp>
+        <p:nvSpPr>
+          <p:cNvPr id="3" name="Subtitle 2">
+            <a:extLst>
+              <a:ext uri="{FF2B5EF4-FFF2-40B4-BE49-F238E27FC236}">
+                <a16:creationId xmlns:a16="http://schemas.microsoft.com/office/drawing/2014/main" id="{B58FD68F-7D06-549F-4349-F5955DB66F4B}"/>
+              </a:ext>
+            </a:extLst>
+          </p:cNvPr>
+          <p:cNvSpPr>
+            <a:spLocks noGrp="1"/>
+          </p:cNvSpPr>
+          <p:nvPr>
+            <p:ph type="subTitle" idx="1"/>
+          </p:nvPr>
+        </p:nvSpPr>
+        <p:spPr>
+          <a:xfrm>
+            <a:off x="867681" y="1016000"/>
+            <a:ext cx="11094131" cy="5461000"/>
+          </a:xfrm>
+        </p:spPr>
+        <p:txBody>
+          <a:bodyPr>
+            <a:normAutofit/>
+          </a:bodyPr>
+          <a:lstStyle/>
+          <a:p>
+            <a:endParaRPr lang="en-US" sz="1600" dirty="0"/>
+          </a:p>
+        </p:txBody>
+      </p:sp>
+    </p:spTree>
+    <p:extLst>
+      <p:ext uri="{BB962C8B-B14F-4D97-AF65-F5344CB8AC3E}">
+        <p14:creationId xmlns:p14="http://schemas.microsoft.com/office/powerpoint/2010/main" val="3370777222"/>
       </p:ext>
     </p:extLst>
   </p:cSld>
@@ -7139,13 +8793,13 @@
   <p:clrMapOvr>
     <a:masterClrMapping/>
   </p:clrMapOvr>
-  <mc:AlternateContent xmlns:mc="http://schemas.openxmlformats.org/markup-compatibility/2006">
-    <mc:Choice xmlns:p14="http://schemas.microsoft.com/office/powerpoint/2010/main" Requires="p14">
+  <mc:AlternateContent xmlns:mc="http://schemas.openxmlformats.org/markup-compatibility/2006" xmlns:p14="http://schemas.microsoft.com/office/powerpoint/2010/main">
+    <mc:Choice Requires="p14">
       <p:transition spd="med" p14:dur="700">
         <p:fade/>
       </p:transition>
     </mc:Choice>
-    <mc:Fallback>
+    <mc:Fallback xmlns="">
       <p:transition spd="med">
         <p:fade/>
       </p:transition>
@@ -7406,13 +9060,13 @@
   <p:clrMapOvr>
     <a:masterClrMapping/>
   </p:clrMapOvr>
-  <mc:AlternateContent xmlns:mc="http://schemas.openxmlformats.org/markup-compatibility/2006">
-    <mc:Choice xmlns:p14="http://schemas.microsoft.com/office/powerpoint/2010/main" Requires="p14">
+  <mc:AlternateContent xmlns:mc="http://schemas.openxmlformats.org/markup-compatibility/2006" xmlns:p14="http://schemas.microsoft.com/office/powerpoint/2010/main">
+    <mc:Choice Requires="p14">
       <p:transition spd="med" p14:dur="700">
         <p:fade/>
       </p:transition>
     </mc:Choice>
-    <mc:Fallback>
+    <mc:Fallback xmlns="">
       <p:transition spd="med">
         <p:fade/>
       </p:transition>
@@ -7612,13 +9266,13 @@
   <p:clrMapOvr>
     <a:masterClrMapping/>
   </p:clrMapOvr>
-  <mc:AlternateContent xmlns:mc="http://schemas.openxmlformats.org/markup-compatibility/2006">
-    <mc:Choice xmlns:p14="http://schemas.microsoft.com/office/powerpoint/2010/main" Requires="p14">
+  <mc:AlternateContent xmlns:mc="http://schemas.openxmlformats.org/markup-compatibility/2006" xmlns:p14="http://schemas.microsoft.com/office/powerpoint/2010/main">
+    <mc:Choice Requires="p14">
       <p:transition spd="med" p14:dur="700">
         <p:fade/>
       </p:transition>
     </mc:Choice>
-    <mc:Fallback>
+    <mc:Fallback xmlns="">
       <p:transition spd="med">
         <p:fade/>
       </p:transition>
@@ -7857,13 +9511,13 @@
   <p:clrMapOvr>
     <a:masterClrMapping/>
   </p:clrMapOvr>
-  <mc:AlternateContent xmlns:mc="http://schemas.openxmlformats.org/markup-compatibility/2006">
-    <mc:Choice xmlns:p14="http://schemas.microsoft.com/office/powerpoint/2010/main" Requires="p14">
+  <mc:AlternateContent xmlns:mc="http://schemas.openxmlformats.org/markup-compatibility/2006" xmlns:p14="http://schemas.microsoft.com/office/powerpoint/2010/main">
+    <mc:Choice Requires="p14">
       <p:transition spd="med" p14:dur="700">
         <p:fade/>
       </p:transition>
     </mc:Choice>
-    <mc:Fallback>
+    <mc:Fallback xmlns="">
       <p:transition spd="med">
         <p:fade/>
       </p:transition>
@@ -8823,6 +10477,142 @@
 </file>
 
 <file path=customXml/item1.xml><?xml version="1.0" encoding="utf-8"?>
+<p:properties xmlns:p="http://schemas.microsoft.com/office/2006/metadata/properties" xmlns:xsi="http://www.w3.org/2001/XMLSchema-instance" xmlns:pc="http://schemas.microsoft.com/office/infopath/2007/PartnerControls">
+  <documentManagement>
+    <LocPublishedLinkedAssetsLookup xmlns="4873beb7-5857-4685-be1f-d57550cc96cc" xsi:nil="true"/>
+    <ApprovalStatus xmlns="4873beb7-5857-4685-be1f-d57550cc96cc">InProgress</ApprovalStatus>
+    <MarketSpecific xmlns="4873beb7-5857-4685-be1f-d57550cc96cc">false</MarketSpecific>
+    <LocComments xmlns="4873beb7-5857-4685-be1f-d57550cc96cc" xsi:nil="true"/>
+    <LocLastLocAttemptVersionTypeLookup xmlns="4873beb7-5857-4685-be1f-d57550cc96cc" xsi:nil="true"/>
+    <DirectSourceMarket xmlns="4873beb7-5857-4685-be1f-d57550cc96cc" xsi:nil="true"/>
+    <ThumbnailAssetId xmlns="4873beb7-5857-4685-be1f-d57550cc96cc" xsi:nil="true"/>
+    <PrimaryImageGen xmlns="4873beb7-5857-4685-be1f-d57550cc96cc">false</PrimaryImageGen>
+    <LocNewPublishedVersionLookup xmlns="4873beb7-5857-4685-be1f-d57550cc96cc" xsi:nil="true"/>
+    <LegacyData xmlns="4873beb7-5857-4685-be1f-d57550cc96cc" xsi:nil="true"/>
+    <LocRecommendedHandoff xmlns="4873beb7-5857-4685-be1f-d57550cc96cc" xsi:nil="true"/>
+    <BusinessGroup xmlns="4873beb7-5857-4685-be1f-d57550cc96cc" xsi:nil="true"/>
+    <BlockPublish xmlns="4873beb7-5857-4685-be1f-d57550cc96cc">false</BlockPublish>
+    <TPFriendlyName xmlns="4873beb7-5857-4685-be1f-d57550cc96cc" xsi:nil="true"/>
+    <LocOverallPublishStatusLookup xmlns="4873beb7-5857-4685-be1f-d57550cc96cc" xsi:nil="true"/>
+    <NumericId xmlns="4873beb7-5857-4685-be1f-d57550cc96cc" xsi:nil="true"/>
+    <APEditor xmlns="4873beb7-5857-4685-be1f-d57550cc96cc">
+      <UserInfo>
+        <DisplayName/>
+        <AccountId xsi:nil="true"/>
+        <AccountType/>
+      </UserInfo>
+    </APEditor>
+    <SourceTitle xmlns="4873beb7-5857-4685-be1f-d57550cc96cc" xsi:nil="true"/>
+    <OpenTemplate xmlns="4873beb7-5857-4685-be1f-d57550cc96cc">true</OpenTemplate>
+    <LocOverallLocStatusLookup xmlns="4873beb7-5857-4685-be1f-d57550cc96cc" xsi:nil="true"/>
+    <UALocComments xmlns="4873beb7-5857-4685-be1f-d57550cc96cc" xsi:nil="true"/>
+    <ParentAssetId xmlns="4873beb7-5857-4685-be1f-d57550cc96cc" xsi:nil="true"/>
+    <IntlLangReviewDate xmlns="4873beb7-5857-4685-be1f-d57550cc96cc" xsi:nil="true"/>
+    <FeatureTagsTaxHTField0 xmlns="4873beb7-5857-4685-be1f-d57550cc96cc">
+      <Terms xmlns="http://schemas.microsoft.com/office/infopath/2007/PartnerControls"/>
+    </FeatureTagsTaxHTField0>
+    <PublishStatusLookup xmlns="4873beb7-5857-4685-be1f-d57550cc96cc">
+      <Value>1345093</Value>
+    </PublishStatusLookup>
+    <Providers xmlns="4873beb7-5857-4685-be1f-d57550cc96cc" xsi:nil="true"/>
+    <MachineTranslated xmlns="4873beb7-5857-4685-be1f-d57550cc96cc">false</MachineTranslated>
+    <OriginalSourceMarket xmlns="4873beb7-5857-4685-be1f-d57550cc96cc" xsi:nil="true"/>
+    <APDescription xmlns="4873beb7-5857-4685-be1f-d57550cc96cc">This simple template design works for technology and  businesses, but it's versatile enough to use in other contexts.  It features multiple slide layouts designed for widescreen (16x9 resolution) and includes a sample SmartArt list and chart that are easily editable.</APDescription>
+    <ClipArtFilename xmlns="4873beb7-5857-4685-be1f-d57550cc96cc" xsi:nil="true"/>
+    <ContentItem xmlns="4873beb7-5857-4685-be1f-d57550cc96cc" xsi:nil="true"/>
+    <TPInstallLocation xmlns="4873beb7-5857-4685-be1f-d57550cc96cc" xsi:nil="true"/>
+    <PublishTargets xmlns="4873beb7-5857-4685-be1f-d57550cc96cc">OfficeOnlineVNext</PublishTargets>
+    <TimesCloned xmlns="4873beb7-5857-4685-be1f-d57550cc96cc" xsi:nil="true"/>
+    <AssetStart xmlns="4873beb7-5857-4685-be1f-d57550cc96cc">2011-11-26T00:30:00+00:00</AssetStart>
+    <Provider xmlns="4873beb7-5857-4685-be1f-d57550cc96cc" xsi:nil="true"/>
+    <AcquiredFrom xmlns="4873beb7-5857-4685-be1f-d57550cc96cc">Internal MS</AcquiredFrom>
+    <FriendlyTitle xmlns="4873beb7-5857-4685-be1f-d57550cc96cc" xsi:nil="true"/>
+    <LastHandOff xmlns="4873beb7-5857-4685-be1f-d57550cc96cc" xsi:nil="true"/>
+    <TPClientViewer xmlns="4873beb7-5857-4685-be1f-d57550cc96cc" xsi:nil="true"/>
+    <TemplateStatus xmlns="4873beb7-5857-4685-be1f-d57550cc96cc">Complete</TemplateStatus>
+    <Downloads xmlns="4873beb7-5857-4685-be1f-d57550cc96cc">0</Downloads>
+    <OOCacheId xmlns="4873beb7-5857-4685-be1f-d57550cc96cc" xsi:nil="true"/>
+    <IsDeleted xmlns="4873beb7-5857-4685-be1f-d57550cc96cc">false</IsDeleted>
+    <LocPublishedDependentAssetsLookup xmlns="4873beb7-5857-4685-be1f-d57550cc96cc" xsi:nil="true"/>
+    <TPExecutable xmlns="4873beb7-5857-4685-be1f-d57550cc96cc" xsi:nil="true"/>
+    <EditorialTags xmlns="4873beb7-5857-4685-be1f-d57550cc96cc" xsi:nil="true"/>
+    <SubmitterId xmlns="4873beb7-5857-4685-be1f-d57550cc96cc" xsi:nil="true"/>
+    <ApprovalLog xmlns="4873beb7-5857-4685-be1f-d57550cc96cc" xsi:nil="true"/>
+    <AssetType xmlns="4873beb7-5857-4685-be1f-d57550cc96cc">TP</AssetType>
+    <BugNumber xmlns="4873beb7-5857-4685-be1f-d57550cc96cc" xsi:nil="true"/>
+    <CSXSubmissionDate xmlns="4873beb7-5857-4685-be1f-d57550cc96cc" xsi:nil="true"/>
+    <CSXUpdate xmlns="4873beb7-5857-4685-be1f-d57550cc96cc">false</CSXUpdate>
+    <Milestone xmlns="4873beb7-5857-4685-be1f-d57550cc96cc" xsi:nil="true"/>
+    <RecommendationsModifier xmlns="4873beb7-5857-4685-be1f-d57550cc96cc" xsi:nil="true"/>
+    <OriginAsset xmlns="4873beb7-5857-4685-be1f-d57550cc96cc" xsi:nil="true"/>
+    <TPComponent xmlns="4873beb7-5857-4685-be1f-d57550cc96cc" xsi:nil="true"/>
+    <AssetId xmlns="4873beb7-5857-4685-be1f-d57550cc96cc">TP102787989</AssetId>
+    <IntlLocPriority xmlns="4873beb7-5857-4685-be1f-d57550cc96cc" xsi:nil="true"/>
+    <PolicheckWords xmlns="4873beb7-5857-4685-be1f-d57550cc96cc" xsi:nil="true"/>
+    <TPLaunchHelpLink xmlns="4873beb7-5857-4685-be1f-d57550cc96cc" xsi:nil="true"/>
+    <TPApplication xmlns="4873beb7-5857-4685-be1f-d57550cc96cc" xsi:nil="true"/>
+    <CrawlForDependencies xmlns="4873beb7-5857-4685-be1f-d57550cc96cc">false</CrawlForDependencies>
+    <HandoffToMSDN xmlns="4873beb7-5857-4685-be1f-d57550cc96cc" xsi:nil="true"/>
+    <PlannedPubDate xmlns="4873beb7-5857-4685-be1f-d57550cc96cc" xsi:nil="true"/>
+    <IntlLangReviewer xmlns="4873beb7-5857-4685-be1f-d57550cc96cc" xsi:nil="true"/>
+    <TrustLevel xmlns="4873beb7-5857-4685-be1f-d57550cc96cc">1 Microsoft Managed Content</TrustLevel>
+    <LocLastLocAttemptVersionLookup xmlns="4873beb7-5857-4685-be1f-d57550cc96cc">694266</LocLastLocAttemptVersionLookup>
+    <LocProcessedForHandoffsLookup xmlns="4873beb7-5857-4685-be1f-d57550cc96cc" xsi:nil="true"/>
+    <IsSearchable xmlns="4873beb7-5857-4685-be1f-d57550cc96cc">true</IsSearchable>
+    <TemplateTemplateType xmlns="4873beb7-5857-4685-be1f-d57550cc96cc">PowerPoint Presentation Template</TemplateTemplateType>
+    <CampaignTagsTaxHTField0 xmlns="4873beb7-5857-4685-be1f-d57550cc96cc">
+      <Terms xmlns="http://schemas.microsoft.com/office/infopath/2007/PartnerControls"/>
+    </CampaignTagsTaxHTField0>
+    <TPNamespace xmlns="4873beb7-5857-4685-be1f-d57550cc96cc" xsi:nil="true"/>
+    <LocOverallPreviewStatusLookup xmlns="4873beb7-5857-4685-be1f-d57550cc96cc" xsi:nil="true"/>
+    <TaxCatchAll xmlns="4873beb7-5857-4685-be1f-d57550cc96cc"/>
+    <Markets xmlns="4873beb7-5857-4685-be1f-d57550cc96cc"/>
+    <UAProjectedTotalWords xmlns="4873beb7-5857-4685-be1f-d57550cc96cc" xsi:nil="true"/>
+    <IntlLangReview xmlns="4873beb7-5857-4685-be1f-d57550cc96cc" xsi:nil="true"/>
+    <OutputCachingOn xmlns="4873beb7-5857-4685-be1f-d57550cc96cc">false</OutputCachingOn>
+    <AverageRating xmlns="4873beb7-5857-4685-be1f-d57550cc96cc" xsi:nil="true"/>
+    <APAuthor xmlns="4873beb7-5857-4685-be1f-d57550cc96cc">
+      <UserInfo>
+        <DisplayName>REDMOND\kristaa</DisplayName>
+        <AccountId>136</AccountId>
+        <AccountType/>
+      </UserInfo>
+    </APAuthor>
+    <LocManualTestRequired xmlns="4873beb7-5857-4685-be1f-d57550cc96cc">false</LocManualTestRequired>
+    <TPCommandLine xmlns="4873beb7-5857-4685-be1f-d57550cc96cc" xsi:nil="true"/>
+    <TPAppVersion xmlns="4873beb7-5857-4685-be1f-d57550cc96cc" xsi:nil="true"/>
+    <EditorialStatus xmlns="4873beb7-5857-4685-be1f-d57550cc96cc">Complete</EditorialStatus>
+    <LastModifiedDateTime xmlns="4873beb7-5857-4685-be1f-d57550cc96cc" xsi:nil="true"/>
+    <ScenarioTagsTaxHTField0 xmlns="4873beb7-5857-4685-be1f-d57550cc96cc">
+      <Terms xmlns="http://schemas.microsoft.com/office/infopath/2007/PartnerControls"/>
+    </ScenarioTagsTaxHTField0>
+    <LocProcessedForMarketsLookup xmlns="4873beb7-5857-4685-be1f-d57550cc96cc" xsi:nil="true"/>
+    <TPLaunchHelpLinkType xmlns="4873beb7-5857-4685-be1f-d57550cc96cc">Template</TPLaunchHelpLinkType>
+    <OriginalRelease xmlns="4873beb7-5857-4685-be1f-d57550cc96cc">15</OriginalRelease>
+    <LocalizationTagsTaxHTField0 xmlns="4873beb7-5857-4685-be1f-d57550cc96cc">
+      <Terms xmlns="http://schemas.microsoft.com/office/infopath/2007/PartnerControls"/>
+    </LocalizationTagsTaxHTField0>
+    <UACurrentWords xmlns="4873beb7-5857-4685-be1f-d57550cc96cc" xsi:nil="true"/>
+    <ArtSampleDocs xmlns="4873beb7-5857-4685-be1f-d57550cc96cc" xsi:nil="true"/>
+    <UALocRecommendation xmlns="4873beb7-5857-4685-be1f-d57550cc96cc">Localize</UALocRecommendation>
+    <Manager xmlns="4873beb7-5857-4685-be1f-d57550cc96cc" xsi:nil="true"/>
+    <LocOverallHandbackStatusLookup xmlns="4873beb7-5857-4685-be1f-d57550cc96cc" xsi:nil="true"/>
+    <ShowIn xmlns="4873beb7-5857-4685-be1f-d57550cc96cc">Show everywhere</ShowIn>
+    <UANotes xmlns="4873beb7-5857-4685-be1f-d57550cc96cc" xsi:nil="true"/>
+    <InternalTagsTaxHTField0 xmlns="4873beb7-5857-4685-be1f-d57550cc96cc">
+      <Terms xmlns="http://schemas.microsoft.com/office/infopath/2007/PartnerControls"/>
+    </InternalTagsTaxHTField0>
+    <CSXHash xmlns="4873beb7-5857-4685-be1f-d57550cc96cc" xsi:nil="true"/>
+    <VoteCount xmlns="4873beb7-5857-4685-be1f-d57550cc96cc" xsi:nil="true"/>
+    <AssetExpire xmlns="4873beb7-5857-4685-be1f-d57550cc96cc">2029-05-12T07:00:00+00:00</AssetExpire>
+    <DSATActionTaken xmlns="4873beb7-5857-4685-be1f-d57550cc96cc" xsi:nil="true"/>
+    <CSXSubmissionMarket xmlns="4873beb7-5857-4685-be1f-d57550cc96cc" xsi:nil="true"/>
+    <LocMarketGroupTiers2 xmlns="4873beb7-5857-4685-be1f-d57550cc96cc" xsi:nil="true"/>
+  </documentManagement>
+</p:properties>
+</file>
+
+<file path=customXml/item2.xml><?xml version="1.0" encoding="utf-8"?>
 <ct:contentTypeSchema xmlns:ct="http://schemas.microsoft.com/office/2006/metadata/contentType" xmlns:ma="http://schemas.microsoft.com/office/2006/metadata/properties/metaAttributes" ct:_="" ma:_="" ma:contentTypeName="TemplateFile" ma:contentTypeID="0x0101006EDDDB5EE6D98C44930B742096920B300400F5B6D36B3EF94B4E9A635CDF2A18F5B8" ma:contentTypeVersion="72" ma:contentTypeDescription="Create a new document." ma:contentTypeScope="" ma:versionID="a23e56308344d904b51738559c3d67c9">
   <xsd:schema xmlns:xsd="http://www.w3.org/2001/XMLSchema" xmlns:xs="http://www.w3.org/2001/XMLSchema" xmlns:p="http://schemas.microsoft.com/office/2006/metadata/properties" xmlns:ns2="4873beb7-5857-4685-be1f-d57550cc96cc" targetNamespace="http://schemas.microsoft.com/office/2006/metadata/properties" ma:root="true" ma:fieldsID="cd0908cc4600e77bf5da051303e00c8d" ns2:_="">
     <xsd:import namespace="4873beb7-5857-4685-be1f-d57550cc96cc"/>
@@ -9862,142 +11652,6 @@
 </ct:contentTypeSchema>
 </file>
 
-<file path=customXml/item2.xml><?xml version="1.0" encoding="utf-8"?>
-<p:properties xmlns:p="http://schemas.microsoft.com/office/2006/metadata/properties" xmlns:xsi="http://www.w3.org/2001/XMLSchema-instance" xmlns:pc="http://schemas.microsoft.com/office/infopath/2007/PartnerControls">
-  <documentManagement>
-    <LocPublishedLinkedAssetsLookup xmlns="4873beb7-5857-4685-be1f-d57550cc96cc" xsi:nil="true"/>
-    <ApprovalStatus xmlns="4873beb7-5857-4685-be1f-d57550cc96cc">InProgress</ApprovalStatus>
-    <MarketSpecific xmlns="4873beb7-5857-4685-be1f-d57550cc96cc">false</MarketSpecific>
-    <LocComments xmlns="4873beb7-5857-4685-be1f-d57550cc96cc" xsi:nil="true"/>
-    <LocLastLocAttemptVersionTypeLookup xmlns="4873beb7-5857-4685-be1f-d57550cc96cc" xsi:nil="true"/>
-    <DirectSourceMarket xmlns="4873beb7-5857-4685-be1f-d57550cc96cc" xsi:nil="true"/>
-    <ThumbnailAssetId xmlns="4873beb7-5857-4685-be1f-d57550cc96cc" xsi:nil="true"/>
-    <PrimaryImageGen xmlns="4873beb7-5857-4685-be1f-d57550cc96cc">false</PrimaryImageGen>
-    <LocNewPublishedVersionLookup xmlns="4873beb7-5857-4685-be1f-d57550cc96cc" xsi:nil="true"/>
-    <LegacyData xmlns="4873beb7-5857-4685-be1f-d57550cc96cc" xsi:nil="true"/>
-    <LocRecommendedHandoff xmlns="4873beb7-5857-4685-be1f-d57550cc96cc" xsi:nil="true"/>
-    <BusinessGroup xmlns="4873beb7-5857-4685-be1f-d57550cc96cc" xsi:nil="true"/>
-    <BlockPublish xmlns="4873beb7-5857-4685-be1f-d57550cc96cc">false</BlockPublish>
-    <TPFriendlyName xmlns="4873beb7-5857-4685-be1f-d57550cc96cc" xsi:nil="true"/>
-    <LocOverallPublishStatusLookup xmlns="4873beb7-5857-4685-be1f-d57550cc96cc" xsi:nil="true"/>
-    <NumericId xmlns="4873beb7-5857-4685-be1f-d57550cc96cc" xsi:nil="true"/>
-    <APEditor xmlns="4873beb7-5857-4685-be1f-d57550cc96cc">
-      <UserInfo>
-        <DisplayName/>
-        <AccountId xsi:nil="true"/>
-        <AccountType/>
-      </UserInfo>
-    </APEditor>
-    <SourceTitle xmlns="4873beb7-5857-4685-be1f-d57550cc96cc" xsi:nil="true"/>
-    <OpenTemplate xmlns="4873beb7-5857-4685-be1f-d57550cc96cc">true</OpenTemplate>
-    <LocOverallLocStatusLookup xmlns="4873beb7-5857-4685-be1f-d57550cc96cc" xsi:nil="true"/>
-    <UALocComments xmlns="4873beb7-5857-4685-be1f-d57550cc96cc" xsi:nil="true"/>
-    <ParentAssetId xmlns="4873beb7-5857-4685-be1f-d57550cc96cc" xsi:nil="true"/>
-    <IntlLangReviewDate xmlns="4873beb7-5857-4685-be1f-d57550cc96cc" xsi:nil="true"/>
-    <FeatureTagsTaxHTField0 xmlns="4873beb7-5857-4685-be1f-d57550cc96cc">
-      <Terms xmlns="http://schemas.microsoft.com/office/infopath/2007/PartnerControls"/>
-    </FeatureTagsTaxHTField0>
-    <PublishStatusLookup xmlns="4873beb7-5857-4685-be1f-d57550cc96cc">
-      <Value>1345093</Value>
-    </PublishStatusLookup>
-    <Providers xmlns="4873beb7-5857-4685-be1f-d57550cc96cc" xsi:nil="true"/>
-    <MachineTranslated xmlns="4873beb7-5857-4685-be1f-d57550cc96cc">false</MachineTranslated>
-    <OriginalSourceMarket xmlns="4873beb7-5857-4685-be1f-d57550cc96cc" xsi:nil="true"/>
-    <APDescription xmlns="4873beb7-5857-4685-be1f-d57550cc96cc">This simple template design works for technology and  businesses, but it's versatile enough to use in other contexts.  It features multiple slide layouts designed for widescreen (16x9 resolution) and includes a sample SmartArt list and chart that are easily editable.</APDescription>
-    <ClipArtFilename xmlns="4873beb7-5857-4685-be1f-d57550cc96cc" xsi:nil="true"/>
-    <ContentItem xmlns="4873beb7-5857-4685-be1f-d57550cc96cc" xsi:nil="true"/>
-    <TPInstallLocation xmlns="4873beb7-5857-4685-be1f-d57550cc96cc" xsi:nil="true"/>
-    <PublishTargets xmlns="4873beb7-5857-4685-be1f-d57550cc96cc">OfficeOnlineVNext</PublishTargets>
-    <TimesCloned xmlns="4873beb7-5857-4685-be1f-d57550cc96cc" xsi:nil="true"/>
-    <AssetStart xmlns="4873beb7-5857-4685-be1f-d57550cc96cc">2011-11-26T00:30:00+00:00</AssetStart>
-    <Provider xmlns="4873beb7-5857-4685-be1f-d57550cc96cc" xsi:nil="true"/>
-    <AcquiredFrom xmlns="4873beb7-5857-4685-be1f-d57550cc96cc">Internal MS</AcquiredFrom>
-    <FriendlyTitle xmlns="4873beb7-5857-4685-be1f-d57550cc96cc" xsi:nil="true"/>
-    <LastHandOff xmlns="4873beb7-5857-4685-be1f-d57550cc96cc" xsi:nil="true"/>
-    <TPClientViewer xmlns="4873beb7-5857-4685-be1f-d57550cc96cc" xsi:nil="true"/>
-    <TemplateStatus xmlns="4873beb7-5857-4685-be1f-d57550cc96cc">Complete</TemplateStatus>
-    <Downloads xmlns="4873beb7-5857-4685-be1f-d57550cc96cc">0</Downloads>
-    <OOCacheId xmlns="4873beb7-5857-4685-be1f-d57550cc96cc" xsi:nil="true"/>
-    <IsDeleted xmlns="4873beb7-5857-4685-be1f-d57550cc96cc">false</IsDeleted>
-    <LocPublishedDependentAssetsLookup xmlns="4873beb7-5857-4685-be1f-d57550cc96cc" xsi:nil="true"/>
-    <TPExecutable xmlns="4873beb7-5857-4685-be1f-d57550cc96cc" xsi:nil="true"/>
-    <EditorialTags xmlns="4873beb7-5857-4685-be1f-d57550cc96cc" xsi:nil="true"/>
-    <SubmitterId xmlns="4873beb7-5857-4685-be1f-d57550cc96cc" xsi:nil="true"/>
-    <ApprovalLog xmlns="4873beb7-5857-4685-be1f-d57550cc96cc" xsi:nil="true"/>
-    <AssetType xmlns="4873beb7-5857-4685-be1f-d57550cc96cc">TP</AssetType>
-    <BugNumber xmlns="4873beb7-5857-4685-be1f-d57550cc96cc" xsi:nil="true"/>
-    <CSXSubmissionDate xmlns="4873beb7-5857-4685-be1f-d57550cc96cc" xsi:nil="true"/>
-    <CSXUpdate xmlns="4873beb7-5857-4685-be1f-d57550cc96cc">false</CSXUpdate>
-    <Milestone xmlns="4873beb7-5857-4685-be1f-d57550cc96cc" xsi:nil="true"/>
-    <RecommendationsModifier xmlns="4873beb7-5857-4685-be1f-d57550cc96cc" xsi:nil="true"/>
-    <OriginAsset xmlns="4873beb7-5857-4685-be1f-d57550cc96cc" xsi:nil="true"/>
-    <TPComponent xmlns="4873beb7-5857-4685-be1f-d57550cc96cc" xsi:nil="true"/>
-    <AssetId xmlns="4873beb7-5857-4685-be1f-d57550cc96cc">TP102787989</AssetId>
-    <IntlLocPriority xmlns="4873beb7-5857-4685-be1f-d57550cc96cc" xsi:nil="true"/>
-    <PolicheckWords xmlns="4873beb7-5857-4685-be1f-d57550cc96cc" xsi:nil="true"/>
-    <TPLaunchHelpLink xmlns="4873beb7-5857-4685-be1f-d57550cc96cc" xsi:nil="true"/>
-    <TPApplication xmlns="4873beb7-5857-4685-be1f-d57550cc96cc" xsi:nil="true"/>
-    <CrawlForDependencies xmlns="4873beb7-5857-4685-be1f-d57550cc96cc">false</CrawlForDependencies>
-    <HandoffToMSDN xmlns="4873beb7-5857-4685-be1f-d57550cc96cc" xsi:nil="true"/>
-    <PlannedPubDate xmlns="4873beb7-5857-4685-be1f-d57550cc96cc" xsi:nil="true"/>
-    <IntlLangReviewer xmlns="4873beb7-5857-4685-be1f-d57550cc96cc" xsi:nil="true"/>
-    <TrustLevel xmlns="4873beb7-5857-4685-be1f-d57550cc96cc">1 Microsoft Managed Content</TrustLevel>
-    <LocLastLocAttemptVersionLookup xmlns="4873beb7-5857-4685-be1f-d57550cc96cc">694266</LocLastLocAttemptVersionLookup>
-    <LocProcessedForHandoffsLookup xmlns="4873beb7-5857-4685-be1f-d57550cc96cc" xsi:nil="true"/>
-    <IsSearchable xmlns="4873beb7-5857-4685-be1f-d57550cc96cc">true</IsSearchable>
-    <TemplateTemplateType xmlns="4873beb7-5857-4685-be1f-d57550cc96cc">PowerPoint Presentation Template</TemplateTemplateType>
-    <CampaignTagsTaxHTField0 xmlns="4873beb7-5857-4685-be1f-d57550cc96cc">
-      <Terms xmlns="http://schemas.microsoft.com/office/infopath/2007/PartnerControls"/>
-    </CampaignTagsTaxHTField0>
-    <TPNamespace xmlns="4873beb7-5857-4685-be1f-d57550cc96cc" xsi:nil="true"/>
-    <LocOverallPreviewStatusLookup xmlns="4873beb7-5857-4685-be1f-d57550cc96cc" xsi:nil="true"/>
-    <TaxCatchAll xmlns="4873beb7-5857-4685-be1f-d57550cc96cc"/>
-    <Markets xmlns="4873beb7-5857-4685-be1f-d57550cc96cc"/>
-    <UAProjectedTotalWords xmlns="4873beb7-5857-4685-be1f-d57550cc96cc" xsi:nil="true"/>
-    <IntlLangReview xmlns="4873beb7-5857-4685-be1f-d57550cc96cc" xsi:nil="true"/>
-    <OutputCachingOn xmlns="4873beb7-5857-4685-be1f-d57550cc96cc">false</OutputCachingOn>
-    <AverageRating xmlns="4873beb7-5857-4685-be1f-d57550cc96cc" xsi:nil="true"/>
-    <APAuthor xmlns="4873beb7-5857-4685-be1f-d57550cc96cc">
-      <UserInfo>
-        <DisplayName>REDMOND\kristaa</DisplayName>
-        <AccountId>136</AccountId>
-        <AccountType/>
-      </UserInfo>
-    </APAuthor>
-    <LocManualTestRequired xmlns="4873beb7-5857-4685-be1f-d57550cc96cc">false</LocManualTestRequired>
-    <TPCommandLine xmlns="4873beb7-5857-4685-be1f-d57550cc96cc" xsi:nil="true"/>
-    <TPAppVersion xmlns="4873beb7-5857-4685-be1f-d57550cc96cc" xsi:nil="true"/>
-    <EditorialStatus xmlns="4873beb7-5857-4685-be1f-d57550cc96cc">Complete</EditorialStatus>
-    <LastModifiedDateTime xmlns="4873beb7-5857-4685-be1f-d57550cc96cc" xsi:nil="true"/>
-    <ScenarioTagsTaxHTField0 xmlns="4873beb7-5857-4685-be1f-d57550cc96cc">
-      <Terms xmlns="http://schemas.microsoft.com/office/infopath/2007/PartnerControls"/>
-    </ScenarioTagsTaxHTField0>
-    <LocProcessedForMarketsLookup xmlns="4873beb7-5857-4685-be1f-d57550cc96cc" xsi:nil="true"/>
-    <TPLaunchHelpLinkType xmlns="4873beb7-5857-4685-be1f-d57550cc96cc">Template</TPLaunchHelpLinkType>
-    <OriginalRelease xmlns="4873beb7-5857-4685-be1f-d57550cc96cc">15</OriginalRelease>
-    <LocalizationTagsTaxHTField0 xmlns="4873beb7-5857-4685-be1f-d57550cc96cc">
-      <Terms xmlns="http://schemas.microsoft.com/office/infopath/2007/PartnerControls"/>
-    </LocalizationTagsTaxHTField0>
-    <UACurrentWords xmlns="4873beb7-5857-4685-be1f-d57550cc96cc" xsi:nil="true"/>
-    <ArtSampleDocs xmlns="4873beb7-5857-4685-be1f-d57550cc96cc" xsi:nil="true"/>
-    <UALocRecommendation xmlns="4873beb7-5857-4685-be1f-d57550cc96cc">Localize</UALocRecommendation>
-    <Manager xmlns="4873beb7-5857-4685-be1f-d57550cc96cc" xsi:nil="true"/>
-    <LocOverallHandbackStatusLookup xmlns="4873beb7-5857-4685-be1f-d57550cc96cc" xsi:nil="true"/>
-    <ShowIn xmlns="4873beb7-5857-4685-be1f-d57550cc96cc">Show everywhere</ShowIn>
-    <UANotes xmlns="4873beb7-5857-4685-be1f-d57550cc96cc" xsi:nil="true"/>
-    <InternalTagsTaxHTField0 xmlns="4873beb7-5857-4685-be1f-d57550cc96cc">
-      <Terms xmlns="http://schemas.microsoft.com/office/infopath/2007/PartnerControls"/>
-    </InternalTagsTaxHTField0>
-    <CSXHash xmlns="4873beb7-5857-4685-be1f-d57550cc96cc" xsi:nil="true"/>
-    <VoteCount xmlns="4873beb7-5857-4685-be1f-d57550cc96cc" xsi:nil="true"/>
-    <AssetExpire xmlns="4873beb7-5857-4685-be1f-d57550cc96cc">2029-05-12T07:00:00+00:00</AssetExpire>
-    <DSATActionTaken xmlns="4873beb7-5857-4685-be1f-d57550cc96cc" xsi:nil="true"/>
-    <CSXSubmissionMarket xmlns="4873beb7-5857-4685-be1f-d57550cc96cc" xsi:nil="true"/>
-    <LocMarketGroupTiers2 xmlns="4873beb7-5857-4685-be1f-d57550cc96cc" xsi:nil="true"/>
-  </documentManagement>
-</p:properties>
-</file>
-
 <file path=customXml/item3.xml><?xml version="1.0" encoding="utf-8"?>
 <?mso-contentType ?>
 <FormTemplates xmlns="http://schemas.microsoft.com/sharepoint/v3/contenttype/forms">
@@ -10008,6 +11662,22 @@
 </file>
 
 <file path=customXml/itemProps1.xml><?xml version="1.0" encoding="utf-8"?>
+<ds:datastoreItem xmlns:ds="http://schemas.openxmlformats.org/officeDocument/2006/customXml" ds:itemID="{60C67BEE-D13F-4BD2-98A5-34D8A0977F68}">
+  <ds:schemaRefs>
+    <ds:schemaRef ds:uri="4873beb7-5857-4685-be1f-d57550cc96cc"/>
+    <ds:schemaRef ds:uri="http://schemas.openxmlformats.org/package/2006/metadata/core-properties"/>
+    <ds:schemaRef ds:uri="http://purl.org/dc/terms/"/>
+    <ds:schemaRef ds:uri="http://schemas.microsoft.com/office/2006/documentManagement/types"/>
+    <ds:schemaRef ds:uri="http://purl.org/dc/elements/1.1/"/>
+    <ds:schemaRef ds:uri="http://schemas.microsoft.com/office/2006/metadata/properties"/>
+    <ds:schemaRef ds:uri="http://schemas.microsoft.com/office/infopath/2007/PartnerControls"/>
+    <ds:schemaRef ds:uri="http://www.w3.org/XML/1998/namespace"/>
+    <ds:schemaRef ds:uri="http://purl.org/dc/dcmitype/"/>
+  </ds:schemaRefs>
+</ds:datastoreItem>
+</file>
+
+<file path=customXml/itemProps2.xml><?xml version="1.0" encoding="utf-8"?>
 <ds:datastoreItem xmlns:ds="http://schemas.openxmlformats.org/officeDocument/2006/customXml" ds:itemID="{A09BF4D4-EF60-4196-BFC3-9462D607978C}">
   <ds:schemaRefs>
     <ds:schemaRef ds:uri="http://schemas.microsoft.com/office/2006/metadata/contentType"/>
@@ -10025,22 +11695,6 @@
 </ds:datastoreItem>
 </file>
 
-<file path=customXml/itemProps2.xml><?xml version="1.0" encoding="utf-8"?>
-<ds:datastoreItem xmlns:ds="http://schemas.openxmlformats.org/officeDocument/2006/customXml" ds:itemID="{60C67BEE-D13F-4BD2-98A5-34D8A0977F68}">
-  <ds:schemaRefs>
-    <ds:schemaRef ds:uri="4873beb7-5857-4685-be1f-d57550cc96cc"/>
-    <ds:schemaRef ds:uri="http://schemas.openxmlformats.org/package/2006/metadata/core-properties"/>
-    <ds:schemaRef ds:uri="http://purl.org/dc/terms/"/>
-    <ds:schemaRef ds:uri="http://schemas.microsoft.com/office/2006/documentManagement/types"/>
-    <ds:schemaRef ds:uri="http://purl.org/dc/elements/1.1/"/>
-    <ds:schemaRef ds:uri="http://schemas.microsoft.com/office/2006/metadata/properties"/>
-    <ds:schemaRef ds:uri="http://schemas.microsoft.com/office/infopath/2007/PartnerControls"/>
-    <ds:schemaRef ds:uri="http://www.w3.org/XML/1998/namespace"/>
-    <ds:schemaRef ds:uri="http://purl.org/dc/dcmitype/"/>
-  </ds:schemaRefs>
-</ds:datastoreItem>
-</file>
-
 <file path=customXml/itemProps3.xml><?xml version="1.0" encoding="utf-8"?>
 <ds:datastoreItem xmlns:ds="http://schemas.openxmlformats.org/officeDocument/2006/customXml" ds:itemID="{3836F65B-1B07-41EE-A0E8-BC6EF3855225}">
   <ds:schemaRefs>

</xml_diff>

<commit_message>
more work on powrpoint
</commit_message>
<xml_diff>
--- a/buildPC.pptx
+++ b/buildPC.pptx
@@ -240,7 +240,7 @@
           <a:p>
             <a:fld id="{FE5B4EDC-59C0-49C7-8ADA-5A781B329E02}" type="datetimeFigureOut">
               <a:rPr lang="en-US"/>
-              <a:t>11/4/2022</a:t>
+              <a:t>11/5/2022</a:t>
             </a:fld>
             <a:endParaRPr/>
           </a:p>
@@ -405,7 +405,7 @@
           <a:p>
             <a:fld id="{F2D8D46A-B586-417D-BFBD-8C8FE0AAF762}" type="datetimeFigureOut">
               <a:rPr lang="en-US"/>
-              <a:t>11/4/2022</a:t>
+              <a:t>11/5/2022</a:t>
             </a:fld>
             <a:endParaRPr/>
           </a:p>
@@ -1423,7 +1423,7 @@
           <a:p>
             <a:fld id="{F0DFD029-FB74-4578-B929-F66AA97659CA}" type="datetimeFigureOut">
               <a:rPr lang="en-US"/>
-              <a:t>11/4/2022</a:t>
+              <a:t>11/5/2022</a:t>
             </a:fld>
             <a:endParaRPr/>
           </a:p>
@@ -1621,7 +1621,7 @@
           <a:p>
             <a:fld id="{F0DFD029-FB74-4578-B929-F66AA97659CA}" type="datetimeFigureOut">
               <a:rPr lang="en-US"/>
-              <a:t>11/4/2022</a:t>
+              <a:t>11/5/2022</a:t>
             </a:fld>
             <a:endParaRPr/>
           </a:p>
@@ -1829,7 +1829,7 @@
           <a:p>
             <a:fld id="{F0DFD029-FB74-4578-B929-F66AA97659CA}" type="datetimeFigureOut">
               <a:rPr lang="en-US"/>
-              <a:t>11/4/2022</a:t>
+              <a:t>11/5/2022</a:t>
             </a:fld>
             <a:endParaRPr/>
           </a:p>
@@ -2027,7 +2027,7 @@
           <a:p>
             <a:fld id="{F0DFD029-FB74-4578-B929-F66AA97659CA}" type="datetimeFigureOut">
               <a:rPr lang="en-US"/>
-              <a:t>11/4/2022</a:t>
+              <a:t>11/5/2022</a:t>
             </a:fld>
             <a:endParaRPr/>
           </a:p>
@@ -2459,7 +2459,7 @@
           <a:p>
             <a:fld id="{F0DFD029-FB74-4578-B929-F66AA97659CA}" type="datetimeFigureOut">
               <a:rPr lang="en-US"/>
-              <a:t>11/4/2022</a:t>
+              <a:t>11/5/2022</a:t>
             </a:fld>
             <a:endParaRPr/>
           </a:p>
@@ -2763,7 +2763,7 @@
           <a:p>
             <a:fld id="{F0DFD029-FB74-4578-B929-F66AA97659CA}" type="datetimeFigureOut">
               <a:rPr lang="en-US"/>
-              <a:t>11/4/2022</a:t>
+              <a:t>11/5/2022</a:t>
             </a:fld>
             <a:endParaRPr/>
           </a:p>
@@ -3219,7 +3219,7 @@
           <a:p>
             <a:fld id="{F0DFD029-FB74-4578-B929-F66AA97659CA}" type="datetimeFigureOut">
               <a:rPr lang="en-US"/>
-              <a:t>11/4/2022</a:t>
+              <a:t>11/5/2022</a:t>
             </a:fld>
             <a:endParaRPr/>
           </a:p>
@@ -3349,7 +3349,7 @@
           <a:p>
             <a:fld id="{F0DFD029-FB74-4578-B929-F66AA97659CA}" type="datetimeFigureOut">
               <a:rPr lang="en-US"/>
-              <a:t>11/4/2022</a:t>
+              <a:t>11/5/2022</a:t>
             </a:fld>
             <a:endParaRPr/>
           </a:p>
@@ -3456,7 +3456,7 @@
           <a:p>
             <a:fld id="{F0DFD029-FB74-4578-B929-F66AA97659CA}" type="datetimeFigureOut">
               <a:rPr lang="en-US"/>
-              <a:t>11/4/2022</a:t>
+              <a:t>11/5/2022</a:t>
             </a:fld>
             <a:endParaRPr/>
           </a:p>
@@ -3755,7 +3755,7 @@
           <a:p>
             <a:fld id="{F0DFD029-FB74-4578-B929-F66AA97659CA}" type="datetimeFigureOut">
               <a:rPr lang="en-US"/>
-              <a:t>11/4/2022</a:t>
+              <a:t>11/5/2022</a:t>
             </a:fld>
             <a:endParaRPr/>
           </a:p>
@@ -4043,7 +4043,7 @@
           <a:p>
             <a:fld id="{F0DFD029-FB74-4578-B929-F66AA97659CA}" type="datetimeFigureOut">
               <a:rPr lang="en-US"/>
-              <a:t>11/4/2022</a:t>
+              <a:t>11/5/2022</a:t>
             </a:fld>
             <a:endParaRPr/>
           </a:p>
@@ -4666,7 +4666,7 @@
             <a:fld id="{F0DFD029-FB74-4578-B929-F66AA97659CA}" type="datetimeFigureOut">
               <a:rPr lang="en-US"/>
               <a:pPr/>
-              <a:t>11/4/2022</a:t>
+              <a:t>11/5/2022</a:t>
             </a:fld>
             <a:endParaRPr/>
           </a:p>
@@ -6560,6 +6560,26 @@
                 </a:solidFill>
               </a:rPr>
               <a:t>Frameless Design</a:t>
+            </a:r>
+          </a:p>
+          <a:p>
+            <a:pPr marL="457200" indent="-457200">
+              <a:buClr>
+                <a:schemeClr val="accent1">
+                  <a:lumMod val="40000"/>
+                  <a:lumOff val="60000"/>
+                </a:schemeClr>
+              </a:buClr>
+              <a:buFont typeface="Arial" panose="020B0604020202020204" pitchFamily="34" charset="0"/>
+              <a:buChar char="•"/>
+            </a:pPr>
+            <a:r>
+              <a:rPr lang="en-US" sz="2000" dirty="0">
+                <a:solidFill>
+                  <a:schemeClr val="tx1"/>
+                </a:solidFill>
+              </a:rPr>
+              <a:t>Purchasing 2 for dual Monitor setup</a:t>
             </a:r>
           </a:p>
         </p:txBody>
@@ -10477,6 +10497,1046 @@
 </file>
 
 <file path=customXml/item1.xml><?xml version="1.0" encoding="utf-8"?>
+<ct:contentTypeSchema xmlns:ct="http://schemas.microsoft.com/office/2006/metadata/contentType" xmlns:ma="http://schemas.microsoft.com/office/2006/metadata/properties/metaAttributes" ct:_="" ma:_="" ma:contentTypeName="TemplateFile" ma:contentTypeID="0x0101006EDDDB5EE6D98C44930B742096920B300400F5B6D36B3EF94B4E9A635CDF2A18F5B8" ma:contentTypeVersion="72" ma:contentTypeDescription="Create a new document." ma:contentTypeScope="" ma:versionID="a23e56308344d904b51738559c3d67c9">
+  <xsd:schema xmlns:xsd="http://www.w3.org/2001/XMLSchema" xmlns:xs="http://www.w3.org/2001/XMLSchema" xmlns:p="http://schemas.microsoft.com/office/2006/metadata/properties" xmlns:ns2="4873beb7-5857-4685-be1f-d57550cc96cc" targetNamespace="http://schemas.microsoft.com/office/2006/metadata/properties" ma:root="true" ma:fieldsID="cd0908cc4600e77bf5da051303e00c8d" ns2:_="">
+    <xsd:import namespace="4873beb7-5857-4685-be1f-d57550cc96cc"/>
+    <xsd:element name="properties">
+      <xsd:complexType>
+        <xsd:sequence>
+          <xsd:element name="documentManagement">
+            <xsd:complexType>
+              <xsd:all>
+                <xsd:element ref="ns2:AcquiredFrom" minOccurs="0"/>
+                <xsd:element ref="ns2:UACurrentWords" minOccurs="0"/>
+                <xsd:element ref="ns2:TPApplication" minOccurs="0"/>
+                <xsd:element ref="ns2:ApprovalLog" minOccurs="0"/>
+                <xsd:element ref="ns2:ApprovalStatus" minOccurs="0"/>
+                <xsd:element ref="ns2:AssetStart" minOccurs="0"/>
+                <xsd:element ref="ns2:AssetExpire" minOccurs="0"/>
+                <xsd:element ref="ns2:AssetId" minOccurs="0"/>
+                <xsd:element ref="ns2:IsSearchable" minOccurs="0"/>
+                <xsd:element ref="ns2:AssetType" minOccurs="0"/>
+                <xsd:element ref="ns2:APAuthor" minOccurs="0"/>
+                <xsd:element ref="ns2:AverageRating" minOccurs="0"/>
+                <xsd:element ref="ns2:BlockPublish" minOccurs="0"/>
+                <xsd:element ref="ns2:BugNumber" minOccurs="0"/>
+                <xsd:element ref="ns2:CampaignTagsTaxHTField0" minOccurs="0"/>
+                <xsd:element ref="ns2:TPClientViewer" minOccurs="0"/>
+                <xsd:element ref="ns2:ClipArtFilename" minOccurs="0"/>
+                <xsd:element ref="ns2:TPCommandLine" minOccurs="0"/>
+                <xsd:element ref="ns2:TPComponent" minOccurs="0"/>
+                <xsd:element ref="ns2:ContentItem" minOccurs="0"/>
+                <xsd:element ref="ns2:CrawlForDependencies" minOccurs="0"/>
+                <xsd:element ref="ns2:CSXHash" minOccurs="0"/>
+                <xsd:element ref="ns2:CSXSubmissionMarket" minOccurs="0"/>
+                <xsd:element ref="ns2:CSXUpdate" minOccurs="0"/>
+                <xsd:element ref="ns2:IntlLangReviewDate" minOccurs="0"/>
+                <xsd:element ref="ns2:IsDeleted" minOccurs="0"/>
+                <xsd:element ref="ns2:APDescription" minOccurs="0"/>
+                <xsd:element ref="ns2:DirectSourceMarket" minOccurs="0"/>
+                <xsd:element ref="ns2:Downloads" minOccurs="0"/>
+                <xsd:element ref="ns2:DSATActionTaken" minOccurs="0"/>
+                <xsd:element ref="ns2:APEditor" minOccurs="0"/>
+                <xsd:element ref="ns2:EditorialStatus" minOccurs="0"/>
+                <xsd:element ref="ns2:EditorialTags" minOccurs="0"/>
+                <xsd:element ref="ns2:TPExecutable" minOccurs="0"/>
+                <xsd:element ref="ns2:FeatureTagsTaxHTField0" minOccurs="0"/>
+                <xsd:element ref="ns2:TPFriendlyName" minOccurs="0"/>
+                <xsd:element ref="ns2:FriendlyTitle" minOccurs="0"/>
+                <xsd:element ref="ns2:PrimaryImageGen" minOccurs="0"/>
+                <xsd:element ref="ns2:HandoffToMSDN" minOccurs="0"/>
+                <xsd:element ref="ns2:InProjectListLookup" minOccurs="0"/>
+                <xsd:element ref="ns2:TPInstallLocation" minOccurs="0"/>
+                <xsd:element ref="ns2:InternalTagsTaxHTField0" minOccurs="0"/>
+                <xsd:element ref="ns2:IntlLangReview" minOccurs="0"/>
+                <xsd:element ref="ns2:IntlLangReviewer" minOccurs="0"/>
+                <xsd:element ref="ns2:MarketSpecific" minOccurs="0"/>
+                <xsd:element ref="ns2:LastCompleteVersionLookup" minOccurs="0"/>
+                <xsd:element ref="ns2:LastHandOff" minOccurs="0"/>
+                <xsd:element ref="ns2:LastModifiedDateTime" minOccurs="0"/>
+                <xsd:element ref="ns2:LastPreviewErrorLookup" minOccurs="0"/>
+                <xsd:element ref="ns2:LastPreviewResultLookup" minOccurs="0"/>
+                <xsd:element ref="ns2:LastPreviewAttemptDateLookup" minOccurs="0"/>
+                <xsd:element ref="ns2:LastPreviewedByLookup" minOccurs="0"/>
+                <xsd:element ref="ns2:LastPreviewTimeLookup" minOccurs="0"/>
+                <xsd:element ref="ns2:LastPreviewVersionLookup" minOccurs="0"/>
+                <xsd:element ref="ns2:LastPublishErrorLookup" minOccurs="0"/>
+                <xsd:element ref="ns2:LastPublishResultLookup" minOccurs="0"/>
+                <xsd:element ref="ns2:LastPublishAttemptDateLookup" minOccurs="0"/>
+                <xsd:element ref="ns2:LastPublishedByLookup" minOccurs="0"/>
+                <xsd:element ref="ns2:LastPublishTimeLookup" minOccurs="0"/>
+                <xsd:element ref="ns2:LastPublishVersionLookup" minOccurs="0"/>
+                <xsd:element ref="ns2:TPLaunchHelpLinkType" minOccurs="0"/>
+                <xsd:element ref="ns2:LegacyData" minOccurs="0"/>
+                <xsd:element ref="ns2:TPLaunchHelpLink" minOccurs="0"/>
+                <xsd:element ref="ns2:LocComments" minOccurs="0"/>
+                <xsd:element ref="ns2:LocLastLocAttemptVersionLookup" minOccurs="0"/>
+                <xsd:element ref="ns2:LocLastLocAttemptVersionTypeLookup" minOccurs="0"/>
+                <xsd:element ref="ns2:LocManualTestRequired" minOccurs="0"/>
+                <xsd:element ref="ns2:LocMarketGroupTiers2" minOccurs="0"/>
+                <xsd:element ref="ns2:LocNewPublishedVersionLookup" minOccurs="0"/>
+                <xsd:element ref="ns2:LocOverallHandbackStatusLookup" minOccurs="0"/>
+                <xsd:element ref="ns2:LocOverallLocStatusLookup" minOccurs="0"/>
+                <xsd:element ref="ns2:LocOverallPreviewStatusLookup" minOccurs="0"/>
+                <xsd:element ref="ns2:LocOverallPublishStatusLookup" minOccurs="0"/>
+                <xsd:element ref="ns2:IntlLocPriority" minOccurs="0"/>
+                <xsd:element ref="ns2:LocProcessedForHandoffsLookup" minOccurs="0"/>
+                <xsd:element ref="ns2:LocProcessedForMarketsLookup" minOccurs="0"/>
+                <xsd:element ref="ns2:LocPublishedDependentAssetsLookup" minOccurs="0"/>
+                <xsd:element ref="ns2:LocPublishedLinkedAssetsLookup" minOccurs="0"/>
+                <xsd:element ref="ns2:LocRecommendedHandoff" minOccurs="0"/>
+                <xsd:element ref="ns2:LocalizationTagsTaxHTField0" minOccurs="0"/>
+                <xsd:element ref="ns2:MachineTranslated" minOccurs="0"/>
+                <xsd:element ref="ns2:Manager" minOccurs="0"/>
+                <xsd:element ref="ns2:Markets" minOccurs="0"/>
+                <xsd:element ref="ns2:Milestone" minOccurs="0"/>
+                <xsd:element ref="ns2:TPNamespace" minOccurs="0"/>
+                <xsd:element ref="ns2:NumericId" minOccurs="0"/>
+                <xsd:element ref="ns2:NumOfRatingsLookup" minOccurs="0"/>
+                <xsd:element ref="ns2:OOCacheId" minOccurs="0"/>
+                <xsd:element ref="ns2:OpenTemplate" minOccurs="0"/>
+                <xsd:element ref="ns2:OriginAsset" minOccurs="0"/>
+                <xsd:element ref="ns2:OriginalRelease" minOccurs="0"/>
+                <xsd:element ref="ns2:OriginalSourceMarket" minOccurs="0"/>
+                <xsd:element ref="ns2:OutputCachingOn" minOccurs="0"/>
+                <xsd:element ref="ns2:ParentAssetId" minOccurs="0"/>
+                <xsd:element ref="ns2:PlannedPubDate" minOccurs="0"/>
+                <xsd:element ref="ns2:PolicheckWords" minOccurs="0"/>
+                <xsd:element ref="ns2:BusinessGroup" minOccurs="0"/>
+                <xsd:element ref="ns2:UAProjectedTotalWords" minOccurs="0"/>
+                <xsd:element ref="ns2:Provider" minOccurs="0"/>
+                <xsd:element ref="ns2:Providers" minOccurs="0"/>
+                <xsd:element ref="ns2:PublishStatusLookup" minOccurs="0"/>
+                <xsd:element ref="ns2:PublishTargets" minOccurs="0"/>
+                <xsd:element ref="ns2:RecommendationsModifier" minOccurs="0"/>
+                <xsd:element ref="ns2:ArtSampleDocs" minOccurs="0"/>
+                <xsd:element ref="ns2:ScenarioTagsTaxHTField0" minOccurs="0"/>
+                <xsd:element ref="ns2:ShowIn" minOccurs="0"/>
+                <xsd:element ref="ns2:SourceTitle" minOccurs="0"/>
+                <xsd:element ref="ns2:CSXSubmissionDate" minOccurs="0"/>
+                <xsd:element ref="ns2:SubmitterId" minOccurs="0"/>
+                <xsd:element ref="ns2:TaxCatchAll" minOccurs="0"/>
+                <xsd:element ref="ns2:TaxCatchAllLabel" minOccurs="0"/>
+                <xsd:element ref="ns2:TemplateStatus" minOccurs="0"/>
+                <xsd:element ref="ns2:TemplateTemplateType" minOccurs="0"/>
+                <xsd:element ref="ns2:ThumbnailAssetId" minOccurs="0"/>
+                <xsd:element ref="ns2:TimesCloned" minOccurs="0"/>
+                <xsd:element ref="ns2:TrustLevel" minOccurs="0"/>
+                <xsd:element ref="ns2:UALocComments" minOccurs="0"/>
+                <xsd:element ref="ns2:UALocRecommendation" minOccurs="0"/>
+                <xsd:element ref="ns2:UANotes" minOccurs="0"/>
+                <xsd:element ref="ns2:TPAppVersion" minOccurs="0"/>
+                <xsd:element ref="ns2:VoteCount" minOccurs="0"/>
+              </xsd:all>
+            </xsd:complexType>
+          </xsd:element>
+        </xsd:sequence>
+      </xsd:complexType>
+    </xsd:element>
+  </xsd:schema>
+  <xsd:schema xmlns:xsd="http://www.w3.org/2001/XMLSchema" xmlns:xs="http://www.w3.org/2001/XMLSchema" xmlns:dms="http://schemas.microsoft.com/office/2006/documentManagement/types" xmlns:pc="http://schemas.microsoft.com/office/infopath/2007/PartnerControls" targetNamespace="4873beb7-5857-4685-be1f-d57550cc96cc" elementFormDefault="qualified">
+    <xsd:import namespace="http://schemas.microsoft.com/office/2006/documentManagement/types"/>
+    <xsd:import namespace="http://schemas.microsoft.com/office/infopath/2007/PartnerControls"/>
+    <xsd:element name="AcquiredFrom" ma:index="1" nillable="true" ma:displayName="Acquired From" ma:default="Internal MS" ma:internalName="AcquiredFrom" ma:readOnly="false">
+      <xsd:simpleType>
+        <xsd:restriction base="dms:Choice">
+          <xsd:enumeration value="Internal MS"/>
+          <xsd:enumeration value="Community"/>
+          <xsd:enumeration value="MVP"/>
+          <xsd:enumeration value="Publisher"/>
+          <xsd:enumeration value="Partner"/>
+          <xsd:enumeration value="None"/>
+        </xsd:restriction>
+      </xsd:simpleType>
+    </xsd:element>
+    <xsd:element name="UACurrentWords" ma:index="2" nillable="true" ma:displayName="Actual Word Count" ma:default="" ma:internalName="UACurrentWords" ma:readOnly="false">
+      <xsd:simpleType>
+        <xsd:restriction base="dms:Unknown"/>
+      </xsd:simpleType>
+    </xsd:element>
+    <xsd:element name="TPApplication" ma:index="3" nillable="true" ma:displayName="Application to Open Template With" ma:default="" ma:internalName="TPApplication">
+      <xsd:simpleType>
+        <xsd:restriction base="dms:Text"/>
+      </xsd:simpleType>
+    </xsd:element>
+    <xsd:element name="ApprovalLog" ma:index="4" nillable="true" ma:displayName="Approval Log" ma:default="" ma:hidden="true" ma:internalName="ApprovalLog" ma:readOnly="false">
+      <xsd:simpleType>
+        <xsd:restriction base="dms:Note"/>
+      </xsd:simpleType>
+    </xsd:element>
+    <xsd:element name="ApprovalStatus" ma:index="5" nillable="true" ma:displayName="Approval Status" ma:default="InProgress" ma:internalName="ApprovalStatus" ma:readOnly="false">
+      <xsd:simpleType>
+        <xsd:restriction base="dms:Choice">
+          <xsd:enumeration value="InProgress"/>
+          <xsd:enumeration value="Rejected"/>
+          <xsd:enumeration value="Questionable"/>
+          <xsd:enumeration value="ApprovedAutomatic"/>
+          <xsd:enumeration value="ApprovedManual"/>
+          <xsd:enumeration value="On Hold"/>
+          <xsd:enumeration value="Needs Review"/>
+          <xsd:enumeration value="A Violation"/>
+          <xsd:enumeration value="Unpublished Violation"/>
+        </xsd:restriction>
+      </xsd:simpleType>
+    </xsd:element>
+    <xsd:element name="AssetStart" ma:index="6" nillable="true" ma:displayName="Asset Begin Date" ma:default="[Today]" ma:internalName="AssetStart" ma:readOnly="false">
+      <xsd:simpleType>
+        <xsd:restriction base="dms:DateTime"/>
+      </xsd:simpleType>
+    </xsd:element>
+    <xsd:element name="AssetExpire" ma:index="7" nillable="true" ma:displayName="Asset End Date" ma:default="2029-01-01T08:00:00Z" ma:format="DateTime" ma:internalName="AssetExpire" ma:readOnly="false">
+      <xsd:simpleType>
+        <xsd:restriction base="dms:DateTime"/>
+      </xsd:simpleType>
+    </xsd:element>
+    <xsd:element name="AssetId" ma:index="8" nillable="true" ma:displayName="Asset ID" ma:default="" ma:indexed="true" ma:internalName="AssetId" ma:readOnly="false">
+      <xsd:simpleType>
+        <xsd:restriction base="dms:Text">
+          <xsd:maxLength value="255"/>
+        </xsd:restriction>
+      </xsd:simpleType>
+    </xsd:element>
+    <xsd:element name="IsSearchable" ma:index="9" nillable="true" ma:displayName="Asset Searchable?" ma:default="true" ma:internalName="IsSearchable" ma:readOnly="false">
+      <xsd:simpleType>
+        <xsd:restriction base="dms:Boolean"/>
+      </xsd:simpleType>
+    </xsd:element>
+    <xsd:element name="AssetType" ma:index="10" nillable="true" ma:displayName="Asset Type" ma:default="" ma:internalName="AssetType" ma:readOnly="false">
+      <xsd:simpleType>
+        <xsd:restriction base="dms:Unknown"/>
+      </xsd:simpleType>
+    </xsd:element>
+    <xsd:element name="APAuthor" ma:index="11" nillable="true" ma:displayName="Author" ma:default="" ma:list="UserInfo" ma:internalName="APAuthor" ma:readOnly="false">
+      <xsd:complexType>
+        <xsd:complexContent>
+          <xsd:extension base="dms:User">
+            <xsd:sequence>
+              <xsd:element name="UserInfo" minOccurs="0" maxOccurs="unbounded">
+                <xsd:complexType>
+                  <xsd:sequence>
+                    <xsd:element name="DisplayName" type="xsd:string" minOccurs="0"/>
+                    <xsd:element name="AccountId" type="dms:UserId" minOccurs="0" nillable="true"/>
+                    <xsd:element name="AccountType" type="xsd:string" minOccurs="0"/>
+                  </xsd:sequence>
+                </xsd:complexType>
+              </xsd:element>
+            </xsd:sequence>
+          </xsd:extension>
+        </xsd:complexContent>
+      </xsd:complexType>
+    </xsd:element>
+    <xsd:element name="AverageRating" ma:index="12" nillable="true" ma:displayName="Average Rating" ma:internalName="AverageRating" ma:readOnly="false">
+      <xsd:simpleType>
+        <xsd:restriction base="dms:Text"/>
+      </xsd:simpleType>
+    </xsd:element>
+    <xsd:element name="BlockPublish" ma:index="13" nillable="true" ma:displayName="Block from Publishing?" ma:default="" ma:internalName="BlockPublish" ma:readOnly="false">
+      <xsd:simpleType>
+        <xsd:restriction base="dms:Boolean"/>
+      </xsd:simpleType>
+    </xsd:element>
+    <xsd:element name="BugNumber" ma:index="14" nillable="true" ma:displayName="Bug Number" ma:default="" ma:internalName="BugNumber" ma:readOnly="false">
+      <xsd:simpleType>
+        <xsd:restriction base="dms:Text"/>
+      </xsd:simpleType>
+    </xsd:element>
+    <xsd:element name="CampaignTagsTaxHTField0" ma:index="16" nillable="true" ma:taxonomy="true" ma:internalName="CampaignTagsTaxHTField0" ma:taxonomyFieldName="CampaignTags" ma:displayName="Campaigns" ma:readOnly="false" ma:default="" ma:fieldId="{1df42cc3-2301-4f11-a52a-6ead923c29ed}" ma:taxonomyMulti="true" ma:sspId="8f79753a-75d3-41f5-8ca3-40b843941b4f" ma:termSetId="ca0e50d4-faa1-44ce-961e-bb1441c60e66" ma:anchorId="00000000-0000-0000-0000-000000000000" ma:open="false" ma:isKeyword="false">
+      <xsd:complexType>
+        <xsd:sequence>
+          <xsd:element ref="pc:Terms" minOccurs="0" maxOccurs="1"/>
+        </xsd:sequence>
+      </xsd:complexType>
+    </xsd:element>
+    <xsd:element name="TPClientViewer" ma:index="17" nillable="true" ma:displayName="Client Viewer" ma:default="" ma:internalName="TPClientViewer">
+      <xsd:simpleType>
+        <xsd:restriction base="dms:Text"/>
+      </xsd:simpleType>
+    </xsd:element>
+    <xsd:element name="ClipArtFilename" ma:index="18" nillable="true" ma:displayName="Clip Art Name" ma:default="" ma:internalName="ClipArtFilename" ma:readOnly="false">
+      <xsd:simpleType>
+        <xsd:restriction base="dms:Text"/>
+      </xsd:simpleType>
+    </xsd:element>
+    <xsd:element name="TPCommandLine" ma:index="19" nillable="true" ma:displayName="Command Line" ma:default="" ma:internalName="TPCommandLine">
+      <xsd:simpleType>
+        <xsd:restriction base="dms:Text"/>
+      </xsd:simpleType>
+    </xsd:element>
+    <xsd:element name="TPComponent" ma:index="20" nillable="true" ma:displayName="Component" ma:default="" ma:internalName="TPComponent">
+      <xsd:simpleType>
+        <xsd:restriction base="dms:Text"/>
+      </xsd:simpleType>
+    </xsd:element>
+    <xsd:element name="ContentItem" ma:index="21" nillable="true" ma:displayName="Content Item" ma:default="" ma:hidden="true" ma:internalName="ContentItem" ma:readOnly="false">
+      <xsd:simpleType>
+        <xsd:restriction base="dms:Unknown"/>
+      </xsd:simpleType>
+    </xsd:element>
+    <xsd:element name="CrawlForDependencies" ma:index="23" nillable="true" ma:displayName="Crawl for Dependencies?" ma:default="true" ma:internalName="CrawlForDependencies" ma:readOnly="false">
+      <xsd:simpleType>
+        <xsd:restriction base="dms:Boolean"/>
+      </xsd:simpleType>
+    </xsd:element>
+    <xsd:element name="CSXHash" ma:index="26" nillable="true" ma:displayName="CSX Hash" ma:default="" ma:indexed="true" ma:internalName="CSXHash" ma:readOnly="false">
+      <xsd:simpleType>
+        <xsd:restriction base="dms:Text"/>
+      </xsd:simpleType>
+    </xsd:element>
+    <xsd:element name="CSXSubmissionMarket" ma:index="27" nillable="true" ma:displayName="CSX Submission Market" ma:default="" ma:list="{2FBD1B11-2ACE-4FDC-B5A3-635D4ADF6F1B}" ma:internalName="CSXSubmissionMarket" ma:readOnly="false" ma:showField="MarketName" ma:web="4873beb7-5857-4685-be1f-d57550cc96cc">
+      <xsd:simpleType>
+        <xsd:restriction base="dms:Lookup"/>
+      </xsd:simpleType>
+    </xsd:element>
+    <xsd:element name="CSXUpdate" ma:index="28" nillable="true" ma:displayName="CSX Updated?" ma:default="false" ma:internalName="CSXUpdate" ma:readOnly="false">
+      <xsd:simpleType>
+        <xsd:restriction base="dms:Boolean"/>
+      </xsd:simpleType>
+    </xsd:element>
+    <xsd:element name="IntlLangReviewDate" ma:index="29" nillable="true" ma:displayName="Date to Complete Intl QA" ma:default="" ma:internalName="IntlLangReviewDate" ma:readOnly="false">
+      <xsd:simpleType>
+        <xsd:restriction base="dms:DateTime"/>
+      </xsd:simpleType>
+    </xsd:element>
+    <xsd:element name="IsDeleted" ma:index="30" nillable="true" ma:displayName="Deleted?" ma:default="" ma:internalName="IsDeleted" ma:readOnly="false">
+      <xsd:simpleType>
+        <xsd:restriction base="dms:Boolean"/>
+      </xsd:simpleType>
+    </xsd:element>
+    <xsd:element name="APDescription" ma:index="31" nillable="true" ma:displayName="Description" ma:default="" ma:internalName="APDescription" ma:readOnly="false">
+      <xsd:simpleType>
+        <xsd:restriction base="dms:Note"/>
+      </xsd:simpleType>
+    </xsd:element>
+    <xsd:element name="DirectSourceMarket" ma:index="32" nillable="true" ma:displayName="Direct Source Market Group" ma:default="" ma:internalName="DirectSourceMarket" ma:readOnly="false">
+      <xsd:simpleType>
+        <xsd:restriction base="dms:Text"/>
+      </xsd:simpleType>
+    </xsd:element>
+    <xsd:element name="Downloads" ma:index="33" nillable="true" ma:displayName="Downloads" ma:default="0" ma:hidden="true" ma:internalName="Downloads" ma:readOnly="false">
+      <xsd:simpleType>
+        <xsd:restriction base="dms:Unknown"/>
+      </xsd:simpleType>
+    </xsd:element>
+    <xsd:element name="DSATActionTaken" ma:index="34" nillable="true" ma:displayName="DSAT Action Taken" ma:default="" ma:internalName="DSATActionTaken" ma:readOnly="false">
+      <xsd:simpleType>
+        <xsd:restriction base="dms:Choice">
+          <xsd:enumeration value="Best Bets"/>
+          <xsd:enumeration value="Expire"/>
+          <xsd:enumeration value="Hide"/>
+          <xsd:enumeration value="None"/>
+        </xsd:restriction>
+      </xsd:simpleType>
+    </xsd:element>
+    <xsd:element name="APEditor" ma:index="35" nillable="true" ma:displayName="Editor" ma:default="" ma:list="UserInfo" ma:internalName="APEditor" ma:readOnly="false">
+      <xsd:complexType>
+        <xsd:complexContent>
+          <xsd:extension base="dms:User">
+            <xsd:sequence>
+              <xsd:element name="UserInfo" minOccurs="0" maxOccurs="unbounded">
+                <xsd:complexType>
+                  <xsd:sequence>
+                    <xsd:element name="DisplayName" type="xsd:string" minOccurs="0"/>
+                    <xsd:element name="AccountId" type="dms:UserId" minOccurs="0" nillable="true"/>
+                    <xsd:element name="AccountType" type="xsd:string" minOccurs="0"/>
+                  </xsd:sequence>
+                </xsd:complexType>
+              </xsd:element>
+            </xsd:sequence>
+          </xsd:extension>
+        </xsd:complexContent>
+      </xsd:complexType>
+    </xsd:element>
+    <xsd:element name="EditorialStatus" ma:index="36" nillable="true" ma:displayName="Editorial Status" ma:default="" ma:internalName="EditorialStatus" ma:readOnly="false">
+      <xsd:simpleType>
+        <xsd:restriction base="dms:Unknown"/>
+      </xsd:simpleType>
+    </xsd:element>
+    <xsd:element name="EditorialTags" ma:index="37" nillable="true" ma:displayName="Editorial Tags" ma:default="" ma:internalName="EditorialTags">
+      <xsd:simpleType>
+        <xsd:restriction base="dms:Unknown"/>
+      </xsd:simpleType>
+    </xsd:element>
+    <xsd:element name="TPExecutable" ma:index="38" nillable="true" ma:displayName="Executable" ma:default="" ma:internalName="TPExecutable">
+      <xsd:simpleType>
+        <xsd:restriction base="dms:Text"/>
+      </xsd:simpleType>
+    </xsd:element>
+    <xsd:element name="FeatureTagsTaxHTField0" ma:index="40" nillable="true" ma:taxonomy="true" ma:internalName="FeatureTagsTaxHTField0" ma:taxonomyFieldName="FeatureTags" ma:displayName="Features" ma:readOnly="false" ma:default="" ma:fieldId="{7fc0d542-15c6-4882-a8e3-13bca44403fb}" ma:taxonomyMulti="true" ma:sspId="8f79753a-75d3-41f5-8ca3-40b843941b4f" ma:termSetId="f1ab6845-967d-4854-a0ba-4ec07f0f8113" ma:anchorId="00000000-0000-0000-0000-000000000000" ma:open="false" ma:isKeyword="false">
+      <xsd:complexType>
+        <xsd:sequence>
+          <xsd:element ref="pc:Terms" minOccurs="0" maxOccurs="1"/>
+        </xsd:sequence>
+      </xsd:complexType>
+    </xsd:element>
+    <xsd:element name="TPFriendlyName" ma:index="41" nillable="true" ma:displayName="Friendly Name" ma:default="" ma:internalName="TPFriendlyName">
+      <xsd:simpleType>
+        <xsd:restriction base="dms:Text"/>
+      </xsd:simpleType>
+    </xsd:element>
+    <xsd:element name="FriendlyTitle" ma:index="42" nillable="true" ma:displayName="Friendly Title" ma:default="" ma:description="Shorter title to be used when displaying search results" ma:internalName="FriendlyTitle" ma:readOnly="false">
+      <xsd:simpleType>
+        <xsd:restriction base="dms:Text"/>
+      </xsd:simpleType>
+    </xsd:element>
+    <xsd:element name="PrimaryImageGen" ma:index="43" nillable="true" ma:displayName="Generate Images?" ma:default="true" ma:internalName="PrimaryImageGen">
+      <xsd:simpleType>
+        <xsd:restriction base="dms:Boolean"/>
+      </xsd:simpleType>
+    </xsd:element>
+    <xsd:element name="HandoffToMSDN" ma:index="44" nillable="true" ma:displayName="Handoff To MSDN Date" ma:default="" ma:internalName="HandoffToMSDN" ma:readOnly="false">
+      <xsd:simpleType>
+        <xsd:restriction base="dms:DateTime"/>
+      </xsd:simpleType>
+    </xsd:element>
+    <xsd:element name="InProjectListLookup" ma:index="45" nillable="true" ma:displayName="InProjectListLookup" ma:list="{9E343742-310B-4684-A24C-1D137CB4B230}" ma:internalName="InProjectListLookup" ma:readOnly="true" ma:showField="InProjectList" ma:web="4873beb7-5857-4685-be1f-d57550cc96cc">
+      <xsd:complexType>
+        <xsd:complexContent>
+          <xsd:extension base="dms:MultiChoiceLookup">
+            <xsd:sequence>
+              <xsd:element name="Value" type="dms:Lookup" maxOccurs="unbounded" minOccurs="0" nillable="true"/>
+            </xsd:sequence>
+          </xsd:extension>
+        </xsd:complexContent>
+      </xsd:complexType>
+    </xsd:element>
+    <xsd:element name="TPInstallLocation" ma:index="46" nillable="true" ma:displayName="Install Location" ma:default="" ma:internalName="TPInstallLocation">
+      <xsd:simpleType>
+        <xsd:restriction base="dms:Text"/>
+      </xsd:simpleType>
+    </xsd:element>
+    <xsd:element name="InternalTagsTaxHTField0" ma:index="48" nillable="true" ma:taxonomy="true" ma:internalName="InternalTagsTaxHTField0" ma:taxonomyFieldName="InternalTags" ma:displayName="Internal Tags" ma:readOnly="false" ma:default="" ma:fieldId="{1490b8a4-2706-41ec-b5e3-73176dccf34e}" ma:taxonomyMulti="true" ma:sspId="8f79753a-75d3-41f5-8ca3-40b843941b4f" ma:termSetId="82b6639e-f7fc-4c18-ad2d-003a6e707765" ma:anchorId="00000000-0000-0000-0000-000000000000" ma:open="false" ma:isKeyword="false">
+      <xsd:complexType>
+        <xsd:sequence>
+          <xsd:element ref="pc:Terms" minOccurs="0" maxOccurs="1"/>
+        </xsd:sequence>
+      </xsd:complexType>
+    </xsd:element>
+    <xsd:element name="IntlLangReview" ma:index="49" nillable="true" ma:displayName="Intl Lang QA Review Required?" ma:default="" ma:internalName="IntlLangReview" ma:readOnly="false">
+      <xsd:simpleType>
+        <xsd:restriction base="dms:Boolean"/>
+      </xsd:simpleType>
+    </xsd:element>
+    <xsd:element name="IntlLangReviewer" ma:index="50" nillable="true" ma:displayName="Intl Lang QA Reviewer" ma:default="" ma:internalName="IntlLangReviewer" ma:readOnly="false">
+      <xsd:simpleType>
+        <xsd:restriction base="dms:Text"/>
+      </xsd:simpleType>
+    </xsd:element>
+    <xsd:element name="MarketSpecific" ma:index="51" nillable="true" ma:displayName="Is Market Specific?" ma:default="" ma:internalName="MarketSpecific" ma:readOnly="false">
+      <xsd:simpleType>
+        <xsd:restriction base="dms:Boolean"/>
+      </xsd:simpleType>
+    </xsd:element>
+    <xsd:element name="LastCompleteVersionLookup" ma:index="52" nillable="true" ma:displayName="Last Complete Version Lookup" ma:default="" ma:list="{9E343742-310B-4684-A24C-1D137CB4B230}" ma:internalName="LastCompleteVersionLookup" ma:readOnly="true" ma:showField="LastCompleteVersion" ma:web="4873beb7-5857-4685-be1f-d57550cc96cc">
+      <xsd:complexType>
+        <xsd:complexContent>
+          <xsd:extension base="dms:MultiChoiceLookup">
+            <xsd:sequence>
+              <xsd:element name="Value" type="dms:Lookup" maxOccurs="unbounded" minOccurs="0" nillable="true"/>
+            </xsd:sequence>
+          </xsd:extension>
+        </xsd:complexContent>
+      </xsd:complexType>
+    </xsd:element>
+    <xsd:element name="LastHandOff" ma:index="53" nillable="true" ma:displayName="Last Hand-off" ma:default="" ma:internalName="LastHandOff" ma:readOnly="false">
+      <xsd:simpleType>
+        <xsd:restriction base="dms:DateTime"/>
+      </xsd:simpleType>
+    </xsd:element>
+    <xsd:element name="LastModifiedDateTime" ma:index="54" nillable="true" ma:displayName="Last Modified Date" ma:default="" ma:internalName="LastModifiedDateTime" ma:readOnly="false">
+      <xsd:simpleType>
+        <xsd:restriction base="dms:DateTime"/>
+      </xsd:simpleType>
+    </xsd:element>
+    <xsd:element name="LastPreviewErrorLookup" ma:index="55" nillable="true" ma:displayName="Last Preview Attempt Error" ma:default="" ma:list="{9E343742-310B-4684-A24C-1D137CB4B230}" ma:internalName="LastPreviewErrorLookup" ma:readOnly="true" ma:showField="LastPreviewError" ma:web="4873beb7-5857-4685-be1f-d57550cc96cc">
+      <xsd:complexType>
+        <xsd:complexContent>
+          <xsd:extension base="dms:MultiChoiceLookup">
+            <xsd:sequence>
+              <xsd:element name="Value" type="dms:Lookup" maxOccurs="unbounded" minOccurs="0" nillable="true"/>
+            </xsd:sequence>
+          </xsd:extension>
+        </xsd:complexContent>
+      </xsd:complexType>
+    </xsd:element>
+    <xsd:element name="LastPreviewResultLookup" ma:index="56" nillable="true" ma:displayName="Last Preview Attempt Result" ma:default="" ma:list="{9E343742-310B-4684-A24C-1D137CB4B230}" ma:internalName="LastPreviewResultLookup" ma:readOnly="true" ma:showField="LastPreviewResult" ma:web="4873beb7-5857-4685-be1f-d57550cc96cc">
+      <xsd:complexType>
+        <xsd:complexContent>
+          <xsd:extension base="dms:MultiChoiceLookup">
+            <xsd:sequence>
+              <xsd:element name="Value" type="dms:Lookup" maxOccurs="unbounded" minOccurs="0" nillable="true"/>
+            </xsd:sequence>
+          </xsd:extension>
+        </xsd:complexContent>
+      </xsd:complexType>
+    </xsd:element>
+    <xsd:element name="LastPreviewAttemptDateLookup" ma:index="57" nillable="true" ma:displayName="Last Preview Attempted On" ma:default="" ma:list="{9E343742-310B-4684-A24C-1D137CB4B230}" ma:internalName="LastPreviewAttemptDateLookup" ma:readOnly="true" ma:showField="LastPreviewAttemptDate" ma:web="4873beb7-5857-4685-be1f-d57550cc96cc">
+      <xsd:complexType>
+        <xsd:complexContent>
+          <xsd:extension base="dms:MultiChoiceLookup">
+            <xsd:sequence>
+              <xsd:element name="Value" type="dms:Lookup" maxOccurs="unbounded" minOccurs="0" nillable="true"/>
+            </xsd:sequence>
+          </xsd:extension>
+        </xsd:complexContent>
+      </xsd:complexType>
+    </xsd:element>
+    <xsd:element name="LastPreviewedByLookup" ma:index="58" nillable="true" ma:displayName="Last Previewed By" ma:default="" ma:list="{9E343742-310B-4684-A24C-1D137CB4B230}" ma:internalName="LastPreviewedByLookup" ma:readOnly="true" ma:showField="LastPreviewedBy" ma:web="4873beb7-5857-4685-be1f-d57550cc96cc">
+      <xsd:complexType>
+        <xsd:complexContent>
+          <xsd:extension base="dms:MultiChoiceLookup">
+            <xsd:sequence>
+              <xsd:element name="Value" type="dms:Lookup" maxOccurs="unbounded" minOccurs="0" nillable="true"/>
+            </xsd:sequence>
+          </xsd:extension>
+        </xsd:complexContent>
+      </xsd:complexType>
+    </xsd:element>
+    <xsd:element name="LastPreviewTimeLookup" ma:index="59" nillable="true" ma:displayName="Last Previewed Date" ma:default="" ma:list="{9E343742-310B-4684-A24C-1D137CB4B230}" ma:internalName="LastPreviewTimeLookup" ma:readOnly="true" ma:showField="LastPreviewTime" ma:web="4873beb7-5857-4685-be1f-d57550cc96cc">
+      <xsd:complexType>
+        <xsd:complexContent>
+          <xsd:extension base="dms:MultiChoiceLookup">
+            <xsd:sequence>
+              <xsd:element name="Value" type="dms:Lookup" maxOccurs="unbounded" minOccurs="0" nillable="true"/>
+            </xsd:sequence>
+          </xsd:extension>
+        </xsd:complexContent>
+      </xsd:complexType>
+    </xsd:element>
+    <xsd:element name="LastPreviewVersionLookup" ma:index="60" nillable="true" ma:displayName="Last Previewed Version" ma:default="" ma:list="{9E343742-310B-4684-A24C-1D137CB4B230}" ma:internalName="LastPreviewVersionLookup" ma:readOnly="true" ma:showField="LastPreviewVersion" ma:web="4873beb7-5857-4685-be1f-d57550cc96cc">
+      <xsd:complexType>
+        <xsd:complexContent>
+          <xsd:extension base="dms:MultiChoiceLookup">
+            <xsd:sequence>
+              <xsd:element name="Value" type="dms:Lookup" maxOccurs="unbounded" minOccurs="0" nillable="true"/>
+            </xsd:sequence>
+          </xsd:extension>
+        </xsd:complexContent>
+      </xsd:complexType>
+    </xsd:element>
+    <xsd:element name="LastPublishErrorLookup" ma:index="61" nillable="true" ma:displayName="Last Publish Attempt Error" ma:default="" ma:list="{9E343742-310B-4684-A24C-1D137CB4B230}" ma:internalName="LastPublishErrorLookup" ma:readOnly="true" ma:showField="LastPublishError" ma:web="4873beb7-5857-4685-be1f-d57550cc96cc">
+      <xsd:complexType>
+        <xsd:complexContent>
+          <xsd:extension base="dms:MultiChoiceLookup">
+            <xsd:sequence>
+              <xsd:element name="Value" type="dms:Lookup" maxOccurs="unbounded" minOccurs="0" nillable="true"/>
+            </xsd:sequence>
+          </xsd:extension>
+        </xsd:complexContent>
+      </xsd:complexType>
+    </xsd:element>
+    <xsd:element name="LastPublishResultLookup" ma:index="62" nillable="true" ma:displayName="Last Publish Attempt Result" ma:default="" ma:list="{9E343742-310B-4684-A24C-1D137CB4B230}" ma:internalName="LastPublishResultLookup" ma:readOnly="true" ma:showField="LastPublishResult" ma:web="4873beb7-5857-4685-be1f-d57550cc96cc">
+      <xsd:complexType>
+        <xsd:complexContent>
+          <xsd:extension base="dms:MultiChoiceLookup">
+            <xsd:sequence>
+              <xsd:element name="Value" type="dms:Lookup" maxOccurs="unbounded" minOccurs="0" nillable="true"/>
+            </xsd:sequence>
+          </xsd:extension>
+        </xsd:complexContent>
+      </xsd:complexType>
+    </xsd:element>
+    <xsd:element name="LastPublishAttemptDateLookup" ma:index="63" nillable="true" ma:displayName="Last Publish Attempted On" ma:default="" ma:list="{9E343742-310B-4684-A24C-1D137CB4B230}" ma:internalName="LastPublishAttemptDateLookup" ma:readOnly="true" ma:showField="LastPublishAttemptDate" ma:web="4873beb7-5857-4685-be1f-d57550cc96cc">
+      <xsd:complexType>
+        <xsd:complexContent>
+          <xsd:extension base="dms:MultiChoiceLookup">
+            <xsd:sequence>
+              <xsd:element name="Value" type="dms:Lookup" maxOccurs="unbounded" minOccurs="0" nillable="true"/>
+            </xsd:sequence>
+          </xsd:extension>
+        </xsd:complexContent>
+      </xsd:complexType>
+    </xsd:element>
+    <xsd:element name="LastPublishedByLookup" ma:index="64" nillable="true" ma:displayName="Last Published By" ma:default="" ma:list="{9E343742-310B-4684-A24C-1D137CB4B230}" ma:internalName="LastPublishedByLookup" ma:readOnly="true" ma:showField="LastPublishedBy" ma:web="4873beb7-5857-4685-be1f-d57550cc96cc">
+      <xsd:complexType>
+        <xsd:complexContent>
+          <xsd:extension base="dms:MultiChoiceLookup">
+            <xsd:sequence>
+              <xsd:element name="Value" type="dms:Lookup" maxOccurs="unbounded" minOccurs="0" nillable="true"/>
+            </xsd:sequence>
+          </xsd:extension>
+        </xsd:complexContent>
+      </xsd:complexType>
+    </xsd:element>
+    <xsd:element name="LastPublishTimeLookup" ma:index="65" nillable="true" ma:displayName="Last Published Date" ma:default="" ma:list="{9E343742-310B-4684-A24C-1D137CB4B230}" ma:internalName="LastPublishTimeLookup" ma:readOnly="true" ma:showField="LastPublishTime" ma:web="4873beb7-5857-4685-be1f-d57550cc96cc">
+      <xsd:complexType>
+        <xsd:complexContent>
+          <xsd:extension base="dms:MultiChoiceLookup">
+            <xsd:sequence>
+              <xsd:element name="Value" type="dms:Lookup" maxOccurs="unbounded" minOccurs="0" nillable="true"/>
+            </xsd:sequence>
+          </xsd:extension>
+        </xsd:complexContent>
+      </xsd:complexType>
+    </xsd:element>
+    <xsd:element name="LastPublishVersionLookup" ma:index="66" nillable="true" ma:displayName="Last Published Version" ma:default="" ma:list="{9E343742-310B-4684-A24C-1D137CB4B230}" ma:internalName="LastPublishVersionLookup" ma:readOnly="true" ma:showField="LastPublishVersion" ma:web="4873beb7-5857-4685-be1f-d57550cc96cc">
+      <xsd:complexType>
+        <xsd:complexContent>
+          <xsd:extension base="dms:MultiChoiceLookup">
+            <xsd:sequence>
+              <xsd:element name="Value" type="dms:Lookup" maxOccurs="unbounded" minOccurs="0" nillable="true"/>
+            </xsd:sequence>
+          </xsd:extension>
+        </xsd:complexContent>
+      </xsd:complexType>
+    </xsd:element>
+    <xsd:element name="TPLaunchHelpLinkType" ma:index="67" nillable="true" ma:displayName="Launch Help Link Type" ma:default="Template" ma:internalName="TPLaunchHelpLinkType">
+      <xsd:simpleType>
+        <xsd:restriction base="dms:Choice">
+          <xsd:enumeration value="Template"/>
+          <xsd:enumeration value="Training"/>
+          <xsd:enumeration value="URL"/>
+          <xsd:enumeration value="None"/>
+        </xsd:restriction>
+      </xsd:simpleType>
+    </xsd:element>
+    <xsd:element name="LegacyData" ma:index="68" nillable="true" ma:displayName="Legacy Data" ma:default="" ma:internalName="LegacyData" ma:readOnly="false">
+      <xsd:simpleType>
+        <xsd:restriction base="dms:Note"/>
+      </xsd:simpleType>
+    </xsd:element>
+    <xsd:element name="TPLaunchHelpLink" ma:index="69" nillable="true" ma:displayName="Link to Launch Help Topic" ma:default="" ma:internalName="TPLaunchHelpLink">
+      <xsd:simpleType>
+        <xsd:restriction base="dms:Text"/>
+      </xsd:simpleType>
+    </xsd:element>
+    <xsd:element name="LocComments" ma:index="70" nillable="true" ma:displayName="Loc Approval Comments" ma:default="" ma:internalName="LocComments" ma:readOnly="false">
+      <xsd:simpleType>
+        <xsd:restriction base="dms:Note"/>
+      </xsd:simpleType>
+    </xsd:element>
+    <xsd:element name="LocLastLocAttemptVersionLookup" ma:index="71" nillable="true" ma:displayName="Loc Last Loc Attempt Version" ma:default="" ma:list="{7DD1DCEC-E449-43D3-891F-7DC62F62AD21}" ma:internalName="LocLastLocAttemptVersionLookup" ma:readOnly="false" ma:showField="LastLocAttemptVersion" ma:web="4873beb7-5857-4685-be1f-d57550cc96cc">
+      <xsd:simpleType>
+        <xsd:restriction base="dms:Lookup"/>
+      </xsd:simpleType>
+    </xsd:element>
+    <xsd:element name="LocLastLocAttemptVersionTypeLookup" ma:index="72" nillable="true" ma:displayName="Loc Last Loc Attempt Version Type" ma:default="" ma:list="{7DD1DCEC-E449-43D3-891F-7DC62F62AD21}" ma:internalName="LocLastLocAttemptVersionTypeLookup" ma:readOnly="true" ma:showField="LastLocAttemptVersionType" ma:web="4873beb7-5857-4685-be1f-d57550cc96cc">
+      <xsd:simpleType>
+        <xsd:restriction base="dms:Lookup"/>
+      </xsd:simpleType>
+    </xsd:element>
+    <xsd:element name="LocManualTestRequired" ma:index="73" nillable="true" ma:displayName="Loc Manual Test Required" ma:default="" ma:internalName="LocManualTestRequired" ma:readOnly="false">
+      <xsd:simpleType>
+        <xsd:restriction base="dms:Boolean"/>
+      </xsd:simpleType>
+    </xsd:element>
+    <xsd:element name="LocMarketGroupTiers2" ma:index="74" nillable="true" ma:displayName="Loc Market Group Tiers" ma:internalName="LocMarketGroupTiers2" ma:readOnly="false">
+      <xsd:simpleType>
+        <xsd:restriction base="dms:Unknown"/>
+      </xsd:simpleType>
+    </xsd:element>
+    <xsd:element name="LocNewPublishedVersionLookup" ma:index="75" nillable="true" ma:displayName="Loc New Published Version Lookup" ma:default="" ma:list="{7DD1DCEC-E449-43D3-891F-7DC62F62AD21}" ma:internalName="LocNewPublishedVersionLookup" ma:readOnly="true" ma:showField="NewPublishedVersion" ma:web="4873beb7-5857-4685-be1f-d57550cc96cc">
+      <xsd:simpleType>
+        <xsd:restriction base="dms:Lookup"/>
+      </xsd:simpleType>
+    </xsd:element>
+    <xsd:element name="LocOverallHandbackStatusLookup" ma:index="76" nillable="true" ma:displayName="Loc Overall Handback Status" ma:default="" ma:list="{7DD1DCEC-E449-43D3-891F-7DC62F62AD21}" ma:internalName="LocOverallHandbackStatusLookup" ma:readOnly="true" ma:showField="OverallHandbackStatus" ma:web="4873beb7-5857-4685-be1f-d57550cc96cc">
+      <xsd:simpleType>
+        <xsd:restriction base="dms:Lookup"/>
+      </xsd:simpleType>
+    </xsd:element>
+    <xsd:element name="LocOverallLocStatusLookup" ma:index="77" nillable="true" ma:displayName="Loc Overall Localize Status" ma:default="" ma:list="{7DD1DCEC-E449-43D3-891F-7DC62F62AD21}" ma:internalName="LocOverallLocStatusLookup" ma:readOnly="true" ma:showField="OverallLocStatus" ma:web="4873beb7-5857-4685-be1f-d57550cc96cc">
+      <xsd:simpleType>
+        <xsd:restriction base="dms:Lookup"/>
+      </xsd:simpleType>
+    </xsd:element>
+    <xsd:element name="LocOverallPreviewStatusLookup" ma:index="78" nillable="true" ma:displayName="Loc Overall Preview Status" ma:default="" ma:list="{7DD1DCEC-E449-43D3-891F-7DC62F62AD21}" ma:internalName="LocOverallPreviewStatusLookup" ma:readOnly="true" ma:showField="OverallPreviewStatus" ma:web="4873beb7-5857-4685-be1f-d57550cc96cc">
+      <xsd:simpleType>
+        <xsd:restriction base="dms:Lookup"/>
+      </xsd:simpleType>
+    </xsd:element>
+    <xsd:element name="LocOverallPublishStatusLookup" ma:index="79" nillable="true" ma:displayName="Loc Overall Publish Status" ma:default="" ma:list="{7DD1DCEC-E449-43D3-891F-7DC62F62AD21}" ma:internalName="LocOverallPublishStatusLookup" ma:readOnly="true" ma:showField="OverallPublishStatus" ma:web="4873beb7-5857-4685-be1f-d57550cc96cc">
+      <xsd:simpleType>
+        <xsd:restriction base="dms:Lookup"/>
+      </xsd:simpleType>
+    </xsd:element>
+    <xsd:element name="IntlLocPriority" ma:index="80" nillable="true" ma:displayName="Loc Priority" ma:default="" ma:internalName="IntlLocPriority" ma:readOnly="false">
+      <xsd:simpleType>
+        <xsd:restriction base="dms:Unknown"/>
+      </xsd:simpleType>
+    </xsd:element>
+    <xsd:element name="LocProcessedForHandoffsLookup" ma:index="81" nillable="true" ma:displayName="Loc Processed For Handoffs" ma:default="" ma:list="{7DD1DCEC-E449-43D3-891F-7DC62F62AD21}" ma:internalName="LocProcessedForHandoffsLookup" ma:readOnly="true" ma:showField="ProcessedForHandoffs" ma:web="4873beb7-5857-4685-be1f-d57550cc96cc">
+      <xsd:simpleType>
+        <xsd:restriction base="dms:Lookup"/>
+      </xsd:simpleType>
+    </xsd:element>
+    <xsd:element name="LocProcessedForMarketsLookup" ma:index="82" nillable="true" ma:displayName="Loc Processed For Markets" ma:default="" ma:list="{7DD1DCEC-E449-43D3-891F-7DC62F62AD21}" ma:internalName="LocProcessedForMarketsLookup" ma:readOnly="true" ma:showField="ProcessedForMarkets" ma:web="4873beb7-5857-4685-be1f-d57550cc96cc">
+      <xsd:simpleType>
+        <xsd:restriction base="dms:Lookup"/>
+      </xsd:simpleType>
+    </xsd:element>
+    <xsd:element name="LocPublishedDependentAssetsLookup" ma:index="83" nillable="true" ma:displayName="Loc Published Dependent Assets" ma:default="" ma:list="{7DD1DCEC-E449-43D3-891F-7DC62F62AD21}" ma:internalName="LocPublishedDependentAssetsLookup" ma:readOnly="true" ma:showField="PublishedDependentAssets" ma:web="4873beb7-5857-4685-be1f-d57550cc96cc">
+      <xsd:simpleType>
+        <xsd:restriction base="dms:Lookup"/>
+      </xsd:simpleType>
+    </xsd:element>
+    <xsd:element name="LocPublishedLinkedAssetsLookup" ma:index="84" nillable="true" ma:displayName="Loc Published Linked Assets" ma:default="" ma:list="{7DD1DCEC-E449-43D3-891F-7DC62F62AD21}" ma:internalName="LocPublishedLinkedAssetsLookup" ma:readOnly="true" ma:showField="PublishedLinkedAssets" ma:web="4873beb7-5857-4685-be1f-d57550cc96cc">
+      <xsd:simpleType>
+        <xsd:restriction base="dms:Lookup"/>
+      </xsd:simpleType>
+    </xsd:element>
+    <xsd:element name="LocRecommendedHandoff" ma:index="85" nillable="true" ma:displayName="Loc Recommended Handoff" ma:default="" ma:indexed="true" ma:internalName="LocRecommendedHandoff" ma:readOnly="false">
+      <xsd:simpleType>
+        <xsd:restriction base="dms:Text"/>
+      </xsd:simpleType>
+    </xsd:element>
+    <xsd:element name="LocalizationTagsTaxHTField0" ma:index="87" nillable="true" ma:taxonomy="true" ma:internalName="LocalizationTagsTaxHTField0" ma:taxonomyFieldName="LocalizationTags" ma:displayName="Localization Tags" ma:readOnly="false" ma:default="" ma:fieldId="{00f02cb3-2c7c-424a-9c61-10e9b6878429}" ma:taxonomyMulti="true" ma:sspId="8f79753a-75d3-41f5-8ca3-40b843941b4f" ma:termSetId="5b7703a5-8e8b-4b58-8b31-1cea35331da3" ma:anchorId="00000000-0000-0000-0000-000000000000" ma:open="false" ma:isKeyword="false">
+      <xsd:complexType>
+        <xsd:sequence>
+          <xsd:element ref="pc:Terms" minOccurs="0" maxOccurs="1"/>
+        </xsd:sequence>
+      </xsd:complexType>
+    </xsd:element>
+    <xsd:element name="MachineTranslated" ma:index="88" nillable="true" ma:displayName="Machine Translated" ma:default="" ma:internalName="MachineTranslated" ma:readOnly="false">
+      <xsd:simpleType>
+        <xsd:restriction base="dms:Boolean"/>
+      </xsd:simpleType>
+    </xsd:element>
+    <xsd:element name="Manager" ma:index="89" nillable="true" ma:displayName="Manager" ma:hidden="true" ma:internalName="Manager" ma:readOnly="false">
+      <xsd:simpleType>
+        <xsd:restriction base="dms:Text"/>
+      </xsd:simpleType>
+    </xsd:element>
+    <xsd:element name="Markets" ma:index="90" nillable="true" ma:displayName="Markets" ma:default="" ma:description="Leave blank to show in all markets" ma:list="{2FBD1B11-2ACE-4FDC-B5A3-635D4ADF6F1B}" ma:internalName="Markets" ma:readOnly="false" ma:showField="MarketName" ma:web="4873beb7-5857-4685-be1f-d57550cc96cc">
+      <xsd:complexType>
+        <xsd:complexContent>
+          <xsd:extension base="dms:MultiChoiceLookup">
+            <xsd:sequence>
+              <xsd:element name="Value" type="dms:Lookup" maxOccurs="unbounded" minOccurs="0" nillable="true"/>
+            </xsd:sequence>
+          </xsd:extension>
+        </xsd:complexContent>
+      </xsd:complexType>
+    </xsd:element>
+    <xsd:element name="Milestone" ma:index="91" nillable="true" ma:displayName="Milestone" ma:default="" ma:internalName="Milestone" ma:readOnly="false">
+      <xsd:simpleType>
+        <xsd:restriction base="dms:Unknown"/>
+      </xsd:simpleType>
+    </xsd:element>
+    <xsd:element name="TPNamespace" ma:index="94" nillable="true" ma:displayName="Namespace" ma:default="" ma:internalName="TPNamespace">
+      <xsd:simpleType>
+        <xsd:restriction base="dms:Text"/>
+      </xsd:simpleType>
+    </xsd:element>
+    <xsd:element name="NumericId" ma:index="95" nillable="true" ma:displayName="Numeric ID" ma:default="" ma:indexed="true" ma:internalName="NumericId" ma:readOnly="false">
+      <xsd:simpleType>
+        <xsd:restriction base="dms:Number"/>
+      </xsd:simpleType>
+    </xsd:element>
+    <xsd:element name="NumOfRatingsLookup" ma:index="96" nillable="true" ma:displayName="NumOfRatings" ma:default="" ma:list="{9E343742-310B-4684-A24C-1D137CB4B230}" ma:internalName="NumOfRatingsLookup" ma:readOnly="true" ma:showField="NumOfRatings" ma:web="4873beb7-5857-4685-be1f-d57550cc96cc">
+      <xsd:complexType>
+        <xsd:complexContent>
+          <xsd:extension base="dms:MultiChoiceLookup">
+            <xsd:sequence>
+              <xsd:element name="Value" type="dms:Lookup" maxOccurs="unbounded" minOccurs="0" nillable="true"/>
+            </xsd:sequence>
+          </xsd:extension>
+        </xsd:complexContent>
+      </xsd:complexType>
+    </xsd:element>
+    <xsd:element name="OOCacheId" ma:index="97" nillable="true" ma:displayName="OOCacheId" ma:internalName="OOCacheId" ma:readOnly="false">
+      <xsd:simpleType>
+        <xsd:restriction base="dms:Text"/>
+      </xsd:simpleType>
+    </xsd:element>
+    <xsd:element name="OpenTemplate" ma:index="98" nillable="true" ma:displayName="Open Template" ma:default="true" ma:internalName="OpenTemplate">
+      <xsd:simpleType>
+        <xsd:restriction base="dms:Boolean"/>
+      </xsd:simpleType>
+    </xsd:element>
+    <xsd:element name="OriginAsset" ma:index="99" nillable="true" ma:displayName="Origin Asset" ma:default="" ma:internalName="OriginAsset" ma:readOnly="false">
+      <xsd:simpleType>
+        <xsd:restriction base="dms:Text"/>
+      </xsd:simpleType>
+    </xsd:element>
+    <xsd:element name="OriginalRelease" ma:index="100" nillable="true" ma:displayName="Original Release" ma:default="15" ma:internalName="OriginalRelease" ma:readOnly="false">
+      <xsd:simpleType>
+        <xsd:restriction base="dms:Choice">
+          <xsd:enumeration value="14"/>
+          <xsd:enumeration value="15"/>
+          <xsd:enumeration value="16"/>
+        </xsd:restriction>
+      </xsd:simpleType>
+    </xsd:element>
+    <xsd:element name="OriginalSourceMarket" ma:index="101" nillable="true" ma:displayName="Original Source Market Group" ma:default="" ma:internalName="OriginalSourceMarket" ma:readOnly="false">
+      <xsd:simpleType>
+        <xsd:restriction base="dms:Text"/>
+      </xsd:simpleType>
+    </xsd:element>
+    <xsd:element name="OutputCachingOn" ma:index="102" nillable="true" ma:displayName="Output Caching" ma:default="true" ma:hidden="true" ma:internalName="OutputCachingOn" ma:readOnly="false">
+      <xsd:simpleType>
+        <xsd:restriction base="dms:Boolean"/>
+      </xsd:simpleType>
+    </xsd:element>
+    <xsd:element name="ParentAssetId" ma:index="103" nillable="true" ma:displayName="Parent Asset Id" ma:default="" ma:internalName="ParentAssetId" ma:readOnly="false">
+      <xsd:simpleType>
+        <xsd:restriction base="dms:Text"/>
+      </xsd:simpleType>
+    </xsd:element>
+    <xsd:element name="PlannedPubDate" ma:index="104" nillable="true" ma:displayName="Planned Publish Date" ma:default="" ma:indexed="true" ma:internalName="PlannedPubDate" ma:readOnly="false">
+      <xsd:simpleType>
+        <xsd:restriction base="dms:DateTime"/>
+      </xsd:simpleType>
+    </xsd:element>
+    <xsd:element name="PolicheckWords" ma:index="105" nillable="true" ma:displayName="Policheck Words" ma:default="" ma:internalName="PolicheckWords" ma:readOnly="false">
+      <xsd:simpleType>
+        <xsd:restriction base="dms:Text"/>
+      </xsd:simpleType>
+    </xsd:element>
+    <xsd:element name="BusinessGroup" ma:index="106" nillable="true" ma:displayName="Product Division Owner" ma:default="" ma:internalName="BusinessGroup" ma:readOnly="false">
+      <xsd:simpleType>
+        <xsd:restriction base="dms:Unknown"/>
+      </xsd:simpleType>
+    </xsd:element>
+    <xsd:element name="UAProjectedTotalWords" ma:index="107" nillable="true" ma:displayName="Projected Word Count" ma:default="" ma:internalName="UAProjectedTotalWords" ma:readOnly="false">
+      <xsd:simpleType>
+        <xsd:restriction base="dms:Unknown"/>
+      </xsd:simpleType>
+    </xsd:element>
+    <xsd:element name="Provider" ma:index="108" nillable="true" ma:displayName="Provider" ma:default="" ma:internalName="Provider" ma:readOnly="false">
+      <xsd:simpleType>
+        <xsd:restriction base="dms:Unknown"/>
+      </xsd:simpleType>
+    </xsd:element>
+    <xsd:element name="Providers" ma:index="109" nillable="true" ma:displayName="Providers" ma:default="" ma:internalName="Providers">
+      <xsd:simpleType>
+        <xsd:restriction base="dms:Unknown"/>
+      </xsd:simpleType>
+    </xsd:element>
+    <xsd:element name="PublishStatusLookup" ma:index="110" nillable="true" ma:displayName="Publish Status" ma:default="" ma:list="{9E343742-310B-4684-A24C-1D137CB4B230}" ma:internalName="PublishStatusLookup" ma:readOnly="false" ma:showField="PublishStatus" ma:web="4873beb7-5857-4685-be1f-d57550cc96cc">
+      <xsd:complexType>
+        <xsd:complexContent>
+          <xsd:extension base="dms:MultiChoiceLookup">
+            <xsd:sequence>
+              <xsd:element name="Value" type="dms:Lookup" maxOccurs="unbounded" minOccurs="0" nillable="true"/>
+            </xsd:sequence>
+          </xsd:extension>
+        </xsd:complexContent>
+      </xsd:complexType>
+    </xsd:element>
+    <xsd:element name="PublishTargets" ma:index="111" nillable="true" ma:displayName="Publish Target" ma:default="OfficeOnlineVNext" ma:internalName="PublishTargets" ma:readOnly="false">
+      <xsd:simpleType>
+        <xsd:restriction base="dms:Unknown"/>
+      </xsd:simpleType>
+    </xsd:element>
+    <xsd:element name="RecommendationsModifier" ma:index="112" nillable="true" ma:displayName="Recommendations Modifier" ma:default="" ma:internalName="RecommendationsModifier" ma:readOnly="false">
+      <xsd:simpleType>
+        <xsd:restriction base="dms:Number"/>
+      </xsd:simpleType>
+    </xsd:element>
+    <xsd:element name="ArtSampleDocs" ma:index="113" nillable="true" ma:displayName="Sample Docs" ma:default="" ma:hidden="true" ma:internalName="ArtSampleDocs" ma:readOnly="false">
+      <xsd:simpleType>
+        <xsd:restriction base="dms:Text"/>
+      </xsd:simpleType>
+    </xsd:element>
+    <xsd:element name="ScenarioTagsTaxHTField0" ma:index="115" nillable="true" ma:taxonomy="true" ma:internalName="ScenarioTagsTaxHTField0" ma:taxonomyFieldName="ScenarioTags" ma:displayName="Scenarios" ma:readOnly="false" ma:default="" ma:fieldId="{93aef74d-6c78-4815-8310-51477dceeccc}" ma:taxonomyMulti="true" ma:sspId="8f79753a-75d3-41f5-8ca3-40b843941b4f" ma:termSetId="4b7d5f16-e2f2-4fc0-bab3-6e8b931e57d6" ma:anchorId="00000000-0000-0000-0000-000000000000" ma:open="false" ma:isKeyword="false">
+      <xsd:complexType>
+        <xsd:sequence>
+          <xsd:element ref="pc:Terms" minOccurs="0" maxOccurs="1"/>
+        </xsd:sequence>
+      </xsd:complexType>
+    </xsd:element>
+    <xsd:element name="ShowIn" ma:index="117" nillable="true" ma:displayName="Show In" ma:default="Show everywhere" ma:internalName="ShowIn" ma:readOnly="false">
+      <xsd:simpleType>
+        <xsd:restriction base="dms:Choice">
+          <xsd:enumeration value="Hide on web"/>
+          <xsd:enumeration value="On Web no search"/>
+          <xsd:enumeration value="Show everywhere"/>
+          <xsd:enumeration value="Special use only"/>
+        </xsd:restriction>
+      </xsd:simpleType>
+    </xsd:element>
+    <xsd:element name="SourceTitle" ma:index="118" nillable="true" ma:displayName="Source Title" ma:default="" ma:indexed="true" ma:internalName="SourceTitle" ma:readOnly="false">
+      <xsd:simpleType>
+        <xsd:restriction base="dms:Text"/>
+      </xsd:simpleType>
+    </xsd:element>
+    <xsd:element name="CSXSubmissionDate" ma:index="119" nillable="true" ma:displayName="Submission Date" ma:default="" ma:internalName="CSXSubmissionDate" ma:readOnly="false">
+      <xsd:simpleType>
+        <xsd:restriction base="dms:DateTime"/>
+      </xsd:simpleType>
+    </xsd:element>
+    <xsd:element name="SubmitterId" ma:index="120" nillable="true" ma:displayName="Submitter ID" ma:default="" ma:internalName="SubmitterId" ma:readOnly="false">
+      <xsd:simpleType>
+        <xsd:restriction base="dms:Text"/>
+      </xsd:simpleType>
+    </xsd:element>
+    <xsd:element name="TaxCatchAll" ma:index="121" nillable="true" ma:displayName="Taxonomy Catch All Column" ma:hidden="true" ma:list="{530f955b-6704-4601-bd83-f81d87f1e440}" ma:internalName="TaxCatchAll" ma:showField="CatchAllData" ma:web="4873beb7-5857-4685-be1f-d57550cc96cc">
+      <xsd:complexType>
+        <xsd:complexContent>
+          <xsd:extension base="dms:MultiChoiceLookup">
+            <xsd:sequence>
+              <xsd:element name="Value" type="dms:Lookup" maxOccurs="unbounded" minOccurs="0" nillable="true"/>
+            </xsd:sequence>
+          </xsd:extension>
+        </xsd:complexContent>
+      </xsd:complexType>
+    </xsd:element>
+    <xsd:element name="TaxCatchAllLabel" ma:index="122" nillable="true" ma:displayName="Taxonomy Catch All Column1" ma:hidden="true" ma:list="{530f955b-6704-4601-bd83-f81d87f1e440}" ma:internalName="TaxCatchAllLabel" ma:readOnly="true" ma:showField="CatchAllDataLabel" ma:web="4873beb7-5857-4685-be1f-d57550cc96cc">
+      <xsd:complexType>
+        <xsd:complexContent>
+          <xsd:extension base="dms:MultiChoiceLookup">
+            <xsd:sequence>
+              <xsd:element name="Value" type="dms:Lookup" maxOccurs="unbounded" minOccurs="0" nillable="true"/>
+            </xsd:sequence>
+          </xsd:extension>
+        </xsd:complexContent>
+      </xsd:complexType>
+    </xsd:element>
+    <xsd:element name="TemplateStatus" ma:index="123" nillable="true" ma:displayName="Template Status" ma:default="" ma:internalName="TemplateStatus">
+      <xsd:simpleType>
+        <xsd:restriction base="dms:Unknown"/>
+      </xsd:simpleType>
+    </xsd:element>
+    <xsd:element name="TemplateTemplateType" ma:index="124" nillable="true" ma:displayName="Template Type" ma:default="" ma:internalName="TemplateTemplateType">
+      <xsd:simpleType>
+        <xsd:restriction base="dms:Unknown"/>
+      </xsd:simpleType>
+    </xsd:element>
+    <xsd:element name="ThumbnailAssetId" ma:index="125" nillable="true" ma:displayName="Thumbnail Image Asset" ma:default="" ma:internalName="ThumbnailAssetId" ma:readOnly="false">
+      <xsd:simpleType>
+        <xsd:restriction base="dms:Text"/>
+      </xsd:simpleType>
+    </xsd:element>
+    <xsd:element name="TimesCloned" ma:index="126" nillable="true" ma:displayName="Times Cloned" ma:default="" ma:internalName="TimesCloned" ma:readOnly="false">
+      <xsd:simpleType>
+        <xsd:restriction base="dms:Number"/>
+      </xsd:simpleType>
+    </xsd:element>
+    <xsd:element name="TrustLevel" ma:index="128" nillable="true" ma:displayName="Trust Level" ma:default="1 Microsoft Managed Content" ma:internalName="TrustLevel" ma:readOnly="false">
+      <xsd:simpleType>
+        <xsd:restriction base="dms:Unknown"/>
+      </xsd:simpleType>
+    </xsd:element>
+    <xsd:element name="UALocComments" ma:index="129" nillable="true" ma:displayName="UA Loc Comments" ma:default="" ma:internalName="UALocComments" ma:readOnly="false">
+      <xsd:simpleType>
+        <xsd:restriction base="dms:Note"/>
+      </xsd:simpleType>
+    </xsd:element>
+    <xsd:element name="UALocRecommendation" ma:index="130" nillable="true" ma:displayName="UA Loc Recommendation" ma:default="Localize" ma:internalName="UALocRecommendation" ma:readOnly="false">
+      <xsd:simpleType>
+        <xsd:restriction base="dms:Choice">
+          <xsd:enumeration value="Localize"/>
+          <xsd:enumeration value="Never Localize"/>
+          <xsd:enumeration value="Priority Localize"/>
+        </xsd:restriction>
+      </xsd:simpleType>
+    </xsd:element>
+    <xsd:element name="UANotes" ma:index="131" nillable="true" ma:displayName="UA Notes" ma:default="" ma:internalName="UANotes" ma:readOnly="false">
+      <xsd:simpleType>
+        <xsd:restriction base="dms:Note"/>
+      </xsd:simpleType>
+    </xsd:element>
+    <xsd:element name="TPAppVersion" ma:index="132" nillable="true" ma:displayName="Version" ma:default="" ma:internalName="TPAppVersion">
+      <xsd:simpleType>
+        <xsd:restriction base="dms:Text"/>
+      </xsd:simpleType>
+    </xsd:element>
+    <xsd:element name="VoteCount" ma:index="133" nillable="true" ma:displayName="Vote Count" ma:default="" ma:internalName="VoteCount" ma:readOnly="false">
+      <xsd:simpleType>
+        <xsd:restriction base="dms:Unknown"/>
+      </xsd:simpleType>
+    </xsd:element>
+  </xsd:schema>
+  <xsd:schema xmlns="http://schemas.openxmlformats.org/package/2006/metadata/core-properties" xmlns:xsd="http://www.w3.org/2001/XMLSchema" xmlns:xsi="http://www.w3.org/2001/XMLSchema-instance" xmlns:dc="http://purl.org/dc/elements/1.1/" xmlns:dcterms="http://purl.org/dc/terms/" xmlns:odoc="http://schemas.microsoft.com/internal/obd" targetNamespace="http://schemas.openxmlformats.org/package/2006/metadata/core-properties" elementFormDefault="qualified" attributeFormDefault="unqualified" blockDefault="#all">
+    <xsd:import namespace="http://purl.org/dc/elements/1.1/" schemaLocation="http://dublincore.org/schemas/xmls/qdc/2003/04/02/dc.xsd"/>
+    <xsd:import namespace="http://purl.org/dc/terms/" schemaLocation="http://dublincore.org/schemas/xmls/qdc/2003/04/02/dcterms.xsd"/>
+    <xsd:element name="coreProperties" type="CT_coreProperties"/>
+    <xsd:complexType name="CT_coreProperties">
+      <xsd:all>
+        <xsd:element ref="dc:creator" minOccurs="0" maxOccurs="1"/>
+        <xsd:element ref="dcterms:created" minOccurs="0" maxOccurs="1"/>
+        <xsd:element ref="dc:identifier" minOccurs="0" maxOccurs="1"/>
+        <xsd:element name="contentType" minOccurs="0" maxOccurs="1" type="xsd:string" ma:index="22" ma:displayName="Content Type"/>
+        <xsd:element ref="dc:title" minOccurs="0" maxOccurs="1" ma:index="127" ma:displayName="Title"/>
+        <xsd:element ref="dc:subject" minOccurs="0" maxOccurs="1"/>
+        <xsd:element ref="dc:description" minOccurs="0" maxOccurs="1"/>
+        <xsd:element name="keywords" minOccurs="0" maxOccurs="1" type="xsd:string"/>
+        <xsd:element ref="dc:language" minOccurs="0" maxOccurs="1"/>
+        <xsd:element name="category" minOccurs="0" maxOccurs="1" type="xsd:string"/>
+        <xsd:element name="version" minOccurs="0" maxOccurs="1" type="xsd:string"/>
+        <xsd:element name="revision" minOccurs="0" maxOccurs="1" type="xsd:string">
+          <xsd:annotation>
+            <xsd:documentation>
+                        This value indicates the number of saves or revisions. The application is responsible for updating this value after each revision.
+                    </xsd:documentation>
+          </xsd:annotation>
+        </xsd:element>
+        <xsd:element name="lastModifiedBy" minOccurs="0" maxOccurs="1" type="xsd:string"/>
+        <xsd:element ref="dcterms:modified" minOccurs="0" maxOccurs="1"/>
+        <xsd:element name="contentStatus" minOccurs="0" maxOccurs="1" type="xsd:string"/>
+      </xsd:all>
+    </xsd:complexType>
+  </xsd:schema>
+  <xs:schema xmlns:pc="http://schemas.microsoft.com/office/infopath/2007/PartnerControls" xmlns:xs="http://www.w3.org/2001/XMLSchema" targetNamespace="http://schemas.microsoft.com/office/infopath/2007/PartnerControls" elementFormDefault="qualified" attributeFormDefault="unqualified">
+    <xs:element name="Person">
+      <xs:complexType>
+        <xs:sequence>
+          <xs:element ref="pc:DisplayName" minOccurs="0"/>
+          <xs:element ref="pc:AccountId" minOccurs="0"/>
+          <xs:element ref="pc:AccountType" minOccurs="0"/>
+        </xs:sequence>
+      </xs:complexType>
+    </xs:element>
+    <xs:element name="DisplayName" type="xs:string"/>
+    <xs:element name="AccountId" type="xs:string"/>
+    <xs:element name="AccountType" type="xs:string"/>
+    <xs:element name="BDCAssociatedEntity">
+      <xs:complexType>
+        <xs:sequence>
+          <xs:element ref="pc:BDCEntity" minOccurs="0" maxOccurs="unbounded"/>
+        </xs:sequence>
+        <xs:attribute ref="pc:EntityNamespace"/>
+        <xs:attribute ref="pc:EntityName"/>
+        <xs:attribute ref="pc:SystemInstanceName"/>
+        <xs:attribute ref="pc:AssociationName"/>
+      </xs:complexType>
+    </xs:element>
+    <xs:attribute name="EntityNamespace" type="xs:string"/>
+    <xs:attribute name="EntityName" type="xs:string"/>
+    <xs:attribute name="SystemInstanceName" type="xs:string"/>
+    <xs:attribute name="AssociationName" type="xs:string"/>
+    <xs:element name="BDCEntity">
+      <xs:complexType>
+        <xs:sequence>
+          <xs:element ref="pc:EntityDisplayName" minOccurs="0"/>
+          <xs:element ref="pc:EntityInstanceReference" minOccurs="0"/>
+          <xs:element ref="pc:EntityId1" minOccurs="0"/>
+          <xs:element ref="pc:EntityId2" minOccurs="0"/>
+          <xs:element ref="pc:EntityId3" minOccurs="0"/>
+          <xs:element ref="pc:EntityId4" minOccurs="0"/>
+          <xs:element ref="pc:EntityId5" minOccurs="0"/>
+        </xs:sequence>
+      </xs:complexType>
+    </xs:element>
+    <xs:element name="EntityDisplayName" type="xs:string"/>
+    <xs:element name="EntityInstanceReference" type="xs:string"/>
+    <xs:element name="EntityId1" type="xs:string"/>
+    <xs:element name="EntityId2" type="xs:string"/>
+    <xs:element name="EntityId3" type="xs:string"/>
+    <xs:element name="EntityId4" type="xs:string"/>
+    <xs:element name="EntityId5" type="xs:string"/>
+    <xs:element name="Terms">
+      <xs:complexType>
+        <xs:sequence>
+          <xs:element ref="pc:TermInfo" minOccurs="0" maxOccurs="unbounded"/>
+        </xs:sequence>
+      </xs:complexType>
+    </xs:element>
+    <xs:element name="TermInfo">
+      <xs:complexType>
+        <xs:sequence>
+          <xs:element ref="pc:TermName" minOccurs="0"/>
+          <xs:element ref="pc:TermId" minOccurs="0"/>
+        </xs:sequence>
+      </xs:complexType>
+    </xs:element>
+    <xs:element name="TermName" type="xs:string"/>
+    <xs:element name="TermId" type="xs:string"/>
+  </xs:schema>
+</ct:contentTypeSchema>
+</file>
+
+<file path=customXml/item2.xml><?xml version="1.0" encoding="utf-8"?>
 <p:properties xmlns:p="http://schemas.microsoft.com/office/2006/metadata/properties" xmlns:xsi="http://www.w3.org/2001/XMLSchema-instance" xmlns:pc="http://schemas.microsoft.com/office/infopath/2007/PartnerControls">
   <documentManagement>
     <LocPublishedLinkedAssetsLookup xmlns="4873beb7-5857-4685-be1f-d57550cc96cc" xsi:nil="true"/>
@@ -10612,1046 +11672,6 @@
 </p:properties>
 </file>
 
-<file path=customXml/item2.xml><?xml version="1.0" encoding="utf-8"?>
-<ct:contentTypeSchema xmlns:ct="http://schemas.microsoft.com/office/2006/metadata/contentType" xmlns:ma="http://schemas.microsoft.com/office/2006/metadata/properties/metaAttributes" ct:_="" ma:_="" ma:contentTypeName="TemplateFile" ma:contentTypeID="0x0101006EDDDB5EE6D98C44930B742096920B300400F5B6D36B3EF94B4E9A635CDF2A18F5B8" ma:contentTypeVersion="72" ma:contentTypeDescription="Create a new document." ma:contentTypeScope="" ma:versionID="a23e56308344d904b51738559c3d67c9">
-  <xsd:schema xmlns:xsd="http://www.w3.org/2001/XMLSchema" xmlns:xs="http://www.w3.org/2001/XMLSchema" xmlns:p="http://schemas.microsoft.com/office/2006/metadata/properties" xmlns:ns2="4873beb7-5857-4685-be1f-d57550cc96cc" targetNamespace="http://schemas.microsoft.com/office/2006/metadata/properties" ma:root="true" ma:fieldsID="cd0908cc4600e77bf5da051303e00c8d" ns2:_="">
-    <xsd:import namespace="4873beb7-5857-4685-be1f-d57550cc96cc"/>
-    <xsd:element name="properties">
-      <xsd:complexType>
-        <xsd:sequence>
-          <xsd:element name="documentManagement">
-            <xsd:complexType>
-              <xsd:all>
-                <xsd:element ref="ns2:AcquiredFrom" minOccurs="0"/>
-                <xsd:element ref="ns2:UACurrentWords" minOccurs="0"/>
-                <xsd:element ref="ns2:TPApplication" minOccurs="0"/>
-                <xsd:element ref="ns2:ApprovalLog" minOccurs="0"/>
-                <xsd:element ref="ns2:ApprovalStatus" minOccurs="0"/>
-                <xsd:element ref="ns2:AssetStart" minOccurs="0"/>
-                <xsd:element ref="ns2:AssetExpire" minOccurs="0"/>
-                <xsd:element ref="ns2:AssetId" minOccurs="0"/>
-                <xsd:element ref="ns2:IsSearchable" minOccurs="0"/>
-                <xsd:element ref="ns2:AssetType" minOccurs="0"/>
-                <xsd:element ref="ns2:APAuthor" minOccurs="0"/>
-                <xsd:element ref="ns2:AverageRating" minOccurs="0"/>
-                <xsd:element ref="ns2:BlockPublish" minOccurs="0"/>
-                <xsd:element ref="ns2:BugNumber" minOccurs="0"/>
-                <xsd:element ref="ns2:CampaignTagsTaxHTField0" minOccurs="0"/>
-                <xsd:element ref="ns2:TPClientViewer" minOccurs="0"/>
-                <xsd:element ref="ns2:ClipArtFilename" minOccurs="0"/>
-                <xsd:element ref="ns2:TPCommandLine" minOccurs="0"/>
-                <xsd:element ref="ns2:TPComponent" minOccurs="0"/>
-                <xsd:element ref="ns2:ContentItem" minOccurs="0"/>
-                <xsd:element ref="ns2:CrawlForDependencies" minOccurs="0"/>
-                <xsd:element ref="ns2:CSXHash" minOccurs="0"/>
-                <xsd:element ref="ns2:CSXSubmissionMarket" minOccurs="0"/>
-                <xsd:element ref="ns2:CSXUpdate" minOccurs="0"/>
-                <xsd:element ref="ns2:IntlLangReviewDate" minOccurs="0"/>
-                <xsd:element ref="ns2:IsDeleted" minOccurs="0"/>
-                <xsd:element ref="ns2:APDescription" minOccurs="0"/>
-                <xsd:element ref="ns2:DirectSourceMarket" minOccurs="0"/>
-                <xsd:element ref="ns2:Downloads" minOccurs="0"/>
-                <xsd:element ref="ns2:DSATActionTaken" minOccurs="0"/>
-                <xsd:element ref="ns2:APEditor" minOccurs="0"/>
-                <xsd:element ref="ns2:EditorialStatus" minOccurs="0"/>
-                <xsd:element ref="ns2:EditorialTags" minOccurs="0"/>
-                <xsd:element ref="ns2:TPExecutable" minOccurs="0"/>
-                <xsd:element ref="ns2:FeatureTagsTaxHTField0" minOccurs="0"/>
-                <xsd:element ref="ns2:TPFriendlyName" minOccurs="0"/>
-                <xsd:element ref="ns2:FriendlyTitle" minOccurs="0"/>
-                <xsd:element ref="ns2:PrimaryImageGen" minOccurs="0"/>
-                <xsd:element ref="ns2:HandoffToMSDN" minOccurs="0"/>
-                <xsd:element ref="ns2:InProjectListLookup" minOccurs="0"/>
-                <xsd:element ref="ns2:TPInstallLocation" minOccurs="0"/>
-                <xsd:element ref="ns2:InternalTagsTaxHTField0" minOccurs="0"/>
-                <xsd:element ref="ns2:IntlLangReview" minOccurs="0"/>
-                <xsd:element ref="ns2:IntlLangReviewer" minOccurs="0"/>
-                <xsd:element ref="ns2:MarketSpecific" minOccurs="0"/>
-                <xsd:element ref="ns2:LastCompleteVersionLookup" minOccurs="0"/>
-                <xsd:element ref="ns2:LastHandOff" minOccurs="0"/>
-                <xsd:element ref="ns2:LastModifiedDateTime" minOccurs="0"/>
-                <xsd:element ref="ns2:LastPreviewErrorLookup" minOccurs="0"/>
-                <xsd:element ref="ns2:LastPreviewResultLookup" minOccurs="0"/>
-                <xsd:element ref="ns2:LastPreviewAttemptDateLookup" minOccurs="0"/>
-                <xsd:element ref="ns2:LastPreviewedByLookup" minOccurs="0"/>
-                <xsd:element ref="ns2:LastPreviewTimeLookup" minOccurs="0"/>
-                <xsd:element ref="ns2:LastPreviewVersionLookup" minOccurs="0"/>
-                <xsd:element ref="ns2:LastPublishErrorLookup" minOccurs="0"/>
-                <xsd:element ref="ns2:LastPublishResultLookup" minOccurs="0"/>
-                <xsd:element ref="ns2:LastPublishAttemptDateLookup" minOccurs="0"/>
-                <xsd:element ref="ns2:LastPublishedByLookup" minOccurs="0"/>
-                <xsd:element ref="ns2:LastPublishTimeLookup" minOccurs="0"/>
-                <xsd:element ref="ns2:LastPublishVersionLookup" minOccurs="0"/>
-                <xsd:element ref="ns2:TPLaunchHelpLinkType" minOccurs="0"/>
-                <xsd:element ref="ns2:LegacyData" minOccurs="0"/>
-                <xsd:element ref="ns2:TPLaunchHelpLink" minOccurs="0"/>
-                <xsd:element ref="ns2:LocComments" minOccurs="0"/>
-                <xsd:element ref="ns2:LocLastLocAttemptVersionLookup" minOccurs="0"/>
-                <xsd:element ref="ns2:LocLastLocAttemptVersionTypeLookup" minOccurs="0"/>
-                <xsd:element ref="ns2:LocManualTestRequired" minOccurs="0"/>
-                <xsd:element ref="ns2:LocMarketGroupTiers2" minOccurs="0"/>
-                <xsd:element ref="ns2:LocNewPublishedVersionLookup" minOccurs="0"/>
-                <xsd:element ref="ns2:LocOverallHandbackStatusLookup" minOccurs="0"/>
-                <xsd:element ref="ns2:LocOverallLocStatusLookup" minOccurs="0"/>
-                <xsd:element ref="ns2:LocOverallPreviewStatusLookup" minOccurs="0"/>
-                <xsd:element ref="ns2:LocOverallPublishStatusLookup" minOccurs="0"/>
-                <xsd:element ref="ns2:IntlLocPriority" minOccurs="0"/>
-                <xsd:element ref="ns2:LocProcessedForHandoffsLookup" minOccurs="0"/>
-                <xsd:element ref="ns2:LocProcessedForMarketsLookup" minOccurs="0"/>
-                <xsd:element ref="ns2:LocPublishedDependentAssetsLookup" minOccurs="0"/>
-                <xsd:element ref="ns2:LocPublishedLinkedAssetsLookup" minOccurs="0"/>
-                <xsd:element ref="ns2:LocRecommendedHandoff" minOccurs="0"/>
-                <xsd:element ref="ns2:LocalizationTagsTaxHTField0" minOccurs="0"/>
-                <xsd:element ref="ns2:MachineTranslated" minOccurs="0"/>
-                <xsd:element ref="ns2:Manager" minOccurs="0"/>
-                <xsd:element ref="ns2:Markets" minOccurs="0"/>
-                <xsd:element ref="ns2:Milestone" minOccurs="0"/>
-                <xsd:element ref="ns2:TPNamespace" minOccurs="0"/>
-                <xsd:element ref="ns2:NumericId" minOccurs="0"/>
-                <xsd:element ref="ns2:NumOfRatingsLookup" minOccurs="0"/>
-                <xsd:element ref="ns2:OOCacheId" minOccurs="0"/>
-                <xsd:element ref="ns2:OpenTemplate" minOccurs="0"/>
-                <xsd:element ref="ns2:OriginAsset" minOccurs="0"/>
-                <xsd:element ref="ns2:OriginalRelease" minOccurs="0"/>
-                <xsd:element ref="ns2:OriginalSourceMarket" minOccurs="0"/>
-                <xsd:element ref="ns2:OutputCachingOn" minOccurs="0"/>
-                <xsd:element ref="ns2:ParentAssetId" minOccurs="0"/>
-                <xsd:element ref="ns2:PlannedPubDate" minOccurs="0"/>
-                <xsd:element ref="ns2:PolicheckWords" minOccurs="0"/>
-                <xsd:element ref="ns2:BusinessGroup" minOccurs="0"/>
-                <xsd:element ref="ns2:UAProjectedTotalWords" minOccurs="0"/>
-                <xsd:element ref="ns2:Provider" minOccurs="0"/>
-                <xsd:element ref="ns2:Providers" minOccurs="0"/>
-                <xsd:element ref="ns2:PublishStatusLookup" minOccurs="0"/>
-                <xsd:element ref="ns2:PublishTargets" minOccurs="0"/>
-                <xsd:element ref="ns2:RecommendationsModifier" minOccurs="0"/>
-                <xsd:element ref="ns2:ArtSampleDocs" minOccurs="0"/>
-                <xsd:element ref="ns2:ScenarioTagsTaxHTField0" minOccurs="0"/>
-                <xsd:element ref="ns2:ShowIn" minOccurs="0"/>
-                <xsd:element ref="ns2:SourceTitle" minOccurs="0"/>
-                <xsd:element ref="ns2:CSXSubmissionDate" minOccurs="0"/>
-                <xsd:element ref="ns2:SubmitterId" minOccurs="0"/>
-                <xsd:element ref="ns2:TaxCatchAll" minOccurs="0"/>
-                <xsd:element ref="ns2:TaxCatchAllLabel" minOccurs="0"/>
-                <xsd:element ref="ns2:TemplateStatus" minOccurs="0"/>
-                <xsd:element ref="ns2:TemplateTemplateType" minOccurs="0"/>
-                <xsd:element ref="ns2:ThumbnailAssetId" minOccurs="0"/>
-                <xsd:element ref="ns2:TimesCloned" minOccurs="0"/>
-                <xsd:element ref="ns2:TrustLevel" minOccurs="0"/>
-                <xsd:element ref="ns2:UALocComments" minOccurs="0"/>
-                <xsd:element ref="ns2:UALocRecommendation" minOccurs="0"/>
-                <xsd:element ref="ns2:UANotes" minOccurs="0"/>
-                <xsd:element ref="ns2:TPAppVersion" minOccurs="0"/>
-                <xsd:element ref="ns2:VoteCount" minOccurs="0"/>
-              </xsd:all>
-            </xsd:complexType>
-          </xsd:element>
-        </xsd:sequence>
-      </xsd:complexType>
-    </xsd:element>
-  </xsd:schema>
-  <xsd:schema xmlns:xsd="http://www.w3.org/2001/XMLSchema" xmlns:xs="http://www.w3.org/2001/XMLSchema" xmlns:dms="http://schemas.microsoft.com/office/2006/documentManagement/types" xmlns:pc="http://schemas.microsoft.com/office/infopath/2007/PartnerControls" targetNamespace="4873beb7-5857-4685-be1f-d57550cc96cc" elementFormDefault="qualified">
-    <xsd:import namespace="http://schemas.microsoft.com/office/2006/documentManagement/types"/>
-    <xsd:import namespace="http://schemas.microsoft.com/office/infopath/2007/PartnerControls"/>
-    <xsd:element name="AcquiredFrom" ma:index="1" nillable="true" ma:displayName="Acquired From" ma:default="Internal MS" ma:internalName="AcquiredFrom" ma:readOnly="false">
-      <xsd:simpleType>
-        <xsd:restriction base="dms:Choice">
-          <xsd:enumeration value="Internal MS"/>
-          <xsd:enumeration value="Community"/>
-          <xsd:enumeration value="MVP"/>
-          <xsd:enumeration value="Publisher"/>
-          <xsd:enumeration value="Partner"/>
-          <xsd:enumeration value="None"/>
-        </xsd:restriction>
-      </xsd:simpleType>
-    </xsd:element>
-    <xsd:element name="UACurrentWords" ma:index="2" nillable="true" ma:displayName="Actual Word Count" ma:default="" ma:internalName="UACurrentWords" ma:readOnly="false">
-      <xsd:simpleType>
-        <xsd:restriction base="dms:Unknown"/>
-      </xsd:simpleType>
-    </xsd:element>
-    <xsd:element name="TPApplication" ma:index="3" nillable="true" ma:displayName="Application to Open Template With" ma:default="" ma:internalName="TPApplication">
-      <xsd:simpleType>
-        <xsd:restriction base="dms:Text"/>
-      </xsd:simpleType>
-    </xsd:element>
-    <xsd:element name="ApprovalLog" ma:index="4" nillable="true" ma:displayName="Approval Log" ma:default="" ma:hidden="true" ma:internalName="ApprovalLog" ma:readOnly="false">
-      <xsd:simpleType>
-        <xsd:restriction base="dms:Note"/>
-      </xsd:simpleType>
-    </xsd:element>
-    <xsd:element name="ApprovalStatus" ma:index="5" nillable="true" ma:displayName="Approval Status" ma:default="InProgress" ma:internalName="ApprovalStatus" ma:readOnly="false">
-      <xsd:simpleType>
-        <xsd:restriction base="dms:Choice">
-          <xsd:enumeration value="InProgress"/>
-          <xsd:enumeration value="Rejected"/>
-          <xsd:enumeration value="Questionable"/>
-          <xsd:enumeration value="ApprovedAutomatic"/>
-          <xsd:enumeration value="ApprovedManual"/>
-          <xsd:enumeration value="On Hold"/>
-          <xsd:enumeration value="Needs Review"/>
-          <xsd:enumeration value="A Violation"/>
-          <xsd:enumeration value="Unpublished Violation"/>
-        </xsd:restriction>
-      </xsd:simpleType>
-    </xsd:element>
-    <xsd:element name="AssetStart" ma:index="6" nillable="true" ma:displayName="Asset Begin Date" ma:default="[Today]" ma:internalName="AssetStart" ma:readOnly="false">
-      <xsd:simpleType>
-        <xsd:restriction base="dms:DateTime"/>
-      </xsd:simpleType>
-    </xsd:element>
-    <xsd:element name="AssetExpire" ma:index="7" nillable="true" ma:displayName="Asset End Date" ma:default="2029-01-01T08:00:00Z" ma:format="DateTime" ma:internalName="AssetExpire" ma:readOnly="false">
-      <xsd:simpleType>
-        <xsd:restriction base="dms:DateTime"/>
-      </xsd:simpleType>
-    </xsd:element>
-    <xsd:element name="AssetId" ma:index="8" nillable="true" ma:displayName="Asset ID" ma:default="" ma:indexed="true" ma:internalName="AssetId" ma:readOnly="false">
-      <xsd:simpleType>
-        <xsd:restriction base="dms:Text">
-          <xsd:maxLength value="255"/>
-        </xsd:restriction>
-      </xsd:simpleType>
-    </xsd:element>
-    <xsd:element name="IsSearchable" ma:index="9" nillable="true" ma:displayName="Asset Searchable?" ma:default="true" ma:internalName="IsSearchable" ma:readOnly="false">
-      <xsd:simpleType>
-        <xsd:restriction base="dms:Boolean"/>
-      </xsd:simpleType>
-    </xsd:element>
-    <xsd:element name="AssetType" ma:index="10" nillable="true" ma:displayName="Asset Type" ma:default="" ma:internalName="AssetType" ma:readOnly="false">
-      <xsd:simpleType>
-        <xsd:restriction base="dms:Unknown"/>
-      </xsd:simpleType>
-    </xsd:element>
-    <xsd:element name="APAuthor" ma:index="11" nillable="true" ma:displayName="Author" ma:default="" ma:list="UserInfo" ma:internalName="APAuthor" ma:readOnly="false">
-      <xsd:complexType>
-        <xsd:complexContent>
-          <xsd:extension base="dms:User">
-            <xsd:sequence>
-              <xsd:element name="UserInfo" minOccurs="0" maxOccurs="unbounded">
-                <xsd:complexType>
-                  <xsd:sequence>
-                    <xsd:element name="DisplayName" type="xsd:string" minOccurs="0"/>
-                    <xsd:element name="AccountId" type="dms:UserId" minOccurs="0" nillable="true"/>
-                    <xsd:element name="AccountType" type="xsd:string" minOccurs="0"/>
-                  </xsd:sequence>
-                </xsd:complexType>
-              </xsd:element>
-            </xsd:sequence>
-          </xsd:extension>
-        </xsd:complexContent>
-      </xsd:complexType>
-    </xsd:element>
-    <xsd:element name="AverageRating" ma:index="12" nillable="true" ma:displayName="Average Rating" ma:internalName="AverageRating" ma:readOnly="false">
-      <xsd:simpleType>
-        <xsd:restriction base="dms:Text"/>
-      </xsd:simpleType>
-    </xsd:element>
-    <xsd:element name="BlockPublish" ma:index="13" nillable="true" ma:displayName="Block from Publishing?" ma:default="" ma:internalName="BlockPublish" ma:readOnly="false">
-      <xsd:simpleType>
-        <xsd:restriction base="dms:Boolean"/>
-      </xsd:simpleType>
-    </xsd:element>
-    <xsd:element name="BugNumber" ma:index="14" nillable="true" ma:displayName="Bug Number" ma:default="" ma:internalName="BugNumber" ma:readOnly="false">
-      <xsd:simpleType>
-        <xsd:restriction base="dms:Text"/>
-      </xsd:simpleType>
-    </xsd:element>
-    <xsd:element name="CampaignTagsTaxHTField0" ma:index="16" nillable="true" ma:taxonomy="true" ma:internalName="CampaignTagsTaxHTField0" ma:taxonomyFieldName="CampaignTags" ma:displayName="Campaigns" ma:readOnly="false" ma:default="" ma:fieldId="{1df42cc3-2301-4f11-a52a-6ead923c29ed}" ma:taxonomyMulti="true" ma:sspId="8f79753a-75d3-41f5-8ca3-40b843941b4f" ma:termSetId="ca0e50d4-faa1-44ce-961e-bb1441c60e66" ma:anchorId="00000000-0000-0000-0000-000000000000" ma:open="false" ma:isKeyword="false">
-      <xsd:complexType>
-        <xsd:sequence>
-          <xsd:element ref="pc:Terms" minOccurs="0" maxOccurs="1"/>
-        </xsd:sequence>
-      </xsd:complexType>
-    </xsd:element>
-    <xsd:element name="TPClientViewer" ma:index="17" nillable="true" ma:displayName="Client Viewer" ma:default="" ma:internalName="TPClientViewer">
-      <xsd:simpleType>
-        <xsd:restriction base="dms:Text"/>
-      </xsd:simpleType>
-    </xsd:element>
-    <xsd:element name="ClipArtFilename" ma:index="18" nillable="true" ma:displayName="Clip Art Name" ma:default="" ma:internalName="ClipArtFilename" ma:readOnly="false">
-      <xsd:simpleType>
-        <xsd:restriction base="dms:Text"/>
-      </xsd:simpleType>
-    </xsd:element>
-    <xsd:element name="TPCommandLine" ma:index="19" nillable="true" ma:displayName="Command Line" ma:default="" ma:internalName="TPCommandLine">
-      <xsd:simpleType>
-        <xsd:restriction base="dms:Text"/>
-      </xsd:simpleType>
-    </xsd:element>
-    <xsd:element name="TPComponent" ma:index="20" nillable="true" ma:displayName="Component" ma:default="" ma:internalName="TPComponent">
-      <xsd:simpleType>
-        <xsd:restriction base="dms:Text"/>
-      </xsd:simpleType>
-    </xsd:element>
-    <xsd:element name="ContentItem" ma:index="21" nillable="true" ma:displayName="Content Item" ma:default="" ma:hidden="true" ma:internalName="ContentItem" ma:readOnly="false">
-      <xsd:simpleType>
-        <xsd:restriction base="dms:Unknown"/>
-      </xsd:simpleType>
-    </xsd:element>
-    <xsd:element name="CrawlForDependencies" ma:index="23" nillable="true" ma:displayName="Crawl for Dependencies?" ma:default="true" ma:internalName="CrawlForDependencies" ma:readOnly="false">
-      <xsd:simpleType>
-        <xsd:restriction base="dms:Boolean"/>
-      </xsd:simpleType>
-    </xsd:element>
-    <xsd:element name="CSXHash" ma:index="26" nillable="true" ma:displayName="CSX Hash" ma:default="" ma:indexed="true" ma:internalName="CSXHash" ma:readOnly="false">
-      <xsd:simpleType>
-        <xsd:restriction base="dms:Text"/>
-      </xsd:simpleType>
-    </xsd:element>
-    <xsd:element name="CSXSubmissionMarket" ma:index="27" nillable="true" ma:displayName="CSX Submission Market" ma:default="" ma:list="{2FBD1B11-2ACE-4FDC-B5A3-635D4ADF6F1B}" ma:internalName="CSXSubmissionMarket" ma:readOnly="false" ma:showField="MarketName" ma:web="4873beb7-5857-4685-be1f-d57550cc96cc">
-      <xsd:simpleType>
-        <xsd:restriction base="dms:Lookup"/>
-      </xsd:simpleType>
-    </xsd:element>
-    <xsd:element name="CSXUpdate" ma:index="28" nillable="true" ma:displayName="CSX Updated?" ma:default="false" ma:internalName="CSXUpdate" ma:readOnly="false">
-      <xsd:simpleType>
-        <xsd:restriction base="dms:Boolean"/>
-      </xsd:simpleType>
-    </xsd:element>
-    <xsd:element name="IntlLangReviewDate" ma:index="29" nillable="true" ma:displayName="Date to Complete Intl QA" ma:default="" ma:internalName="IntlLangReviewDate" ma:readOnly="false">
-      <xsd:simpleType>
-        <xsd:restriction base="dms:DateTime"/>
-      </xsd:simpleType>
-    </xsd:element>
-    <xsd:element name="IsDeleted" ma:index="30" nillable="true" ma:displayName="Deleted?" ma:default="" ma:internalName="IsDeleted" ma:readOnly="false">
-      <xsd:simpleType>
-        <xsd:restriction base="dms:Boolean"/>
-      </xsd:simpleType>
-    </xsd:element>
-    <xsd:element name="APDescription" ma:index="31" nillable="true" ma:displayName="Description" ma:default="" ma:internalName="APDescription" ma:readOnly="false">
-      <xsd:simpleType>
-        <xsd:restriction base="dms:Note"/>
-      </xsd:simpleType>
-    </xsd:element>
-    <xsd:element name="DirectSourceMarket" ma:index="32" nillable="true" ma:displayName="Direct Source Market Group" ma:default="" ma:internalName="DirectSourceMarket" ma:readOnly="false">
-      <xsd:simpleType>
-        <xsd:restriction base="dms:Text"/>
-      </xsd:simpleType>
-    </xsd:element>
-    <xsd:element name="Downloads" ma:index="33" nillable="true" ma:displayName="Downloads" ma:default="0" ma:hidden="true" ma:internalName="Downloads" ma:readOnly="false">
-      <xsd:simpleType>
-        <xsd:restriction base="dms:Unknown"/>
-      </xsd:simpleType>
-    </xsd:element>
-    <xsd:element name="DSATActionTaken" ma:index="34" nillable="true" ma:displayName="DSAT Action Taken" ma:default="" ma:internalName="DSATActionTaken" ma:readOnly="false">
-      <xsd:simpleType>
-        <xsd:restriction base="dms:Choice">
-          <xsd:enumeration value="Best Bets"/>
-          <xsd:enumeration value="Expire"/>
-          <xsd:enumeration value="Hide"/>
-          <xsd:enumeration value="None"/>
-        </xsd:restriction>
-      </xsd:simpleType>
-    </xsd:element>
-    <xsd:element name="APEditor" ma:index="35" nillable="true" ma:displayName="Editor" ma:default="" ma:list="UserInfo" ma:internalName="APEditor" ma:readOnly="false">
-      <xsd:complexType>
-        <xsd:complexContent>
-          <xsd:extension base="dms:User">
-            <xsd:sequence>
-              <xsd:element name="UserInfo" minOccurs="0" maxOccurs="unbounded">
-                <xsd:complexType>
-                  <xsd:sequence>
-                    <xsd:element name="DisplayName" type="xsd:string" minOccurs="0"/>
-                    <xsd:element name="AccountId" type="dms:UserId" minOccurs="0" nillable="true"/>
-                    <xsd:element name="AccountType" type="xsd:string" minOccurs="0"/>
-                  </xsd:sequence>
-                </xsd:complexType>
-              </xsd:element>
-            </xsd:sequence>
-          </xsd:extension>
-        </xsd:complexContent>
-      </xsd:complexType>
-    </xsd:element>
-    <xsd:element name="EditorialStatus" ma:index="36" nillable="true" ma:displayName="Editorial Status" ma:default="" ma:internalName="EditorialStatus" ma:readOnly="false">
-      <xsd:simpleType>
-        <xsd:restriction base="dms:Unknown"/>
-      </xsd:simpleType>
-    </xsd:element>
-    <xsd:element name="EditorialTags" ma:index="37" nillable="true" ma:displayName="Editorial Tags" ma:default="" ma:internalName="EditorialTags">
-      <xsd:simpleType>
-        <xsd:restriction base="dms:Unknown"/>
-      </xsd:simpleType>
-    </xsd:element>
-    <xsd:element name="TPExecutable" ma:index="38" nillable="true" ma:displayName="Executable" ma:default="" ma:internalName="TPExecutable">
-      <xsd:simpleType>
-        <xsd:restriction base="dms:Text"/>
-      </xsd:simpleType>
-    </xsd:element>
-    <xsd:element name="FeatureTagsTaxHTField0" ma:index="40" nillable="true" ma:taxonomy="true" ma:internalName="FeatureTagsTaxHTField0" ma:taxonomyFieldName="FeatureTags" ma:displayName="Features" ma:readOnly="false" ma:default="" ma:fieldId="{7fc0d542-15c6-4882-a8e3-13bca44403fb}" ma:taxonomyMulti="true" ma:sspId="8f79753a-75d3-41f5-8ca3-40b843941b4f" ma:termSetId="f1ab6845-967d-4854-a0ba-4ec07f0f8113" ma:anchorId="00000000-0000-0000-0000-000000000000" ma:open="false" ma:isKeyword="false">
-      <xsd:complexType>
-        <xsd:sequence>
-          <xsd:element ref="pc:Terms" minOccurs="0" maxOccurs="1"/>
-        </xsd:sequence>
-      </xsd:complexType>
-    </xsd:element>
-    <xsd:element name="TPFriendlyName" ma:index="41" nillable="true" ma:displayName="Friendly Name" ma:default="" ma:internalName="TPFriendlyName">
-      <xsd:simpleType>
-        <xsd:restriction base="dms:Text"/>
-      </xsd:simpleType>
-    </xsd:element>
-    <xsd:element name="FriendlyTitle" ma:index="42" nillable="true" ma:displayName="Friendly Title" ma:default="" ma:description="Shorter title to be used when displaying search results" ma:internalName="FriendlyTitle" ma:readOnly="false">
-      <xsd:simpleType>
-        <xsd:restriction base="dms:Text"/>
-      </xsd:simpleType>
-    </xsd:element>
-    <xsd:element name="PrimaryImageGen" ma:index="43" nillable="true" ma:displayName="Generate Images?" ma:default="true" ma:internalName="PrimaryImageGen">
-      <xsd:simpleType>
-        <xsd:restriction base="dms:Boolean"/>
-      </xsd:simpleType>
-    </xsd:element>
-    <xsd:element name="HandoffToMSDN" ma:index="44" nillable="true" ma:displayName="Handoff To MSDN Date" ma:default="" ma:internalName="HandoffToMSDN" ma:readOnly="false">
-      <xsd:simpleType>
-        <xsd:restriction base="dms:DateTime"/>
-      </xsd:simpleType>
-    </xsd:element>
-    <xsd:element name="InProjectListLookup" ma:index="45" nillable="true" ma:displayName="InProjectListLookup" ma:list="{9E343742-310B-4684-A24C-1D137CB4B230}" ma:internalName="InProjectListLookup" ma:readOnly="true" ma:showField="InProjectList" ma:web="4873beb7-5857-4685-be1f-d57550cc96cc">
-      <xsd:complexType>
-        <xsd:complexContent>
-          <xsd:extension base="dms:MultiChoiceLookup">
-            <xsd:sequence>
-              <xsd:element name="Value" type="dms:Lookup" maxOccurs="unbounded" minOccurs="0" nillable="true"/>
-            </xsd:sequence>
-          </xsd:extension>
-        </xsd:complexContent>
-      </xsd:complexType>
-    </xsd:element>
-    <xsd:element name="TPInstallLocation" ma:index="46" nillable="true" ma:displayName="Install Location" ma:default="" ma:internalName="TPInstallLocation">
-      <xsd:simpleType>
-        <xsd:restriction base="dms:Text"/>
-      </xsd:simpleType>
-    </xsd:element>
-    <xsd:element name="InternalTagsTaxHTField0" ma:index="48" nillable="true" ma:taxonomy="true" ma:internalName="InternalTagsTaxHTField0" ma:taxonomyFieldName="InternalTags" ma:displayName="Internal Tags" ma:readOnly="false" ma:default="" ma:fieldId="{1490b8a4-2706-41ec-b5e3-73176dccf34e}" ma:taxonomyMulti="true" ma:sspId="8f79753a-75d3-41f5-8ca3-40b843941b4f" ma:termSetId="82b6639e-f7fc-4c18-ad2d-003a6e707765" ma:anchorId="00000000-0000-0000-0000-000000000000" ma:open="false" ma:isKeyword="false">
-      <xsd:complexType>
-        <xsd:sequence>
-          <xsd:element ref="pc:Terms" minOccurs="0" maxOccurs="1"/>
-        </xsd:sequence>
-      </xsd:complexType>
-    </xsd:element>
-    <xsd:element name="IntlLangReview" ma:index="49" nillable="true" ma:displayName="Intl Lang QA Review Required?" ma:default="" ma:internalName="IntlLangReview" ma:readOnly="false">
-      <xsd:simpleType>
-        <xsd:restriction base="dms:Boolean"/>
-      </xsd:simpleType>
-    </xsd:element>
-    <xsd:element name="IntlLangReviewer" ma:index="50" nillable="true" ma:displayName="Intl Lang QA Reviewer" ma:default="" ma:internalName="IntlLangReviewer" ma:readOnly="false">
-      <xsd:simpleType>
-        <xsd:restriction base="dms:Text"/>
-      </xsd:simpleType>
-    </xsd:element>
-    <xsd:element name="MarketSpecific" ma:index="51" nillable="true" ma:displayName="Is Market Specific?" ma:default="" ma:internalName="MarketSpecific" ma:readOnly="false">
-      <xsd:simpleType>
-        <xsd:restriction base="dms:Boolean"/>
-      </xsd:simpleType>
-    </xsd:element>
-    <xsd:element name="LastCompleteVersionLookup" ma:index="52" nillable="true" ma:displayName="Last Complete Version Lookup" ma:default="" ma:list="{9E343742-310B-4684-A24C-1D137CB4B230}" ma:internalName="LastCompleteVersionLookup" ma:readOnly="true" ma:showField="LastCompleteVersion" ma:web="4873beb7-5857-4685-be1f-d57550cc96cc">
-      <xsd:complexType>
-        <xsd:complexContent>
-          <xsd:extension base="dms:MultiChoiceLookup">
-            <xsd:sequence>
-              <xsd:element name="Value" type="dms:Lookup" maxOccurs="unbounded" minOccurs="0" nillable="true"/>
-            </xsd:sequence>
-          </xsd:extension>
-        </xsd:complexContent>
-      </xsd:complexType>
-    </xsd:element>
-    <xsd:element name="LastHandOff" ma:index="53" nillable="true" ma:displayName="Last Hand-off" ma:default="" ma:internalName="LastHandOff" ma:readOnly="false">
-      <xsd:simpleType>
-        <xsd:restriction base="dms:DateTime"/>
-      </xsd:simpleType>
-    </xsd:element>
-    <xsd:element name="LastModifiedDateTime" ma:index="54" nillable="true" ma:displayName="Last Modified Date" ma:default="" ma:internalName="LastModifiedDateTime" ma:readOnly="false">
-      <xsd:simpleType>
-        <xsd:restriction base="dms:DateTime"/>
-      </xsd:simpleType>
-    </xsd:element>
-    <xsd:element name="LastPreviewErrorLookup" ma:index="55" nillable="true" ma:displayName="Last Preview Attempt Error" ma:default="" ma:list="{9E343742-310B-4684-A24C-1D137CB4B230}" ma:internalName="LastPreviewErrorLookup" ma:readOnly="true" ma:showField="LastPreviewError" ma:web="4873beb7-5857-4685-be1f-d57550cc96cc">
-      <xsd:complexType>
-        <xsd:complexContent>
-          <xsd:extension base="dms:MultiChoiceLookup">
-            <xsd:sequence>
-              <xsd:element name="Value" type="dms:Lookup" maxOccurs="unbounded" minOccurs="0" nillable="true"/>
-            </xsd:sequence>
-          </xsd:extension>
-        </xsd:complexContent>
-      </xsd:complexType>
-    </xsd:element>
-    <xsd:element name="LastPreviewResultLookup" ma:index="56" nillable="true" ma:displayName="Last Preview Attempt Result" ma:default="" ma:list="{9E343742-310B-4684-A24C-1D137CB4B230}" ma:internalName="LastPreviewResultLookup" ma:readOnly="true" ma:showField="LastPreviewResult" ma:web="4873beb7-5857-4685-be1f-d57550cc96cc">
-      <xsd:complexType>
-        <xsd:complexContent>
-          <xsd:extension base="dms:MultiChoiceLookup">
-            <xsd:sequence>
-              <xsd:element name="Value" type="dms:Lookup" maxOccurs="unbounded" minOccurs="0" nillable="true"/>
-            </xsd:sequence>
-          </xsd:extension>
-        </xsd:complexContent>
-      </xsd:complexType>
-    </xsd:element>
-    <xsd:element name="LastPreviewAttemptDateLookup" ma:index="57" nillable="true" ma:displayName="Last Preview Attempted On" ma:default="" ma:list="{9E343742-310B-4684-A24C-1D137CB4B230}" ma:internalName="LastPreviewAttemptDateLookup" ma:readOnly="true" ma:showField="LastPreviewAttemptDate" ma:web="4873beb7-5857-4685-be1f-d57550cc96cc">
-      <xsd:complexType>
-        <xsd:complexContent>
-          <xsd:extension base="dms:MultiChoiceLookup">
-            <xsd:sequence>
-              <xsd:element name="Value" type="dms:Lookup" maxOccurs="unbounded" minOccurs="0" nillable="true"/>
-            </xsd:sequence>
-          </xsd:extension>
-        </xsd:complexContent>
-      </xsd:complexType>
-    </xsd:element>
-    <xsd:element name="LastPreviewedByLookup" ma:index="58" nillable="true" ma:displayName="Last Previewed By" ma:default="" ma:list="{9E343742-310B-4684-A24C-1D137CB4B230}" ma:internalName="LastPreviewedByLookup" ma:readOnly="true" ma:showField="LastPreviewedBy" ma:web="4873beb7-5857-4685-be1f-d57550cc96cc">
-      <xsd:complexType>
-        <xsd:complexContent>
-          <xsd:extension base="dms:MultiChoiceLookup">
-            <xsd:sequence>
-              <xsd:element name="Value" type="dms:Lookup" maxOccurs="unbounded" minOccurs="0" nillable="true"/>
-            </xsd:sequence>
-          </xsd:extension>
-        </xsd:complexContent>
-      </xsd:complexType>
-    </xsd:element>
-    <xsd:element name="LastPreviewTimeLookup" ma:index="59" nillable="true" ma:displayName="Last Previewed Date" ma:default="" ma:list="{9E343742-310B-4684-A24C-1D137CB4B230}" ma:internalName="LastPreviewTimeLookup" ma:readOnly="true" ma:showField="LastPreviewTime" ma:web="4873beb7-5857-4685-be1f-d57550cc96cc">
-      <xsd:complexType>
-        <xsd:complexContent>
-          <xsd:extension base="dms:MultiChoiceLookup">
-            <xsd:sequence>
-              <xsd:element name="Value" type="dms:Lookup" maxOccurs="unbounded" minOccurs="0" nillable="true"/>
-            </xsd:sequence>
-          </xsd:extension>
-        </xsd:complexContent>
-      </xsd:complexType>
-    </xsd:element>
-    <xsd:element name="LastPreviewVersionLookup" ma:index="60" nillable="true" ma:displayName="Last Previewed Version" ma:default="" ma:list="{9E343742-310B-4684-A24C-1D137CB4B230}" ma:internalName="LastPreviewVersionLookup" ma:readOnly="true" ma:showField="LastPreviewVersion" ma:web="4873beb7-5857-4685-be1f-d57550cc96cc">
-      <xsd:complexType>
-        <xsd:complexContent>
-          <xsd:extension base="dms:MultiChoiceLookup">
-            <xsd:sequence>
-              <xsd:element name="Value" type="dms:Lookup" maxOccurs="unbounded" minOccurs="0" nillable="true"/>
-            </xsd:sequence>
-          </xsd:extension>
-        </xsd:complexContent>
-      </xsd:complexType>
-    </xsd:element>
-    <xsd:element name="LastPublishErrorLookup" ma:index="61" nillable="true" ma:displayName="Last Publish Attempt Error" ma:default="" ma:list="{9E343742-310B-4684-A24C-1D137CB4B230}" ma:internalName="LastPublishErrorLookup" ma:readOnly="true" ma:showField="LastPublishError" ma:web="4873beb7-5857-4685-be1f-d57550cc96cc">
-      <xsd:complexType>
-        <xsd:complexContent>
-          <xsd:extension base="dms:MultiChoiceLookup">
-            <xsd:sequence>
-              <xsd:element name="Value" type="dms:Lookup" maxOccurs="unbounded" minOccurs="0" nillable="true"/>
-            </xsd:sequence>
-          </xsd:extension>
-        </xsd:complexContent>
-      </xsd:complexType>
-    </xsd:element>
-    <xsd:element name="LastPublishResultLookup" ma:index="62" nillable="true" ma:displayName="Last Publish Attempt Result" ma:default="" ma:list="{9E343742-310B-4684-A24C-1D137CB4B230}" ma:internalName="LastPublishResultLookup" ma:readOnly="true" ma:showField="LastPublishResult" ma:web="4873beb7-5857-4685-be1f-d57550cc96cc">
-      <xsd:complexType>
-        <xsd:complexContent>
-          <xsd:extension base="dms:MultiChoiceLookup">
-            <xsd:sequence>
-              <xsd:element name="Value" type="dms:Lookup" maxOccurs="unbounded" minOccurs="0" nillable="true"/>
-            </xsd:sequence>
-          </xsd:extension>
-        </xsd:complexContent>
-      </xsd:complexType>
-    </xsd:element>
-    <xsd:element name="LastPublishAttemptDateLookup" ma:index="63" nillable="true" ma:displayName="Last Publish Attempted On" ma:default="" ma:list="{9E343742-310B-4684-A24C-1D137CB4B230}" ma:internalName="LastPublishAttemptDateLookup" ma:readOnly="true" ma:showField="LastPublishAttemptDate" ma:web="4873beb7-5857-4685-be1f-d57550cc96cc">
-      <xsd:complexType>
-        <xsd:complexContent>
-          <xsd:extension base="dms:MultiChoiceLookup">
-            <xsd:sequence>
-              <xsd:element name="Value" type="dms:Lookup" maxOccurs="unbounded" minOccurs="0" nillable="true"/>
-            </xsd:sequence>
-          </xsd:extension>
-        </xsd:complexContent>
-      </xsd:complexType>
-    </xsd:element>
-    <xsd:element name="LastPublishedByLookup" ma:index="64" nillable="true" ma:displayName="Last Published By" ma:default="" ma:list="{9E343742-310B-4684-A24C-1D137CB4B230}" ma:internalName="LastPublishedByLookup" ma:readOnly="true" ma:showField="LastPublishedBy" ma:web="4873beb7-5857-4685-be1f-d57550cc96cc">
-      <xsd:complexType>
-        <xsd:complexContent>
-          <xsd:extension base="dms:MultiChoiceLookup">
-            <xsd:sequence>
-              <xsd:element name="Value" type="dms:Lookup" maxOccurs="unbounded" minOccurs="0" nillable="true"/>
-            </xsd:sequence>
-          </xsd:extension>
-        </xsd:complexContent>
-      </xsd:complexType>
-    </xsd:element>
-    <xsd:element name="LastPublishTimeLookup" ma:index="65" nillable="true" ma:displayName="Last Published Date" ma:default="" ma:list="{9E343742-310B-4684-A24C-1D137CB4B230}" ma:internalName="LastPublishTimeLookup" ma:readOnly="true" ma:showField="LastPublishTime" ma:web="4873beb7-5857-4685-be1f-d57550cc96cc">
-      <xsd:complexType>
-        <xsd:complexContent>
-          <xsd:extension base="dms:MultiChoiceLookup">
-            <xsd:sequence>
-              <xsd:element name="Value" type="dms:Lookup" maxOccurs="unbounded" minOccurs="0" nillable="true"/>
-            </xsd:sequence>
-          </xsd:extension>
-        </xsd:complexContent>
-      </xsd:complexType>
-    </xsd:element>
-    <xsd:element name="LastPublishVersionLookup" ma:index="66" nillable="true" ma:displayName="Last Published Version" ma:default="" ma:list="{9E343742-310B-4684-A24C-1D137CB4B230}" ma:internalName="LastPublishVersionLookup" ma:readOnly="true" ma:showField="LastPublishVersion" ma:web="4873beb7-5857-4685-be1f-d57550cc96cc">
-      <xsd:complexType>
-        <xsd:complexContent>
-          <xsd:extension base="dms:MultiChoiceLookup">
-            <xsd:sequence>
-              <xsd:element name="Value" type="dms:Lookup" maxOccurs="unbounded" minOccurs="0" nillable="true"/>
-            </xsd:sequence>
-          </xsd:extension>
-        </xsd:complexContent>
-      </xsd:complexType>
-    </xsd:element>
-    <xsd:element name="TPLaunchHelpLinkType" ma:index="67" nillable="true" ma:displayName="Launch Help Link Type" ma:default="Template" ma:internalName="TPLaunchHelpLinkType">
-      <xsd:simpleType>
-        <xsd:restriction base="dms:Choice">
-          <xsd:enumeration value="Template"/>
-          <xsd:enumeration value="Training"/>
-          <xsd:enumeration value="URL"/>
-          <xsd:enumeration value="None"/>
-        </xsd:restriction>
-      </xsd:simpleType>
-    </xsd:element>
-    <xsd:element name="LegacyData" ma:index="68" nillable="true" ma:displayName="Legacy Data" ma:default="" ma:internalName="LegacyData" ma:readOnly="false">
-      <xsd:simpleType>
-        <xsd:restriction base="dms:Note"/>
-      </xsd:simpleType>
-    </xsd:element>
-    <xsd:element name="TPLaunchHelpLink" ma:index="69" nillable="true" ma:displayName="Link to Launch Help Topic" ma:default="" ma:internalName="TPLaunchHelpLink">
-      <xsd:simpleType>
-        <xsd:restriction base="dms:Text"/>
-      </xsd:simpleType>
-    </xsd:element>
-    <xsd:element name="LocComments" ma:index="70" nillable="true" ma:displayName="Loc Approval Comments" ma:default="" ma:internalName="LocComments" ma:readOnly="false">
-      <xsd:simpleType>
-        <xsd:restriction base="dms:Note"/>
-      </xsd:simpleType>
-    </xsd:element>
-    <xsd:element name="LocLastLocAttemptVersionLookup" ma:index="71" nillable="true" ma:displayName="Loc Last Loc Attempt Version" ma:default="" ma:list="{7DD1DCEC-E449-43D3-891F-7DC62F62AD21}" ma:internalName="LocLastLocAttemptVersionLookup" ma:readOnly="false" ma:showField="LastLocAttemptVersion" ma:web="4873beb7-5857-4685-be1f-d57550cc96cc">
-      <xsd:simpleType>
-        <xsd:restriction base="dms:Lookup"/>
-      </xsd:simpleType>
-    </xsd:element>
-    <xsd:element name="LocLastLocAttemptVersionTypeLookup" ma:index="72" nillable="true" ma:displayName="Loc Last Loc Attempt Version Type" ma:default="" ma:list="{7DD1DCEC-E449-43D3-891F-7DC62F62AD21}" ma:internalName="LocLastLocAttemptVersionTypeLookup" ma:readOnly="true" ma:showField="LastLocAttemptVersionType" ma:web="4873beb7-5857-4685-be1f-d57550cc96cc">
-      <xsd:simpleType>
-        <xsd:restriction base="dms:Lookup"/>
-      </xsd:simpleType>
-    </xsd:element>
-    <xsd:element name="LocManualTestRequired" ma:index="73" nillable="true" ma:displayName="Loc Manual Test Required" ma:default="" ma:internalName="LocManualTestRequired" ma:readOnly="false">
-      <xsd:simpleType>
-        <xsd:restriction base="dms:Boolean"/>
-      </xsd:simpleType>
-    </xsd:element>
-    <xsd:element name="LocMarketGroupTiers2" ma:index="74" nillable="true" ma:displayName="Loc Market Group Tiers" ma:internalName="LocMarketGroupTiers2" ma:readOnly="false">
-      <xsd:simpleType>
-        <xsd:restriction base="dms:Unknown"/>
-      </xsd:simpleType>
-    </xsd:element>
-    <xsd:element name="LocNewPublishedVersionLookup" ma:index="75" nillable="true" ma:displayName="Loc New Published Version Lookup" ma:default="" ma:list="{7DD1DCEC-E449-43D3-891F-7DC62F62AD21}" ma:internalName="LocNewPublishedVersionLookup" ma:readOnly="true" ma:showField="NewPublishedVersion" ma:web="4873beb7-5857-4685-be1f-d57550cc96cc">
-      <xsd:simpleType>
-        <xsd:restriction base="dms:Lookup"/>
-      </xsd:simpleType>
-    </xsd:element>
-    <xsd:element name="LocOverallHandbackStatusLookup" ma:index="76" nillable="true" ma:displayName="Loc Overall Handback Status" ma:default="" ma:list="{7DD1DCEC-E449-43D3-891F-7DC62F62AD21}" ma:internalName="LocOverallHandbackStatusLookup" ma:readOnly="true" ma:showField="OverallHandbackStatus" ma:web="4873beb7-5857-4685-be1f-d57550cc96cc">
-      <xsd:simpleType>
-        <xsd:restriction base="dms:Lookup"/>
-      </xsd:simpleType>
-    </xsd:element>
-    <xsd:element name="LocOverallLocStatusLookup" ma:index="77" nillable="true" ma:displayName="Loc Overall Localize Status" ma:default="" ma:list="{7DD1DCEC-E449-43D3-891F-7DC62F62AD21}" ma:internalName="LocOverallLocStatusLookup" ma:readOnly="true" ma:showField="OverallLocStatus" ma:web="4873beb7-5857-4685-be1f-d57550cc96cc">
-      <xsd:simpleType>
-        <xsd:restriction base="dms:Lookup"/>
-      </xsd:simpleType>
-    </xsd:element>
-    <xsd:element name="LocOverallPreviewStatusLookup" ma:index="78" nillable="true" ma:displayName="Loc Overall Preview Status" ma:default="" ma:list="{7DD1DCEC-E449-43D3-891F-7DC62F62AD21}" ma:internalName="LocOverallPreviewStatusLookup" ma:readOnly="true" ma:showField="OverallPreviewStatus" ma:web="4873beb7-5857-4685-be1f-d57550cc96cc">
-      <xsd:simpleType>
-        <xsd:restriction base="dms:Lookup"/>
-      </xsd:simpleType>
-    </xsd:element>
-    <xsd:element name="LocOverallPublishStatusLookup" ma:index="79" nillable="true" ma:displayName="Loc Overall Publish Status" ma:default="" ma:list="{7DD1DCEC-E449-43D3-891F-7DC62F62AD21}" ma:internalName="LocOverallPublishStatusLookup" ma:readOnly="true" ma:showField="OverallPublishStatus" ma:web="4873beb7-5857-4685-be1f-d57550cc96cc">
-      <xsd:simpleType>
-        <xsd:restriction base="dms:Lookup"/>
-      </xsd:simpleType>
-    </xsd:element>
-    <xsd:element name="IntlLocPriority" ma:index="80" nillable="true" ma:displayName="Loc Priority" ma:default="" ma:internalName="IntlLocPriority" ma:readOnly="false">
-      <xsd:simpleType>
-        <xsd:restriction base="dms:Unknown"/>
-      </xsd:simpleType>
-    </xsd:element>
-    <xsd:element name="LocProcessedForHandoffsLookup" ma:index="81" nillable="true" ma:displayName="Loc Processed For Handoffs" ma:default="" ma:list="{7DD1DCEC-E449-43D3-891F-7DC62F62AD21}" ma:internalName="LocProcessedForHandoffsLookup" ma:readOnly="true" ma:showField="ProcessedForHandoffs" ma:web="4873beb7-5857-4685-be1f-d57550cc96cc">
-      <xsd:simpleType>
-        <xsd:restriction base="dms:Lookup"/>
-      </xsd:simpleType>
-    </xsd:element>
-    <xsd:element name="LocProcessedForMarketsLookup" ma:index="82" nillable="true" ma:displayName="Loc Processed For Markets" ma:default="" ma:list="{7DD1DCEC-E449-43D3-891F-7DC62F62AD21}" ma:internalName="LocProcessedForMarketsLookup" ma:readOnly="true" ma:showField="ProcessedForMarkets" ma:web="4873beb7-5857-4685-be1f-d57550cc96cc">
-      <xsd:simpleType>
-        <xsd:restriction base="dms:Lookup"/>
-      </xsd:simpleType>
-    </xsd:element>
-    <xsd:element name="LocPublishedDependentAssetsLookup" ma:index="83" nillable="true" ma:displayName="Loc Published Dependent Assets" ma:default="" ma:list="{7DD1DCEC-E449-43D3-891F-7DC62F62AD21}" ma:internalName="LocPublishedDependentAssetsLookup" ma:readOnly="true" ma:showField="PublishedDependentAssets" ma:web="4873beb7-5857-4685-be1f-d57550cc96cc">
-      <xsd:simpleType>
-        <xsd:restriction base="dms:Lookup"/>
-      </xsd:simpleType>
-    </xsd:element>
-    <xsd:element name="LocPublishedLinkedAssetsLookup" ma:index="84" nillable="true" ma:displayName="Loc Published Linked Assets" ma:default="" ma:list="{7DD1DCEC-E449-43D3-891F-7DC62F62AD21}" ma:internalName="LocPublishedLinkedAssetsLookup" ma:readOnly="true" ma:showField="PublishedLinkedAssets" ma:web="4873beb7-5857-4685-be1f-d57550cc96cc">
-      <xsd:simpleType>
-        <xsd:restriction base="dms:Lookup"/>
-      </xsd:simpleType>
-    </xsd:element>
-    <xsd:element name="LocRecommendedHandoff" ma:index="85" nillable="true" ma:displayName="Loc Recommended Handoff" ma:default="" ma:indexed="true" ma:internalName="LocRecommendedHandoff" ma:readOnly="false">
-      <xsd:simpleType>
-        <xsd:restriction base="dms:Text"/>
-      </xsd:simpleType>
-    </xsd:element>
-    <xsd:element name="LocalizationTagsTaxHTField0" ma:index="87" nillable="true" ma:taxonomy="true" ma:internalName="LocalizationTagsTaxHTField0" ma:taxonomyFieldName="LocalizationTags" ma:displayName="Localization Tags" ma:readOnly="false" ma:default="" ma:fieldId="{00f02cb3-2c7c-424a-9c61-10e9b6878429}" ma:taxonomyMulti="true" ma:sspId="8f79753a-75d3-41f5-8ca3-40b843941b4f" ma:termSetId="5b7703a5-8e8b-4b58-8b31-1cea35331da3" ma:anchorId="00000000-0000-0000-0000-000000000000" ma:open="false" ma:isKeyword="false">
-      <xsd:complexType>
-        <xsd:sequence>
-          <xsd:element ref="pc:Terms" minOccurs="0" maxOccurs="1"/>
-        </xsd:sequence>
-      </xsd:complexType>
-    </xsd:element>
-    <xsd:element name="MachineTranslated" ma:index="88" nillable="true" ma:displayName="Machine Translated" ma:default="" ma:internalName="MachineTranslated" ma:readOnly="false">
-      <xsd:simpleType>
-        <xsd:restriction base="dms:Boolean"/>
-      </xsd:simpleType>
-    </xsd:element>
-    <xsd:element name="Manager" ma:index="89" nillable="true" ma:displayName="Manager" ma:hidden="true" ma:internalName="Manager" ma:readOnly="false">
-      <xsd:simpleType>
-        <xsd:restriction base="dms:Text"/>
-      </xsd:simpleType>
-    </xsd:element>
-    <xsd:element name="Markets" ma:index="90" nillable="true" ma:displayName="Markets" ma:default="" ma:description="Leave blank to show in all markets" ma:list="{2FBD1B11-2ACE-4FDC-B5A3-635D4ADF6F1B}" ma:internalName="Markets" ma:readOnly="false" ma:showField="MarketName" ma:web="4873beb7-5857-4685-be1f-d57550cc96cc">
-      <xsd:complexType>
-        <xsd:complexContent>
-          <xsd:extension base="dms:MultiChoiceLookup">
-            <xsd:sequence>
-              <xsd:element name="Value" type="dms:Lookup" maxOccurs="unbounded" minOccurs="0" nillable="true"/>
-            </xsd:sequence>
-          </xsd:extension>
-        </xsd:complexContent>
-      </xsd:complexType>
-    </xsd:element>
-    <xsd:element name="Milestone" ma:index="91" nillable="true" ma:displayName="Milestone" ma:default="" ma:internalName="Milestone" ma:readOnly="false">
-      <xsd:simpleType>
-        <xsd:restriction base="dms:Unknown"/>
-      </xsd:simpleType>
-    </xsd:element>
-    <xsd:element name="TPNamespace" ma:index="94" nillable="true" ma:displayName="Namespace" ma:default="" ma:internalName="TPNamespace">
-      <xsd:simpleType>
-        <xsd:restriction base="dms:Text"/>
-      </xsd:simpleType>
-    </xsd:element>
-    <xsd:element name="NumericId" ma:index="95" nillable="true" ma:displayName="Numeric ID" ma:default="" ma:indexed="true" ma:internalName="NumericId" ma:readOnly="false">
-      <xsd:simpleType>
-        <xsd:restriction base="dms:Number"/>
-      </xsd:simpleType>
-    </xsd:element>
-    <xsd:element name="NumOfRatingsLookup" ma:index="96" nillable="true" ma:displayName="NumOfRatings" ma:default="" ma:list="{9E343742-310B-4684-A24C-1D137CB4B230}" ma:internalName="NumOfRatingsLookup" ma:readOnly="true" ma:showField="NumOfRatings" ma:web="4873beb7-5857-4685-be1f-d57550cc96cc">
-      <xsd:complexType>
-        <xsd:complexContent>
-          <xsd:extension base="dms:MultiChoiceLookup">
-            <xsd:sequence>
-              <xsd:element name="Value" type="dms:Lookup" maxOccurs="unbounded" minOccurs="0" nillable="true"/>
-            </xsd:sequence>
-          </xsd:extension>
-        </xsd:complexContent>
-      </xsd:complexType>
-    </xsd:element>
-    <xsd:element name="OOCacheId" ma:index="97" nillable="true" ma:displayName="OOCacheId" ma:internalName="OOCacheId" ma:readOnly="false">
-      <xsd:simpleType>
-        <xsd:restriction base="dms:Text"/>
-      </xsd:simpleType>
-    </xsd:element>
-    <xsd:element name="OpenTemplate" ma:index="98" nillable="true" ma:displayName="Open Template" ma:default="true" ma:internalName="OpenTemplate">
-      <xsd:simpleType>
-        <xsd:restriction base="dms:Boolean"/>
-      </xsd:simpleType>
-    </xsd:element>
-    <xsd:element name="OriginAsset" ma:index="99" nillable="true" ma:displayName="Origin Asset" ma:default="" ma:internalName="OriginAsset" ma:readOnly="false">
-      <xsd:simpleType>
-        <xsd:restriction base="dms:Text"/>
-      </xsd:simpleType>
-    </xsd:element>
-    <xsd:element name="OriginalRelease" ma:index="100" nillable="true" ma:displayName="Original Release" ma:default="15" ma:internalName="OriginalRelease" ma:readOnly="false">
-      <xsd:simpleType>
-        <xsd:restriction base="dms:Choice">
-          <xsd:enumeration value="14"/>
-          <xsd:enumeration value="15"/>
-          <xsd:enumeration value="16"/>
-        </xsd:restriction>
-      </xsd:simpleType>
-    </xsd:element>
-    <xsd:element name="OriginalSourceMarket" ma:index="101" nillable="true" ma:displayName="Original Source Market Group" ma:default="" ma:internalName="OriginalSourceMarket" ma:readOnly="false">
-      <xsd:simpleType>
-        <xsd:restriction base="dms:Text"/>
-      </xsd:simpleType>
-    </xsd:element>
-    <xsd:element name="OutputCachingOn" ma:index="102" nillable="true" ma:displayName="Output Caching" ma:default="true" ma:hidden="true" ma:internalName="OutputCachingOn" ma:readOnly="false">
-      <xsd:simpleType>
-        <xsd:restriction base="dms:Boolean"/>
-      </xsd:simpleType>
-    </xsd:element>
-    <xsd:element name="ParentAssetId" ma:index="103" nillable="true" ma:displayName="Parent Asset Id" ma:default="" ma:internalName="ParentAssetId" ma:readOnly="false">
-      <xsd:simpleType>
-        <xsd:restriction base="dms:Text"/>
-      </xsd:simpleType>
-    </xsd:element>
-    <xsd:element name="PlannedPubDate" ma:index="104" nillable="true" ma:displayName="Planned Publish Date" ma:default="" ma:indexed="true" ma:internalName="PlannedPubDate" ma:readOnly="false">
-      <xsd:simpleType>
-        <xsd:restriction base="dms:DateTime"/>
-      </xsd:simpleType>
-    </xsd:element>
-    <xsd:element name="PolicheckWords" ma:index="105" nillable="true" ma:displayName="Policheck Words" ma:default="" ma:internalName="PolicheckWords" ma:readOnly="false">
-      <xsd:simpleType>
-        <xsd:restriction base="dms:Text"/>
-      </xsd:simpleType>
-    </xsd:element>
-    <xsd:element name="BusinessGroup" ma:index="106" nillable="true" ma:displayName="Product Division Owner" ma:default="" ma:internalName="BusinessGroup" ma:readOnly="false">
-      <xsd:simpleType>
-        <xsd:restriction base="dms:Unknown"/>
-      </xsd:simpleType>
-    </xsd:element>
-    <xsd:element name="UAProjectedTotalWords" ma:index="107" nillable="true" ma:displayName="Projected Word Count" ma:default="" ma:internalName="UAProjectedTotalWords" ma:readOnly="false">
-      <xsd:simpleType>
-        <xsd:restriction base="dms:Unknown"/>
-      </xsd:simpleType>
-    </xsd:element>
-    <xsd:element name="Provider" ma:index="108" nillable="true" ma:displayName="Provider" ma:default="" ma:internalName="Provider" ma:readOnly="false">
-      <xsd:simpleType>
-        <xsd:restriction base="dms:Unknown"/>
-      </xsd:simpleType>
-    </xsd:element>
-    <xsd:element name="Providers" ma:index="109" nillable="true" ma:displayName="Providers" ma:default="" ma:internalName="Providers">
-      <xsd:simpleType>
-        <xsd:restriction base="dms:Unknown"/>
-      </xsd:simpleType>
-    </xsd:element>
-    <xsd:element name="PublishStatusLookup" ma:index="110" nillable="true" ma:displayName="Publish Status" ma:default="" ma:list="{9E343742-310B-4684-A24C-1D137CB4B230}" ma:internalName="PublishStatusLookup" ma:readOnly="false" ma:showField="PublishStatus" ma:web="4873beb7-5857-4685-be1f-d57550cc96cc">
-      <xsd:complexType>
-        <xsd:complexContent>
-          <xsd:extension base="dms:MultiChoiceLookup">
-            <xsd:sequence>
-              <xsd:element name="Value" type="dms:Lookup" maxOccurs="unbounded" minOccurs="0" nillable="true"/>
-            </xsd:sequence>
-          </xsd:extension>
-        </xsd:complexContent>
-      </xsd:complexType>
-    </xsd:element>
-    <xsd:element name="PublishTargets" ma:index="111" nillable="true" ma:displayName="Publish Target" ma:default="OfficeOnlineVNext" ma:internalName="PublishTargets" ma:readOnly="false">
-      <xsd:simpleType>
-        <xsd:restriction base="dms:Unknown"/>
-      </xsd:simpleType>
-    </xsd:element>
-    <xsd:element name="RecommendationsModifier" ma:index="112" nillable="true" ma:displayName="Recommendations Modifier" ma:default="" ma:internalName="RecommendationsModifier" ma:readOnly="false">
-      <xsd:simpleType>
-        <xsd:restriction base="dms:Number"/>
-      </xsd:simpleType>
-    </xsd:element>
-    <xsd:element name="ArtSampleDocs" ma:index="113" nillable="true" ma:displayName="Sample Docs" ma:default="" ma:hidden="true" ma:internalName="ArtSampleDocs" ma:readOnly="false">
-      <xsd:simpleType>
-        <xsd:restriction base="dms:Text"/>
-      </xsd:simpleType>
-    </xsd:element>
-    <xsd:element name="ScenarioTagsTaxHTField0" ma:index="115" nillable="true" ma:taxonomy="true" ma:internalName="ScenarioTagsTaxHTField0" ma:taxonomyFieldName="ScenarioTags" ma:displayName="Scenarios" ma:readOnly="false" ma:default="" ma:fieldId="{93aef74d-6c78-4815-8310-51477dceeccc}" ma:taxonomyMulti="true" ma:sspId="8f79753a-75d3-41f5-8ca3-40b843941b4f" ma:termSetId="4b7d5f16-e2f2-4fc0-bab3-6e8b931e57d6" ma:anchorId="00000000-0000-0000-0000-000000000000" ma:open="false" ma:isKeyword="false">
-      <xsd:complexType>
-        <xsd:sequence>
-          <xsd:element ref="pc:Terms" minOccurs="0" maxOccurs="1"/>
-        </xsd:sequence>
-      </xsd:complexType>
-    </xsd:element>
-    <xsd:element name="ShowIn" ma:index="117" nillable="true" ma:displayName="Show In" ma:default="Show everywhere" ma:internalName="ShowIn" ma:readOnly="false">
-      <xsd:simpleType>
-        <xsd:restriction base="dms:Choice">
-          <xsd:enumeration value="Hide on web"/>
-          <xsd:enumeration value="On Web no search"/>
-          <xsd:enumeration value="Show everywhere"/>
-          <xsd:enumeration value="Special use only"/>
-        </xsd:restriction>
-      </xsd:simpleType>
-    </xsd:element>
-    <xsd:element name="SourceTitle" ma:index="118" nillable="true" ma:displayName="Source Title" ma:default="" ma:indexed="true" ma:internalName="SourceTitle" ma:readOnly="false">
-      <xsd:simpleType>
-        <xsd:restriction base="dms:Text"/>
-      </xsd:simpleType>
-    </xsd:element>
-    <xsd:element name="CSXSubmissionDate" ma:index="119" nillable="true" ma:displayName="Submission Date" ma:default="" ma:internalName="CSXSubmissionDate" ma:readOnly="false">
-      <xsd:simpleType>
-        <xsd:restriction base="dms:DateTime"/>
-      </xsd:simpleType>
-    </xsd:element>
-    <xsd:element name="SubmitterId" ma:index="120" nillable="true" ma:displayName="Submitter ID" ma:default="" ma:internalName="SubmitterId" ma:readOnly="false">
-      <xsd:simpleType>
-        <xsd:restriction base="dms:Text"/>
-      </xsd:simpleType>
-    </xsd:element>
-    <xsd:element name="TaxCatchAll" ma:index="121" nillable="true" ma:displayName="Taxonomy Catch All Column" ma:hidden="true" ma:list="{530f955b-6704-4601-bd83-f81d87f1e440}" ma:internalName="TaxCatchAll" ma:showField="CatchAllData" ma:web="4873beb7-5857-4685-be1f-d57550cc96cc">
-      <xsd:complexType>
-        <xsd:complexContent>
-          <xsd:extension base="dms:MultiChoiceLookup">
-            <xsd:sequence>
-              <xsd:element name="Value" type="dms:Lookup" maxOccurs="unbounded" minOccurs="0" nillable="true"/>
-            </xsd:sequence>
-          </xsd:extension>
-        </xsd:complexContent>
-      </xsd:complexType>
-    </xsd:element>
-    <xsd:element name="TaxCatchAllLabel" ma:index="122" nillable="true" ma:displayName="Taxonomy Catch All Column1" ma:hidden="true" ma:list="{530f955b-6704-4601-bd83-f81d87f1e440}" ma:internalName="TaxCatchAllLabel" ma:readOnly="true" ma:showField="CatchAllDataLabel" ma:web="4873beb7-5857-4685-be1f-d57550cc96cc">
-      <xsd:complexType>
-        <xsd:complexContent>
-          <xsd:extension base="dms:MultiChoiceLookup">
-            <xsd:sequence>
-              <xsd:element name="Value" type="dms:Lookup" maxOccurs="unbounded" minOccurs="0" nillable="true"/>
-            </xsd:sequence>
-          </xsd:extension>
-        </xsd:complexContent>
-      </xsd:complexType>
-    </xsd:element>
-    <xsd:element name="TemplateStatus" ma:index="123" nillable="true" ma:displayName="Template Status" ma:default="" ma:internalName="TemplateStatus">
-      <xsd:simpleType>
-        <xsd:restriction base="dms:Unknown"/>
-      </xsd:simpleType>
-    </xsd:element>
-    <xsd:element name="TemplateTemplateType" ma:index="124" nillable="true" ma:displayName="Template Type" ma:default="" ma:internalName="TemplateTemplateType">
-      <xsd:simpleType>
-        <xsd:restriction base="dms:Unknown"/>
-      </xsd:simpleType>
-    </xsd:element>
-    <xsd:element name="ThumbnailAssetId" ma:index="125" nillable="true" ma:displayName="Thumbnail Image Asset" ma:default="" ma:internalName="ThumbnailAssetId" ma:readOnly="false">
-      <xsd:simpleType>
-        <xsd:restriction base="dms:Text"/>
-      </xsd:simpleType>
-    </xsd:element>
-    <xsd:element name="TimesCloned" ma:index="126" nillable="true" ma:displayName="Times Cloned" ma:default="" ma:internalName="TimesCloned" ma:readOnly="false">
-      <xsd:simpleType>
-        <xsd:restriction base="dms:Number"/>
-      </xsd:simpleType>
-    </xsd:element>
-    <xsd:element name="TrustLevel" ma:index="128" nillable="true" ma:displayName="Trust Level" ma:default="1 Microsoft Managed Content" ma:internalName="TrustLevel" ma:readOnly="false">
-      <xsd:simpleType>
-        <xsd:restriction base="dms:Unknown"/>
-      </xsd:simpleType>
-    </xsd:element>
-    <xsd:element name="UALocComments" ma:index="129" nillable="true" ma:displayName="UA Loc Comments" ma:default="" ma:internalName="UALocComments" ma:readOnly="false">
-      <xsd:simpleType>
-        <xsd:restriction base="dms:Note"/>
-      </xsd:simpleType>
-    </xsd:element>
-    <xsd:element name="UALocRecommendation" ma:index="130" nillable="true" ma:displayName="UA Loc Recommendation" ma:default="Localize" ma:internalName="UALocRecommendation" ma:readOnly="false">
-      <xsd:simpleType>
-        <xsd:restriction base="dms:Choice">
-          <xsd:enumeration value="Localize"/>
-          <xsd:enumeration value="Never Localize"/>
-          <xsd:enumeration value="Priority Localize"/>
-        </xsd:restriction>
-      </xsd:simpleType>
-    </xsd:element>
-    <xsd:element name="UANotes" ma:index="131" nillable="true" ma:displayName="UA Notes" ma:default="" ma:internalName="UANotes" ma:readOnly="false">
-      <xsd:simpleType>
-        <xsd:restriction base="dms:Note"/>
-      </xsd:simpleType>
-    </xsd:element>
-    <xsd:element name="TPAppVersion" ma:index="132" nillable="true" ma:displayName="Version" ma:default="" ma:internalName="TPAppVersion">
-      <xsd:simpleType>
-        <xsd:restriction base="dms:Text"/>
-      </xsd:simpleType>
-    </xsd:element>
-    <xsd:element name="VoteCount" ma:index="133" nillable="true" ma:displayName="Vote Count" ma:default="" ma:internalName="VoteCount" ma:readOnly="false">
-      <xsd:simpleType>
-        <xsd:restriction base="dms:Unknown"/>
-      </xsd:simpleType>
-    </xsd:element>
-  </xsd:schema>
-  <xsd:schema xmlns="http://schemas.openxmlformats.org/package/2006/metadata/core-properties" xmlns:xsd="http://www.w3.org/2001/XMLSchema" xmlns:xsi="http://www.w3.org/2001/XMLSchema-instance" xmlns:dc="http://purl.org/dc/elements/1.1/" xmlns:dcterms="http://purl.org/dc/terms/" xmlns:odoc="http://schemas.microsoft.com/internal/obd" targetNamespace="http://schemas.openxmlformats.org/package/2006/metadata/core-properties" elementFormDefault="qualified" attributeFormDefault="unqualified" blockDefault="#all">
-    <xsd:import namespace="http://purl.org/dc/elements/1.1/" schemaLocation="http://dublincore.org/schemas/xmls/qdc/2003/04/02/dc.xsd"/>
-    <xsd:import namespace="http://purl.org/dc/terms/" schemaLocation="http://dublincore.org/schemas/xmls/qdc/2003/04/02/dcterms.xsd"/>
-    <xsd:element name="coreProperties" type="CT_coreProperties"/>
-    <xsd:complexType name="CT_coreProperties">
-      <xsd:all>
-        <xsd:element ref="dc:creator" minOccurs="0" maxOccurs="1"/>
-        <xsd:element ref="dcterms:created" minOccurs="0" maxOccurs="1"/>
-        <xsd:element ref="dc:identifier" minOccurs="0" maxOccurs="1"/>
-        <xsd:element name="contentType" minOccurs="0" maxOccurs="1" type="xsd:string" ma:index="22" ma:displayName="Content Type"/>
-        <xsd:element ref="dc:title" minOccurs="0" maxOccurs="1" ma:index="127" ma:displayName="Title"/>
-        <xsd:element ref="dc:subject" minOccurs="0" maxOccurs="1"/>
-        <xsd:element ref="dc:description" minOccurs="0" maxOccurs="1"/>
-        <xsd:element name="keywords" minOccurs="0" maxOccurs="1" type="xsd:string"/>
-        <xsd:element ref="dc:language" minOccurs="0" maxOccurs="1"/>
-        <xsd:element name="category" minOccurs="0" maxOccurs="1" type="xsd:string"/>
-        <xsd:element name="version" minOccurs="0" maxOccurs="1" type="xsd:string"/>
-        <xsd:element name="revision" minOccurs="0" maxOccurs="1" type="xsd:string">
-          <xsd:annotation>
-            <xsd:documentation>
-                        This value indicates the number of saves or revisions. The application is responsible for updating this value after each revision.
-                    </xsd:documentation>
-          </xsd:annotation>
-        </xsd:element>
-        <xsd:element name="lastModifiedBy" minOccurs="0" maxOccurs="1" type="xsd:string"/>
-        <xsd:element ref="dcterms:modified" minOccurs="0" maxOccurs="1"/>
-        <xsd:element name="contentStatus" minOccurs="0" maxOccurs="1" type="xsd:string"/>
-      </xsd:all>
-    </xsd:complexType>
-  </xsd:schema>
-  <xs:schema xmlns:pc="http://schemas.microsoft.com/office/infopath/2007/PartnerControls" xmlns:xs="http://www.w3.org/2001/XMLSchema" targetNamespace="http://schemas.microsoft.com/office/infopath/2007/PartnerControls" elementFormDefault="qualified" attributeFormDefault="unqualified">
-    <xs:element name="Person">
-      <xs:complexType>
-        <xs:sequence>
-          <xs:element ref="pc:DisplayName" minOccurs="0"/>
-          <xs:element ref="pc:AccountId" minOccurs="0"/>
-          <xs:element ref="pc:AccountType" minOccurs="0"/>
-        </xs:sequence>
-      </xs:complexType>
-    </xs:element>
-    <xs:element name="DisplayName" type="xs:string"/>
-    <xs:element name="AccountId" type="xs:string"/>
-    <xs:element name="AccountType" type="xs:string"/>
-    <xs:element name="BDCAssociatedEntity">
-      <xs:complexType>
-        <xs:sequence>
-          <xs:element ref="pc:BDCEntity" minOccurs="0" maxOccurs="unbounded"/>
-        </xs:sequence>
-        <xs:attribute ref="pc:EntityNamespace"/>
-        <xs:attribute ref="pc:EntityName"/>
-        <xs:attribute ref="pc:SystemInstanceName"/>
-        <xs:attribute ref="pc:AssociationName"/>
-      </xs:complexType>
-    </xs:element>
-    <xs:attribute name="EntityNamespace" type="xs:string"/>
-    <xs:attribute name="EntityName" type="xs:string"/>
-    <xs:attribute name="SystemInstanceName" type="xs:string"/>
-    <xs:attribute name="AssociationName" type="xs:string"/>
-    <xs:element name="BDCEntity">
-      <xs:complexType>
-        <xs:sequence>
-          <xs:element ref="pc:EntityDisplayName" minOccurs="0"/>
-          <xs:element ref="pc:EntityInstanceReference" minOccurs="0"/>
-          <xs:element ref="pc:EntityId1" minOccurs="0"/>
-          <xs:element ref="pc:EntityId2" minOccurs="0"/>
-          <xs:element ref="pc:EntityId3" minOccurs="0"/>
-          <xs:element ref="pc:EntityId4" minOccurs="0"/>
-          <xs:element ref="pc:EntityId5" minOccurs="0"/>
-        </xs:sequence>
-      </xs:complexType>
-    </xs:element>
-    <xs:element name="EntityDisplayName" type="xs:string"/>
-    <xs:element name="EntityInstanceReference" type="xs:string"/>
-    <xs:element name="EntityId1" type="xs:string"/>
-    <xs:element name="EntityId2" type="xs:string"/>
-    <xs:element name="EntityId3" type="xs:string"/>
-    <xs:element name="EntityId4" type="xs:string"/>
-    <xs:element name="EntityId5" type="xs:string"/>
-    <xs:element name="Terms">
-      <xs:complexType>
-        <xs:sequence>
-          <xs:element ref="pc:TermInfo" minOccurs="0" maxOccurs="unbounded"/>
-        </xs:sequence>
-      </xs:complexType>
-    </xs:element>
-    <xs:element name="TermInfo">
-      <xs:complexType>
-        <xs:sequence>
-          <xs:element ref="pc:TermName" minOccurs="0"/>
-          <xs:element ref="pc:TermId" minOccurs="0"/>
-        </xs:sequence>
-      </xs:complexType>
-    </xs:element>
-    <xs:element name="TermName" type="xs:string"/>
-    <xs:element name="TermId" type="xs:string"/>
-  </xs:schema>
-</ct:contentTypeSchema>
-</file>
-
 <file path=customXml/item3.xml><?xml version="1.0" encoding="utf-8"?>
 <?mso-contentType ?>
 <FormTemplates xmlns="http://schemas.microsoft.com/sharepoint/v3/contenttype/forms">
@@ -11662,22 +11682,6 @@
 </file>
 
 <file path=customXml/itemProps1.xml><?xml version="1.0" encoding="utf-8"?>
-<ds:datastoreItem xmlns:ds="http://schemas.openxmlformats.org/officeDocument/2006/customXml" ds:itemID="{60C67BEE-D13F-4BD2-98A5-34D8A0977F68}">
-  <ds:schemaRefs>
-    <ds:schemaRef ds:uri="4873beb7-5857-4685-be1f-d57550cc96cc"/>
-    <ds:schemaRef ds:uri="http://schemas.openxmlformats.org/package/2006/metadata/core-properties"/>
-    <ds:schemaRef ds:uri="http://purl.org/dc/terms/"/>
-    <ds:schemaRef ds:uri="http://schemas.microsoft.com/office/2006/documentManagement/types"/>
-    <ds:schemaRef ds:uri="http://purl.org/dc/elements/1.1/"/>
-    <ds:schemaRef ds:uri="http://schemas.microsoft.com/office/2006/metadata/properties"/>
-    <ds:schemaRef ds:uri="http://schemas.microsoft.com/office/infopath/2007/PartnerControls"/>
-    <ds:schemaRef ds:uri="http://www.w3.org/XML/1998/namespace"/>
-    <ds:schemaRef ds:uri="http://purl.org/dc/dcmitype/"/>
-  </ds:schemaRefs>
-</ds:datastoreItem>
-</file>
-
-<file path=customXml/itemProps2.xml><?xml version="1.0" encoding="utf-8"?>
 <ds:datastoreItem xmlns:ds="http://schemas.openxmlformats.org/officeDocument/2006/customXml" ds:itemID="{A09BF4D4-EF60-4196-BFC3-9462D607978C}">
   <ds:schemaRefs>
     <ds:schemaRef ds:uri="http://schemas.microsoft.com/office/2006/metadata/contentType"/>
@@ -11695,6 +11699,22 @@
 </ds:datastoreItem>
 </file>
 
+<file path=customXml/itemProps2.xml><?xml version="1.0" encoding="utf-8"?>
+<ds:datastoreItem xmlns:ds="http://schemas.openxmlformats.org/officeDocument/2006/customXml" ds:itemID="{60C67BEE-D13F-4BD2-98A5-34D8A0977F68}">
+  <ds:schemaRefs>
+    <ds:schemaRef ds:uri="4873beb7-5857-4685-be1f-d57550cc96cc"/>
+    <ds:schemaRef ds:uri="http://schemas.openxmlformats.org/package/2006/metadata/core-properties"/>
+    <ds:schemaRef ds:uri="http://purl.org/dc/terms/"/>
+    <ds:schemaRef ds:uri="http://schemas.microsoft.com/office/2006/documentManagement/types"/>
+    <ds:schemaRef ds:uri="http://purl.org/dc/elements/1.1/"/>
+    <ds:schemaRef ds:uri="http://schemas.microsoft.com/office/2006/metadata/properties"/>
+    <ds:schemaRef ds:uri="http://schemas.microsoft.com/office/infopath/2007/PartnerControls"/>
+    <ds:schemaRef ds:uri="http://www.w3.org/XML/1998/namespace"/>
+    <ds:schemaRef ds:uri="http://purl.org/dc/dcmitype/"/>
+  </ds:schemaRefs>
+</ds:datastoreItem>
+</file>
+
 <file path=customXml/itemProps3.xml><?xml version="1.0" encoding="utf-8"?>
 <ds:datastoreItem xmlns:ds="http://schemas.openxmlformats.org/officeDocument/2006/customXml" ds:itemID="{3836F65B-1B07-41EE-A0E8-BC6EF3855225}">
   <ds:schemaRefs>

</xml_diff>

<commit_message>
rough draft of pcbuild powerpoint complete
</commit_message>
<xml_diff>
--- a/buildPC.pptx
+++ b/buildPC.pptx
@@ -7733,17 +7733,116 @@
         </p:nvSpPr>
         <p:spPr>
           <a:xfrm>
-            <a:off x="867681" y="1016000"/>
-            <a:ext cx="11094131" cy="5461000"/>
+            <a:off x="1141412" y="1016000"/>
+            <a:ext cx="9753600" cy="5308600"/>
           </a:xfrm>
         </p:spPr>
         <p:txBody>
           <a:bodyPr>
-            <a:normAutofit/>
+            <a:normAutofit fontScale="92500" lnSpcReduction="20000"/>
           </a:bodyPr>
           <a:lstStyle/>
           <a:p>
-            <a:endParaRPr lang="en-US" sz="1600" dirty="0"/>
+            <a:pPr>
+              <a:lnSpc>
+                <a:spcPct val="150000"/>
+              </a:lnSpc>
+            </a:pPr>
+            <a:r>
+              <a:rPr lang="en-US" sz="1600" cap="none" dirty="0">
+                <a:latin typeface="Calibri" panose="020F0502020204030204" pitchFamily="34" charset="0"/>
+                <a:ea typeface="Calibri" panose="020F0502020204030204" pitchFamily="34" charset="0"/>
+                <a:cs typeface="Calibri" panose="020F0502020204030204" pitchFamily="34" charset="0"/>
+              </a:rPr>
+              <a:t>	</a:t>
+            </a:r>
+            <a:r>
+              <a:rPr lang="en-US" sz="1600" cap="none" dirty="0">
+                <a:solidFill>
+                  <a:schemeClr val="tx1"/>
+                </a:solidFill>
+                <a:latin typeface="Calibri" panose="020F0502020204030204" pitchFamily="34" charset="0"/>
+                <a:ea typeface="Calibri" panose="020F0502020204030204" pitchFamily="34" charset="0"/>
+                <a:cs typeface="Calibri" panose="020F0502020204030204" pitchFamily="34" charset="0"/>
+              </a:rPr>
+              <a:t>In this project I attempt to build a computer for Productivity, Virtualization, Entertainment, and Gaming for $1200. I chose a MSI B550 Tomahawk Motherboard with an 8-core AMD Ryzen 7 5800x CPU as the brains of the computer. The computer will feature a Cooler Master Hyper 212 CPU cooler and a Fractal Design Pop XL Air Full ATX case, for easy future upgrading. It will feature 32 GB of </a:t>
+            </a:r>
+            <a:r>
+              <a:rPr lang="en-US" sz="1600" cap="none" dirty="0" err="1">
+                <a:solidFill>
+                  <a:schemeClr val="tx1"/>
+                </a:solidFill>
+                <a:latin typeface="Calibri" panose="020F0502020204030204" pitchFamily="34" charset="0"/>
+                <a:ea typeface="Calibri" panose="020F0502020204030204" pitchFamily="34" charset="0"/>
+                <a:cs typeface="Calibri" panose="020F0502020204030204" pitchFamily="34" charset="0"/>
+              </a:rPr>
+              <a:t>G.Skill</a:t>
+            </a:r>
+            <a:r>
+              <a:rPr lang="en-US" sz="1600" cap="none" dirty="0">
+                <a:solidFill>
+                  <a:schemeClr val="tx1"/>
+                </a:solidFill>
+                <a:latin typeface="Calibri" panose="020F0502020204030204" pitchFamily="34" charset="0"/>
+                <a:ea typeface="Calibri" panose="020F0502020204030204" pitchFamily="34" charset="0"/>
+                <a:cs typeface="Calibri" panose="020F0502020204030204" pitchFamily="34" charset="0"/>
+              </a:rPr>
+              <a:t> DDR4 3200 RAM, along with a 500 GB SSD drive for the OS, and 6 TB of HDD for applications, data storage, and games. The video card will be a Radeon RX 6600 with 8Gb of GDDR6 memory. </a:t>
+            </a:r>
+          </a:p>
+          <a:p>
+            <a:pPr>
+              <a:lnSpc>
+                <a:spcPct val="150000"/>
+              </a:lnSpc>
+            </a:pPr>
+            <a:r>
+              <a:rPr lang="en-US" sz="1600" cap="none" dirty="0">
+                <a:solidFill>
+                  <a:schemeClr val="tx1"/>
+                </a:solidFill>
+                <a:latin typeface="Calibri" panose="020F0502020204030204" pitchFamily="34" charset="0"/>
+                <a:ea typeface="Calibri" panose="020F0502020204030204" pitchFamily="34" charset="0"/>
+                <a:cs typeface="Calibri" panose="020F0502020204030204" pitchFamily="34" charset="0"/>
+              </a:rPr>
+              <a:t>	If I had stopped with the initial build, I would have successfully built the Desktop for a subtotal of slightly more than $1200, pre-Black Friday / Cyber-Monday deals. I added 2 monitors for a dual monitor setup and ended up spending another $400. The subtotal with the monitors is $1622.69 on the Newegg.com website. I will end up adding a mechanical keyboard and triple monitor mount to bring the subtotal up to $1900 or more eventually. </a:t>
+            </a:r>
+          </a:p>
+          <a:p>
+            <a:pPr>
+              <a:lnSpc>
+                <a:spcPct val="150000"/>
+              </a:lnSpc>
+            </a:pPr>
+            <a:r>
+              <a:rPr lang="en-US" sz="1600" cap="none" dirty="0">
+                <a:solidFill>
+                  <a:schemeClr val="tx1"/>
+                </a:solidFill>
+                <a:latin typeface="Calibri" panose="020F0502020204030204" pitchFamily="34" charset="0"/>
+                <a:ea typeface="Calibri" panose="020F0502020204030204" pitchFamily="34" charset="0"/>
+                <a:cs typeface="Calibri" panose="020F0502020204030204" pitchFamily="34" charset="0"/>
+              </a:rPr>
+              <a:t>	I currently have 2 monitors and multiple keyboards and mice, so I could successfully build the desktop for a price in my budget. If I am to build this system, I will wait until Black Friday or Cyber Monday when many of these parts will be discounted.  </a:t>
+            </a:r>
+          </a:p>
+          <a:p>
+            <a:pPr>
+              <a:lnSpc>
+                <a:spcPct val="150000"/>
+              </a:lnSpc>
+            </a:pPr>
+            <a:r>
+              <a:rPr lang="en-US" sz="1600" cap="none" dirty="0">
+                <a:solidFill>
+                  <a:schemeClr val="tx1"/>
+                </a:solidFill>
+                <a:latin typeface="Calibri" panose="020F0502020204030204" pitchFamily="34" charset="0"/>
+                <a:ea typeface="Calibri" panose="020F0502020204030204" pitchFamily="34" charset="0"/>
+                <a:cs typeface="Calibri" panose="020F0502020204030204" pitchFamily="34" charset="0"/>
+              </a:rPr>
+              <a:t> </a:t>
+            </a:r>
           </a:p>
         </p:txBody>
       </p:sp>
@@ -10497,6 +10596,142 @@
 </file>
 
 <file path=customXml/item1.xml><?xml version="1.0" encoding="utf-8"?>
+<p:properties xmlns:p="http://schemas.microsoft.com/office/2006/metadata/properties" xmlns:xsi="http://www.w3.org/2001/XMLSchema-instance" xmlns:pc="http://schemas.microsoft.com/office/infopath/2007/PartnerControls">
+  <documentManagement>
+    <LocPublishedLinkedAssetsLookup xmlns="4873beb7-5857-4685-be1f-d57550cc96cc" xsi:nil="true"/>
+    <ApprovalStatus xmlns="4873beb7-5857-4685-be1f-d57550cc96cc">InProgress</ApprovalStatus>
+    <MarketSpecific xmlns="4873beb7-5857-4685-be1f-d57550cc96cc">false</MarketSpecific>
+    <LocComments xmlns="4873beb7-5857-4685-be1f-d57550cc96cc" xsi:nil="true"/>
+    <LocLastLocAttemptVersionTypeLookup xmlns="4873beb7-5857-4685-be1f-d57550cc96cc" xsi:nil="true"/>
+    <DirectSourceMarket xmlns="4873beb7-5857-4685-be1f-d57550cc96cc" xsi:nil="true"/>
+    <ThumbnailAssetId xmlns="4873beb7-5857-4685-be1f-d57550cc96cc" xsi:nil="true"/>
+    <PrimaryImageGen xmlns="4873beb7-5857-4685-be1f-d57550cc96cc">false</PrimaryImageGen>
+    <LocNewPublishedVersionLookup xmlns="4873beb7-5857-4685-be1f-d57550cc96cc" xsi:nil="true"/>
+    <LegacyData xmlns="4873beb7-5857-4685-be1f-d57550cc96cc" xsi:nil="true"/>
+    <LocRecommendedHandoff xmlns="4873beb7-5857-4685-be1f-d57550cc96cc" xsi:nil="true"/>
+    <BusinessGroup xmlns="4873beb7-5857-4685-be1f-d57550cc96cc" xsi:nil="true"/>
+    <BlockPublish xmlns="4873beb7-5857-4685-be1f-d57550cc96cc">false</BlockPublish>
+    <TPFriendlyName xmlns="4873beb7-5857-4685-be1f-d57550cc96cc" xsi:nil="true"/>
+    <LocOverallPublishStatusLookup xmlns="4873beb7-5857-4685-be1f-d57550cc96cc" xsi:nil="true"/>
+    <NumericId xmlns="4873beb7-5857-4685-be1f-d57550cc96cc" xsi:nil="true"/>
+    <APEditor xmlns="4873beb7-5857-4685-be1f-d57550cc96cc">
+      <UserInfo>
+        <DisplayName/>
+        <AccountId xsi:nil="true"/>
+        <AccountType/>
+      </UserInfo>
+    </APEditor>
+    <SourceTitle xmlns="4873beb7-5857-4685-be1f-d57550cc96cc" xsi:nil="true"/>
+    <OpenTemplate xmlns="4873beb7-5857-4685-be1f-d57550cc96cc">true</OpenTemplate>
+    <LocOverallLocStatusLookup xmlns="4873beb7-5857-4685-be1f-d57550cc96cc" xsi:nil="true"/>
+    <UALocComments xmlns="4873beb7-5857-4685-be1f-d57550cc96cc" xsi:nil="true"/>
+    <ParentAssetId xmlns="4873beb7-5857-4685-be1f-d57550cc96cc" xsi:nil="true"/>
+    <IntlLangReviewDate xmlns="4873beb7-5857-4685-be1f-d57550cc96cc" xsi:nil="true"/>
+    <FeatureTagsTaxHTField0 xmlns="4873beb7-5857-4685-be1f-d57550cc96cc">
+      <Terms xmlns="http://schemas.microsoft.com/office/infopath/2007/PartnerControls"/>
+    </FeatureTagsTaxHTField0>
+    <PublishStatusLookup xmlns="4873beb7-5857-4685-be1f-d57550cc96cc">
+      <Value>1345093</Value>
+    </PublishStatusLookup>
+    <Providers xmlns="4873beb7-5857-4685-be1f-d57550cc96cc" xsi:nil="true"/>
+    <MachineTranslated xmlns="4873beb7-5857-4685-be1f-d57550cc96cc">false</MachineTranslated>
+    <OriginalSourceMarket xmlns="4873beb7-5857-4685-be1f-d57550cc96cc" xsi:nil="true"/>
+    <APDescription xmlns="4873beb7-5857-4685-be1f-d57550cc96cc">This simple template design works for technology and  businesses, but it's versatile enough to use in other contexts.  It features multiple slide layouts designed for widescreen (16x9 resolution) and includes a sample SmartArt list and chart that are easily editable.</APDescription>
+    <ClipArtFilename xmlns="4873beb7-5857-4685-be1f-d57550cc96cc" xsi:nil="true"/>
+    <ContentItem xmlns="4873beb7-5857-4685-be1f-d57550cc96cc" xsi:nil="true"/>
+    <TPInstallLocation xmlns="4873beb7-5857-4685-be1f-d57550cc96cc" xsi:nil="true"/>
+    <PublishTargets xmlns="4873beb7-5857-4685-be1f-d57550cc96cc">OfficeOnlineVNext</PublishTargets>
+    <TimesCloned xmlns="4873beb7-5857-4685-be1f-d57550cc96cc" xsi:nil="true"/>
+    <AssetStart xmlns="4873beb7-5857-4685-be1f-d57550cc96cc">2011-11-26T00:30:00+00:00</AssetStart>
+    <Provider xmlns="4873beb7-5857-4685-be1f-d57550cc96cc" xsi:nil="true"/>
+    <AcquiredFrom xmlns="4873beb7-5857-4685-be1f-d57550cc96cc">Internal MS</AcquiredFrom>
+    <FriendlyTitle xmlns="4873beb7-5857-4685-be1f-d57550cc96cc" xsi:nil="true"/>
+    <LastHandOff xmlns="4873beb7-5857-4685-be1f-d57550cc96cc" xsi:nil="true"/>
+    <TPClientViewer xmlns="4873beb7-5857-4685-be1f-d57550cc96cc" xsi:nil="true"/>
+    <TemplateStatus xmlns="4873beb7-5857-4685-be1f-d57550cc96cc">Complete</TemplateStatus>
+    <Downloads xmlns="4873beb7-5857-4685-be1f-d57550cc96cc">0</Downloads>
+    <OOCacheId xmlns="4873beb7-5857-4685-be1f-d57550cc96cc" xsi:nil="true"/>
+    <IsDeleted xmlns="4873beb7-5857-4685-be1f-d57550cc96cc">false</IsDeleted>
+    <LocPublishedDependentAssetsLookup xmlns="4873beb7-5857-4685-be1f-d57550cc96cc" xsi:nil="true"/>
+    <TPExecutable xmlns="4873beb7-5857-4685-be1f-d57550cc96cc" xsi:nil="true"/>
+    <EditorialTags xmlns="4873beb7-5857-4685-be1f-d57550cc96cc" xsi:nil="true"/>
+    <SubmitterId xmlns="4873beb7-5857-4685-be1f-d57550cc96cc" xsi:nil="true"/>
+    <ApprovalLog xmlns="4873beb7-5857-4685-be1f-d57550cc96cc" xsi:nil="true"/>
+    <AssetType xmlns="4873beb7-5857-4685-be1f-d57550cc96cc">TP</AssetType>
+    <BugNumber xmlns="4873beb7-5857-4685-be1f-d57550cc96cc" xsi:nil="true"/>
+    <CSXSubmissionDate xmlns="4873beb7-5857-4685-be1f-d57550cc96cc" xsi:nil="true"/>
+    <CSXUpdate xmlns="4873beb7-5857-4685-be1f-d57550cc96cc">false</CSXUpdate>
+    <Milestone xmlns="4873beb7-5857-4685-be1f-d57550cc96cc" xsi:nil="true"/>
+    <RecommendationsModifier xmlns="4873beb7-5857-4685-be1f-d57550cc96cc" xsi:nil="true"/>
+    <OriginAsset xmlns="4873beb7-5857-4685-be1f-d57550cc96cc" xsi:nil="true"/>
+    <TPComponent xmlns="4873beb7-5857-4685-be1f-d57550cc96cc" xsi:nil="true"/>
+    <AssetId xmlns="4873beb7-5857-4685-be1f-d57550cc96cc">TP102787989</AssetId>
+    <IntlLocPriority xmlns="4873beb7-5857-4685-be1f-d57550cc96cc" xsi:nil="true"/>
+    <PolicheckWords xmlns="4873beb7-5857-4685-be1f-d57550cc96cc" xsi:nil="true"/>
+    <TPLaunchHelpLink xmlns="4873beb7-5857-4685-be1f-d57550cc96cc" xsi:nil="true"/>
+    <TPApplication xmlns="4873beb7-5857-4685-be1f-d57550cc96cc" xsi:nil="true"/>
+    <CrawlForDependencies xmlns="4873beb7-5857-4685-be1f-d57550cc96cc">false</CrawlForDependencies>
+    <HandoffToMSDN xmlns="4873beb7-5857-4685-be1f-d57550cc96cc" xsi:nil="true"/>
+    <PlannedPubDate xmlns="4873beb7-5857-4685-be1f-d57550cc96cc" xsi:nil="true"/>
+    <IntlLangReviewer xmlns="4873beb7-5857-4685-be1f-d57550cc96cc" xsi:nil="true"/>
+    <TrustLevel xmlns="4873beb7-5857-4685-be1f-d57550cc96cc">1 Microsoft Managed Content</TrustLevel>
+    <LocLastLocAttemptVersionLookup xmlns="4873beb7-5857-4685-be1f-d57550cc96cc">694266</LocLastLocAttemptVersionLookup>
+    <LocProcessedForHandoffsLookup xmlns="4873beb7-5857-4685-be1f-d57550cc96cc" xsi:nil="true"/>
+    <IsSearchable xmlns="4873beb7-5857-4685-be1f-d57550cc96cc">true</IsSearchable>
+    <TemplateTemplateType xmlns="4873beb7-5857-4685-be1f-d57550cc96cc">PowerPoint Presentation Template</TemplateTemplateType>
+    <CampaignTagsTaxHTField0 xmlns="4873beb7-5857-4685-be1f-d57550cc96cc">
+      <Terms xmlns="http://schemas.microsoft.com/office/infopath/2007/PartnerControls"/>
+    </CampaignTagsTaxHTField0>
+    <TPNamespace xmlns="4873beb7-5857-4685-be1f-d57550cc96cc" xsi:nil="true"/>
+    <LocOverallPreviewStatusLookup xmlns="4873beb7-5857-4685-be1f-d57550cc96cc" xsi:nil="true"/>
+    <TaxCatchAll xmlns="4873beb7-5857-4685-be1f-d57550cc96cc"/>
+    <Markets xmlns="4873beb7-5857-4685-be1f-d57550cc96cc"/>
+    <UAProjectedTotalWords xmlns="4873beb7-5857-4685-be1f-d57550cc96cc" xsi:nil="true"/>
+    <IntlLangReview xmlns="4873beb7-5857-4685-be1f-d57550cc96cc" xsi:nil="true"/>
+    <OutputCachingOn xmlns="4873beb7-5857-4685-be1f-d57550cc96cc">false</OutputCachingOn>
+    <AverageRating xmlns="4873beb7-5857-4685-be1f-d57550cc96cc" xsi:nil="true"/>
+    <APAuthor xmlns="4873beb7-5857-4685-be1f-d57550cc96cc">
+      <UserInfo>
+        <DisplayName>REDMOND\kristaa</DisplayName>
+        <AccountId>136</AccountId>
+        <AccountType/>
+      </UserInfo>
+    </APAuthor>
+    <LocManualTestRequired xmlns="4873beb7-5857-4685-be1f-d57550cc96cc">false</LocManualTestRequired>
+    <TPCommandLine xmlns="4873beb7-5857-4685-be1f-d57550cc96cc" xsi:nil="true"/>
+    <TPAppVersion xmlns="4873beb7-5857-4685-be1f-d57550cc96cc" xsi:nil="true"/>
+    <EditorialStatus xmlns="4873beb7-5857-4685-be1f-d57550cc96cc">Complete</EditorialStatus>
+    <LastModifiedDateTime xmlns="4873beb7-5857-4685-be1f-d57550cc96cc" xsi:nil="true"/>
+    <ScenarioTagsTaxHTField0 xmlns="4873beb7-5857-4685-be1f-d57550cc96cc">
+      <Terms xmlns="http://schemas.microsoft.com/office/infopath/2007/PartnerControls"/>
+    </ScenarioTagsTaxHTField0>
+    <LocProcessedForMarketsLookup xmlns="4873beb7-5857-4685-be1f-d57550cc96cc" xsi:nil="true"/>
+    <TPLaunchHelpLinkType xmlns="4873beb7-5857-4685-be1f-d57550cc96cc">Template</TPLaunchHelpLinkType>
+    <OriginalRelease xmlns="4873beb7-5857-4685-be1f-d57550cc96cc">15</OriginalRelease>
+    <LocalizationTagsTaxHTField0 xmlns="4873beb7-5857-4685-be1f-d57550cc96cc">
+      <Terms xmlns="http://schemas.microsoft.com/office/infopath/2007/PartnerControls"/>
+    </LocalizationTagsTaxHTField0>
+    <UACurrentWords xmlns="4873beb7-5857-4685-be1f-d57550cc96cc" xsi:nil="true"/>
+    <ArtSampleDocs xmlns="4873beb7-5857-4685-be1f-d57550cc96cc" xsi:nil="true"/>
+    <UALocRecommendation xmlns="4873beb7-5857-4685-be1f-d57550cc96cc">Localize</UALocRecommendation>
+    <Manager xmlns="4873beb7-5857-4685-be1f-d57550cc96cc" xsi:nil="true"/>
+    <LocOverallHandbackStatusLookup xmlns="4873beb7-5857-4685-be1f-d57550cc96cc" xsi:nil="true"/>
+    <ShowIn xmlns="4873beb7-5857-4685-be1f-d57550cc96cc">Show everywhere</ShowIn>
+    <UANotes xmlns="4873beb7-5857-4685-be1f-d57550cc96cc" xsi:nil="true"/>
+    <InternalTagsTaxHTField0 xmlns="4873beb7-5857-4685-be1f-d57550cc96cc">
+      <Terms xmlns="http://schemas.microsoft.com/office/infopath/2007/PartnerControls"/>
+    </InternalTagsTaxHTField0>
+    <CSXHash xmlns="4873beb7-5857-4685-be1f-d57550cc96cc" xsi:nil="true"/>
+    <VoteCount xmlns="4873beb7-5857-4685-be1f-d57550cc96cc" xsi:nil="true"/>
+    <AssetExpire xmlns="4873beb7-5857-4685-be1f-d57550cc96cc">2029-05-12T07:00:00+00:00</AssetExpire>
+    <DSATActionTaken xmlns="4873beb7-5857-4685-be1f-d57550cc96cc" xsi:nil="true"/>
+    <CSXSubmissionMarket xmlns="4873beb7-5857-4685-be1f-d57550cc96cc" xsi:nil="true"/>
+    <LocMarketGroupTiers2 xmlns="4873beb7-5857-4685-be1f-d57550cc96cc" xsi:nil="true"/>
+  </documentManagement>
+</p:properties>
+</file>
+
+<file path=customXml/item2.xml><?xml version="1.0" encoding="utf-8"?>
 <ct:contentTypeSchema xmlns:ct="http://schemas.microsoft.com/office/2006/metadata/contentType" xmlns:ma="http://schemas.microsoft.com/office/2006/metadata/properties/metaAttributes" ct:_="" ma:_="" ma:contentTypeName="TemplateFile" ma:contentTypeID="0x0101006EDDDB5EE6D98C44930B742096920B300400F5B6D36B3EF94B4E9A635CDF2A18F5B8" ma:contentTypeVersion="72" ma:contentTypeDescription="Create a new document." ma:contentTypeScope="" ma:versionID="a23e56308344d904b51738559c3d67c9">
   <xsd:schema xmlns:xsd="http://www.w3.org/2001/XMLSchema" xmlns:xs="http://www.w3.org/2001/XMLSchema" xmlns:p="http://schemas.microsoft.com/office/2006/metadata/properties" xmlns:ns2="4873beb7-5857-4685-be1f-d57550cc96cc" targetNamespace="http://schemas.microsoft.com/office/2006/metadata/properties" ma:root="true" ma:fieldsID="cd0908cc4600e77bf5da051303e00c8d" ns2:_="">
     <xsd:import namespace="4873beb7-5857-4685-be1f-d57550cc96cc"/>
@@ -11536,142 +11771,6 @@
 </ct:contentTypeSchema>
 </file>
 
-<file path=customXml/item2.xml><?xml version="1.0" encoding="utf-8"?>
-<p:properties xmlns:p="http://schemas.microsoft.com/office/2006/metadata/properties" xmlns:xsi="http://www.w3.org/2001/XMLSchema-instance" xmlns:pc="http://schemas.microsoft.com/office/infopath/2007/PartnerControls">
-  <documentManagement>
-    <LocPublishedLinkedAssetsLookup xmlns="4873beb7-5857-4685-be1f-d57550cc96cc" xsi:nil="true"/>
-    <ApprovalStatus xmlns="4873beb7-5857-4685-be1f-d57550cc96cc">InProgress</ApprovalStatus>
-    <MarketSpecific xmlns="4873beb7-5857-4685-be1f-d57550cc96cc">false</MarketSpecific>
-    <LocComments xmlns="4873beb7-5857-4685-be1f-d57550cc96cc" xsi:nil="true"/>
-    <LocLastLocAttemptVersionTypeLookup xmlns="4873beb7-5857-4685-be1f-d57550cc96cc" xsi:nil="true"/>
-    <DirectSourceMarket xmlns="4873beb7-5857-4685-be1f-d57550cc96cc" xsi:nil="true"/>
-    <ThumbnailAssetId xmlns="4873beb7-5857-4685-be1f-d57550cc96cc" xsi:nil="true"/>
-    <PrimaryImageGen xmlns="4873beb7-5857-4685-be1f-d57550cc96cc">false</PrimaryImageGen>
-    <LocNewPublishedVersionLookup xmlns="4873beb7-5857-4685-be1f-d57550cc96cc" xsi:nil="true"/>
-    <LegacyData xmlns="4873beb7-5857-4685-be1f-d57550cc96cc" xsi:nil="true"/>
-    <LocRecommendedHandoff xmlns="4873beb7-5857-4685-be1f-d57550cc96cc" xsi:nil="true"/>
-    <BusinessGroup xmlns="4873beb7-5857-4685-be1f-d57550cc96cc" xsi:nil="true"/>
-    <BlockPublish xmlns="4873beb7-5857-4685-be1f-d57550cc96cc">false</BlockPublish>
-    <TPFriendlyName xmlns="4873beb7-5857-4685-be1f-d57550cc96cc" xsi:nil="true"/>
-    <LocOverallPublishStatusLookup xmlns="4873beb7-5857-4685-be1f-d57550cc96cc" xsi:nil="true"/>
-    <NumericId xmlns="4873beb7-5857-4685-be1f-d57550cc96cc" xsi:nil="true"/>
-    <APEditor xmlns="4873beb7-5857-4685-be1f-d57550cc96cc">
-      <UserInfo>
-        <DisplayName/>
-        <AccountId xsi:nil="true"/>
-        <AccountType/>
-      </UserInfo>
-    </APEditor>
-    <SourceTitle xmlns="4873beb7-5857-4685-be1f-d57550cc96cc" xsi:nil="true"/>
-    <OpenTemplate xmlns="4873beb7-5857-4685-be1f-d57550cc96cc">true</OpenTemplate>
-    <LocOverallLocStatusLookup xmlns="4873beb7-5857-4685-be1f-d57550cc96cc" xsi:nil="true"/>
-    <UALocComments xmlns="4873beb7-5857-4685-be1f-d57550cc96cc" xsi:nil="true"/>
-    <ParentAssetId xmlns="4873beb7-5857-4685-be1f-d57550cc96cc" xsi:nil="true"/>
-    <IntlLangReviewDate xmlns="4873beb7-5857-4685-be1f-d57550cc96cc" xsi:nil="true"/>
-    <FeatureTagsTaxHTField0 xmlns="4873beb7-5857-4685-be1f-d57550cc96cc">
-      <Terms xmlns="http://schemas.microsoft.com/office/infopath/2007/PartnerControls"/>
-    </FeatureTagsTaxHTField0>
-    <PublishStatusLookup xmlns="4873beb7-5857-4685-be1f-d57550cc96cc">
-      <Value>1345093</Value>
-    </PublishStatusLookup>
-    <Providers xmlns="4873beb7-5857-4685-be1f-d57550cc96cc" xsi:nil="true"/>
-    <MachineTranslated xmlns="4873beb7-5857-4685-be1f-d57550cc96cc">false</MachineTranslated>
-    <OriginalSourceMarket xmlns="4873beb7-5857-4685-be1f-d57550cc96cc" xsi:nil="true"/>
-    <APDescription xmlns="4873beb7-5857-4685-be1f-d57550cc96cc">This simple template design works for technology and  businesses, but it's versatile enough to use in other contexts.  It features multiple slide layouts designed for widescreen (16x9 resolution) and includes a sample SmartArt list and chart that are easily editable.</APDescription>
-    <ClipArtFilename xmlns="4873beb7-5857-4685-be1f-d57550cc96cc" xsi:nil="true"/>
-    <ContentItem xmlns="4873beb7-5857-4685-be1f-d57550cc96cc" xsi:nil="true"/>
-    <TPInstallLocation xmlns="4873beb7-5857-4685-be1f-d57550cc96cc" xsi:nil="true"/>
-    <PublishTargets xmlns="4873beb7-5857-4685-be1f-d57550cc96cc">OfficeOnlineVNext</PublishTargets>
-    <TimesCloned xmlns="4873beb7-5857-4685-be1f-d57550cc96cc" xsi:nil="true"/>
-    <AssetStart xmlns="4873beb7-5857-4685-be1f-d57550cc96cc">2011-11-26T00:30:00+00:00</AssetStart>
-    <Provider xmlns="4873beb7-5857-4685-be1f-d57550cc96cc" xsi:nil="true"/>
-    <AcquiredFrom xmlns="4873beb7-5857-4685-be1f-d57550cc96cc">Internal MS</AcquiredFrom>
-    <FriendlyTitle xmlns="4873beb7-5857-4685-be1f-d57550cc96cc" xsi:nil="true"/>
-    <LastHandOff xmlns="4873beb7-5857-4685-be1f-d57550cc96cc" xsi:nil="true"/>
-    <TPClientViewer xmlns="4873beb7-5857-4685-be1f-d57550cc96cc" xsi:nil="true"/>
-    <TemplateStatus xmlns="4873beb7-5857-4685-be1f-d57550cc96cc">Complete</TemplateStatus>
-    <Downloads xmlns="4873beb7-5857-4685-be1f-d57550cc96cc">0</Downloads>
-    <OOCacheId xmlns="4873beb7-5857-4685-be1f-d57550cc96cc" xsi:nil="true"/>
-    <IsDeleted xmlns="4873beb7-5857-4685-be1f-d57550cc96cc">false</IsDeleted>
-    <LocPublishedDependentAssetsLookup xmlns="4873beb7-5857-4685-be1f-d57550cc96cc" xsi:nil="true"/>
-    <TPExecutable xmlns="4873beb7-5857-4685-be1f-d57550cc96cc" xsi:nil="true"/>
-    <EditorialTags xmlns="4873beb7-5857-4685-be1f-d57550cc96cc" xsi:nil="true"/>
-    <SubmitterId xmlns="4873beb7-5857-4685-be1f-d57550cc96cc" xsi:nil="true"/>
-    <ApprovalLog xmlns="4873beb7-5857-4685-be1f-d57550cc96cc" xsi:nil="true"/>
-    <AssetType xmlns="4873beb7-5857-4685-be1f-d57550cc96cc">TP</AssetType>
-    <BugNumber xmlns="4873beb7-5857-4685-be1f-d57550cc96cc" xsi:nil="true"/>
-    <CSXSubmissionDate xmlns="4873beb7-5857-4685-be1f-d57550cc96cc" xsi:nil="true"/>
-    <CSXUpdate xmlns="4873beb7-5857-4685-be1f-d57550cc96cc">false</CSXUpdate>
-    <Milestone xmlns="4873beb7-5857-4685-be1f-d57550cc96cc" xsi:nil="true"/>
-    <RecommendationsModifier xmlns="4873beb7-5857-4685-be1f-d57550cc96cc" xsi:nil="true"/>
-    <OriginAsset xmlns="4873beb7-5857-4685-be1f-d57550cc96cc" xsi:nil="true"/>
-    <TPComponent xmlns="4873beb7-5857-4685-be1f-d57550cc96cc" xsi:nil="true"/>
-    <AssetId xmlns="4873beb7-5857-4685-be1f-d57550cc96cc">TP102787989</AssetId>
-    <IntlLocPriority xmlns="4873beb7-5857-4685-be1f-d57550cc96cc" xsi:nil="true"/>
-    <PolicheckWords xmlns="4873beb7-5857-4685-be1f-d57550cc96cc" xsi:nil="true"/>
-    <TPLaunchHelpLink xmlns="4873beb7-5857-4685-be1f-d57550cc96cc" xsi:nil="true"/>
-    <TPApplication xmlns="4873beb7-5857-4685-be1f-d57550cc96cc" xsi:nil="true"/>
-    <CrawlForDependencies xmlns="4873beb7-5857-4685-be1f-d57550cc96cc">false</CrawlForDependencies>
-    <HandoffToMSDN xmlns="4873beb7-5857-4685-be1f-d57550cc96cc" xsi:nil="true"/>
-    <PlannedPubDate xmlns="4873beb7-5857-4685-be1f-d57550cc96cc" xsi:nil="true"/>
-    <IntlLangReviewer xmlns="4873beb7-5857-4685-be1f-d57550cc96cc" xsi:nil="true"/>
-    <TrustLevel xmlns="4873beb7-5857-4685-be1f-d57550cc96cc">1 Microsoft Managed Content</TrustLevel>
-    <LocLastLocAttemptVersionLookup xmlns="4873beb7-5857-4685-be1f-d57550cc96cc">694266</LocLastLocAttemptVersionLookup>
-    <LocProcessedForHandoffsLookup xmlns="4873beb7-5857-4685-be1f-d57550cc96cc" xsi:nil="true"/>
-    <IsSearchable xmlns="4873beb7-5857-4685-be1f-d57550cc96cc">true</IsSearchable>
-    <TemplateTemplateType xmlns="4873beb7-5857-4685-be1f-d57550cc96cc">PowerPoint Presentation Template</TemplateTemplateType>
-    <CampaignTagsTaxHTField0 xmlns="4873beb7-5857-4685-be1f-d57550cc96cc">
-      <Terms xmlns="http://schemas.microsoft.com/office/infopath/2007/PartnerControls"/>
-    </CampaignTagsTaxHTField0>
-    <TPNamespace xmlns="4873beb7-5857-4685-be1f-d57550cc96cc" xsi:nil="true"/>
-    <LocOverallPreviewStatusLookup xmlns="4873beb7-5857-4685-be1f-d57550cc96cc" xsi:nil="true"/>
-    <TaxCatchAll xmlns="4873beb7-5857-4685-be1f-d57550cc96cc"/>
-    <Markets xmlns="4873beb7-5857-4685-be1f-d57550cc96cc"/>
-    <UAProjectedTotalWords xmlns="4873beb7-5857-4685-be1f-d57550cc96cc" xsi:nil="true"/>
-    <IntlLangReview xmlns="4873beb7-5857-4685-be1f-d57550cc96cc" xsi:nil="true"/>
-    <OutputCachingOn xmlns="4873beb7-5857-4685-be1f-d57550cc96cc">false</OutputCachingOn>
-    <AverageRating xmlns="4873beb7-5857-4685-be1f-d57550cc96cc" xsi:nil="true"/>
-    <APAuthor xmlns="4873beb7-5857-4685-be1f-d57550cc96cc">
-      <UserInfo>
-        <DisplayName>REDMOND\kristaa</DisplayName>
-        <AccountId>136</AccountId>
-        <AccountType/>
-      </UserInfo>
-    </APAuthor>
-    <LocManualTestRequired xmlns="4873beb7-5857-4685-be1f-d57550cc96cc">false</LocManualTestRequired>
-    <TPCommandLine xmlns="4873beb7-5857-4685-be1f-d57550cc96cc" xsi:nil="true"/>
-    <TPAppVersion xmlns="4873beb7-5857-4685-be1f-d57550cc96cc" xsi:nil="true"/>
-    <EditorialStatus xmlns="4873beb7-5857-4685-be1f-d57550cc96cc">Complete</EditorialStatus>
-    <LastModifiedDateTime xmlns="4873beb7-5857-4685-be1f-d57550cc96cc" xsi:nil="true"/>
-    <ScenarioTagsTaxHTField0 xmlns="4873beb7-5857-4685-be1f-d57550cc96cc">
-      <Terms xmlns="http://schemas.microsoft.com/office/infopath/2007/PartnerControls"/>
-    </ScenarioTagsTaxHTField0>
-    <LocProcessedForMarketsLookup xmlns="4873beb7-5857-4685-be1f-d57550cc96cc" xsi:nil="true"/>
-    <TPLaunchHelpLinkType xmlns="4873beb7-5857-4685-be1f-d57550cc96cc">Template</TPLaunchHelpLinkType>
-    <OriginalRelease xmlns="4873beb7-5857-4685-be1f-d57550cc96cc">15</OriginalRelease>
-    <LocalizationTagsTaxHTField0 xmlns="4873beb7-5857-4685-be1f-d57550cc96cc">
-      <Terms xmlns="http://schemas.microsoft.com/office/infopath/2007/PartnerControls"/>
-    </LocalizationTagsTaxHTField0>
-    <UACurrentWords xmlns="4873beb7-5857-4685-be1f-d57550cc96cc" xsi:nil="true"/>
-    <ArtSampleDocs xmlns="4873beb7-5857-4685-be1f-d57550cc96cc" xsi:nil="true"/>
-    <UALocRecommendation xmlns="4873beb7-5857-4685-be1f-d57550cc96cc">Localize</UALocRecommendation>
-    <Manager xmlns="4873beb7-5857-4685-be1f-d57550cc96cc" xsi:nil="true"/>
-    <LocOverallHandbackStatusLookup xmlns="4873beb7-5857-4685-be1f-d57550cc96cc" xsi:nil="true"/>
-    <ShowIn xmlns="4873beb7-5857-4685-be1f-d57550cc96cc">Show everywhere</ShowIn>
-    <UANotes xmlns="4873beb7-5857-4685-be1f-d57550cc96cc" xsi:nil="true"/>
-    <InternalTagsTaxHTField0 xmlns="4873beb7-5857-4685-be1f-d57550cc96cc">
-      <Terms xmlns="http://schemas.microsoft.com/office/infopath/2007/PartnerControls"/>
-    </InternalTagsTaxHTField0>
-    <CSXHash xmlns="4873beb7-5857-4685-be1f-d57550cc96cc" xsi:nil="true"/>
-    <VoteCount xmlns="4873beb7-5857-4685-be1f-d57550cc96cc" xsi:nil="true"/>
-    <AssetExpire xmlns="4873beb7-5857-4685-be1f-d57550cc96cc">2029-05-12T07:00:00+00:00</AssetExpire>
-    <DSATActionTaken xmlns="4873beb7-5857-4685-be1f-d57550cc96cc" xsi:nil="true"/>
-    <CSXSubmissionMarket xmlns="4873beb7-5857-4685-be1f-d57550cc96cc" xsi:nil="true"/>
-    <LocMarketGroupTiers2 xmlns="4873beb7-5857-4685-be1f-d57550cc96cc" xsi:nil="true"/>
-  </documentManagement>
-</p:properties>
-</file>
-
 <file path=customXml/item3.xml><?xml version="1.0" encoding="utf-8"?>
 <?mso-contentType ?>
 <FormTemplates xmlns="http://schemas.microsoft.com/sharepoint/v3/contenttype/forms">
@@ -11682,6 +11781,22 @@
 </file>
 
 <file path=customXml/itemProps1.xml><?xml version="1.0" encoding="utf-8"?>
+<ds:datastoreItem xmlns:ds="http://schemas.openxmlformats.org/officeDocument/2006/customXml" ds:itemID="{60C67BEE-D13F-4BD2-98A5-34D8A0977F68}">
+  <ds:schemaRefs>
+    <ds:schemaRef ds:uri="4873beb7-5857-4685-be1f-d57550cc96cc"/>
+    <ds:schemaRef ds:uri="http://schemas.openxmlformats.org/package/2006/metadata/core-properties"/>
+    <ds:schemaRef ds:uri="http://purl.org/dc/terms/"/>
+    <ds:schemaRef ds:uri="http://schemas.microsoft.com/office/2006/documentManagement/types"/>
+    <ds:schemaRef ds:uri="http://purl.org/dc/elements/1.1/"/>
+    <ds:schemaRef ds:uri="http://schemas.microsoft.com/office/2006/metadata/properties"/>
+    <ds:schemaRef ds:uri="http://schemas.microsoft.com/office/infopath/2007/PartnerControls"/>
+    <ds:schemaRef ds:uri="http://www.w3.org/XML/1998/namespace"/>
+    <ds:schemaRef ds:uri="http://purl.org/dc/dcmitype/"/>
+  </ds:schemaRefs>
+</ds:datastoreItem>
+</file>
+
+<file path=customXml/itemProps2.xml><?xml version="1.0" encoding="utf-8"?>
 <ds:datastoreItem xmlns:ds="http://schemas.openxmlformats.org/officeDocument/2006/customXml" ds:itemID="{A09BF4D4-EF60-4196-BFC3-9462D607978C}">
   <ds:schemaRefs>
     <ds:schemaRef ds:uri="http://schemas.microsoft.com/office/2006/metadata/contentType"/>
@@ -11699,22 +11814,6 @@
 </ds:datastoreItem>
 </file>
 
-<file path=customXml/itemProps2.xml><?xml version="1.0" encoding="utf-8"?>
-<ds:datastoreItem xmlns:ds="http://schemas.openxmlformats.org/officeDocument/2006/customXml" ds:itemID="{60C67BEE-D13F-4BD2-98A5-34D8A0977F68}">
-  <ds:schemaRefs>
-    <ds:schemaRef ds:uri="4873beb7-5857-4685-be1f-d57550cc96cc"/>
-    <ds:schemaRef ds:uri="http://schemas.openxmlformats.org/package/2006/metadata/core-properties"/>
-    <ds:schemaRef ds:uri="http://purl.org/dc/terms/"/>
-    <ds:schemaRef ds:uri="http://schemas.microsoft.com/office/2006/documentManagement/types"/>
-    <ds:schemaRef ds:uri="http://purl.org/dc/elements/1.1/"/>
-    <ds:schemaRef ds:uri="http://schemas.microsoft.com/office/2006/metadata/properties"/>
-    <ds:schemaRef ds:uri="http://schemas.microsoft.com/office/infopath/2007/PartnerControls"/>
-    <ds:schemaRef ds:uri="http://www.w3.org/XML/1998/namespace"/>
-    <ds:schemaRef ds:uri="http://purl.org/dc/dcmitype/"/>
-  </ds:schemaRefs>
-</ds:datastoreItem>
-</file>
-
 <file path=customXml/itemProps3.xml><?xml version="1.0" encoding="utf-8"?>
 <ds:datastoreItem xmlns:ds="http://schemas.openxmlformats.org/officeDocument/2006/customXml" ds:itemID="{3836F65B-1B07-41EE-A0E8-BC6EF3855225}">
   <ds:schemaRefs>

</xml_diff>

<commit_message>
rough draft buildpc powerpoint
</commit_message>
<xml_diff>
--- a/buildPC.pptx
+++ b/buildPC.pptx
@@ -7823,7 +7823,7 @@
                 <a:ea typeface="Calibri" panose="020F0502020204030204" pitchFamily="34" charset="0"/>
                 <a:cs typeface="Calibri" panose="020F0502020204030204" pitchFamily="34" charset="0"/>
               </a:rPr>
-              <a:t>	I currently have 2 monitors and multiple keyboards and mice, so I could successfully build the desktop for a price in my budget. If I am to build this system, I will wait until Black Friday or Cyber Monday when many of these parts will be discounted.  </a:t>
+              <a:t>	I currently have 2 monitors and multiple keyboards and mice, so I can successfully build the desktop for a price within my budget. If I am to build this system, I will wait until Black Friday or Cyber Monday when many of these parts will be discounted.  </a:t>
             </a:r>
           </a:p>
           <a:p>
@@ -7900,7 +7900,7 @@
         </p:nvSpPr>
         <p:spPr>
           <a:xfrm>
-            <a:off x="1218883" y="274637"/>
+            <a:off x="836612" y="228600"/>
             <a:ext cx="10360501" cy="1223963"/>
           </a:xfrm>
         </p:spPr>
@@ -7911,7 +7911,7 @@
           <a:lstStyle/>
           <a:p>
             <a:r>
-              <a:rPr lang="en-US" dirty="0">
+              <a:rPr lang="en-US" sz="5400" dirty="0">
                 <a:solidFill>
                   <a:schemeClr val="accent1">
                     <a:lumMod val="40000"/>
@@ -7976,7 +7976,7 @@
           </a:xfrm>
         </p:spPr>
         <p:txBody>
-          <a:bodyPr>
+          <a:bodyPr anchor="ctr">
             <a:normAutofit/>
           </a:bodyPr>
           <a:lstStyle/>
@@ -8014,12 +8014,6 @@
             <a:r>
               <a:rPr lang="en-US" dirty="0"/>
               <a:t>MSI</a:t>
-            </a:r>
-          </a:p>
-          <a:p>
-            <a:r>
-              <a:rPr lang="en-US" dirty="0"/>
-              <a:t>Liquid Cooled</a:t>
             </a:r>
           </a:p>
         </p:txBody>
@@ -10596,6 +10590,1046 @@
 </file>
 
 <file path=customXml/item1.xml><?xml version="1.0" encoding="utf-8"?>
+<ct:contentTypeSchema xmlns:ct="http://schemas.microsoft.com/office/2006/metadata/contentType" xmlns:ma="http://schemas.microsoft.com/office/2006/metadata/properties/metaAttributes" ct:_="" ma:_="" ma:contentTypeName="TemplateFile" ma:contentTypeID="0x0101006EDDDB5EE6D98C44930B742096920B300400F5B6D36B3EF94B4E9A635CDF2A18F5B8" ma:contentTypeVersion="72" ma:contentTypeDescription="Create a new document." ma:contentTypeScope="" ma:versionID="a23e56308344d904b51738559c3d67c9">
+  <xsd:schema xmlns:xsd="http://www.w3.org/2001/XMLSchema" xmlns:xs="http://www.w3.org/2001/XMLSchema" xmlns:p="http://schemas.microsoft.com/office/2006/metadata/properties" xmlns:ns2="4873beb7-5857-4685-be1f-d57550cc96cc" targetNamespace="http://schemas.microsoft.com/office/2006/metadata/properties" ma:root="true" ma:fieldsID="cd0908cc4600e77bf5da051303e00c8d" ns2:_="">
+    <xsd:import namespace="4873beb7-5857-4685-be1f-d57550cc96cc"/>
+    <xsd:element name="properties">
+      <xsd:complexType>
+        <xsd:sequence>
+          <xsd:element name="documentManagement">
+            <xsd:complexType>
+              <xsd:all>
+                <xsd:element ref="ns2:AcquiredFrom" minOccurs="0"/>
+                <xsd:element ref="ns2:UACurrentWords" minOccurs="0"/>
+                <xsd:element ref="ns2:TPApplication" minOccurs="0"/>
+                <xsd:element ref="ns2:ApprovalLog" minOccurs="0"/>
+                <xsd:element ref="ns2:ApprovalStatus" minOccurs="0"/>
+                <xsd:element ref="ns2:AssetStart" minOccurs="0"/>
+                <xsd:element ref="ns2:AssetExpire" minOccurs="0"/>
+                <xsd:element ref="ns2:AssetId" minOccurs="0"/>
+                <xsd:element ref="ns2:IsSearchable" minOccurs="0"/>
+                <xsd:element ref="ns2:AssetType" minOccurs="0"/>
+                <xsd:element ref="ns2:APAuthor" minOccurs="0"/>
+                <xsd:element ref="ns2:AverageRating" minOccurs="0"/>
+                <xsd:element ref="ns2:BlockPublish" minOccurs="0"/>
+                <xsd:element ref="ns2:BugNumber" minOccurs="0"/>
+                <xsd:element ref="ns2:CampaignTagsTaxHTField0" minOccurs="0"/>
+                <xsd:element ref="ns2:TPClientViewer" minOccurs="0"/>
+                <xsd:element ref="ns2:ClipArtFilename" minOccurs="0"/>
+                <xsd:element ref="ns2:TPCommandLine" minOccurs="0"/>
+                <xsd:element ref="ns2:TPComponent" minOccurs="0"/>
+                <xsd:element ref="ns2:ContentItem" minOccurs="0"/>
+                <xsd:element ref="ns2:CrawlForDependencies" minOccurs="0"/>
+                <xsd:element ref="ns2:CSXHash" minOccurs="0"/>
+                <xsd:element ref="ns2:CSXSubmissionMarket" minOccurs="0"/>
+                <xsd:element ref="ns2:CSXUpdate" minOccurs="0"/>
+                <xsd:element ref="ns2:IntlLangReviewDate" minOccurs="0"/>
+                <xsd:element ref="ns2:IsDeleted" minOccurs="0"/>
+                <xsd:element ref="ns2:APDescription" minOccurs="0"/>
+                <xsd:element ref="ns2:DirectSourceMarket" minOccurs="0"/>
+                <xsd:element ref="ns2:Downloads" minOccurs="0"/>
+                <xsd:element ref="ns2:DSATActionTaken" minOccurs="0"/>
+                <xsd:element ref="ns2:APEditor" minOccurs="0"/>
+                <xsd:element ref="ns2:EditorialStatus" minOccurs="0"/>
+                <xsd:element ref="ns2:EditorialTags" minOccurs="0"/>
+                <xsd:element ref="ns2:TPExecutable" minOccurs="0"/>
+                <xsd:element ref="ns2:FeatureTagsTaxHTField0" minOccurs="0"/>
+                <xsd:element ref="ns2:TPFriendlyName" minOccurs="0"/>
+                <xsd:element ref="ns2:FriendlyTitle" minOccurs="0"/>
+                <xsd:element ref="ns2:PrimaryImageGen" minOccurs="0"/>
+                <xsd:element ref="ns2:HandoffToMSDN" minOccurs="0"/>
+                <xsd:element ref="ns2:InProjectListLookup" minOccurs="0"/>
+                <xsd:element ref="ns2:TPInstallLocation" minOccurs="0"/>
+                <xsd:element ref="ns2:InternalTagsTaxHTField0" minOccurs="0"/>
+                <xsd:element ref="ns2:IntlLangReview" minOccurs="0"/>
+                <xsd:element ref="ns2:IntlLangReviewer" minOccurs="0"/>
+                <xsd:element ref="ns2:MarketSpecific" minOccurs="0"/>
+                <xsd:element ref="ns2:LastCompleteVersionLookup" minOccurs="0"/>
+                <xsd:element ref="ns2:LastHandOff" minOccurs="0"/>
+                <xsd:element ref="ns2:LastModifiedDateTime" minOccurs="0"/>
+                <xsd:element ref="ns2:LastPreviewErrorLookup" minOccurs="0"/>
+                <xsd:element ref="ns2:LastPreviewResultLookup" minOccurs="0"/>
+                <xsd:element ref="ns2:LastPreviewAttemptDateLookup" minOccurs="0"/>
+                <xsd:element ref="ns2:LastPreviewedByLookup" minOccurs="0"/>
+                <xsd:element ref="ns2:LastPreviewTimeLookup" minOccurs="0"/>
+                <xsd:element ref="ns2:LastPreviewVersionLookup" minOccurs="0"/>
+                <xsd:element ref="ns2:LastPublishErrorLookup" minOccurs="0"/>
+                <xsd:element ref="ns2:LastPublishResultLookup" minOccurs="0"/>
+                <xsd:element ref="ns2:LastPublishAttemptDateLookup" minOccurs="0"/>
+                <xsd:element ref="ns2:LastPublishedByLookup" minOccurs="0"/>
+                <xsd:element ref="ns2:LastPublishTimeLookup" minOccurs="0"/>
+                <xsd:element ref="ns2:LastPublishVersionLookup" minOccurs="0"/>
+                <xsd:element ref="ns2:TPLaunchHelpLinkType" minOccurs="0"/>
+                <xsd:element ref="ns2:LegacyData" minOccurs="0"/>
+                <xsd:element ref="ns2:TPLaunchHelpLink" minOccurs="0"/>
+                <xsd:element ref="ns2:LocComments" minOccurs="0"/>
+                <xsd:element ref="ns2:LocLastLocAttemptVersionLookup" minOccurs="0"/>
+                <xsd:element ref="ns2:LocLastLocAttemptVersionTypeLookup" minOccurs="0"/>
+                <xsd:element ref="ns2:LocManualTestRequired" minOccurs="0"/>
+                <xsd:element ref="ns2:LocMarketGroupTiers2" minOccurs="0"/>
+                <xsd:element ref="ns2:LocNewPublishedVersionLookup" minOccurs="0"/>
+                <xsd:element ref="ns2:LocOverallHandbackStatusLookup" minOccurs="0"/>
+                <xsd:element ref="ns2:LocOverallLocStatusLookup" minOccurs="0"/>
+                <xsd:element ref="ns2:LocOverallPreviewStatusLookup" minOccurs="0"/>
+                <xsd:element ref="ns2:LocOverallPublishStatusLookup" minOccurs="0"/>
+                <xsd:element ref="ns2:IntlLocPriority" minOccurs="0"/>
+                <xsd:element ref="ns2:LocProcessedForHandoffsLookup" minOccurs="0"/>
+                <xsd:element ref="ns2:LocProcessedForMarketsLookup" minOccurs="0"/>
+                <xsd:element ref="ns2:LocPublishedDependentAssetsLookup" minOccurs="0"/>
+                <xsd:element ref="ns2:LocPublishedLinkedAssetsLookup" minOccurs="0"/>
+                <xsd:element ref="ns2:LocRecommendedHandoff" minOccurs="0"/>
+                <xsd:element ref="ns2:LocalizationTagsTaxHTField0" minOccurs="0"/>
+                <xsd:element ref="ns2:MachineTranslated" minOccurs="0"/>
+                <xsd:element ref="ns2:Manager" minOccurs="0"/>
+                <xsd:element ref="ns2:Markets" minOccurs="0"/>
+                <xsd:element ref="ns2:Milestone" minOccurs="0"/>
+                <xsd:element ref="ns2:TPNamespace" minOccurs="0"/>
+                <xsd:element ref="ns2:NumericId" minOccurs="0"/>
+                <xsd:element ref="ns2:NumOfRatingsLookup" minOccurs="0"/>
+                <xsd:element ref="ns2:OOCacheId" minOccurs="0"/>
+                <xsd:element ref="ns2:OpenTemplate" minOccurs="0"/>
+                <xsd:element ref="ns2:OriginAsset" minOccurs="0"/>
+                <xsd:element ref="ns2:OriginalRelease" minOccurs="0"/>
+                <xsd:element ref="ns2:OriginalSourceMarket" minOccurs="0"/>
+                <xsd:element ref="ns2:OutputCachingOn" minOccurs="0"/>
+                <xsd:element ref="ns2:ParentAssetId" minOccurs="0"/>
+                <xsd:element ref="ns2:PlannedPubDate" minOccurs="0"/>
+                <xsd:element ref="ns2:PolicheckWords" minOccurs="0"/>
+                <xsd:element ref="ns2:BusinessGroup" minOccurs="0"/>
+                <xsd:element ref="ns2:UAProjectedTotalWords" minOccurs="0"/>
+                <xsd:element ref="ns2:Provider" minOccurs="0"/>
+                <xsd:element ref="ns2:Providers" minOccurs="0"/>
+                <xsd:element ref="ns2:PublishStatusLookup" minOccurs="0"/>
+                <xsd:element ref="ns2:PublishTargets" minOccurs="0"/>
+                <xsd:element ref="ns2:RecommendationsModifier" minOccurs="0"/>
+                <xsd:element ref="ns2:ArtSampleDocs" minOccurs="0"/>
+                <xsd:element ref="ns2:ScenarioTagsTaxHTField0" minOccurs="0"/>
+                <xsd:element ref="ns2:ShowIn" minOccurs="0"/>
+                <xsd:element ref="ns2:SourceTitle" minOccurs="0"/>
+                <xsd:element ref="ns2:CSXSubmissionDate" minOccurs="0"/>
+                <xsd:element ref="ns2:SubmitterId" minOccurs="0"/>
+                <xsd:element ref="ns2:TaxCatchAll" minOccurs="0"/>
+                <xsd:element ref="ns2:TaxCatchAllLabel" minOccurs="0"/>
+                <xsd:element ref="ns2:TemplateStatus" minOccurs="0"/>
+                <xsd:element ref="ns2:TemplateTemplateType" minOccurs="0"/>
+                <xsd:element ref="ns2:ThumbnailAssetId" minOccurs="0"/>
+                <xsd:element ref="ns2:TimesCloned" minOccurs="0"/>
+                <xsd:element ref="ns2:TrustLevel" minOccurs="0"/>
+                <xsd:element ref="ns2:UALocComments" minOccurs="0"/>
+                <xsd:element ref="ns2:UALocRecommendation" minOccurs="0"/>
+                <xsd:element ref="ns2:UANotes" minOccurs="0"/>
+                <xsd:element ref="ns2:TPAppVersion" minOccurs="0"/>
+                <xsd:element ref="ns2:VoteCount" minOccurs="0"/>
+              </xsd:all>
+            </xsd:complexType>
+          </xsd:element>
+        </xsd:sequence>
+      </xsd:complexType>
+    </xsd:element>
+  </xsd:schema>
+  <xsd:schema xmlns:xsd="http://www.w3.org/2001/XMLSchema" xmlns:xs="http://www.w3.org/2001/XMLSchema" xmlns:dms="http://schemas.microsoft.com/office/2006/documentManagement/types" xmlns:pc="http://schemas.microsoft.com/office/infopath/2007/PartnerControls" targetNamespace="4873beb7-5857-4685-be1f-d57550cc96cc" elementFormDefault="qualified">
+    <xsd:import namespace="http://schemas.microsoft.com/office/2006/documentManagement/types"/>
+    <xsd:import namespace="http://schemas.microsoft.com/office/infopath/2007/PartnerControls"/>
+    <xsd:element name="AcquiredFrom" ma:index="1" nillable="true" ma:displayName="Acquired From" ma:default="Internal MS" ma:internalName="AcquiredFrom" ma:readOnly="false">
+      <xsd:simpleType>
+        <xsd:restriction base="dms:Choice">
+          <xsd:enumeration value="Internal MS"/>
+          <xsd:enumeration value="Community"/>
+          <xsd:enumeration value="MVP"/>
+          <xsd:enumeration value="Publisher"/>
+          <xsd:enumeration value="Partner"/>
+          <xsd:enumeration value="None"/>
+        </xsd:restriction>
+      </xsd:simpleType>
+    </xsd:element>
+    <xsd:element name="UACurrentWords" ma:index="2" nillable="true" ma:displayName="Actual Word Count" ma:default="" ma:internalName="UACurrentWords" ma:readOnly="false">
+      <xsd:simpleType>
+        <xsd:restriction base="dms:Unknown"/>
+      </xsd:simpleType>
+    </xsd:element>
+    <xsd:element name="TPApplication" ma:index="3" nillable="true" ma:displayName="Application to Open Template With" ma:default="" ma:internalName="TPApplication">
+      <xsd:simpleType>
+        <xsd:restriction base="dms:Text"/>
+      </xsd:simpleType>
+    </xsd:element>
+    <xsd:element name="ApprovalLog" ma:index="4" nillable="true" ma:displayName="Approval Log" ma:default="" ma:hidden="true" ma:internalName="ApprovalLog" ma:readOnly="false">
+      <xsd:simpleType>
+        <xsd:restriction base="dms:Note"/>
+      </xsd:simpleType>
+    </xsd:element>
+    <xsd:element name="ApprovalStatus" ma:index="5" nillable="true" ma:displayName="Approval Status" ma:default="InProgress" ma:internalName="ApprovalStatus" ma:readOnly="false">
+      <xsd:simpleType>
+        <xsd:restriction base="dms:Choice">
+          <xsd:enumeration value="InProgress"/>
+          <xsd:enumeration value="Rejected"/>
+          <xsd:enumeration value="Questionable"/>
+          <xsd:enumeration value="ApprovedAutomatic"/>
+          <xsd:enumeration value="ApprovedManual"/>
+          <xsd:enumeration value="On Hold"/>
+          <xsd:enumeration value="Needs Review"/>
+          <xsd:enumeration value="A Violation"/>
+          <xsd:enumeration value="Unpublished Violation"/>
+        </xsd:restriction>
+      </xsd:simpleType>
+    </xsd:element>
+    <xsd:element name="AssetStart" ma:index="6" nillable="true" ma:displayName="Asset Begin Date" ma:default="[Today]" ma:internalName="AssetStart" ma:readOnly="false">
+      <xsd:simpleType>
+        <xsd:restriction base="dms:DateTime"/>
+      </xsd:simpleType>
+    </xsd:element>
+    <xsd:element name="AssetExpire" ma:index="7" nillable="true" ma:displayName="Asset End Date" ma:default="2029-01-01T08:00:00Z" ma:format="DateTime" ma:internalName="AssetExpire" ma:readOnly="false">
+      <xsd:simpleType>
+        <xsd:restriction base="dms:DateTime"/>
+      </xsd:simpleType>
+    </xsd:element>
+    <xsd:element name="AssetId" ma:index="8" nillable="true" ma:displayName="Asset ID" ma:default="" ma:indexed="true" ma:internalName="AssetId" ma:readOnly="false">
+      <xsd:simpleType>
+        <xsd:restriction base="dms:Text">
+          <xsd:maxLength value="255"/>
+        </xsd:restriction>
+      </xsd:simpleType>
+    </xsd:element>
+    <xsd:element name="IsSearchable" ma:index="9" nillable="true" ma:displayName="Asset Searchable?" ma:default="true" ma:internalName="IsSearchable" ma:readOnly="false">
+      <xsd:simpleType>
+        <xsd:restriction base="dms:Boolean"/>
+      </xsd:simpleType>
+    </xsd:element>
+    <xsd:element name="AssetType" ma:index="10" nillable="true" ma:displayName="Asset Type" ma:default="" ma:internalName="AssetType" ma:readOnly="false">
+      <xsd:simpleType>
+        <xsd:restriction base="dms:Unknown"/>
+      </xsd:simpleType>
+    </xsd:element>
+    <xsd:element name="APAuthor" ma:index="11" nillable="true" ma:displayName="Author" ma:default="" ma:list="UserInfo" ma:internalName="APAuthor" ma:readOnly="false">
+      <xsd:complexType>
+        <xsd:complexContent>
+          <xsd:extension base="dms:User">
+            <xsd:sequence>
+              <xsd:element name="UserInfo" minOccurs="0" maxOccurs="unbounded">
+                <xsd:complexType>
+                  <xsd:sequence>
+                    <xsd:element name="DisplayName" type="xsd:string" minOccurs="0"/>
+                    <xsd:element name="AccountId" type="dms:UserId" minOccurs="0" nillable="true"/>
+                    <xsd:element name="AccountType" type="xsd:string" minOccurs="0"/>
+                  </xsd:sequence>
+                </xsd:complexType>
+              </xsd:element>
+            </xsd:sequence>
+          </xsd:extension>
+        </xsd:complexContent>
+      </xsd:complexType>
+    </xsd:element>
+    <xsd:element name="AverageRating" ma:index="12" nillable="true" ma:displayName="Average Rating" ma:internalName="AverageRating" ma:readOnly="false">
+      <xsd:simpleType>
+        <xsd:restriction base="dms:Text"/>
+      </xsd:simpleType>
+    </xsd:element>
+    <xsd:element name="BlockPublish" ma:index="13" nillable="true" ma:displayName="Block from Publishing?" ma:default="" ma:internalName="BlockPublish" ma:readOnly="false">
+      <xsd:simpleType>
+        <xsd:restriction base="dms:Boolean"/>
+      </xsd:simpleType>
+    </xsd:element>
+    <xsd:element name="BugNumber" ma:index="14" nillable="true" ma:displayName="Bug Number" ma:default="" ma:internalName="BugNumber" ma:readOnly="false">
+      <xsd:simpleType>
+        <xsd:restriction base="dms:Text"/>
+      </xsd:simpleType>
+    </xsd:element>
+    <xsd:element name="CampaignTagsTaxHTField0" ma:index="16" nillable="true" ma:taxonomy="true" ma:internalName="CampaignTagsTaxHTField0" ma:taxonomyFieldName="CampaignTags" ma:displayName="Campaigns" ma:readOnly="false" ma:default="" ma:fieldId="{1df42cc3-2301-4f11-a52a-6ead923c29ed}" ma:taxonomyMulti="true" ma:sspId="8f79753a-75d3-41f5-8ca3-40b843941b4f" ma:termSetId="ca0e50d4-faa1-44ce-961e-bb1441c60e66" ma:anchorId="00000000-0000-0000-0000-000000000000" ma:open="false" ma:isKeyword="false">
+      <xsd:complexType>
+        <xsd:sequence>
+          <xsd:element ref="pc:Terms" minOccurs="0" maxOccurs="1"/>
+        </xsd:sequence>
+      </xsd:complexType>
+    </xsd:element>
+    <xsd:element name="TPClientViewer" ma:index="17" nillable="true" ma:displayName="Client Viewer" ma:default="" ma:internalName="TPClientViewer">
+      <xsd:simpleType>
+        <xsd:restriction base="dms:Text"/>
+      </xsd:simpleType>
+    </xsd:element>
+    <xsd:element name="ClipArtFilename" ma:index="18" nillable="true" ma:displayName="Clip Art Name" ma:default="" ma:internalName="ClipArtFilename" ma:readOnly="false">
+      <xsd:simpleType>
+        <xsd:restriction base="dms:Text"/>
+      </xsd:simpleType>
+    </xsd:element>
+    <xsd:element name="TPCommandLine" ma:index="19" nillable="true" ma:displayName="Command Line" ma:default="" ma:internalName="TPCommandLine">
+      <xsd:simpleType>
+        <xsd:restriction base="dms:Text"/>
+      </xsd:simpleType>
+    </xsd:element>
+    <xsd:element name="TPComponent" ma:index="20" nillable="true" ma:displayName="Component" ma:default="" ma:internalName="TPComponent">
+      <xsd:simpleType>
+        <xsd:restriction base="dms:Text"/>
+      </xsd:simpleType>
+    </xsd:element>
+    <xsd:element name="ContentItem" ma:index="21" nillable="true" ma:displayName="Content Item" ma:default="" ma:hidden="true" ma:internalName="ContentItem" ma:readOnly="false">
+      <xsd:simpleType>
+        <xsd:restriction base="dms:Unknown"/>
+      </xsd:simpleType>
+    </xsd:element>
+    <xsd:element name="CrawlForDependencies" ma:index="23" nillable="true" ma:displayName="Crawl for Dependencies?" ma:default="true" ma:internalName="CrawlForDependencies" ma:readOnly="false">
+      <xsd:simpleType>
+        <xsd:restriction base="dms:Boolean"/>
+      </xsd:simpleType>
+    </xsd:element>
+    <xsd:element name="CSXHash" ma:index="26" nillable="true" ma:displayName="CSX Hash" ma:default="" ma:indexed="true" ma:internalName="CSXHash" ma:readOnly="false">
+      <xsd:simpleType>
+        <xsd:restriction base="dms:Text"/>
+      </xsd:simpleType>
+    </xsd:element>
+    <xsd:element name="CSXSubmissionMarket" ma:index="27" nillable="true" ma:displayName="CSX Submission Market" ma:default="" ma:list="{2FBD1B11-2ACE-4FDC-B5A3-635D4ADF6F1B}" ma:internalName="CSXSubmissionMarket" ma:readOnly="false" ma:showField="MarketName" ma:web="4873beb7-5857-4685-be1f-d57550cc96cc">
+      <xsd:simpleType>
+        <xsd:restriction base="dms:Lookup"/>
+      </xsd:simpleType>
+    </xsd:element>
+    <xsd:element name="CSXUpdate" ma:index="28" nillable="true" ma:displayName="CSX Updated?" ma:default="false" ma:internalName="CSXUpdate" ma:readOnly="false">
+      <xsd:simpleType>
+        <xsd:restriction base="dms:Boolean"/>
+      </xsd:simpleType>
+    </xsd:element>
+    <xsd:element name="IntlLangReviewDate" ma:index="29" nillable="true" ma:displayName="Date to Complete Intl QA" ma:default="" ma:internalName="IntlLangReviewDate" ma:readOnly="false">
+      <xsd:simpleType>
+        <xsd:restriction base="dms:DateTime"/>
+      </xsd:simpleType>
+    </xsd:element>
+    <xsd:element name="IsDeleted" ma:index="30" nillable="true" ma:displayName="Deleted?" ma:default="" ma:internalName="IsDeleted" ma:readOnly="false">
+      <xsd:simpleType>
+        <xsd:restriction base="dms:Boolean"/>
+      </xsd:simpleType>
+    </xsd:element>
+    <xsd:element name="APDescription" ma:index="31" nillable="true" ma:displayName="Description" ma:default="" ma:internalName="APDescription" ma:readOnly="false">
+      <xsd:simpleType>
+        <xsd:restriction base="dms:Note"/>
+      </xsd:simpleType>
+    </xsd:element>
+    <xsd:element name="DirectSourceMarket" ma:index="32" nillable="true" ma:displayName="Direct Source Market Group" ma:default="" ma:internalName="DirectSourceMarket" ma:readOnly="false">
+      <xsd:simpleType>
+        <xsd:restriction base="dms:Text"/>
+      </xsd:simpleType>
+    </xsd:element>
+    <xsd:element name="Downloads" ma:index="33" nillable="true" ma:displayName="Downloads" ma:default="0" ma:hidden="true" ma:internalName="Downloads" ma:readOnly="false">
+      <xsd:simpleType>
+        <xsd:restriction base="dms:Unknown"/>
+      </xsd:simpleType>
+    </xsd:element>
+    <xsd:element name="DSATActionTaken" ma:index="34" nillable="true" ma:displayName="DSAT Action Taken" ma:default="" ma:internalName="DSATActionTaken" ma:readOnly="false">
+      <xsd:simpleType>
+        <xsd:restriction base="dms:Choice">
+          <xsd:enumeration value="Best Bets"/>
+          <xsd:enumeration value="Expire"/>
+          <xsd:enumeration value="Hide"/>
+          <xsd:enumeration value="None"/>
+        </xsd:restriction>
+      </xsd:simpleType>
+    </xsd:element>
+    <xsd:element name="APEditor" ma:index="35" nillable="true" ma:displayName="Editor" ma:default="" ma:list="UserInfo" ma:internalName="APEditor" ma:readOnly="false">
+      <xsd:complexType>
+        <xsd:complexContent>
+          <xsd:extension base="dms:User">
+            <xsd:sequence>
+              <xsd:element name="UserInfo" minOccurs="0" maxOccurs="unbounded">
+                <xsd:complexType>
+                  <xsd:sequence>
+                    <xsd:element name="DisplayName" type="xsd:string" minOccurs="0"/>
+                    <xsd:element name="AccountId" type="dms:UserId" minOccurs="0" nillable="true"/>
+                    <xsd:element name="AccountType" type="xsd:string" minOccurs="0"/>
+                  </xsd:sequence>
+                </xsd:complexType>
+              </xsd:element>
+            </xsd:sequence>
+          </xsd:extension>
+        </xsd:complexContent>
+      </xsd:complexType>
+    </xsd:element>
+    <xsd:element name="EditorialStatus" ma:index="36" nillable="true" ma:displayName="Editorial Status" ma:default="" ma:internalName="EditorialStatus" ma:readOnly="false">
+      <xsd:simpleType>
+        <xsd:restriction base="dms:Unknown"/>
+      </xsd:simpleType>
+    </xsd:element>
+    <xsd:element name="EditorialTags" ma:index="37" nillable="true" ma:displayName="Editorial Tags" ma:default="" ma:internalName="EditorialTags">
+      <xsd:simpleType>
+        <xsd:restriction base="dms:Unknown"/>
+      </xsd:simpleType>
+    </xsd:element>
+    <xsd:element name="TPExecutable" ma:index="38" nillable="true" ma:displayName="Executable" ma:default="" ma:internalName="TPExecutable">
+      <xsd:simpleType>
+        <xsd:restriction base="dms:Text"/>
+      </xsd:simpleType>
+    </xsd:element>
+    <xsd:element name="FeatureTagsTaxHTField0" ma:index="40" nillable="true" ma:taxonomy="true" ma:internalName="FeatureTagsTaxHTField0" ma:taxonomyFieldName="FeatureTags" ma:displayName="Features" ma:readOnly="false" ma:default="" ma:fieldId="{7fc0d542-15c6-4882-a8e3-13bca44403fb}" ma:taxonomyMulti="true" ma:sspId="8f79753a-75d3-41f5-8ca3-40b843941b4f" ma:termSetId="f1ab6845-967d-4854-a0ba-4ec07f0f8113" ma:anchorId="00000000-0000-0000-0000-000000000000" ma:open="false" ma:isKeyword="false">
+      <xsd:complexType>
+        <xsd:sequence>
+          <xsd:element ref="pc:Terms" minOccurs="0" maxOccurs="1"/>
+        </xsd:sequence>
+      </xsd:complexType>
+    </xsd:element>
+    <xsd:element name="TPFriendlyName" ma:index="41" nillable="true" ma:displayName="Friendly Name" ma:default="" ma:internalName="TPFriendlyName">
+      <xsd:simpleType>
+        <xsd:restriction base="dms:Text"/>
+      </xsd:simpleType>
+    </xsd:element>
+    <xsd:element name="FriendlyTitle" ma:index="42" nillable="true" ma:displayName="Friendly Title" ma:default="" ma:description="Shorter title to be used when displaying search results" ma:internalName="FriendlyTitle" ma:readOnly="false">
+      <xsd:simpleType>
+        <xsd:restriction base="dms:Text"/>
+      </xsd:simpleType>
+    </xsd:element>
+    <xsd:element name="PrimaryImageGen" ma:index="43" nillable="true" ma:displayName="Generate Images?" ma:default="true" ma:internalName="PrimaryImageGen">
+      <xsd:simpleType>
+        <xsd:restriction base="dms:Boolean"/>
+      </xsd:simpleType>
+    </xsd:element>
+    <xsd:element name="HandoffToMSDN" ma:index="44" nillable="true" ma:displayName="Handoff To MSDN Date" ma:default="" ma:internalName="HandoffToMSDN" ma:readOnly="false">
+      <xsd:simpleType>
+        <xsd:restriction base="dms:DateTime"/>
+      </xsd:simpleType>
+    </xsd:element>
+    <xsd:element name="InProjectListLookup" ma:index="45" nillable="true" ma:displayName="InProjectListLookup" ma:list="{9E343742-310B-4684-A24C-1D137CB4B230}" ma:internalName="InProjectListLookup" ma:readOnly="true" ma:showField="InProjectList" ma:web="4873beb7-5857-4685-be1f-d57550cc96cc">
+      <xsd:complexType>
+        <xsd:complexContent>
+          <xsd:extension base="dms:MultiChoiceLookup">
+            <xsd:sequence>
+              <xsd:element name="Value" type="dms:Lookup" maxOccurs="unbounded" minOccurs="0" nillable="true"/>
+            </xsd:sequence>
+          </xsd:extension>
+        </xsd:complexContent>
+      </xsd:complexType>
+    </xsd:element>
+    <xsd:element name="TPInstallLocation" ma:index="46" nillable="true" ma:displayName="Install Location" ma:default="" ma:internalName="TPInstallLocation">
+      <xsd:simpleType>
+        <xsd:restriction base="dms:Text"/>
+      </xsd:simpleType>
+    </xsd:element>
+    <xsd:element name="InternalTagsTaxHTField0" ma:index="48" nillable="true" ma:taxonomy="true" ma:internalName="InternalTagsTaxHTField0" ma:taxonomyFieldName="InternalTags" ma:displayName="Internal Tags" ma:readOnly="false" ma:default="" ma:fieldId="{1490b8a4-2706-41ec-b5e3-73176dccf34e}" ma:taxonomyMulti="true" ma:sspId="8f79753a-75d3-41f5-8ca3-40b843941b4f" ma:termSetId="82b6639e-f7fc-4c18-ad2d-003a6e707765" ma:anchorId="00000000-0000-0000-0000-000000000000" ma:open="false" ma:isKeyword="false">
+      <xsd:complexType>
+        <xsd:sequence>
+          <xsd:element ref="pc:Terms" minOccurs="0" maxOccurs="1"/>
+        </xsd:sequence>
+      </xsd:complexType>
+    </xsd:element>
+    <xsd:element name="IntlLangReview" ma:index="49" nillable="true" ma:displayName="Intl Lang QA Review Required?" ma:default="" ma:internalName="IntlLangReview" ma:readOnly="false">
+      <xsd:simpleType>
+        <xsd:restriction base="dms:Boolean"/>
+      </xsd:simpleType>
+    </xsd:element>
+    <xsd:element name="IntlLangReviewer" ma:index="50" nillable="true" ma:displayName="Intl Lang QA Reviewer" ma:default="" ma:internalName="IntlLangReviewer" ma:readOnly="false">
+      <xsd:simpleType>
+        <xsd:restriction base="dms:Text"/>
+      </xsd:simpleType>
+    </xsd:element>
+    <xsd:element name="MarketSpecific" ma:index="51" nillable="true" ma:displayName="Is Market Specific?" ma:default="" ma:internalName="MarketSpecific" ma:readOnly="false">
+      <xsd:simpleType>
+        <xsd:restriction base="dms:Boolean"/>
+      </xsd:simpleType>
+    </xsd:element>
+    <xsd:element name="LastCompleteVersionLookup" ma:index="52" nillable="true" ma:displayName="Last Complete Version Lookup" ma:default="" ma:list="{9E343742-310B-4684-A24C-1D137CB4B230}" ma:internalName="LastCompleteVersionLookup" ma:readOnly="true" ma:showField="LastCompleteVersion" ma:web="4873beb7-5857-4685-be1f-d57550cc96cc">
+      <xsd:complexType>
+        <xsd:complexContent>
+          <xsd:extension base="dms:MultiChoiceLookup">
+            <xsd:sequence>
+              <xsd:element name="Value" type="dms:Lookup" maxOccurs="unbounded" minOccurs="0" nillable="true"/>
+            </xsd:sequence>
+          </xsd:extension>
+        </xsd:complexContent>
+      </xsd:complexType>
+    </xsd:element>
+    <xsd:element name="LastHandOff" ma:index="53" nillable="true" ma:displayName="Last Hand-off" ma:default="" ma:internalName="LastHandOff" ma:readOnly="false">
+      <xsd:simpleType>
+        <xsd:restriction base="dms:DateTime"/>
+      </xsd:simpleType>
+    </xsd:element>
+    <xsd:element name="LastModifiedDateTime" ma:index="54" nillable="true" ma:displayName="Last Modified Date" ma:default="" ma:internalName="LastModifiedDateTime" ma:readOnly="false">
+      <xsd:simpleType>
+        <xsd:restriction base="dms:DateTime"/>
+      </xsd:simpleType>
+    </xsd:element>
+    <xsd:element name="LastPreviewErrorLookup" ma:index="55" nillable="true" ma:displayName="Last Preview Attempt Error" ma:default="" ma:list="{9E343742-310B-4684-A24C-1D137CB4B230}" ma:internalName="LastPreviewErrorLookup" ma:readOnly="true" ma:showField="LastPreviewError" ma:web="4873beb7-5857-4685-be1f-d57550cc96cc">
+      <xsd:complexType>
+        <xsd:complexContent>
+          <xsd:extension base="dms:MultiChoiceLookup">
+            <xsd:sequence>
+              <xsd:element name="Value" type="dms:Lookup" maxOccurs="unbounded" minOccurs="0" nillable="true"/>
+            </xsd:sequence>
+          </xsd:extension>
+        </xsd:complexContent>
+      </xsd:complexType>
+    </xsd:element>
+    <xsd:element name="LastPreviewResultLookup" ma:index="56" nillable="true" ma:displayName="Last Preview Attempt Result" ma:default="" ma:list="{9E343742-310B-4684-A24C-1D137CB4B230}" ma:internalName="LastPreviewResultLookup" ma:readOnly="true" ma:showField="LastPreviewResult" ma:web="4873beb7-5857-4685-be1f-d57550cc96cc">
+      <xsd:complexType>
+        <xsd:complexContent>
+          <xsd:extension base="dms:MultiChoiceLookup">
+            <xsd:sequence>
+              <xsd:element name="Value" type="dms:Lookup" maxOccurs="unbounded" minOccurs="0" nillable="true"/>
+            </xsd:sequence>
+          </xsd:extension>
+        </xsd:complexContent>
+      </xsd:complexType>
+    </xsd:element>
+    <xsd:element name="LastPreviewAttemptDateLookup" ma:index="57" nillable="true" ma:displayName="Last Preview Attempted On" ma:default="" ma:list="{9E343742-310B-4684-A24C-1D137CB4B230}" ma:internalName="LastPreviewAttemptDateLookup" ma:readOnly="true" ma:showField="LastPreviewAttemptDate" ma:web="4873beb7-5857-4685-be1f-d57550cc96cc">
+      <xsd:complexType>
+        <xsd:complexContent>
+          <xsd:extension base="dms:MultiChoiceLookup">
+            <xsd:sequence>
+              <xsd:element name="Value" type="dms:Lookup" maxOccurs="unbounded" minOccurs="0" nillable="true"/>
+            </xsd:sequence>
+          </xsd:extension>
+        </xsd:complexContent>
+      </xsd:complexType>
+    </xsd:element>
+    <xsd:element name="LastPreviewedByLookup" ma:index="58" nillable="true" ma:displayName="Last Previewed By" ma:default="" ma:list="{9E343742-310B-4684-A24C-1D137CB4B230}" ma:internalName="LastPreviewedByLookup" ma:readOnly="true" ma:showField="LastPreviewedBy" ma:web="4873beb7-5857-4685-be1f-d57550cc96cc">
+      <xsd:complexType>
+        <xsd:complexContent>
+          <xsd:extension base="dms:MultiChoiceLookup">
+            <xsd:sequence>
+              <xsd:element name="Value" type="dms:Lookup" maxOccurs="unbounded" minOccurs="0" nillable="true"/>
+            </xsd:sequence>
+          </xsd:extension>
+        </xsd:complexContent>
+      </xsd:complexType>
+    </xsd:element>
+    <xsd:element name="LastPreviewTimeLookup" ma:index="59" nillable="true" ma:displayName="Last Previewed Date" ma:default="" ma:list="{9E343742-310B-4684-A24C-1D137CB4B230}" ma:internalName="LastPreviewTimeLookup" ma:readOnly="true" ma:showField="LastPreviewTime" ma:web="4873beb7-5857-4685-be1f-d57550cc96cc">
+      <xsd:complexType>
+        <xsd:complexContent>
+          <xsd:extension base="dms:MultiChoiceLookup">
+            <xsd:sequence>
+              <xsd:element name="Value" type="dms:Lookup" maxOccurs="unbounded" minOccurs="0" nillable="true"/>
+            </xsd:sequence>
+          </xsd:extension>
+        </xsd:complexContent>
+      </xsd:complexType>
+    </xsd:element>
+    <xsd:element name="LastPreviewVersionLookup" ma:index="60" nillable="true" ma:displayName="Last Previewed Version" ma:default="" ma:list="{9E343742-310B-4684-A24C-1D137CB4B230}" ma:internalName="LastPreviewVersionLookup" ma:readOnly="true" ma:showField="LastPreviewVersion" ma:web="4873beb7-5857-4685-be1f-d57550cc96cc">
+      <xsd:complexType>
+        <xsd:complexContent>
+          <xsd:extension base="dms:MultiChoiceLookup">
+            <xsd:sequence>
+              <xsd:element name="Value" type="dms:Lookup" maxOccurs="unbounded" minOccurs="0" nillable="true"/>
+            </xsd:sequence>
+          </xsd:extension>
+        </xsd:complexContent>
+      </xsd:complexType>
+    </xsd:element>
+    <xsd:element name="LastPublishErrorLookup" ma:index="61" nillable="true" ma:displayName="Last Publish Attempt Error" ma:default="" ma:list="{9E343742-310B-4684-A24C-1D137CB4B230}" ma:internalName="LastPublishErrorLookup" ma:readOnly="true" ma:showField="LastPublishError" ma:web="4873beb7-5857-4685-be1f-d57550cc96cc">
+      <xsd:complexType>
+        <xsd:complexContent>
+          <xsd:extension base="dms:MultiChoiceLookup">
+            <xsd:sequence>
+              <xsd:element name="Value" type="dms:Lookup" maxOccurs="unbounded" minOccurs="0" nillable="true"/>
+            </xsd:sequence>
+          </xsd:extension>
+        </xsd:complexContent>
+      </xsd:complexType>
+    </xsd:element>
+    <xsd:element name="LastPublishResultLookup" ma:index="62" nillable="true" ma:displayName="Last Publish Attempt Result" ma:default="" ma:list="{9E343742-310B-4684-A24C-1D137CB4B230}" ma:internalName="LastPublishResultLookup" ma:readOnly="true" ma:showField="LastPublishResult" ma:web="4873beb7-5857-4685-be1f-d57550cc96cc">
+      <xsd:complexType>
+        <xsd:complexContent>
+          <xsd:extension base="dms:MultiChoiceLookup">
+            <xsd:sequence>
+              <xsd:element name="Value" type="dms:Lookup" maxOccurs="unbounded" minOccurs="0" nillable="true"/>
+            </xsd:sequence>
+          </xsd:extension>
+        </xsd:complexContent>
+      </xsd:complexType>
+    </xsd:element>
+    <xsd:element name="LastPublishAttemptDateLookup" ma:index="63" nillable="true" ma:displayName="Last Publish Attempted On" ma:default="" ma:list="{9E343742-310B-4684-A24C-1D137CB4B230}" ma:internalName="LastPublishAttemptDateLookup" ma:readOnly="true" ma:showField="LastPublishAttemptDate" ma:web="4873beb7-5857-4685-be1f-d57550cc96cc">
+      <xsd:complexType>
+        <xsd:complexContent>
+          <xsd:extension base="dms:MultiChoiceLookup">
+            <xsd:sequence>
+              <xsd:element name="Value" type="dms:Lookup" maxOccurs="unbounded" minOccurs="0" nillable="true"/>
+            </xsd:sequence>
+          </xsd:extension>
+        </xsd:complexContent>
+      </xsd:complexType>
+    </xsd:element>
+    <xsd:element name="LastPublishedByLookup" ma:index="64" nillable="true" ma:displayName="Last Published By" ma:default="" ma:list="{9E343742-310B-4684-A24C-1D137CB4B230}" ma:internalName="LastPublishedByLookup" ma:readOnly="true" ma:showField="LastPublishedBy" ma:web="4873beb7-5857-4685-be1f-d57550cc96cc">
+      <xsd:complexType>
+        <xsd:complexContent>
+          <xsd:extension base="dms:MultiChoiceLookup">
+            <xsd:sequence>
+              <xsd:element name="Value" type="dms:Lookup" maxOccurs="unbounded" minOccurs="0" nillable="true"/>
+            </xsd:sequence>
+          </xsd:extension>
+        </xsd:complexContent>
+      </xsd:complexType>
+    </xsd:element>
+    <xsd:element name="LastPublishTimeLookup" ma:index="65" nillable="true" ma:displayName="Last Published Date" ma:default="" ma:list="{9E343742-310B-4684-A24C-1D137CB4B230}" ma:internalName="LastPublishTimeLookup" ma:readOnly="true" ma:showField="LastPublishTime" ma:web="4873beb7-5857-4685-be1f-d57550cc96cc">
+      <xsd:complexType>
+        <xsd:complexContent>
+          <xsd:extension base="dms:MultiChoiceLookup">
+            <xsd:sequence>
+              <xsd:element name="Value" type="dms:Lookup" maxOccurs="unbounded" minOccurs="0" nillable="true"/>
+            </xsd:sequence>
+          </xsd:extension>
+        </xsd:complexContent>
+      </xsd:complexType>
+    </xsd:element>
+    <xsd:element name="LastPublishVersionLookup" ma:index="66" nillable="true" ma:displayName="Last Published Version" ma:default="" ma:list="{9E343742-310B-4684-A24C-1D137CB4B230}" ma:internalName="LastPublishVersionLookup" ma:readOnly="true" ma:showField="LastPublishVersion" ma:web="4873beb7-5857-4685-be1f-d57550cc96cc">
+      <xsd:complexType>
+        <xsd:complexContent>
+          <xsd:extension base="dms:MultiChoiceLookup">
+            <xsd:sequence>
+              <xsd:element name="Value" type="dms:Lookup" maxOccurs="unbounded" minOccurs="0" nillable="true"/>
+            </xsd:sequence>
+          </xsd:extension>
+        </xsd:complexContent>
+      </xsd:complexType>
+    </xsd:element>
+    <xsd:element name="TPLaunchHelpLinkType" ma:index="67" nillable="true" ma:displayName="Launch Help Link Type" ma:default="Template" ma:internalName="TPLaunchHelpLinkType">
+      <xsd:simpleType>
+        <xsd:restriction base="dms:Choice">
+          <xsd:enumeration value="Template"/>
+          <xsd:enumeration value="Training"/>
+          <xsd:enumeration value="URL"/>
+          <xsd:enumeration value="None"/>
+        </xsd:restriction>
+      </xsd:simpleType>
+    </xsd:element>
+    <xsd:element name="LegacyData" ma:index="68" nillable="true" ma:displayName="Legacy Data" ma:default="" ma:internalName="LegacyData" ma:readOnly="false">
+      <xsd:simpleType>
+        <xsd:restriction base="dms:Note"/>
+      </xsd:simpleType>
+    </xsd:element>
+    <xsd:element name="TPLaunchHelpLink" ma:index="69" nillable="true" ma:displayName="Link to Launch Help Topic" ma:default="" ma:internalName="TPLaunchHelpLink">
+      <xsd:simpleType>
+        <xsd:restriction base="dms:Text"/>
+      </xsd:simpleType>
+    </xsd:element>
+    <xsd:element name="LocComments" ma:index="70" nillable="true" ma:displayName="Loc Approval Comments" ma:default="" ma:internalName="LocComments" ma:readOnly="false">
+      <xsd:simpleType>
+        <xsd:restriction base="dms:Note"/>
+      </xsd:simpleType>
+    </xsd:element>
+    <xsd:element name="LocLastLocAttemptVersionLookup" ma:index="71" nillable="true" ma:displayName="Loc Last Loc Attempt Version" ma:default="" ma:list="{7DD1DCEC-E449-43D3-891F-7DC62F62AD21}" ma:internalName="LocLastLocAttemptVersionLookup" ma:readOnly="false" ma:showField="LastLocAttemptVersion" ma:web="4873beb7-5857-4685-be1f-d57550cc96cc">
+      <xsd:simpleType>
+        <xsd:restriction base="dms:Lookup"/>
+      </xsd:simpleType>
+    </xsd:element>
+    <xsd:element name="LocLastLocAttemptVersionTypeLookup" ma:index="72" nillable="true" ma:displayName="Loc Last Loc Attempt Version Type" ma:default="" ma:list="{7DD1DCEC-E449-43D3-891F-7DC62F62AD21}" ma:internalName="LocLastLocAttemptVersionTypeLookup" ma:readOnly="true" ma:showField="LastLocAttemptVersionType" ma:web="4873beb7-5857-4685-be1f-d57550cc96cc">
+      <xsd:simpleType>
+        <xsd:restriction base="dms:Lookup"/>
+      </xsd:simpleType>
+    </xsd:element>
+    <xsd:element name="LocManualTestRequired" ma:index="73" nillable="true" ma:displayName="Loc Manual Test Required" ma:default="" ma:internalName="LocManualTestRequired" ma:readOnly="false">
+      <xsd:simpleType>
+        <xsd:restriction base="dms:Boolean"/>
+      </xsd:simpleType>
+    </xsd:element>
+    <xsd:element name="LocMarketGroupTiers2" ma:index="74" nillable="true" ma:displayName="Loc Market Group Tiers" ma:internalName="LocMarketGroupTiers2" ma:readOnly="false">
+      <xsd:simpleType>
+        <xsd:restriction base="dms:Unknown"/>
+      </xsd:simpleType>
+    </xsd:element>
+    <xsd:element name="LocNewPublishedVersionLookup" ma:index="75" nillable="true" ma:displayName="Loc New Published Version Lookup" ma:default="" ma:list="{7DD1DCEC-E449-43D3-891F-7DC62F62AD21}" ma:internalName="LocNewPublishedVersionLookup" ma:readOnly="true" ma:showField="NewPublishedVersion" ma:web="4873beb7-5857-4685-be1f-d57550cc96cc">
+      <xsd:simpleType>
+        <xsd:restriction base="dms:Lookup"/>
+      </xsd:simpleType>
+    </xsd:element>
+    <xsd:element name="LocOverallHandbackStatusLookup" ma:index="76" nillable="true" ma:displayName="Loc Overall Handback Status" ma:default="" ma:list="{7DD1DCEC-E449-43D3-891F-7DC62F62AD21}" ma:internalName="LocOverallHandbackStatusLookup" ma:readOnly="true" ma:showField="OverallHandbackStatus" ma:web="4873beb7-5857-4685-be1f-d57550cc96cc">
+      <xsd:simpleType>
+        <xsd:restriction base="dms:Lookup"/>
+      </xsd:simpleType>
+    </xsd:element>
+    <xsd:element name="LocOverallLocStatusLookup" ma:index="77" nillable="true" ma:displayName="Loc Overall Localize Status" ma:default="" ma:list="{7DD1DCEC-E449-43D3-891F-7DC62F62AD21}" ma:internalName="LocOverallLocStatusLookup" ma:readOnly="true" ma:showField="OverallLocStatus" ma:web="4873beb7-5857-4685-be1f-d57550cc96cc">
+      <xsd:simpleType>
+        <xsd:restriction base="dms:Lookup"/>
+      </xsd:simpleType>
+    </xsd:element>
+    <xsd:element name="LocOverallPreviewStatusLookup" ma:index="78" nillable="true" ma:displayName="Loc Overall Preview Status" ma:default="" ma:list="{7DD1DCEC-E449-43D3-891F-7DC62F62AD21}" ma:internalName="LocOverallPreviewStatusLookup" ma:readOnly="true" ma:showField="OverallPreviewStatus" ma:web="4873beb7-5857-4685-be1f-d57550cc96cc">
+      <xsd:simpleType>
+        <xsd:restriction base="dms:Lookup"/>
+      </xsd:simpleType>
+    </xsd:element>
+    <xsd:element name="LocOverallPublishStatusLookup" ma:index="79" nillable="true" ma:displayName="Loc Overall Publish Status" ma:default="" ma:list="{7DD1DCEC-E449-43D3-891F-7DC62F62AD21}" ma:internalName="LocOverallPublishStatusLookup" ma:readOnly="true" ma:showField="OverallPublishStatus" ma:web="4873beb7-5857-4685-be1f-d57550cc96cc">
+      <xsd:simpleType>
+        <xsd:restriction base="dms:Lookup"/>
+      </xsd:simpleType>
+    </xsd:element>
+    <xsd:element name="IntlLocPriority" ma:index="80" nillable="true" ma:displayName="Loc Priority" ma:default="" ma:internalName="IntlLocPriority" ma:readOnly="false">
+      <xsd:simpleType>
+        <xsd:restriction base="dms:Unknown"/>
+      </xsd:simpleType>
+    </xsd:element>
+    <xsd:element name="LocProcessedForHandoffsLookup" ma:index="81" nillable="true" ma:displayName="Loc Processed For Handoffs" ma:default="" ma:list="{7DD1DCEC-E449-43D3-891F-7DC62F62AD21}" ma:internalName="LocProcessedForHandoffsLookup" ma:readOnly="true" ma:showField="ProcessedForHandoffs" ma:web="4873beb7-5857-4685-be1f-d57550cc96cc">
+      <xsd:simpleType>
+        <xsd:restriction base="dms:Lookup"/>
+      </xsd:simpleType>
+    </xsd:element>
+    <xsd:element name="LocProcessedForMarketsLookup" ma:index="82" nillable="true" ma:displayName="Loc Processed For Markets" ma:default="" ma:list="{7DD1DCEC-E449-43D3-891F-7DC62F62AD21}" ma:internalName="LocProcessedForMarketsLookup" ma:readOnly="true" ma:showField="ProcessedForMarkets" ma:web="4873beb7-5857-4685-be1f-d57550cc96cc">
+      <xsd:simpleType>
+        <xsd:restriction base="dms:Lookup"/>
+      </xsd:simpleType>
+    </xsd:element>
+    <xsd:element name="LocPublishedDependentAssetsLookup" ma:index="83" nillable="true" ma:displayName="Loc Published Dependent Assets" ma:default="" ma:list="{7DD1DCEC-E449-43D3-891F-7DC62F62AD21}" ma:internalName="LocPublishedDependentAssetsLookup" ma:readOnly="true" ma:showField="PublishedDependentAssets" ma:web="4873beb7-5857-4685-be1f-d57550cc96cc">
+      <xsd:simpleType>
+        <xsd:restriction base="dms:Lookup"/>
+      </xsd:simpleType>
+    </xsd:element>
+    <xsd:element name="LocPublishedLinkedAssetsLookup" ma:index="84" nillable="true" ma:displayName="Loc Published Linked Assets" ma:default="" ma:list="{7DD1DCEC-E449-43D3-891F-7DC62F62AD21}" ma:internalName="LocPublishedLinkedAssetsLookup" ma:readOnly="true" ma:showField="PublishedLinkedAssets" ma:web="4873beb7-5857-4685-be1f-d57550cc96cc">
+      <xsd:simpleType>
+        <xsd:restriction base="dms:Lookup"/>
+      </xsd:simpleType>
+    </xsd:element>
+    <xsd:element name="LocRecommendedHandoff" ma:index="85" nillable="true" ma:displayName="Loc Recommended Handoff" ma:default="" ma:indexed="true" ma:internalName="LocRecommendedHandoff" ma:readOnly="false">
+      <xsd:simpleType>
+        <xsd:restriction base="dms:Text"/>
+      </xsd:simpleType>
+    </xsd:element>
+    <xsd:element name="LocalizationTagsTaxHTField0" ma:index="87" nillable="true" ma:taxonomy="true" ma:internalName="LocalizationTagsTaxHTField0" ma:taxonomyFieldName="LocalizationTags" ma:displayName="Localization Tags" ma:readOnly="false" ma:default="" ma:fieldId="{00f02cb3-2c7c-424a-9c61-10e9b6878429}" ma:taxonomyMulti="true" ma:sspId="8f79753a-75d3-41f5-8ca3-40b843941b4f" ma:termSetId="5b7703a5-8e8b-4b58-8b31-1cea35331da3" ma:anchorId="00000000-0000-0000-0000-000000000000" ma:open="false" ma:isKeyword="false">
+      <xsd:complexType>
+        <xsd:sequence>
+          <xsd:element ref="pc:Terms" minOccurs="0" maxOccurs="1"/>
+        </xsd:sequence>
+      </xsd:complexType>
+    </xsd:element>
+    <xsd:element name="MachineTranslated" ma:index="88" nillable="true" ma:displayName="Machine Translated" ma:default="" ma:internalName="MachineTranslated" ma:readOnly="false">
+      <xsd:simpleType>
+        <xsd:restriction base="dms:Boolean"/>
+      </xsd:simpleType>
+    </xsd:element>
+    <xsd:element name="Manager" ma:index="89" nillable="true" ma:displayName="Manager" ma:hidden="true" ma:internalName="Manager" ma:readOnly="false">
+      <xsd:simpleType>
+        <xsd:restriction base="dms:Text"/>
+      </xsd:simpleType>
+    </xsd:element>
+    <xsd:element name="Markets" ma:index="90" nillable="true" ma:displayName="Markets" ma:default="" ma:description="Leave blank to show in all markets" ma:list="{2FBD1B11-2ACE-4FDC-B5A3-635D4ADF6F1B}" ma:internalName="Markets" ma:readOnly="false" ma:showField="MarketName" ma:web="4873beb7-5857-4685-be1f-d57550cc96cc">
+      <xsd:complexType>
+        <xsd:complexContent>
+          <xsd:extension base="dms:MultiChoiceLookup">
+            <xsd:sequence>
+              <xsd:element name="Value" type="dms:Lookup" maxOccurs="unbounded" minOccurs="0" nillable="true"/>
+            </xsd:sequence>
+          </xsd:extension>
+        </xsd:complexContent>
+      </xsd:complexType>
+    </xsd:element>
+    <xsd:element name="Milestone" ma:index="91" nillable="true" ma:displayName="Milestone" ma:default="" ma:internalName="Milestone" ma:readOnly="false">
+      <xsd:simpleType>
+        <xsd:restriction base="dms:Unknown"/>
+      </xsd:simpleType>
+    </xsd:element>
+    <xsd:element name="TPNamespace" ma:index="94" nillable="true" ma:displayName="Namespace" ma:default="" ma:internalName="TPNamespace">
+      <xsd:simpleType>
+        <xsd:restriction base="dms:Text"/>
+      </xsd:simpleType>
+    </xsd:element>
+    <xsd:element name="NumericId" ma:index="95" nillable="true" ma:displayName="Numeric ID" ma:default="" ma:indexed="true" ma:internalName="NumericId" ma:readOnly="false">
+      <xsd:simpleType>
+        <xsd:restriction base="dms:Number"/>
+      </xsd:simpleType>
+    </xsd:element>
+    <xsd:element name="NumOfRatingsLookup" ma:index="96" nillable="true" ma:displayName="NumOfRatings" ma:default="" ma:list="{9E343742-310B-4684-A24C-1D137CB4B230}" ma:internalName="NumOfRatingsLookup" ma:readOnly="true" ma:showField="NumOfRatings" ma:web="4873beb7-5857-4685-be1f-d57550cc96cc">
+      <xsd:complexType>
+        <xsd:complexContent>
+          <xsd:extension base="dms:MultiChoiceLookup">
+            <xsd:sequence>
+              <xsd:element name="Value" type="dms:Lookup" maxOccurs="unbounded" minOccurs="0" nillable="true"/>
+            </xsd:sequence>
+          </xsd:extension>
+        </xsd:complexContent>
+      </xsd:complexType>
+    </xsd:element>
+    <xsd:element name="OOCacheId" ma:index="97" nillable="true" ma:displayName="OOCacheId" ma:internalName="OOCacheId" ma:readOnly="false">
+      <xsd:simpleType>
+        <xsd:restriction base="dms:Text"/>
+      </xsd:simpleType>
+    </xsd:element>
+    <xsd:element name="OpenTemplate" ma:index="98" nillable="true" ma:displayName="Open Template" ma:default="true" ma:internalName="OpenTemplate">
+      <xsd:simpleType>
+        <xsd:restriction base="dms:Boolean"/>
+      </xsd:simpleType>
+    </xsd:element>
+    <xsd:element name="OriginAsset" ma:index="99" nillable="true" ma:displayName="Origin Asset" ma:default="" ma:internalName="OriginAsset" ma:readOnly="false">
+      <xsd:simpleType>
+        <xsd:restriction base="dms:Text"/>
+      </xsd:simpleType>
+    </xsd:element>
+    <xsd:element name="OriginalRelease" ma:index="100" nillable="true" ma:displayName="Original Release" ma:default="15" ma:internalName="OriginalRelease" ma:readOnly="false">
+      <xsd:simpleType>
+        <xsd:restriction base="dms:Choice">
+          <xsd:enumeration value="14"/>
+          <xsd:enumeration value="15"/>
+          <xsd:enumeration value="16"/>
+        </xsd:restriction>
+      </xsd:simpleType>
+    </xsd:element>
+    <xsd:element name="OriginalSourceMarket" ma:index="101" nillable="true" ma:displayName="Original Source Market Group" ma:default="" ma:internalName="OriginalSourceMarket" ma:readOnly="false">
+      <xsd:simpleType>
+        <xsd:restriction base="dms:Text"/>
+      </xsd:simpleType>
+    </xsd:element>
+    <xsd:element name="OutputCachingOn" ma:index="102" nillable="true" ma:displayName="Output Caching" ma:default="true" ma:hidden="true" ma:internalName="OutputCachingOn" ma:readOnly="false">
+      <xsd:simpleType>
+        <xsd:restriction base="dms:Boolean"/>
+      </xsd:simpleType>
+    </xsd:element>
+    <xsd:element name="ParentAssetId" ma:index="103" nillable="true" ma:displayName="Parent Asset Id" ma:default="" ma:internalName="ParentAssetId" ma:readOnly="false">
+      <xsd:simpleType>
+        <xsd:restriction base="dms:Text"/>
+      </xsd:simpleType>
+    </xsd:element>
+    <xsd:element name="PlannedPubDate" ma:index="104" nillable="true" ma:displayName="Planned Publish Date" ma:default="" ma:indexed="true" ma:internalName="PlannedPubDate" ma:readOnly="false">
+      <xsd:simpleType>
+        <xsd:restriction base="dms:DateTime"/>
+      </xsd:simpleType>
+    </xsd:element>
+    <xsd:element name="PolicheckWords" ma:index="105" nillable="true" ma:displayName="Policheck Words" ma:default="" ma:internalName="PolicheckWords" ma:readOnly="false">
+      <xsd:simpleType>
+        <xsd:restriction base="dms:Text"/>
+      </xsd:simpleType>
+    </xsd:element>
+    <xsd:element name="BusinessGroup" ma:index="106" nillable="true" ma:displayName="Product Division Owner" ma:default="" ma:internalName="BusinessGroup" ma:readOnly="false">
+      <xsd:simpleType>
+        <xsd:restriction base="dms:Unknown"/>
+      </xsd:simpleType>
+    </xsd:element>
+    <xsd:element name="UAProjectedTotalWords" ma:index="107" nillable="true" ma:displayName="Projected Word Count" ma:default="" ma:internalName="UAProjectedTotalWords" ma:readOnly="false">
+      <xsd:simpleType>
+        <xsd:restriction base="dms:Unknown"/>
+      </xsd:simpleType>
+    </xsd:element>
+    <xsd:element name="Provider" ma:index="108" nillable="true" ma:displayName="Provider" ma:default="" ma:internalName="Provider" ma:readOnly="false">
+      <xsd:simpleType>
+        <xsd:restriction base="dms:Unknown"/>
+      </xsd:simpleType>
+    </xsd:element>
+    <xsd:element name="Providers" ma:index="109" nillable="true" ma:displayName="Providers" ma:default="" ma:internalName="Providers">
+      <xsd:simpleType>
+        <xsd:restriction base="dms:Unknown"/>
+      </xsd:simpleType>
+    </xsd:element>
+    <xsd:element name="PublishStatusLookup" ma:index="110" nillable="true" ma:displayName="Publish Status" ma:default="" ma:list="{9E343742-310B-4684-A24C-1D137CB4B230}" ma:internalName="PublishStatusLookup" ma:readOnly="false" ma:showField="PublishStatus" ma:web="4873beb7-5857-4685-be1f-d57550cc96cc">
+      <xsd:complexType>
+        <xsd:complexContent>
+          <xsd:extension base="dms:MultiChoiceLookup">
+            <xsd:sequence>
+              <xsd:element name="Value" type="dms:Lookup" maxOccurs="unbounded" minOccurs="0" nillable="true"/>
+            </xsd:sequence>
+          </xsd:extension>
+        </xsd:complexContent>
+      </xsd:complexType>
+    </xsd:element>
+    <xsd:element name="PublishTargets" ma:index="111" nillable="true" ma:displayName="Publish Target" ma:default="OfficeOnlineVNext" ma:internalName="PublishTargets" ma:readOnly="false">
+      <xsd:simpleType>
+        <xsd:restriction base="dms:Unknown"/>
+      </xsd:simpleType>
+    </xsd:element>
+    <xsd:element name="RecommendationsModifier" ma:index="112" nillable="true" ma:displayName="Recommendations Modifier" ma:default="" ma:internalName="RecommendationsModifier" ma:readOnly="false">
+      <xsd:simpleType>
+        <xsd:restriction base="dms:Number"/>
+      </xsd:simpleType>
+    </xsd:element>
+    <xsd:element name="ArtSampleDocs" ma:index="113" nillable="true" ma:displayName="Sample Docs" ma:default="" ma:hidden="true" ma:internalName="ArtSampleDocs" ma:readOnly="false">
+      <xsd:simpleType>
+        <xsd:restriction base="dms:Text"/>
+      </xsd:simpleType>
+    </xsd:element>
+    <xsd:element name="ScenarioTagsTaxHTField0" ma:index="115" nillable="true" ma:taxonomy="true" ma:internalName="ScenarioTagsTaxHTField0" ma:taxonomyFieldName="ScenarioTags" ma:displayName="Scenarios" ma:readOnly="false" ma:default="" ma:fieldId="{93aef74d-6c78-4815-8310-51477dceeccc}" ma:taxonomyMulti="true" ma:sspId="8f79753a-75d3-41f5-8ca3-40b843941b4f" ma:termSetId="4b7d5f16-e2f2-4fc0-bab3-6e8b931e57d6" ma:anchorId="00000000-0000-0000-0000-000000000000" ma:open="false" ma:isKeyword="false">
+      <xsd:complexType>
+        <xsd:sequence>
+          <xsd:element ref="pc:Terms" minOccurs="0" maxOccurs="1"/>
+        </xsd:sequence>
+      </xsd:complexType>
+    </xsd:element>
+    <xsd:element name="ShowIn" ma:index="117" nillable="true" ma:displayName="Show In" ma:default="Show everywhere" ma:internalName="ShowIn" ma:readOnly="false">
+      <xsd:simpleType>
+        <xsd:restriction base="dms:Choice">
+          <xsd:enumeration value="Hide on web"/>
+          <xsd:enumeration value="On Web no search"/>
+          <xsd:enumeration value="Show everywhere"/>
+          <xsd:enumeration value="Special use only"/>
+        </xsd:restriction>
+      </xsd:simpleType>
+    </xsd:element>
+    <xsd:element name="SourceTitle" ma:index="118" nillable="true" ma:displayName="Source Title" ma:default="" ma:indexed="true" ma:internalName="SourceTitle" ma:readOnly="false">
+      <xsd:simpleType>
+        <xsd:restriction base="dms:Text"/>
+      </xsd:simpleType>
+    </xsd:element>
+    <xsd:element name="CSXSubmissionDate" ma:index="119" nillable="true" ma:displayName="Submission Date" ma:default="" ma:internalName="CSXSubmissionDate" ma:readOnly="false">
+      <xsd:simpleType>
+        <xsd:restriction base="dms:DateTime"/>
+      </xsd:simpleType>
+    </xsd:element>
+    <xsd:element name="SubmitterId" ma:index="120" nillable="true" ma:displayName="Submitter ID" ma:default="" ma:internalName="SubmitterId" ma:readOnly="false">
+      <xsd:simpleType>
+        <xsd:restriction base="dms:Text"/>
+      </xsd:simpleType>
+    </xsd:element>
+    <xsd:element name="TaxCatchAll" ma:index="121" nillable="true" ma:displayName="Taxonomy Catch All Column" ma:hidden="true" ma:list="{530f955b-6704-4601-bd83-f81d87f1e440}" ma:internalName="TaxCatchAll" ma:showField="CatchAllData" ma:web="4873beb7-5857-4685-be1f-d57550cc96cc">
+      <xsd:complexType>
+        <xsd:complexContent>
+          <xsd:extension base="dms:MultiChoiceLookup">
+            <xsd:sequence>
+              <xsd:element name="Value" type="dms:Lookup" maxOccurs="unbounded" minOccurs="0" nillable="true"/>
+            </xsd:sequence>
+          </xsd:extension>
+        </xsd:complexContent>
+      </xsd:complexType>
+    </xsd:element>
+    <xsd:element name="TaxCatchAllLabel" ma:index="122" nillable="true" ma:displayName="Taxonomy Catch All Column1" ma:hidden="true" ma:list="{530f955b-6704-4601-bd83-f81d87f1e440}" ma:internalName="TaxCatchAllLabel" ma:readOnly="true" ma:showField="CatchAllDataLabel" ma:web="4873beb7-5857-4685-be1f-d57550cc96cc">
+      <xsd:complexType>
+        <xsd:complexContent>
+          <xsd:extension base="dms:MultiChoiceLookup">
+            <xsd:sequence>
+              <xsd:element name="Value" type="dms:Lookup" maxOccurs="unbounded" minOccurs="0" nillable="true"/>
+            </xsd:sequence>
+          </xsd:extension>
+        </xsd:complexContent>
+      </xsd:complexType>
+    </xsd:element>
+    <xsd:element name="TemplateStatus" ma:index="123" nillable="true" ma:displayName="Template Status" ma:default="" ma:internalName="TemplateStatus">
+      <xsd:simpleType>
+        <xsd:restriction base="dms:Unknown"/>
+      </xsd:simpleType>
+    </xsd:element>
+    <xsd:element name="TemplateTemplateType" ma:index="124" nillable="true" ma:displayName="Template Type" ma:default="" ma:internalName="TemplateTemplateType">
+      <xsd:simpleType>
+        <xsd:restriction base="dms:Unknown"/>
+      </xsd:simpleType>
+    </xsd:element>
+    <xsd:element name="ThumbnailAssetId" ma:index="125" nillable="true" ma:displayName="Thumbnail Image Asset" ma:default="" ma:internalName="ThumbnailAssetId" ma:readOnly="false">
+      <xsd:simpleType>
+        <xsd:restriction base="dms:Text"/>
+      </xsd:simpleType>
+    </xsd:element>
+    <xsd:element name="TimesCloned" ma:index="126" nillable="true" ma:displayName="Times Cloned" ma:default="" ma:internalName="TimesCloned" ma:readOnly="false">
+      <xsd:simpleType>
+        <xsd:restriction base="dms:Number"/>
+      </xsd:simpleType>
+    </xsd:element>
+    <xsd:element name="TrustLevel" ma:index="128" nillable="true" ma:displayName="Trust Level" ma:default="1 Microsoft Managed Content" ma:internalName="TrustLevel" ma:readOnly="false">
+      <xsd:simpleType>
+        <xsd:restriction base="dms:Unknown"/>
+      </xsd:simpleType>
+    </xsd:element>
+    <xsd:element name="UALocComments" ma:index="129" nillable="true" ma:displayName="UA Loc Comments" ma:default="" ma:internalName="UALocComments" ma:readOnly="false">
+      <xsd:simpleType>
+        <xsd:restriction base="dms:Note"/>
+      </xsd:simpleType>
+    </xsd:element>
+    <xsd:element name="UALocRecommendation" ma:index="130" nillable="true" ma:displayName="UA Loc Recommendation" ma:default="Localize" ma:internalName="UALocRecommendation" ma:readOnly="false">
+      <xsd:simpleType>
+        <xsd:restriction base="dms:Choice">
+          <xsd:enumeration value="Localize"/>
+          <xsd:enumeration value="Never Localize"/>
+          <xsd:enumeration value="Priority Localize"/>
+        </xsd:restriction>
+      </xsd:simpleType>
+    </xsd:element>
+    <xsd:element name="UANotes" ma:index="131" nillable="true" ma:displayName="UA Notes" ma:default="" ma:internalName="UANotes" ma:readOnly="false">
+      <xsd:simpleType>
+        <xsd:restriction base="dms:Note"/>
+      </xsd:simpleType>
+    </xsd:element>
+    <xsd:element name="TPAppVersion" ma:index="132" nillable="true" ma:displayName="Version" ma:default="" ma:internalName="TPAppVersion">
+      <xsd:simpleType>
+        <xsd:restriction base="dms:Text"/>
+      </xsd:simpleType>
+    </xsd:element>
+    <xsd:element name="VoteCount" ma:index="133" nillable="true" ma:displayName="Vote Count" ma:default="" ma:internalName="VoteCount" ma:readOnly="false">
+      <xsd:simpleType>
+        <xsd:restriction base="dms:Unknown"/>
+      </xsd:simpleType>
+    </xsd:element>
+  </xsd:schema>
+  <xsd:schema xmlns="http://schemas.openxmlformats.org/package/2006/metadata/core-properties" xmlns:xsd="http://www.w3.org/2001/XMLSchema" xmlns:xsi="http://www.w3.org/2001/XMLSchema-instance" xmlns:dc="http://purl.org/dc/elements/1.1/" xmlns:dcterms="http://purl.org/dc/terms/" xmlns:odoc="http://schemas.microsoft.com/internal/obd" targetNamespace="http://schemas.openxmlformats.org/package/2006/metadata/core-properties" elementFormDefault="qualified" attributeFormDefault="unqualified" blockDefault="#all">
+    <xsd:import namespace="http://purl.org/dc/elements/1.1/" schemaLocation="http://dublincore.org/schemas/xmls/qdc/2003/04/02/dc.xsd"/>
+    <xsd:import namespace="http://purl.org/dc/terms/" schemaLocation="http://dublincore.org/schemas/xmls/qdc/2003/04/02/dcterms.xsd"/>
+    <xsd:element name="coreProperties" type="CT_coreProperties"/>
+    <xsd:complexType name="CT_coreProperties">
+      <xsd:all>
+        <xsd:element ref="dc:creator" minOccurs="0" maxOccurs="1"/>
+        <xsd:element ref="dcterms:created" minOccurs="0" maxOccurs="1"/>
+        <xsd:element ref="dc:identifier" minOccurs="0" maxOccurs="1"/>
+        <xsd:element name="contentType" minOccurs="0" maxOccurs="1" type="xsd:string" ma:index="22" ma:displayName="Content Type"/>
+        <xsd:element ref="dc:title" minOccurs="0" maxOccurs="1" ma:index="127" ma:displayName="Title"/>
+        <xsd:element ref="dc:subject" minOccurs="0" maxOccurs="1"/>
+        <xsd:element ref="dc:description" minOccurs="0" maxOccurs="1"/>
+        <xsd:element name="keywords" minOccurs="0" maxOccurs="1" type="xsd:string"/>
+        <xsd:element ref="dc:language" minOccurs="0" maxOccurs="1"/>
+        <xsd:element name="category" minOccurs="0" maxOccurs="1" type="xsd:string"/>
+        <xsd:element name="version" minOccurs="0" maxOccurs="1" type="xsd:string"/>
+        <xsd:element name="revision" minOccurs="0" maxOccurs="1" type="xsd:string">
+          <xsd:annotation>
+            <xsd:documentation>
+                        This value indicates the number of saves or revisions. The application is responsible for updating this value after each revision.
+                    </xsd:documentation>
+          </xsd:annotation>
+        </xsd:element>
+        <xsd:element name="lastModifiedBy" minOccurs="0" maxOccurs="1" type="xsd:string"/>
+        <xsd:element ref="dcterms:modified" minOccurs="0" maxOccurs="1"/>
+        <xsd:element name="contentStatus" minOccurs="0" maxOccurs="1" type="xsd:string"/>
+      </xsd:all>
+    </xsd:complexType>
+  </xsd:schema>
+  <xs:schema xmlns:pc="http://schemas.microsoft.com/office/infopath/2007/PartnerControls" xmlns:xs="http://www.w3.org/2001/XMLSchema" targetNamespace="http://schemas.microsoft.com/office/infopath/2007/PartnerControls" elementFormDefault="qualified" attributeFormDefault="unqualified">
+    <xs:element name="Person">
+      <xs:complexType>
+        <xs:sequence>
+          <xs:element ref="pc:DisplayName" minOccurs="0"/>
+          <xs:element ref="pc:AccountId" minOccurs="0"/>
+          <xs:element ref="pc:AccountType" minOccurs="0"/>
+        </xs:sequence>
+      </xs:complexType>
+    </xs:element>
+    <xs:element name="DisplayName" type="xs:string"/>
+    <xs:element name="AccountId" type="xs:string"/>
+    <xs:element name="AccountType" type="xs:string"/>
+    <xs:element name="BDCAssociatedEntity">
+      <xs:complexType>
+        <xs:sequence>
+          <xs:element ref="pc:BDCEntity" minOccurs="0" maxOccurs="unbounded"/>
+        </xs:sequence>
+        <xs:attribute ref="pc:EntityNamespace"/>
+        <xs:attribute ref="pc:EntityName"/>
+        <xs:attribute ref="pc:SystemInstanceName"/>
+        <xs:attribute ref="pc:AssociationName"/>
+      </xs:complexType>
+    </xs:element>
+    <xs:attribute name="EntityNamespace" type="xs:string"/>
+    <xs:attribute name="EntityName" type="xs:string"/>
+    <xs:attribute name="SystemInstanceName" type="xs:string"/>
+    <xs:attribute name="AssociationName" type="xs:string"/>
+    <xs:element name="BDCEntity">
+      <xs:complexType>
+        <xs:sequence>
+          <xs:element ref="pc:EntityDisplayName" minOccurs="0"/>
+          <xs:element ref="pc:EntityInstanceReference" minOccurs="0"/>
+          <xs:element ref="pc:EntityId1" minOccurs="0"/>
+          <xs:element ref="pc:EntityId2" minOccurs="0"/>
+          <xs:element ref="pc:EntityId3" minOccurs="0"/>
+          <xs:element ref="pc:EntityId4" minOccurs="0"/>
+          <xs:element ref="pc:EntityId5" minOccurs="0"/>
+        </xs:sequence>
+      </xs:complexType>
+    </xs:element>
+    <xs:element name="EntityDisplayName" type="xs:string"/>
+    <xs:element name="EntityInstanceReference" type="xs:string"/>
+    <xs:element name="EntityId1" type="xs:string"/>
+    <xs:element name="EntityId2" type="xs:string"/>
+    <xs:element name="EntityId3" type="xs:string"/>
+    <xs:element name="EntityId4" type="xs:string"/>
+    <xs:element name="EntityId5" type="xs:string"/>
+    <xs:element name="Terms">
+      <xs:complexType>
+        <xs:sequence>
+          <xs:element ref="pc:TermInfo" minOccurs="0" maxOccurs="unbounded"/>
+        </xs:sequence>
+      </xs:complexType>
+    </xs:element>
+    <xs:element name="TermInfo">
+      <xs:complexType>
+        <xs:sequence>
+          <xs:element ref="pc:TermName" minOccurs="0"/>
+          <xs:element ref="pc:TermId" minOccurs="0"/>
+        </xs:sequence>
+      </xs:complexType>
+    </xs:element>
+    <xs:element name="TermName" type="xs:string"/>
+    <xs:element name="TermId" type="xs:string"/>
+  </xs:schema>
+</ct:contentTypeSchema>
+</file>
+
+<file path=customXml/item2.xml><?xml version="1.0" encoding="utf-8"?>
 <p:properties xmlns:p="http://schemas.microsoft.com/office/2006/metadata/properties" xmlns:xsi="http://www.w3.org/2001/XMLSchema-instance" xmlns:pc="http://schemas.microsoft.com/office/infopath/2007/PartnerControls">
   <documentManagement>
     <LocPublishedLinkedAssetsLookup xmlns="4873beb7-5857-4685-be1f-d57550cc96cc" xsi:nil="true"/>
@@ -10731,1046 +11765,6 @@
 </p:properties>
 </file>
 
-<file path=customXml/item2.xml><?xml version="1.0" encoding="utf-8"?>
-<ct:contentTypeSchema xmlns:ct="http://schemas.microsoft.com/office/2006/metadata/contentType" xmlns:ma="http://schemas.microsoft.com/office/2006/metadata/properties/metaAttributes" ct:_="" ma:_="" ma:contentTypeName="TemplateFile" ma:contentTypeID="0x0101006EDDDB5EE6D98C44930B742096920B300400F5B6D36B3EF94B4E9A635CDF2A18F5B8" ma:contentTypeVersion="72" ma:contentTypeDescription="Create a new document." ma:contentTypeScope="" ma:versionID="a23e56308344d904b51738559c3d67c9">
-  <xsd:schema xmlns:xsd="http://www.w3.org/2001/XMLSchema" xmlns:xs="http://www.w3.org/2001/XMLSchema" xmlns:p="http://schemas.microsoft.com/office/2006/metadata/properties" xmlns:ns2="4873beb7-5857-4685-be1f-d57550cc96cc" targetNamespace="http://schemas.microsoft.com/office/2006/metadata/properties" ma:root="true" ma:fieldsID="cd0908cc4600e77bf5da051303e00c8d" ns2:_="">
-    <xsd:import namespace="4873beb7-5857-4685-be1f-d57550cc96cc"/>
-    <xsd:element name="properties">
-      <xsd:complexType>
-        <xsd:sequence>
-          <xsd:element name="documentManagement">
-            <xsd:complexType>
-              <xsd:all>
-                <xsd:element ref="ns2:AcquiredFrom" minOccurs="0"/>
-                <xsd:element ref="ns2:UACurrentWords" minOccurs="0"/>
-                <xsd:element ref="ns2:TPApplication" minOccurs="0"/>
-                <xsd:element ref="ns2:ApprovalLog" minOccurs="0"/>
-                <xsd:element ref="ns2:ApprovalStatus" minOccurs="0"/>
-                <xsd:element ref="ns2:AssetStart" minOccurs="0"/>
-                <xsd:element ref="ns2:AssetExpire" minOccurs="0"/>
-                <xsd:element ref="ns2:AssetId" minOccurs="0"/>
-                <xsd:element ref="ns2:IsSearchable" minOccurs="0"/>
-                <xsd:element ref="ns2:AssetType" minOccurs="0"/>
-                <xsd:element ref="ns2:APAuthor" minOccurs="0"/>
-                <xsd:element ref="ns2:AverageRating" minOccurs="0"/>
-                <xsd:element ref="ns2:BlockPublish" minOccurs="0"/>
-                <xsd:element ref="ns2:BugNumber" minOccurs="0"/>
-                <xsd:element ref="ns2:CampaignTagsTaxHTField0" minOccurs="0"/>
-                <xsd:element ref="ns2:TPClientViewer" minOccurs="0"/>
-                <xsd:element ref="ns2:ClipArtFilename" minOccurs="0"/>
-                <xsd:element ref="ns2:TPCommandLine" minOccurs="0"/>
-                <xsd:element ref="ns2:TPComponent" minOccurs="0"/>
-                <xsd:element ref="ns2:ContentItem" minOccurs="0"/>
-                <xsd:element ref="ns2:CrawlForDependencies" minOccurs="0"/>
-                <xsd:element ref="ns2:CSXHash" minOccurs="0"/>
-                <xsd:element ref="ns2:CSXSubmissionMarket" minOccurs="0"/>
-                <xsd:element ref="ns2:CSXUpdate" minOccurs="0"/>
-                <xsd:element ref="ns2:IntlLangReviewDate" minOccurs="0"/>
-                <xsd:element ref="ns2:IsDeleted" minOccurs="0"/>
-                <xsd:element ref="ns2:APDescription" minOccurs="0"/>
-                <xsd:element ref="ns2:DirectSourceMarket" minOccurs="0"/>
-                <xsd:element ref="ns2:Downloads" minOccurs="0"/>
-                <xsd:element ref="ns2:DSATActionTaken" minOccurs="0"/>
-                <xsd:element ref="ns2:APEditor" minOccurs="0"/>
-                <xsd:element ref="ns2:EditorialStatus" minOccurs="0"/>
-                <xsd:element ref="ns2:EditorialTags" minOccurs="0"/>
-                <xsd:element ref="ns2:TPExecutable" minOccurs="0"/>
-                <xsd:element ref="ns2:FeatureTagsTaxHTField0" minOccurs="0"/>
-                <xsd:element ref="ns2:TPFriendlyName" minOccurs="0"/>
-                <xsd:element ref="ns2:FriendlyTitle" minOccurs="0"/>
-                <xsd:element ref="ns2:PrimaryImageGen" minOccurs="0"/>
-                <xsd:element ref="ns2:HandoffToMSDN" minOccurs="0"/>
-                <xsd:element ref="ns2:InProjectListLookup" minOccurs="0"/>
-                <xsd:element ref="ns2:TPInstallLocation" minOccurs="0"/>
-                <xsd:element ref="ns2:InternalTagsTaxHTField0" minOccurs="0"/>
-                <xsd:element ref="ns2:IntlLangReview" minOccurs="0"/>
-                <xsd:element ref="ns2:IntlLangReviewer" minOccurs="0"/>
-                <xsd:element ref="ns2:MarketSpecific" minOccurs="0"/>
-                <xsd:element ref="ns2:LastCompleteVersionLookup" minOccurs="0"/>
-                <xsd:element ref="ns2:LastHandOff" minOccurs="0"/>
-                <xsd:element ref="ns2:LastModifiedDateTime" minOccurs="0"/>
-                <xsd:element ref="ns2:LastPreviewErrorLookup" minOccurs="0"/>
-                <xsd:element ref="ns2:LastPreviewResultLookup" minOccurs="0"/>
-                <xsd:element ref="ns2:LastPreviewAttemptDateLookup" minOccurs="0"/>
-                <xsd:element ref="ns2:LastPreviewedByLookup" minOccurs="0"/>
-                <xsd:element ref="ns2:LastPreviewTimeLookup" minOccurs="0"/>
-                <xsd:element ref="ns2:LastPreviewVersionLookup" minOccurs="0"/>
-                <xsd:element ref="ns2:LastPublishErrorLookup" minOccurs="0"/>
-                <xsd:element ref="ns2:LastPublishResultLookup" minOccurs="0"/>
-                <xsd:element ref="ns2:LastPublishAttemptDateLookup" minOccurs="0"/>
-                <xsd:element ref="ns2:LastPublishedByLookup" minOccurs="0"/>
-                <xsd:element ref="ns2:LastPublishTimeLookup" minOccurs="0"/>
-                <xsd:element ref="ns2:LastPublishVersionLookup" minOccurs="0"/>
-                <xsd:element ref="ns2:TPLaunchHelpLinkType" minOccurs="0"/>
-                <xsd:element ref="ns2:LegacyData" minOccurs="0"/>
-                <xsd:element ref="ns2:TPLaunchHelpLink" minOccurs="0"/>
-                <xsd:element ref="ns2:LocComments" minOccurs="0"/>
-                <xsd:element ref="ns2:LocLastLocAttemptVersionLookup" minOccurs="0"/>
-                <xsd:element ref="ns2:LocLastLocAttemptVersionTypeLookup" minOccurs="0"/>
-                <xsd:element ref="ns2:LocManualTestRequired" minOccurs="0"/>
-                <xsd:element ref="ns2:LocMarketGroupTiers2" minOccurs="0"/>
-                <xsd:element ref="ns2:LocNewPublishedVersionLookup" minOccurs="0"/>
-                <xsd:element ref="ns2:LocOverallHandbackStatusLookup" minOccurs="0"/>
-                <xsd:element ref="ns2:LocOverallLocStatusLookup" minOccurs="0"/>
-                <xsd:element ref="ns2:LocOverallPreviewStatusLookup" minOccurs="0"/>
-                <xsd:element ref="ns2:LocOverallPublishStatusLookup" minOccurs="0"/>
-                <xsd:element ref="ns2:IntlLocPriority" minOccurs="0"/>
-                <xsd:element ref="ns2:LocProcessedForHandoffsLookup" minOccurs="0"/>
-                <xsd:element ref="ns2:LocProcessedForMarketsLookup" minOccurs="0"/>
-                <xsd:element ref="ns2:LocPublishedDependentAssetsLookup" minOccurs="0"/>
-                <xsd:element ref="ns2:LocPublishedLinkedAssetsLookup" minOccurs="0"/>
-                <xsd:element ref="ns2:LocRecommendedHandoff" minOccurs="0"/>
-                <xsd:element ref="ns2:LocalizationTagsTaxHTField0" minOccurs="0"/>
-                <xsd:element ref="ns2:MachineTranslated" minOccurs="0"/>
-                <xsd:element ref="ns2:Manager" minOccurs="0"/>
-                <xsd:element ref="ns2:Markets" minOccurs="0"/>
-                <xsd:element ref="ns2:Milestone" minOccurs="0"/>
-                <xsd:element ref="ns2:TPNamespace" minOccurs="0"/>
-                <xsd:element ref="ns2:NumericId" minOccurs="0"/>
-                <xsd:element ref="ns2:NumOfRatingsLookup" minOccurs="0"/>
-                <xsd:element ref="ns2:OOCacheId" minOccurs="0"/>
-                <xsd:element ref="ns2:OpenTemplate" minOccurs="0"/>
-                <xsd:element ref="ns2:OriginAsset" minOccurs="0"/>
-                <xsd:element ref="ns2:OriginalRelease" minOccurs="0"/>
-                <xsd:element ref="ns2:OriginalSourceMarket" minOccurs="0"/>
-                <xsd:element ref="ns2:OutputCachingOn" minOccurs="0"/>
-                <xsd:element ref="ns2:ParentAssetId" minOccurs="0"/>
-                <xsd:element ref="ns2:PlannedPubDate" minOccurs="0"/>
-                <xsd:element ref="ns2:PolicheckWords" minOccurs="0"/>
-                <xsd:element ref="ns2:BusinessGroup" minOccurs="0"/>
-                <xsd:element ref="ns2:UAProjectedTotalWords" minOccurs="0"/>
-                <xsd:element ref="ns2:Provider" minOccurs="0"/>
-                <xsd:element ref="ns2:Providers" minOccurs="0"/>
-                <xsd:element ref="ns2:PublishStatusLookup" minOccurs="0"/>
-                <xsd:element ref="ns2:PublishTargets" minOccurs="0"/>
-                <xsd:element ref="ns2:RecommendationsModifier" minOccurs="0"/>
-                <xsd:element ref="ns2:ArtSampleDocs" minOccurs="0"/>
-                <xsd:element ref="ns2:ScenarioTagsTaxHTField0" minOccurs="0"/>
-                <xsd:element ref="ns2:ShowIn" minOccurs="0"/>
-                <xsd:element ref="ns2:SourceTitle" minOccurs="0"/>
-                <xsd:element ref="ns2:CSXSubmissionDate" minOccurs="0"/>
-                <xsd:element ref="ns2:SubmitterId" minOccurs="0"/>
-                <xsd:element ref="ns2:TaxCatchAll" minOccurs="0"/>
-                <xsd:element ref="ns2:TaxCatchAllLabel" minOccurs="0"/>
-                <xsd:element ref="ns2:TemplateStatus" minOccurs="0"/>
-                <xsd:element ref="ns2:TemplateTemplateType" minOccurs="0"/>
-                <xsd:element ref="ns2:ThumbnailAssetId" minOccurs="0"/>
-                <xsd:element ref="ns2:TimesCloned" minOccurs="0"/>
-                <xsd:element ref="ns2:TrustLevel" minOccurs="0"/>
-                <xsd:element ref="ns2:UALocComments" minOccurs="0"/>
-                <xsd:element ref="ns2:UALocRecommendation" minOccurs="0"/>
-                <xsd:element ref="ns2:UANotes" minOccurs="0"/>
-                <xsd:element ref="ns2:TPAppVersion" minOccurs="0"/>
-                <xsd:element ref="ns2:VoteCount" minOccurs="0"/>
-              </xsd:all>
-            </xsd:complexType>
-          </xsd:element>
-        </xsd:sequence>
-      </xsd:complexType>
-    </xsd:element>
-  </xsd:schema>
-  <xsd:schema xmlns:xsd="http://www.w3.org/2001/XMLSchema" xmlns:xs="http://www.w3.org/2001/XMLSchema" xmlns:dms="http://schemas.microsoft.com/office/2006/documentManagement/types" xmlns:pc="http://schemas.microsoft.com/office/infopath/2007/PartnerControls" targetNamespace="4873beb7-5857-4685-be1f-d57550cc96cc" elementFormDefault="qualified">
-    <xsd:import namespace="http://schemas.microsoft.com/office/2006/documentManagement/types"/>
-    <xsd:import namespace="http://schemas.microsoft.com/office/infopath/2007/PartnerControls"/>
-    <xsd:element name="AcquiredFrom" ma:index="1" nillable="true" ma:displayName="Acquired From" ma:default="Internal MS" ma:internalName="AcquiredFrom" ma:readOnly="false">
-      <xsd:simpleType>
-        <xsd:restriction base="dms:Choice">
-          <xsd:enumeration value="Internal MS"/>
-          <xsd:enumeration value="Community"/>
-          <xsd:enumeration value="MVP"/>
-          <xsd:enumeration value="Publisher"/>
-          <xsd:enumeration value="Partner"/>
-          <xsd:enumeration value="None"/>
-        </xsd:restriction>
-      </xsd:simpleType>
-    </xsd:element>
-    <xsd:element name="UACurrentWords" ma:index="2" nillable="true" ma:displayName="Actual Word Count" ma:default="" ma:internalName="UACurrentWords" ma:readOnly="false">
-      <xsd:simpleType>
-        <xsd:restriction base="dms:Unknown"/>
-      </xsd:simpleType>
-    </xsd:element>
-    <xsd:element name="TPApplication" ma:index="3" nillable="true" ma:displayName="Application to Open Template With" ma:default="" ma:internalName="TPApplication">
-      <xsd:simpleType>
-        <xsd:restriction base="dms:Text"/>
-      </xsd:simpleType>
-    </xsd:element>
-    <xsd:element name="ApprovalLog" ma:index="4" nillable="true" ma:displayName="Approval Log" ma:default="" ma:hidden="true" ma:internalName="ApprovalLog" ma:readOnly="false">
-      <xsd:simpleType>
-        <xsd:restriction base="dms:Note"/>
-      </xsd:simpleType>
-    </xsd:element>
-    <xsd:element name="ApprovalStatus" ma:index="5" nillable="true" ma:displayName="Approval Status" ma:default="InProgress" ma:internalName="ApprovalStatus" ma:readOnly="false">
-      <xsd:simpleType>
-        <xsd:restriction base="dms:Choice">
-          <xsd:enumeration value="InProgress"/>
-          <xsd:enumeration value="Rejected"/>
-          <xsd:enumeration value="Questionable"/>
-          <xsd:enumeration value="ApprovedAutomatic"/>
-          <xsd:enumeration value="ApprovedManual"/>
-          <xsd:enumeration value="On Hold"/>
-          <xsd:enumeration value="Needs Review"/>
-          <xsd:enumeration value="A Violation"/>
-          <xsd:enumeration value="Unpublished Violation"/>
-        </xsd:restriction>
-      </xsd:simpleType>
-    </xsd:element>
-    <xsd:element name="AssetStart" ma:index="6" nillable="true" ma:displayName="Asset Begin Date" ma:default="[Today]" ma:internalName="AssetStart" ma:readOnly="false">
-      <xsd:simpleType>
-        <xsd:restriction base="dms:DateTime"/>
-      </xsd:simpleType>
-    </xsd:element>
-    <xsd:element name="AssetExpire" ma:index="7" nillable="true" ma:displayName="Asset End Date" ma:default="2029-01-01T08:00:00Z" ma:format="DateTime" ma:internalName="AssetExpire" ma:readOnly="false">
-      <xsd:simpleType>
-        <xsd:restriction base="dms:DateTime"/>
-      </xsd:simpleType>
-    </xsd:element>
-    <xsd:element name="AssetId" ma:index="8" nillable="true" ma:displayName="Asset ID" ma:default="" ma:indexed="true" ma:internalName="AssetId" ma:readOnly="false">
-      <xsd:simpleType>
-        <xsd:restriction base="dms:Text">
-          <xsd:maxLength value="255"/>
-        </xsd:restriction>
-      </xsd:simpleType>
-    </xsd:element>
-    <xsd:element name="IsSearchable" ma:index="9" nillable="true" ma:displayName="Asset Searchable?" ma:default="true" ma:internalName="IsSearchable" ma:readOnly="false">
-      <xsd:simpleType>
-        <xsd:restriction base="dms:Boolean"/>
-      </xsd:simpleType>
-    </xsd:element>
-    <xsd:element name="AssetType" ma:index="10" nillable="true" ma:displayName="Asset Type" ma:default="" ma:internalName="AssetType" ma:readOnly="false">
-      <xsd:simpleType>
-        <xsd:restriction base="dms:Unknown"/>
-      </xsd:simpleType>
-    </xsd:element>
-    <xsd:element name="APAuthor" ma:index="11" nillable="true" ma:displayName="Author" ma:default="" ma:list="UserInfo" ma:internalName="APAuthor" ma:readOnly="false">
-      <xsd:complexType>
-        <xsd:complexContent>
-          <xsd:extension base="dms:User">
-            <xsd:sequence>
-              <xsd:element name="UserInfo" minOccurs="0" maxOccurs="unbounded">
-                <xsd:complexType>
-                  <xsd:sequence>
-                    <xsd:element name="DisplayName" type="xsd:string" minOccurs="0"/>
-                    <xsd:element name="AccountId" type="dms:UserId" minOccurs="0" nillable="true"/>
-                    <xsd:element name="AccountType" type="xsd:string" minOccurs="0"/>
-                  </xsd:sequence>
-                </xsd:complexType>
-              </xsd:element>
-            </xsd:sequence>
-          </xsd:extension>
-        </xsd:complexContent>
-      </xsd:complexType>
-    </xsd:element>
-    <xsd:element name="AverageRating" ma:index="12" nillable="true" ma:displayName="Average Rating" ma:internalName="AverageRating" ma:readOnly="false">
-      <xsd:simpleType>
-        <xsd:restriction base="dms:Text"/>
-      </xsd:simpleType>
-    </xsd:element>
-    <xsd:element name="BlockPublish" ma:index="13" nillable="true" ma:displayName="Block from Publishing?" ma:default="" ma:internalName="BlockPublish" ma:readOnly="false">
-      <xsd:simpleType>
-        <xsd:restriction base="dms:Boolean"/>
-      </xsd:simpleType>
-    </xsd:element>
-    <xsd:element name="BugNumber" ma:index="14" nillable="true" ma:displayName="Bug Number" ma:default="" ma:internalName="BugNumber" ma:readOnly="false">
-      <xsd:simpleType>
-        <xsd:restriction base="dms:Text"/>
-      </xsd:simpleType>
-    </xsd:element>
-    <xsd:element name="CampaignTagsTaxHTField0" ma:index="16" nillable="true" ma:taxonomy="true" ma:internalName="CampaignTagsTaxHTField0" ma:taxonomyFieldName="CampaignTags" ma:displayName="Campaigns" ma:readOnly="false" ma:default="" ma:fieldId="{1df42cc3-2301-4f11-a52a-6ead923c29ed}" ma:taxonomyMulti="true" ma:sspId="8f79753a-75d3-41f5-8ca3-40b843941b4f" ma:termSetId="ca0e50d4-faa1-44ce-961e-bb1441c60e66" ma:anchorId="00000000-0000-0000-0000-000000000000" ma:open="false" ma:isKeyword="false">
-      <xsd:complexType>
-        <xsd:sequence>
-          <xsd:element ref="pc:Terms" minOccurs="0" maxOccurs="1"/>
-        </xsd:sequence>
-      </xsd:complexType>
-    </xsd:element>
-    <xsd:element name="TPClientViewer" ma:index="17" nillable="true" ma:displayName="Client Viewer" ma:default="" ma:internalName="TPClientViewer">
-      <xsd:simpleType>
-        <xsd:restriction base="dms:Text"/>
-      </xsd:simpleType>
-    </xsd:element>
-    <xsd:element name="ClipArtFilename" ma:index="18" nillable="true" ma:displayName="Clip Art Name" ma:default="" ma:internalName="ClipArtFilename" ma:readOnly="false">
-      <xsd:simpleType>
-        <xsd:restriction base="dms:Text"/>
-      </xsd:simpleType>
-    </xsd:element>
-    <xsd:element name="TPCommandLine" ma:index="19" nillable="true" ma:displayName="Command Line" ma:default="" ma:internalName="TPCommandLine">
-      <xsd:simpleType>
-        <xsd:restriction base="dms:Text"/>
-      </xsd:simpleType>
-    </xsd:element>
-    <xsd:element name="TPComponent" ma:index="20" nillable="true" ma:displayName="Component" ma:default="" ma:internalName="TPComponent">
-      <xsd:simpleType>
-        <xsd:restriction base="dms:Text"/>
-      </xsd:simpleType>
-    </xsd:element>
-    <xsd:element name="ContentItem" ma:index="21" nillable="true" ma:displayName="Content Item" ma:default="" ma:hidden="true" ma:internalName="ContentItem" ma:readOnly="false">
-      <xsd:simpleType>
-        <xsd:restriction base="dms:Unknown"/>
-      </xsd:simpleType>
-    </xsd:element>
-    <xsd:element name="CrawlForDependencies" ma:index="23" nillable="true" ma:displayName="Crawl for Dependencies?" ma:default="true" ma:internalName="CrawlForDependencies" ma:readOnly="false">
-      <xsd:simpleType>
-        <xsd:restriction base="dms:Boolean"/>
-      </xsd:simpleType>
-    </xsd:element>
-    <xsd:element name="CSXHash" ma:index="26" nillable="true" ma:displayName="CSX Hash" ma:default="" ma:indexed="true" ma:internalName="CSXHash" ma:readOnly="false">
-      <xsd:simpleType>
-        <xsd:restriction base="dms:Text"/>
-      </xsd:simpleType>
-    </xsd:element>
-    <xsd:element name="CSXSubmissionMarket" ma:index="27" nillable="true" ma:displayName="CSX Submission Market" ma:default="" ma:list="{2FBD1B11-2ACE-4FDC-B5A3-635D4ADF6F1B}" ma:internalName="CSXSubmissionMarket" ma:readOnly="false" ma:showField="MarketName" ma:web="4873beb7-5857-4685-be1f-d57550cc96cc">
-      <xsd:simpleType>
-        <xsd:restriction base="dms:Lookup"/>
-      </xsd:simpleType>
-    </xsd:element>
-    <xsd:element name="CSXUpdate" ma:index="28" nillable="true" ma:displayName="CSX Updated?" ma:default="false" ma:internalName="CSXUpdate" ma:readOnly="false">
-      <xsd:simpleType>
-        <xsd:restriction base="dms:Boolean"/>
-      </xsd:simpleType>
-    </xsd:element>
-    <xsd:element name="IntlLangReviewDate" ma:index="29" nillable="true" ma:displayName="Date to Complete Intl QA" ma:default="" ma:internalName="IntlLangReviewDate" ma:readOnly="false">
-      <xsd:simpleType>
-        <xsd:restriction base="dms:DateTime"/>
-      </xsd:simpleType>
-    </xsd:element>
-    <xsd:element name="IsDeleted" ma:index="30" nillable="true" ma:displayName="Deleted?" ma:default="" ma:internalName="IsDeleted" ma:readOnly="false">
-      <xsd:simpleType>
-        <xsd:restriction base="dms:Boolean"/>
-      </xsd:simpleType>
-    </xsd:element>
-    <xsd:element name="APDescription" ma:index="31" nillable="true" ma:displayName="Description" ma:default="" ma:internalName="APDescription" ma:readOnly="false">
-      <xsd:simpleType>
-        <xsd:restriction base="dms:Note"/>
-      </xsd:simpleType>
-    </xsd:element>
-    <xsd:element name="DirectSourceMarket" ma:index="32" nillable="true" ma:displayName="Direct Source Market Group" ma:default="" ma:internalName="DirectSourceMarket" ma:readOnly="false">
-      <xsd:simpleType>
-        <xsd:restriction base="dms:Text"/>
-      </xsd:simpleType>
-    </xsd:element>
-    <xsd:element name="Downloads" ma:index="33" nillable="true" ma:displayName="Downloads" ma:default="0" ma:hidden="true" ma:internalName="Downloads" ma:readOnly="false">
-      <xsd:simpleType>
-        <xsd:restriction base="dms:Unknown"/>
-      </xsd:simpleType>
-    </xsd:element>
-    <xsd:element name="DSATActionTaken" ma:index="34" nillable="true" ma:displayName="DSAT Action Taken" ma:default="" ma:internalName="DSATActionTaken" ma:readOnly="false">
-      <xsd:simpleType>
-        <xsd:restriction base="dms:Choice">
-          <xsd:enumeration value="Best Bets"/>
-          <xsd:enumeration value="Expire"/>
-          <xsd:enumeration value="Hide"/>
-          <xsd:enumeration value="None"/>
-        </xsd:restriction>
-      </xsd:simpleType>
-    </xsd:element>
-    <xsd:element name="APEditor" ma:index="35" nillable="true" ma:displayName="Editor" ma:default="" ma:list="UserInfo" ma:internalName="APEditor" ma:readOnly="false">
-      <xsd:complexType>
-        <xsd:complexContent>
-          <xsd:extension base="dms:User">
-            <xsd:sequence>
-              <xsd:element name="UserInfo" minOccurs="0" maxOccurs="unbounded">
-                <xsd:complexType>
-                  <xsd:sequence>
-                    <xsd:element name="DisplayName" type="xsd:string" minOccurs="0"/>
-                    <xsd:element name="AccountId" type="dms:UserId" minOccurs="0" nillable="true"/>
-                    <xsd:element name="AccountType" type="xsd:string" minOccurs="0"/>
-                  </xsd:sequence>
-                </xsd:complexType>
-              </xsd:element>
-            </xsd:sequence>
-          </xsd:extension>
-        </xsd:complexContent>
-      </xsd:complexType>
-    </xsd:element>
-    <xsd:element name="EditorialStatus" ma:index="36" nillable="true" ma:displayName="Editorial Status" ma:default="" ma:internalName="EditorialStatus" ma:readOnly="false">
-      <xsd:simpleType>
-        <xsd:restriction base="dms:Unknown"/>
-      </xsd:simpleType>
-    </xsd:element>
-    <xsd:element name="EditorialTags" ma:index="37" nillable="true" ma:displayName="Editorial Tags" ma:default="" ma:internalName="EditorialTags">
-      <xsd:simpleType>
-        <xsd:restriction base="dms:Unknown"/>
-      </xsd:simpleType>
-    </xsd:element>
-    <xsd:element name="TPExecutable" ma:index="38" nillable="true" ma:displayName="Executable" ma:default="" ma:internalName="TPExecutable">
-      <xsd:simpleType>
-        <xsd:restriction base="dms:Text"/>
-      </xsd:simpleType>
-    </xsd:element>
-    <xsd:element name="FeatureTagsTaxHTField0" ma:index="40" nillable="true" ma:taxonomy="true" ma:internalName="FeatureTagsTaxHTField0" ma:taxonomyFieldName="FeatureTags" ma:displayName="Features" ma:readOnly="false" ma:default="" ma:fieldId="{7fc0d542-15c6-4882-a8e3-13bca44403fb}" ma:taxonomyMulti="true" ma:sspId="8f79753a-75d3-41f5-8ca3-40b843941b4f" ma:termSetId="f1ab6845-967d-4854-a0ba-4ec07f0f8113" ma:anchorId="00000000-0000-0000-0000-000000000000" ma:open="false" ma:isKeyword="false">
-      <xsd:complexType>
-        <xsd:sequence>
-          <xsd:element ref="pc:Terms" minOccurs="0" maxOccurs="1"/>
-        </xsd:sequence>
-      </xsd:complexType>
-    </xsd:element>
-    <xsd:element name="TPFriendlyName" ma:index="41" nillable="true" ma:displayName="Friendly Name" ma:default="" ma:internalName="TPFriendlyName">
-      <xsd:simpleType>
-        <xsd:restriction base="dms:Text"/>
-      </xsd:simpleType>
-    </xsd:element>
-    <xsd:element name="FriendlyTitle" ma:index="42" nillable="true" ma:displayName="Friendly Title" ma:default="" ma:description="Shorter title to be used when displaying search results" ma:internalName="FriendlyTitle" ma:readOnly="false">
-      <xsd:simpleType>
-        <xsd:restriction base="dms:Text"/>
-      </xsd:simpleType>
-    </xsd:element>
-    <xsd:element name="PrimaryImageGen" ma:index="43" nillable="true" ma:displayName="Generate Images?" ma:default="true" ma:internalName="PrimaryImageGen">
-      <xsd:simpleType>
-        <xsd:restriction base="dms:Boolean"/>
-      </xsd:simpleType>
-    </xsd:element>
-    <xsd:element name="HandoffToMSDN" ma:index="44" nillable="true" ma:displayName="Handoff To MSDN Date" ma:default="" ma:internalName="HandoffToMSDN" ma:readOnly="false">
-      <xsd:simpleType>
-        <xsd:restriction base="dms:DateTime"/>
-      </xsd:simpleType>
-    </xsd:element>
-    <xsd:element name="InProjectListLookup" ma:index="45" nillable="true" ma:displayName="InProjectListLookup" ma:list="{9E343742-310B-4684-A24C-1D137CB4B230}" ma:internalName="InProjectListLookup" ma:readOnly="true" ma:showField="InProjectList" ma:web="4873beb7-5857-4685-be1f-d57550cc96cc">
-      <xsd:complexType>
-        <xsd:complexContent>
-          <xsd:extension base="dms:MultiChoiceLookup">
-            <xsd:sequence>
-              <xsd:element name="Value" type="dms:Lookup" maxOccurs="unbounded" minOccurs="0" nillable="true"/>
-            </xsd:sequence>
-          </xsd:extension>
-        </xsd:complexContent>
-      </xsd:complexType>
-    </xsd:element>
-    <xsd:element name="TPInstallLocation" ma:index="46" nillable="true" ma:displayName="Install Location" ma:default="" ma:internalName="TPInstallLocation">
-      <xsd:simpleType>
-        <xsd:restriction base="dms:Text"/>
-      </xsd:simpleType>
-    </xsd:element>
-    <xsd:element name="InternalTagsTaxHTField0" ma:index="48" nillable="true" ma:taxonomy="true" ma:internalName="InternalTagsTaxHTField0" ma:taxonomyFieldName="InternalTags" ma:displayName="Internal Tags" ma:readOnly="false" ma:default="" ma:fieldId="{1490b8a4-2706-41ec-b5e3-73176dccf34e}" ma:taxonomyMulti="true" ma:sspId="8f79753a-75d3-41f5-8ca3-40b843941b4f" ma:termSetId="82b6639e-f7fc-4c18-ad2d-003a6e707765" ma:anchorId="00000000-0000-0000-0000-000000000000" ma:open="false" ma:isKeyword="false">
-      <xsd:complexType>
-        <xsd:sequence>
-          <xsd:element ref="pc:Terms" minOccurs="0" maxOccurs="1"/>
-        </xsd:sequence>
-      </xsd:complexType>
-    </xsd:element>
-    <xsd:element name="IntlLangReview" ma:index="49" nillable="true" ma:displayName="Intl Lang QA Review Required?" ma:default="" ma:internalName="IntlLangReview" ma:readOnly="false">
-      <xsd:simpleType>
-        <xsd:restriction base="dms:Boolean"/>
-      </xsd:simpleType>
-    </xsd:element>
-    <xsd:element name="IntlLangReviewer" ma:index="50" nillable="true" ma:displayName="Intl Lang QA Reviewer" ma:default="" ma:internalName="IntlLangReviewer" ma:readOnly="false">
-      <xsd:simpleType>
-        <xsd:restriction base="dms:Text"/>
-      </xsd:simpleType>
-    </xsd:element>
-    <xsd:element name="MarketSpecific" ma:index="51" nillable="true" ma:displayName="Is Market Specific?" ma:default="" ma:internalName="MarketSpecific" ma:readOnly="false">
-      <xsd:simpleType>
-        <xsd:restriction base="dms:Boolean"/>
-      </xsd:simpleType>
-    </xsd:element>
-    <xsd:element name="LastCompleteVersionLookup" ma:index="52" nillable="true" ma:displayName="Last Complete Version Lookup" ma:default="" ma:list="{9E343742-310B-4684-A24C-1D137CB4B230}" ma:internalName="LastCompleteVersionLookup" ma:readOnly="true" ma:showField="LastCompleteVersion" ma:web="4873beb7-5857-4685-be1f-d57550cc96cc">
-      <xsd:complexType>
-        <xsd:complexContent>
-          <xsd:extension base="dms:MultiChoiceLookup">
-            <xsd:sequence>
-              <xsd:element name="Value" type="dms:Lookup" maxOccurs="unbounded" minOccurs="0" nillable="true"/>
-            </xsd:sequence>
-          </xsd:extension>
-        </xsd:complexContent>
-      </xsd:complexType>
-    </xsd:element>
-    <xsd:element name="LastHandOff" ma:index="53" nillable="true" ma:displayName="Last Hand-off" ma:default="" ma:internalName="LastHandOff" ma:readOnly="false">
-      <xsd:simpleType>
-        <xsd:restriction base="dms:DateTime"/>
-      </xsd:simpleType>
-    </xsd:element>
-    <xsd:element name="LastModifiedDateTime" ma:index="54" nillable="true" ma:displayName="Last Modified Date" ma:default="" ma:internalName="LastModifiedDateTime" ma:readOnly="false">
-      <xsd:simpleType>
-        <xsd:restriction base="dms:DateTime"/>
-      </xsd:simpleType>
-    </xsd:element>
-    <xsd:element name="LastPreviewErrorLookup" ma:index="55" nillable="true" ma:displayName="Last Preview Attempt Error" ma:default="" ma:list="{9E343742-310B-4684-A24C-1D137CB4B230}" ma:internalName="LastPreviewErrorLookup" ma:readOnly="true" ma:showField="LastPreviewError" ma:web="4873beb7-5857-4685-be1f-d57550cc96cc">
-      <xsd:complexType>
-        <xsd:complexContent>
-          <xsd:extension base="dms:MultiChoiceLookup">
-            <xsd:sequence>
-              <xsd:element name="Value" type="dms:Lookup" maxOccurs="unbounded" minOccurs="0" nillable="true"/>
-            </xsd:sequence>
-          </xsd:extension>
-        </xsd:complexContent>
-      </xsd:complexType>
-    </xsd:element>
-    <xsd:element name="LastPreviewResultLookup" ma:index="56" nillable="true" ma:displayName="Last Preview Attempt Result" ma:default="" ma:list="{9E343742-310B-4684-A24C-1D137CB4B230}" ma:internalName="LastPreviewResultLookup" ma:readOnly="true" ma:showField="LastPreviewResult" ma:web="4873beb7-5857-4685-be1f-d57550cc96cc">
-      <xsd:complexType>
-        <xsd:complexContent>
-          <xsd:extension base="dms:MultiChoiceLookup">
-            <xsd:sequence>
-              <xsd:element name="Value" type="dms:Lookup" maxOccurs="unbounded" minOccurs="0" nillable="true"/>
-            </xsd:sequence>
-          </xsd:extension>
-        </xsd:complexContent>
-      </xsd:complexType>
-    </xsd:element>
-    <xsd:element name="LastPreviewAttemptDateLookup" ma:index="57" nillable="true" ma:displayName="Last Preview Attempted On" ma:default="" ma:list="{9E343742-310B-4684-A24C-1D137CB4B230}" ma:internalName="LastPreviewAttemptDateLookup" ma:readOnly="true" ma:showField="LastPreviewAttemptDate" ma:web="4873beb7-5857-4685-be1f-d57550cc96cc">
-      <xsd:complexType>
-        <xsd:complexContent>
-          <xsd:extension base="dms:MultiChoiceLookup">
-            <xsd:sequence>
-              <xsd:element name="Value" type="dms:Lookup" maxOccurs="unbounded" minOccurs="0" nillable="true"/>
-            </xsd:sequence>
-          </xsd:extension>
-        </xsd:complexContent>
-      </xsd:complexType>
-    </xsd:element>
-    <xsd:element name="LastPreviewedByLookup" ma:index="58" nillable="true" ma:displayName="Last Previewed By" ma:default="" ma:list="{9E343742-310B-4684-A24C-1D137CB4B230}" ma:internalName="LastPreviewedByLookup" ma:readOnly="true" ma:showField="LastPreviewedBy" ma:web="4873beb7-5857-4685-be1f-d57550cc96cc">
-      <xsd:complexType>
-        <xsd:complexContent>
-          <xsd:extension base="dms:MultiChoiceLookup">
-            <xsd:sequence>
-              <xsd:element name="Value" type="dms:Lookup" maxOccurs="unbounded" minOccurs="0" nillable="true"/>
-            </xsd:sequence>
-          </xsd:extension>
-        </xsd:complexContent>
-      </xsd:complexType>
-    </xsd:element>
-    <xsd:element name="LastPreviewTimeLookup" ma:index="59" nillable="true" ma:displayName="Last Previewed Date" ma:default="" ma:list="{9E343742-310B-4684-A24C-1D137CB4B230}" ma:internalName="LastPreviewTimeLookup" ma:readOnly="true" ma:showField="LastPreviewTime" ma:web="4873beb7-5857-4685-be1f-d57550cc96cc">
-      <xsd:complexType>
-        <xsd:complexContent>
-          <xsd:extension base="dms:MultiChoiceLookup">
-            <xsd:sequence>
-              <xsd:element name="Value" type="dms:Lookup" maxOccurs="unbounded" minOccurs="0" nillable="true"/>
-            </xsd:sequence>
-          </xsd:extension>
-        </xsd:complexContent>
-      </xsd:complexType>
-    </xsd:element>
-    <xsd:element name="LastPreviewVersionLookup" ma:index="60" nillable="true" ma:displayName="Last Previewed Version" ma:default="" ma:list="{9E343742-310B-4684-A24C-1D137CB4B230}" ma:internalName="LastPreviewVersionLookup" ma:readOnly="true" ma:showField="LastPreviewVersion" ma:web="4873beb7-5857-4685-be1f-d57550cc96cc">
-      <xsd:complexType>
-        <xsd:complexContent>
-          <xsd:extension base="dms:MultiChoiceLookup">
-            <xsd:sequence>
-              <xsd:element name="Value" type="dms:Lookup" maxOccurs="unbounded" minOccurs="0" nillable="true"/>
-            </xsd:sequence>
-          </xsd:extension>
-        </xsd:complexContent>
-      </xsd:complexType>
-    </xsd:element>
-    <xsd:element name="LastPublishErrorLookup" ma:index="61" nillable="true" ma:displayName="Last Publish Attempt Error" ma:default="" ma:list="{9E343742-310B-4684-A24C-1D137CB4B230}" ma:internalName="LastPublishErrorLookup" ma:readOnly="true" ma:showField="LastPublishError" ma:web="4873beb7-5857-4685-be1f-d57550cc96cc">
-      <xsd:complexType>
-        <xsd:complexContent>
-          <xsd:extension base="dms:MultiChoiceLookup">
-            <xsd:sequence>
-              <xsd:element name="Value" type="dms:Lookup" maxOccurs="unbounded" minOccurs="0" nillable="true"/>
-            </xsd:sequence>
-          </xsd:extension>
-        </xsd:complexContent>
-      </xsd:complexType>
-    </xsd:element>
-    <xsd:element name="LastPublishResultLookup" ma:index="62" nillable="true" ma:displayName="Last Publish Attempt Result" ma:default="" ma:list="{9E343742-310B-4684-A24C-1D137CB4B230}" ma:internalName="LastPublishResultLookup" ma:readOnly="true" ma:showField="LastPublishResult" ma:web="4873beb7-5857-4685-be1f-d57550cc96cc">
-      <xsd:complexType>
-        <xsd:complexContent>
-          <xsd:extension base="dms:MultiChoiceLookup">
-            <xsd:sequence>
-              <xsd:element name="Value" type="dms:Lookup" maxOccurs="unbounded" minOccurs="0" nillable="true"/>
-            </xsd:sequence>
-          </xsd:extension>
-        </xsd:complexContent>
-      </xsd:complexType>
-    </xsd:element>
-    <xsd:element name="LastPublishAttemptDateLookup" ma:index="63" nillable="true" ma:displayName="Last Publish Attempted On" ma:default="" ma:list="{9E343742-310B-4684-A24C-1D137CB4B230}" ma:internalName="LastPublishAttemptDateLookup" ma:readOnly="true" ma:showField="LastPublishAttemptDate" ma:web="4873beb7-5857-4685-be1f-d57550cc96cc">
-      <xsd:complexType>
-        <xsd:complexContent>
-          <xsd:extension base="dms:MultiChoiceLookup">
-            <xsd:sequence>
-              <xsd:element name="Value" type="dms:Lookup" maxOccurs="unbounded" minOccurs="0" nillable="true"/>
-            </xsd:sequence>
-          </xsd:extension>
-        </xsd:complexContent>
-      </xsd:complexType>
-    </xsd:element>
-    <xsd:element name="LastPublishedByLookup" ma:index="64" nillable="true" ma:displayName="Last Published By" ma:default="" ma:list="{9E343742-310B-4684-A24C-1D137CB4B230}" ma:internalName="LastPublishedByLookup" ma:readOnly="true" ma:showField="LastPublishedBy" ma:web="4873beb7-5857-4685-be1f-d57550cc96cc">
-      <xsd:complexType>
-        <xsd:complexContent>
-          <xsd:extension base="dms:MultiChoiceLookup">
-            <xsd:sequence>
-              <xsd:element name="Value" type="dms:Lookup" maxOccurs="unbounded" minOccurs="0" nillable="true"/>
-            </xsd:sequence>
-          </xsd:extension>
-        </xsd:complexContent>
-      </xsd:complexType>
-    </xsd:element>
-    <xsd:element name="LastPublishTimeLookup" ma:index="65" nillable="true" ma:displayName="Last Published Date" ma:default="" ma:list="{9E343742-310B-4684-A24C-1D137CB4B230}" ma:internalName="LastPublishTimeLookup" ma:readOnly="true" ma:showField="LastPublishTime" ma:web="4873beb7-5857-4685-be1f-d57550cc96cc">
-      <xsd:complexType>
-        <xsd:complexContent>
-          <xsd:extension base="dms:MultiChoiceLookup">
-            <xsd:sequence>
-              <xsd:element name="Value" type="dms:Lookup" maxOccurs="unbounded" minOccurs="0" nillable="true"/>
-            </xsd:sequence>
-          </xsd:extension>
-        </xsd:complexContent>
-      </xsd:complexType>
-    </xsd:element>
-    <xsd:element name="LastPublishVersionLookup" ma:index="66" nillable="true" ma:displayName="Last Published Version" ma:default="" ma:list="{9E343742-310B-4684-A24C-1D137CB4B230}" ma:internalName="LastPublishVersionLookup" ma:readOnly="true" ma:showField="LastPublishVersion" ma:web="4873beb7-5857-4685-be1f-d57550cc96cc">
-      <xsd:complexType>
-        <xsd:complexContent>
-          <xsd:extension base="dms:MultiChoiceLookup">
-            <xsd:sequence>
-              <xsd:element name="Value" type="dms:Lookup" maxOccurs="unbounded" minOccurs="0" nillable="true"/>
-            </xsd:sequence>
-          </xsd:extension>
-        </xsd:complexContent>
-      </xsd:complexType>
-    </xsd:element>
-    <xsd:element name="TPLaunchHelpLinkType" ma:index="67" nillable="true" ma:displayName="Launch Help Link Type" ma:default="Template" ma:internalName="TPLaunchHelpLinkType">
-      <xsd:simpleType>
-        <xsd:restriction base="dms:Choice">
-          <xsd:enumeration value="Template"/>
-          <xsd:enumeration value="Training"/>
-          <xsd:enumeration value="URL"/>
-          <xsd:enumeration value="None"/>
-        </xsd:restriction>
-      </xsd:simpleType>
-    </xsd:element>
-    <xsd:element name="LegacyData" ma:index="68" nillable="true" ma:displayName="Legacy Data" ma:default="" ma:internalName="LegacyData" ma:readOnly="false">
-      <xsd:simpleType>
-        <xsd:restriction base="dms:Note"/>
-      </xsd:simpleType>
-    </xsd:element>
-    <xsd:element name="TPLaunchHelpLink" ma:index="69" nillable="true" ma:displayName="Link to Launch Help Topic" ma:default="" ma:internalName="TPLaunchHelpLink">
-      <xsd:simpleType>
-        <xsd:restriction base="dms:Text"/>
-      </xsd:simpleType>
-    </xsd:element>
-    <xsd:element name="LocComments" ma:index="70" nillable="true" ma:displayName="Loc Approval Comments" ma:default="" ma:internalName="LocComments" ma:readOnly="false">
-      <xsd:simpleType>
-        <xsd:restriction base="dms:Note"/>
-      </xsd:simpleType>
-    </xsd:element>
-    <xsd:element name="LocLastLocAttemptVersionLookup" ma:index="71" nillable="true" ma:displayName="Loc Last Loc Attempt Version" ma:default="" ma:list="{7DD1DCEC-E449-43D3-891F-7DC62F62AD21}" ma:internalName="LocLastLocAttemptVersionLookup" ma:readOnly="false" ma:showField="LastLocAttemptVersion" ma:web="4873beb7-5857-4685-be1f-d57550cc96cc">
-      <xsd:simpleType>
-        <xsd:restriction base="dms:Lookup"/>
-      </xsd:simpleType>
-    </xsd:element>
-    <xsd:element name="LocLastLocAttemptVersionTypeLookup" ma:index="72" nillable="true" ma:displayName="Loc Last Loc Attempt Version Type" ma:default="" ma:list="{7DD1DCEC-E449-43D3-891F-7DC62F62AD21}" ma:internalName="LocLastLocAttemptVersionTypeLookup" ma:readOnly="true" ma:showField="LastLocAttemptVersionType" ma:web="4873beb7-5857-4685-be1f-d57550cc96cc">
-      <xsd:simpleType>
-        <xsd:restriction base="dms:Lookup"/>
-      </xsd:simpleType>
-    </xsd:element>
-    <xsd:element name="LocManualTestRequired" ma:index="73" nillable="true" ma:displayName="Loc Manual Test Required" ma:default="" ma:internalName="LocManualTestRequired" ma:readOnly="false">
-      <xsd:simpleType>
-        <xsd:restriction base="dms:Boolean"/>
-      </xsd:simpleType>
-    </xsd:element>
-    <xsd:element name="LocMarketGroupTiers2" ma:index="74" nillable="true" ma:displayName="Loc Market Group Tiers" ma:internalName="LocMarketGroupTiers2" ma:readOnly="false">
-      <xsd:simpleType>
-        <xsd:restriction base="dms:Unknown"/>
-      </xsd:simpleType>
-    </xsd:element>
-    <xsd:element name="LocNewPublishedVersionLookup" ma:index="75" nillable="true" ma:displayName="Loc New Published Version Lookup" ma:default="" ma:list="{7DD1DCEC-E449-43D3-891F-7DC62F62AD21}" ma:internalName="LocNewPublishedVersionLookup" ma:readOnly="true" ma:showField="NewPublishedVersion" ma:web="4873beb7-5857-4685-be1f-d57550cc96cc">
-      <xsd:simpleType>
-        <xsd:restriction base="dms:Lookup"/>
-      </xsd:simpleType>
-    </xsd:element>
-    <xsd:element name="LocOverallHandbackStatusLookup" ma:index="76" nillable="true" ma:displayName="Loc Overall Handback Status" ma:default="" ma:list="{7DD1DCEC-E449-43D3-891F-7DC62F62AD21}" ma:internalName="LocOverallHandbackStatusLookup" ma:readOnly="true" ma:showField="OverallHandbackStatus" ma:web="4873beb7-5857-4685-be1f-d57550cc96cc">
-      <xsd:simpleType>
-        <xsd:restriction base="dms:Lookup"/>
-      </xsd:simpleType>
-    </xsd:element>
-    <xsd:element name="LocOverallLocStatusLookup" ma:index="77" nillable="true" ma:displayName="Loc Overall Localize Status" ma:default="" ma:list="{7DD1DCEC-E449-43D3-891F-7DC62F62AD21}" ma:internalName="LocOverallLocStatusLookup" ma:readOnly="true" ma:showField="OverallLocStatus" ma:web="4873beb7-5857-4685-be1f-d57550cc96cc">
-      <xsd:simpleType>
-        <xsd:restriction base="dms:Lookup"/>
-      </xsd:simpleType>
-    </xsd:element>
-    <xsd:element name="LocOverallPreviewStatusLookup" ma:index="78" nillable="true" ma:displayName="Loc Overall Preview Status" ma:default="" ma:list="{7DD1DCEC-E449-43D3-891F-7DC62F62AD21}" ma:internalName="LocOverallPreviewStatusLookup" ma:readOnly="true" ma:showField="OverallPreviewStatus" ma:web="4873beb7-5857-4685-be1f-d57550cc96cc">
-      <xsd:simpleType>
-        <xsd:restriction base="dms:Lookup"/>
-      </xsd:simpleType>
-    </xsd:element>
-    <xsd:element name="LocOverallPublishStatusLookup" ma:index="79" nillable="true" ma:displayName="Loc Overall Publish Status" ma:default="" ma:list="{7DD1DCEC-E449-43D3-891F-7DC62F62AD21}" ma:internalName="LocOverallPublishStatusLookup" ma:readOnly="true" ma:showField="OverallPublishStatus" ma:web="4873beb7-5857-4685-be1f-d57550cc96cc">
-      <xsd:simpleType>
-        <xsd:restriction base="dms:Lookup"/>
-      </xsd:simpleType>
-    </xsd:element>
-    <xsd:element name="IntlLocPriority" ma:index="80" nillable="true" ma:displayName="Loc Priority" ma:default="" ma:internalName="IntlLocPriority" ma:readOnly="false">
-      <xsd:simpleType>
-        <xsd:restriction base="dms:Unknown"/>
-      </xsd:simpleType>
-    </xsd:element>
-    <xsd:element name="LocProcessedForHandoffsLookup" ma:index="81" nillable="true" ma:displayName="Loc Processed For Handoffs" ma:default="" ma:list="{7DD1DCEC-E449-43D3-891F-7DC62F62AD21}" ma:internalName="LocProcessedForHandoffsLookup" ma:readOnly="true" ma:showField="ProcessedForHandoffs" ma:web="4873beb7-5857-4685-be1f-d57550cc96cc">
-      <xsd:simpleType>
-        <xsd:restriction base="dms:Lookup"/>
-      </xsd:simpleType>
-    </xsd:element>
-    <xsd:element name="LocProcessedForMarketsLookup" ma:index="82" nillable="true" ma:displayName="Loc Processed For Markets" ma:default="" ma:list="{7DD1DCEC-E449-43D3-891F-7DC62F62AD21}" ma:internalName="LocProcessedForMarketsLookup" ma:readOnly="true" ma:showField="ProcessedForMarkets" ma:web="4873beb7-5857-4685-be1f-d57550cc96cc">
-      <xsd:simpleType>
-        <xsd:restriction base="dms:Lookup"/>
-      </xsd:simpleType>
-    </xsd:element>
-    <xsd:element name="LocPublishedDependentAssetsLookup" ma:index="83" nillable="true" ma:displayName="Loc Published Dependent Assets" ma:default="" ma:list="{7DD1DCEC-E449-43D3-891F-7DC62F62AD21}" ma:internalName="LocPublishedDependentAssetsLookup" ma:readOnly="true" ma:showField="PublishedDependentAssets" ma:web="4873beb7-5857-4685-be1f-d57550cc96cc">
-      <xsd:simpleType>
-        <xsd:restriction base="dms:Lookup"/>
-      </xsd:simpleType>
-    </xsd:element>
-    <xsd:element name="LocPublishedLinkedAssetsLookup" ma:index="84" nillable="true" ma:displayName="Loc Published Linked Assets" ma:default="" ma:list="{7DD1DCEC-E449-43D3-891F-7DC62F62AD21}" ma:internalName="LocPublishedLinkedAssetsLookup" ma:readOnly="true" ma:showField="PublishedLinkedAssets" ma:web="4873beb7-5857-4685-be1f-d57550cc96cc">
-      <xsd:simpleType>
-        <xsd:restriction base="dms:Lookup"/>
-      </xsd:simpleType>
-    </xsd:element>
-    <xsd:element name="LocRecommendedHandoff" ma:index="85" nillable="true" ma:displayName="Loc Recommended Handoff" ma:default="" ma:indexed="true" ma:internalName="LocRecommendedHandoff" ma:readOnly="false">
-      <xsd:simpleType>
-        <xsd:restriction base="dms:Text"/>
-      </xsd:simpleType>
-    </xsd:element>
-    <xsd:element name="LocalizationTagsTaxHTField0" ma:index="87" nillable="true" ma:taxonomy="true" ma:internalName="LocalizationTagsTaxHTField0" ma:taxonomyFieldName="LocalizationTags" ma:displayName="Localization Tags" ma:readOnly="false" ma:default="" ma:fieldId="{00f02cb3-2c7c-424a-9c61-10e9b6878429}" ma:taxonomyMulti="true" ma:sspId="8f79753a-75d3-41f5-8ca3-40b843941b4f" ma:termSetId="5b7703a5-8e8b-4b58-8b31-1cea35331da3" ma:anchorId="00000000-0000-0000-0000-000000000000" ma:open="false" ma:isKeyword="false">
-      <xsd:complexType>
-        <xsd:sequence>
-          <xsd:element ref="pc:Terms" minOccurs="0" maxOccurs="1"/>
-        </xsd:sequence>
-      </xsd:complexType>
-    </xsd:element>
-    <xsd:element name="MachineTranslated" ma:index="88" nillable="true" ma:displayName="Machine Translated" ma:default="" ma:internalName="MachineTranslated" ma:readOnly="false">
-      <xsd:simpleType>
-        <xsd:restriction base="dms:Boolean"/>
-      </xsd:simpleType>
-    </xsd:element>
-    <xsd:element name="Manager" ma:index="89" nillable="true" ma:displayName="Manager" ma:hidden="true" ma:internalName="Manager" ma:readOnly="false">
-      <xsd:simpleType>
-        <xsd:restriction base="dms:Text"/>
-      </xsd:simpleType>
-    </xsd:element>
-    <xsd:element name="Markets" ma:index="90" nillable="true" ma:displayName="Markets" ma:default="" ma:description="Leave blank to show in all markets" ma:list="{2FBD1B11-2ACE-4FDC-B5A3-635D4ADF6F1B}" ma:internalName="Markets" ma:readOnly="false" ma:showField="MarketName" ma:web="4873beb7-5857-4685-be1f-d57550cc96cc">
-      <xsd:complexType>
-        <xsd:complexContent>
-          <xsd:extension base="dms:MultiChoiceLookup">
-            <xsd:sequence>
-              <xsd:element name="Value" type="dms:Lookup" maxOccurs="unbounded" minOccurs="0" nillable="true"/>
-            </xsd:sequence>
-          </xsd:extension>
-        </xsd:complexContent>
-      </xsd:complexType>
-    </xsd:element>
-    <xsd:element name="Milestone" ma:index="91" nillable="true" ma:displayName="Milestone" ma:default="" ma:internalName="Milestone" ma:readOnly="false">
-      <xsd:simpleType>
-        <xsd:restriction base="dms:Unknown"/>
-      </xsd:simpleType>
-    </xsd:element>
-    <xsd:element name="TPNamespace" ma:index="94" nillable="true" ma:displayName="Namespace" ma:default="" ma:internalName="TPNamespace">
-      <xsd:simpleType>
-        <xsd:restriction base="dms:Text"/>
-      </xsd:simpleType>
-    </xsd:element>
-    <xsd:element name="NumericId" ma:index="95" nillable="true" ma:displayName="Numeric ID" ma:default="" ma:indexed="true" ma:internalName="NumericId" ma:readOnly="false">
-      <xsd:simpleType>
-        <xsd:restriction base="dms:Number"/>
-      </xsd:simpleType>
-    </xsd:element>
-    <xsd:element name="NumOfRatingsLookup" ma:index="96" nillable="true" ma:displayName="NumOfRatings" ma:default="" ma:list="{9E343742-310B-4684-A24C-1D137CB4B230}" ma:internalName="NumOfRatingsLookup" ma:readOnly="true" ma:showField="NumOfRatings" ma:web="4873beb7-5857-4685-be1f-d57550cc96cc">
-      <xsd:complexType>
-        <xsd:complexContent>
-          <xsd:extension base="dms:MultiChoiceLookup">
-            <xsd:sequence>
-              <xsd:element name="Value" type="dms:Lookup" maxOccurs="unbounded" minOccurs="0" nillable="true"/>
-            </xsd:sequence>
-          </xsd:extension>
-        </xsd:complexContent>
-      </xsd:complexType>
-    </xsd:element>
-    <xsd:element name="OOCacheId" ma:index="97" nillable="true" ma:displayName="OOCacheId" ma:internalName="OOCacheId" ma:readOnly="false">
-      <xsd:simpleType>
-        <xsd:restriction base="dms:Text"/>
-      </xsd:simpleType>
-    </xsd:element>
-    <xsd:element name="OpenTemplate" ma:index="98" nillable="true" ma:displayName="Open Template" ma:default="true" ma:internalName="OpenTemplate">
-      <xsd:simpleType>
-        <xsd:restriction base="dms:Boolean"/>
-      </xsd:simpleType>
-    </xsd:element>
-    <xsd:element name="OriginAsset" ma:index="99" nillable="true" ma:displayName="Origin Asset" ma:default="" ma:internalName="OriginAsset" ma:readOnly="false">
-      <xsd:simpleType>
-        <xsd:restriction base="dms:Text"/>
-      </xsd:simpleType>
-    </xsd:element>
-    <xsd:element name="OriginalRelease" ma:index="100" nillable="true" ma:displayName="Original Release" ma:default="15" ma:internalName="OriginalRelease" ma:readOnly="false">
-      <xsd:simpleType>
-        <xsd:restriction base="dms:Choice">
-          <xsd:enumeration value="14"/>
-          <xsd:enumeration value="15"/>
-          <xsd:enumeration value="16"/>
-        </xsd:restriction>
-      </xsd:simpleType>
-    </xsd:element>
-    <xsd:element name="OriginalSourceMarket" ma:index="101" nillable="true" ma:displayName="Original Source Market Group" ma:default="" ma:internalName="OriginalSourceMarket" ma:readOnly="false">
-      <xsd:simpleType>
-        <xsd:restriction base="dms:Text"/>
-      </xsd:simpleType>
-    </xsd:element>
-    <xsd:element name="OutputCachingOn" ma:index="102" nillable="true" ma:displayName="Output Caching" ma:default="true" ma:hidden="true" ma:internalName="OutputCachingOn" ma:readOnly="false">
-      <xsd:simpleType>
-        <xsd:restriction base="dms:Boolean"/>
-      </xsd:simpleType>
-    </xsd:element>
-    <xsd:element name="ParentAssetId" ma:index="103" nillable="true" ma:displayName="Parent Asset Id" ma:default="" ma:internalName="ParentAssetId" ma:readOnly="false">
-      <xsd:simpleType>
-        <xsd:restriction base="dms:Text"/>
-      </xsd:simpleType>
-    </xsd:element>
-    <xsd:element name="PlannedPubDate" ma:index="104" nillable="true" ma:displayName="Planned Publish Date" ma:default="" ma:indexed="true" ma:internalName="PlannedPubDate" ma:readOnly="false">
-      <xsd:simpleType>
-        <xsd:restriction base="dms:DateTime"/>
-      </xsd:simpleType>
-    </xsd:element>
-    <xsd:element name="PolicheckWords" ma:index="105" nillable="true" ma:displayName="Policheck Words" ma:default="" ma:internalName="PolicheckWords" ma:readOnly="false">
-      <xsd:simpleType>
-        <xsd:restriction base="dms:Text"/>
-      </xsd:simpleType>
-    </xsd:element>
-    <xsd:element name="BusinessGroup" ma:index="106" nillable="true" ma:displayName="Product Division Owner" ma:default="" ma:internalName="BusinessGroup" ma:readOnly="false">
-      <xsd:simpleType>
-        <xsd:restriction base="dms:Unknown"/>
-      </xsd:simpleType>
-    </xsd:element>
-    <xsd:element name="UAProjectedTotalWords" ma:index="107" nillable="true" ma:displayName="Projected Word Count" ma:default="" ma:internalName="UAProjectedTotalWords" ma:readOnly="false">
-      <xsd:simpleType>
-        <xsd:restriction base="dms:Unknown"/>
-      </xsd:simpleType>
-    </xsd:element>
-    <xsd:element name="Provider" ma:index="108" nillable="true" ma:displayName="Provider" ma:default="" ma:internalName="Provider" ma:readOnly="false">
-      <xsd:simpleType>
-        <xsd:restriction base="dms:Unknown"/>
-      </xsd:simpleType>
-    </xsd:element>
-    <xsd:element name="Providers" ma:index="109" nillable="true" ma:displayName="Providers" ma:default="" ma:internalName="Providers">
-      <xsd:simpleType>
-        <xsd:restriction base="dms:Unknown"/>
-      </xsd:simpleType>
-    </xsd:element>
-    <xsd:element name="PublishStatusLookup" ma:index="110" nillable="true" ma:displayName="Publish Status" ma:default="" ma:list="{9E343742-310B-4684-A24C-1D137CB4B230}" ma:internalName="PublishStatusLookup" ma:readOnly="false" ma:showField="PublishStatus" ma:web="4873beb7-5857-4685-be1f-d57550cc96cc">
-      <xsd:complexType>
-        <xsd:complexContent>
-          <xsd:extension base="dms:MultiChoiceLookup">
-            <xsd:sequence>
-              <xsd:element name="Value" type="dms:Lookup" maxOccurs="unbounded" minOccurs="0" nillable="true"/>
-            </xsd:sequence>
-          </xsd:extension>
-        </xsd:complexContent>
-      </xsd:complexType>
-    </xsd:element>
-    <xsd:element name="PublishTargets" ma:index="111" nillable="true" ma:displayName="Publish Target" ma:default="OfficeOnlineVNext" ma:internalName="PublishTargets" ma:readOnly="false">
-      <xsd:simpleType>
-        <xsd:restriction base="dms:Unknown"/>
-      </xsd:simpleType>
-    </xsd:element>
-    <xsd:element name="RecommendationsModifier" ma:index="112" nillable="true" ma:displayName="Recommendations Modifier" ma:default="" ma:internalName="RecommendationsModifier" ma:readOnly="false">
-      <xsd:simpleType>
-        <xsd:restriction base="dms:Number"/>
-      </xsd:simpleType>
-    </xsd:element>
-    <xsd:element name="ArtSampleDocs" ma:index="113" nillable="true" ma:displayName="Sample Docs" ma:default="" ma:hidden="true" ma:internalName="ArtSampleDocs" ma:readOnly="false">
-      <xsd:simpleType>
-        <xsd:restriction base="dms:Text"/>
-      </xsd:simpleType>
-    </xsd:element>
-    <xsd:element name="ScenarioTagsTaxHTField0" ma:index="115" nillable="true" ma:taxonomy="true" ma:internalName="ScenarioTagsTaxHTField0" ma:taxonomyFieldName="ScenarioTags" ma:displayName="Scenarios" ma:readOnly="false" ma:default="" ma:fieldId="{93aef74d-6c78-4815-8310-51477dceeccc}" ma:taxonomyMulti="true" ma:sspId="8f79753a-75d3-41f5-8ca3-40b843941b4f" ma:termSetId="4b7d5f16-e2f2-4fc0-bab3-6e8b931e57d6" ma:anchorId="00000000-0000-0000-0000-000000000000" ma:open="false" ma:isKeyword="false">
-      <xsd:complexType>
-        <xsd:sequence>
-          <xsd:element ref="pc:Terms" minOccurs="0" maxOccurs="1"/>
-        </xsd:sequence>
-      </xsd:complexType>
-    </xsd:element>
-    <xsd:element name="ShowIn" ma:index="117" nillable="true" ma:displayName="Show In" ma:default="Show everywhere" ma:internalName="ShowIn" ma:readOnly="false">
-      <xsd:simpleType>
-        <xsd:restriction base="dms:Choice">
-          <xsd:enumeration value="Hide on web"/>
-          <xsd:enumeration value="On Web no search"/>
-          <xsd:enumeration value="Show everywhere"/>
-          <xsd:enumeration value="Special use only"/>
-        </xsd:restriction>
-      </xsd:simpleType>
-    </xsd:element>
-    <xsd:element name="SourceTitle" ma:index="118" nillable="true" ma:displayName="Source Title" ma:default="" ma:indexed="true" ma:internalName="SourceTitle" ma:readOnly="false">
-      <xsd:simpleType>
-        <xsd:restriction base="dms:Text"/>
-      </xsd:simpleType>
-    </xsd:element>
-    <xsd:element name="CSXSubmissionDate" ma:index="119" nillable="true" ma:displayName="Submission Date" ma:default="" ma:internalName="CSXSubmissionDate" ma:readOnly="false">
-      <xsd:simpleType>
-        <xsd:restriction base="dms:DateTime"/>
-      </xsd:simpleType>
-    </xsd:element>
-    <xsd:element name="SubmitterId" ma:index="120" nillable="true" ma:displayName="Submitter ID" ma:default="" ma:internalName="SubmitterId" ma:readOnly="false">
-      <xsd:simpleType>
-        <xsd:restriction base="dms:Text"/>
-      </xsd:simpleType>
-    </xsd:element>
-    <xsd:element name="TaxCatchAll" ma:index="121" nillable="true" ma:displayName="Taxonomy Catch All Column" ma:hidden="true" ma:list="{530f955b-6704-4601-bd83-f81d87f1e440}" ma:internalName="TaxCatchAll" ma:showField="CatchAllData" ma:web="4873beb7-5857-4685-be1f-d57550cc96cc">
-      <xsd:complexType>
-        <xsd:complexContent>
-          <xsd:extension base="dms:MultiChoiceLookup">
-            <xsd:sequence>
-              <xsd:element name="Value" type="dms:Lookup" maxOccurs="unbounded" minOccurs="0" nillable="true"/>
-            </xsd:sequence>
-          </xsd:extension>
-        </xsd:complexContent>
-      </xsd:complexType>
-    </xsd:element>
-    <xsd:element name="TaxCatchAllLabel" ma:index="122" nillable="true" ma:displayName="Taxonomy Catch All Column1" ma:hidden="true" ma:list="{530f955b-6704-4601-bd83-f81d87f1e440}" ma:internalName="TaxCatchAllLabel" ma:readOnly="true" ma:showField="CatchAllDataLabel" ma:web="4873beb7-5857-4685-be1f-d57550cc96cc">
-      <xsd:complexType>
-        <xsd:complexContent>
-          <xsd:extension base="dms:MultiChoiceLookup">
-            <xsd:sequence>
-              <xsd:element name="Value" type="dms:Lookup" maxOccurs="unbounded" minOccurs="0" nillable="true"/>
-            </xsd:sequence>
-          </xsd:extension>
-        </xsd:complexContent>
-      </xsd:complexType>
-    </xsd:element>
-    <xsd:element name="TemplateStatus" ma:index="123" nillable="true" ma:displayName="Template Status" ma:default="" ma:internalName="TemplateStatus">
-      <xsd:simpleType>
-        <xsd:restriction base="dms:Unknown"/>
-      </xsd:simpleType>
-    </xsd:element>
-    <xsd:element name="TemplateTemplateType" ma:index="124" nillable="true" ma:displayName="Template Type" ma:default="" ma:internalName="TemplateTemplateType">
-      <xsd:simpleType>
-        <xsd:restriction base="dms:Unknown"/>
-      </xsd:simpleType>
-    </xsd:element>
-    <xsd:element name="ThumbnailAssetId" ma:index="125" nillable="true" ma:displayName="Thumbnail Image Asset" ma:default="" ma:internalName="ThumbnailAssetId" ma:readOnly="false">
-      <xsd:simpleType>
-        <xsd:restriction base="dms:Text"/>
-      </xsd:simpleType>
-    </xsd:element>
-    <xsd:element name="TimesCloned" ma:index="126" nillable="true" ma:displayName="Times Cloned" ma:default="" ma:internalName="TimesCloned" ma:readOnly="false">
-      <xsd:simpleType>
-        <xsd:restriction base="dms:Number"/>
-      </xsd:simpleType>
-    </xsd:element>
-    <xsd:element name="TrustLevel" ma:index="128" nillable="true" ma:displayName="Trust Level" ma:default="1 Microsoft Managed Content" ma:internalName="TrustLevel" ma:readOnly="false">
-      <xsd:simpleType>
-        <xsd:restriction base="dms:Unknown"/>
-      </xsd:simpleType>
-    </xsd:element>
-    <xsd:element name="UALocComments" ma:index="129" nillable="true" ma:displayName="UA Loc Comments" ma:default="" ma:internalName="UALocComments" ma:readOnly="false">
-      <xsd:simpleType>
-        <xsd:restriction base="dms:Note"/>
-      </xsd:simpleType>
-    </xsd:element>
-    <xsd:element name="UALocRecommendation" ma:index="130" nillable="true" ma:displayName="UA Loc Recommendation" ma:default="Localize" ma:internalName="UALocRecommendation" ma:readOnly="false">
-      <xsd:simpleType>
-        <xsd:restriction base="dms:Choice">
-          <xsd:enumeration value="Localize"/>
-          <xsd:enumeration value="Never Localize"/>
-          <xsd:enumeration value="Priority Localize"/>
-        </xsd:restriction>
-      </xsd:simpleType>
-    </xsd:element>
-    <xsd:element name="UANotes" ma:index="131" nillable="true" ma:displayName="UA Notes" ma:default="" ma:internalName="UANotes" ma:readOnly="false">
-      <xsd:simpleType>
-        <xsd:restriction base="dms:Note"/>
-      </xsd:simpleType>
-    </xsd:element>
-    <xsd:element name="TPAppVersion" ma:index="132" nillable="true" ma:displayName="Version" ma:default="" ma:internalName="TPAppVersion">
-      <xsd:simpleType>
-        <xsd:restriction base="dms:Text"/>
-      </xsd:simpleType>
-    </xsd:element>
-    <xsd:element name="VoteCount" ma:index="133" nillable="true" ma:displayName="Vote Count" ma:default="" ma:internalName="VoteCount" ma:readOnly="false">
-      <xsd:simpleType>
-        <xsd:restriction base="dms:Unknown"/>
-      </xsd:simpleType>
-    </xsd:element>
-  </xsd:schema>
-  <xsd:schema xmlns="http://schemas.openxmlformats.org/package/2006/metadata/core-properties" xmlns:xsd="http://www.w3.org/2001/XMLSchema" xmlns:xsi="http://www.w3.org/2001/XMLSchema-instance" xmlns:dc="http://purl.org/dc/elements/1.1/" xmlns:dcterms="http://purl.org/dc/terms/" xmlns:odoc="http://schemas.microsoft.com/internal/obd" targetNamespace="http://schemas.openxmlformats.org/package/2006/metadata/core-properties" elementFormDefault="qualified" attributeFormDefault="unqualified" blockDefault="#all">
-    <xsd:import namespace="http://purl.org/dc/elements/1.1/" schemaLocation="http://dublincore.org/schemas/xmls/qdc/2003/04/02/dc.xsd"/>
-    <xsd:import namespace="http://purl.org/dc/terms/" schemaLocation="http://dublincore.org/schemas/xmls/qdc/2003/04/02/dcterms.xsd"/>
-    <xsd:element name="coreProperties" type="CT_coreProperties"/>
-    <xsd:complexType name="CT_coreProperties">
-      <xsd:all>
-        <xsd:element ref="dc:creator" minOccurs="0" maxOccurs="1"/>
-        <xsd:element ref="dcterms:created" minOccurs="0" maxOccurs="1"/>
-        <xsd:element ref="dc:identifier" minOccurs="0" maxOccurs="1"/>
-        <xsd:element name="contentType" minOccurs="0" maxOccurs="1" type="xsd:string" ma:index="22" ma:displayName="Content Type"/>
-        <xsd:element ref="dc:title" minOccurs="0" maxOccurs="1" ma:index="127" ma:displayName="Title"/>
-        <xsd:element ref="dc:subject" minOccurs="0" maxOccurs="1"/>
-        <xsd:element ref="dc:description" minOccurs="0" maxOccurs="1"/>
-        <xsd:element name="keywords" minOccurs="0" maxOccurs="1" type="xsd:string"/>
-        <xsd:element ref="dc:language" minOccurs="0" maxOccurs="1"/>
-        <xsd:element name="category" minOccurs="0" maxOccurs="1" type="xsd:string"/>
-        <xsd:element name="version" minOccurs="0" maxOccurs="1" type="xsd:string"/>
-        <xsd:element name="revision" minOccurs="0" maxOccurs="1" type="xsd:string">
-          <xsd:annotation>
-            <xsd:documentation>
-                        This value indicates the number of saves or revisions. The application is responsible for updating this value after each revision.
-                    </xsd:documentation>
-          </xsd:annotation>
-        </xsd:element>
-        <xsd:element name="lastModifiedBy" minOccurs="0" maxOccurs="1" type="xsd:string"/>
-        <xsd:element ref="dcterms:modified" minOccurs="0" maxOccurs="1"/>
-        <xsd:element name="contentStatus" minOccurs="0" maxOccurs="1" type="xsd:string"/>
-      </xsd:all>
-    </xsd:complexType>
-  </xsd:schema>
-  <xs:schema xmlns:pc="http://schemas.microsoft.com/office/infopath/2007/PartnerControls" xmlns:xs="http://www.w3.org/2001/XMLSchema" targetNamespace="http://schemas.microsoft.com/office/infopath/2007/PartnerControls" elementFormDefault="qualified" attributeFormDefault="unqualified">
-    <xs:element name="Person">
-      <xs:complexType>
-        <xs:sequence>
-          <xs:element ref="pc:DisplayName" minOccurs="0"/>
-          <xs:element ref="pc:AccountId" minOccurs="0"/>
-          <xs:element ref="pc:AccountType" minOccurs="0"/>
-        </xs:sequence>
-      </xs:complexType>
-    </xs:element>
-    <xs:element name="DisplayName" type="xs:string"/>
-    <xs:element name="AccountId" type="xs:string"/>
-    <xs:element name="AccountType" type="xs:string"/>
-    <xs:element name="BDCAssociatedEntity">
-      <xs:complexType>
-        <xs:sequence>
-          <xs:element ref="pc:BDCEntity" minOccurs="0" maxOccurs="unbounded"/>
-        </xs:sequence>
-        <xs:attribute ref="pc:EntityNamespace"/>
-        <xs:attribute ref="pc:EntityName"/>
-        <xs:attribute ref="pc:SystemInstanceName"/>
-        <xs:attribute ref="pc:AssociationName"/>
-      </xs:complexType>
-    </xs:element>
-    <xs:attribute name="EntityNamespace" type="xs:string"/>
-    <xs:attribute name="EntityName" type="xs:string"/>
-    <xs:attribute name="SystemInstanceName" type="xs:string"/>
-    <xs:attribute name="AssociationName" type="xs:string"/>
-    <xs:element name="BDCEntity">
-      <xs:complexType>
-        <xs:sequence>
-          <xs:element ref="pc:EntityDisplayName" minOccurs="0"/>
-          <xs:element ref="pc:EntityInstanceReference" minOccurs="0"/>
-          <xs:element ref="pc:EntityId1" minOccurs="0"/>
-          <xs:element ref="pc:EntityId2" minOccurs="0"/>
-          <xs:element ref="pc:EntityId3" minOccurs="0"/>
-          <xs:element ref="pc:EntityId4" minOccurs="0"/>
-          <xs:element ref="pc:EntityId5" minOccurs="0"/>
-        </xs:sequence>
-      </xs:complexType>
-    </xs:element>
-    <xs:element name="EntityDisplayName" type="xs:string"/>
-    <xs:element name="EntityInstanceReference" type="xs:string"/>
-    <xs:element name="EntityId1" type="xs:string"/>
-    <xs:element name="EntityId2" type="xs:string"/>
-    <xs:element name="EntityId3" type="xs:string"/>
-    <xs:element name="EntityId4" type="xs:string"/>
-    <xs:element name="EntityId5" type="xs:string"/>
-    <xs:element name="Terms">
-      <xs:complexType>
-        <xs:sequence>
-          <xs:element ref="pc:TermInfo" minOccurs="0" maxOccurs="unbounded"/>
-        </xs:sequence>
-      </xs:complexType>
-    </xs:element>
-    <xs:element name="TermInfo">
-      <xs:complexType>
-        <xs:sequence>
-          <xs:element ref="pc:TermName" minOccurs="0"/>
-          <xs:element ref="pc:TermId" minOccurs="0"/>
-        </xs:sequence>
-      </xs:complexType>
-    </xs:element>
-    <xs:element name="TermName" type="xs:string"/>
-    <xs:element name="TermId" type="xs:string"/>
-  </xs:schema>
-</ct:contentTypeSchema>
-</file>
-
 <file path=customXml/item3.xml><?xml version="1.0" encoding="utf-8"?>
 <?mso-contentType ?>
 <FormTemplates xmlns="http://schemas.microsoft.com/sharepoint/v3/contenttype/forms">
@@ -11781,22 +11775,6 @@
 </file>
 
 <file path=customXml/itemProps1.xml><?xml version="1.0" encoding="utf-8"?>
-<ds:datastoreItem xmlns:ds="http://schemas.openxmlformats.org/officeDocument/2006/customXml" ds:itemID="{60C67BEE-D13F-4BD2-98A5-34D8A0977F68}">
-  <ds:schemaRefs>
-    <ds:schemaRef ds:uri="4873beb7-5857-4685-be1f-d57550cc96cc"/>
-    <ds:schemaRef ds:uri="http://schemas.openxmlformats.org/package/2006/metadata/core-properties"/>
-    <ds:schemaRef ds:uri="http://purl.org/dc/terms/"/>
-    <ds:schemaRef ds:uri="http://schemas.microsoft.com/office/2006/documentManagement/types"/>
-    <ds:schemaRef ds:uri="http://purl.org/dc/elements/1.1/"/>
-    <ds:schemaRef ds:uri="http://schemas.microsoft.com/office/2006/metadata/properties"/>
-    <ds:schemaRef ds:uri="http://schemas.microsoft.com/office/infopath/2007/PartnerControls"/>
-    <ds:schemaRef ds:uri="http://www.w3.org/XML/1998/namespace"/>
-    <ds:schemaRef ds:uri="http://purl.org/dc/dcmitype/"/>
-  </ds:schemaRefs>
-</ds:datastoreItem>
-</file>
-
-<file path=customXml/itemProps2.xml><?xml version="1.0" encoding="utf-8"?>
 <ds:datastoreItem xmlns:ds="http://schemas.openxmlformats.org/officeDocument/2006/customXml" ds:itemID="{A09BF4D4-EF60-4196-BFC3-9462D607978C}">
   <ds:schemaRefs>
     <ds:schemaRef ds:uri="http://schemas.microsoft.com/office/2006/metadata/contentType"/>
@@ -11814,6 +11792,22 @@
 </ds:datastoreItem>
 </file>
 
+<file path=customXml/itemProps2.xml><?xml version="1.0" encoding="utf-8"?>
+<ds:datastoreItem xmlns:ds="http://schemas.openxmlformats.org/officeDocument/2006/customXml" ds:itemID="{60C67BEE-D13F-4BD2-98A5-34D8A0977F68}">
+  <ds:schemaRefs>
+    <ds:schemaRef ds:uri="4873beb7-5857-4685-be1f-d57550cc96cc"/>
+    <ds:schemaRef ds:uri="http://schemas.openxmlformats.org/package/2006/metadata/core-properties"/>
+    <ds:schemaRef ds:uri="http://purl.org/dc/terms/"/>
+    <ds:schemaRef ds:uri="http://schemas.microsoft.com/office/2006/documentManagement/types"/>
+    <ds:schemaRef ds:uri="http://purl.org/dc/elements/1.1/"/>
+    <ds:schemaRef ds:uri="http://schemas.microsoft.com/office/2006/metadata/properties"/>
+    <ds:schemaRef ds:uri="http://schemas.microsoft.com/office/infopath/2007/PartnerControls"/>
+    <ds:schemaRef ds:uri="http://www.w3.org/XML/1998/namespace"/>
+    <ds:schemaRef ds:uri="http://purl.org/dc/dcmitype/"/>
+  </ds:schemaRefs>
+</ds:datastoreItem>
+</file>
+
 <file path=customXml/itemProps3.xml><?xml version="1.0" encoding="utf-8"?>
 <ds:datastoreItem xmlns:ds="http://schemas.openxmlformats.org/officeDocument/2006/customXml" ds:itemID="{3836F65B-1B07-41EE-A0E8-BC6EF3855225}">
   <ds:schemaRefs>

</xml_diff>

<commit_message>
pcbuild power point edited
</commit_message>
<xml_diff>
--- a/buildPC.pptx
+++ b/buildPC.pptx
@@ -16967,7 +16967,7 @@
         <p:fade/>
       </p:transition>
     </mc:Choice>
-    <mc:Fallback xmlns="" xmlns:p15="http://schemas.microsoft.com/office/powerpoint/2012/main">
+    <mc:Fallback xmlns:p15="http://schemas.microsoft.com/office/powerpoint/2012/main" xmlns="">
       <p:transition spd="med">
         <p:fade/>
       </p:transition>
@@ -17317,7 +17317,7 @@
         <p:fade/>
       </p:transition>
     </mc:Choice>
-    <mc:Fallback xmlns="" xmlns:p15="http://schemas.microsoft.com/office/powerpoint/2012/main">
+    <mc:Fallback xmlns:p15="http://schemas.microsoft.com/office/powerpoint/2012/main" xmlns="">
       <p:transition spd="med">
         <p:fade/>
       </p:transition>
@@ -17758,7 +17758,7 @@
         <p:fade/>
       </p:transition>
     </mc:Choice>
-    <mc:Fallback xmlns="" xmlns:p15="http://schemas.microsoft.com/office/powerpoint/2012/main">
+    <mc:Fallback xmlns:p15="http://schemas.microsoft.com/office/powerpoint/2012/main" xmlns="">
       <p:transition spd="med">
         <p:fade/>
       </p:transition>
@@ -18064,7 +18064,7 @@
         <p:fade/>
       </p:transition>
     </mc:Choice>
-    <mc:Fallback xmlns="" xmlns:p15="http://schemas.microsoft.com/office/powerpoint/2012/main">
+    <mc:Fallback xmlns:p15="http://schemas.microsoft.com/office/powerpoint/2012/main" xmlns="">
       <p:transition spd="med">
         <p:fade/>
       </p:transition>
@@ -18505,7 +18505,7 @@
         <p:fade/>
       </p:transition>
     </mc:Choice>
-    <mc:Fallback xmlns="" xmlns:p15="http://schemas.microsoft.com/office/powerpoint/2012/main">
+    <mc:Fallback xmlns:p15="http://schemas.microsoft.com/office/powerpoint/2012/main" xmlns="">
       <p:transition spd="med">
         <p:fade/>
       </p:transition>
@@ -19053,7 +19053,7 @@
         <p:fade/>
       </p:transition>
     </mc:Choice>
-    <mc:Fallback xmlns="" xmlns:p15="http://schemas.microsoft.com/office/powerpoint/2012/main">
+    <mc:Fallback xmlns:p15="http://schemas.microsoft.com/office/powerpoint/2012/main" xmlns="">
       <p:transition spd="med">
         <p:fade/>
       </p:transition>
@@ -19909,7 +19909,7 @@
         <p:fade/>
       </p:transition>
     </mc:Choice>
-    <mc:Fallback xmlns="" xmlns:p15="http://schemas.microsoft.com/office/powerpoint/2012/main">
+    <mc:Fallback xmlns:p15="http://schemas.microsoft.com/office/powerpoint/2012/main" xmlns="">
       <p:transition spd="med">
         <p:fade/>
       </p:transition>
@@ -20010,7 +20010,7 @@
         </p:spPr>
         <p:txBody>
           <a:bodyPr lIns="122040" tIns="60840" rIns="122040" bIns="60840" anchor="t">
-            <a:normAutofit fontScale="88000" lnSpcReduction="10000"/>
+            <a:normAutofit fontScale="80500" lnSpcReduction="20000"/>
           </a:bodyPr>
           <a:lstStyle/>
           <a:p>
@@ -20041,7 +20041,27 @@
                 <a:latin typeface="Calibri"/>
                 <a:ea typeface="Calibri"/>
               </a:rPr>
-              <a:t>In this project I attempt to build a computer for Productivity, Virtualization, Entertainment, and Gaming for $1200. I chose a MSI B550 Tomahawk Motherboard with an 8-core AMD Ryzen 7 5800x CPU as the brains of the computer. The computer will feature a Cooler Master Hyper 212 CPU cooler and a Fractal Design Pop XL Air Full ATX case, for easy future upgrading. It will feature 32 GB of </a:t>
+              <a:t>In this project I attempt to build a computer for Productivity, Virtualization, Entertainment, and Gaming for $1200. I chose a MSI B550 Tomahawk Motherboard with an 8-core AMD Ryzen 7 5800x CPU as the brains of the computer. I am personally a ‘Team Red’ member </a:t>
+            </a:r>
+            <a:r>
+              <a:rPr lang="en-US" sz="1600" spc="197" dirty="0">
+                <a:solidFill>
+                  <a:srgbClr val="FFFFFF"/>
+                </a:solidFill>
+                <a:latin typeface="Calibri"/>
+                <a:ea typeface="Calibri"/>
+              </a:rPr>
+              <a:t>and normally purchase AMD chipsets. I chose the MSI B550 because I currently have an MSI B450 in a computer and have never had any issue with performance, so I like the MSI brand. </a:t>
+            </a:r>
+            <a:r>
+              <a:rPr lang="en-US" sz="1600" b="0" strike="noStrike" spc="197" dirty="0">
+                <a:solidFill>
+                  <a:srgbClr val="FFFFFF"/>
+                </a:solidFill>
+                <a:latin typeface="Calibri"/>
+                <a:ea typeface="Calibri"/>
+              </a:rPr>
+              <a:t>The computer will feature a Cooler Master Hyper 212 CPU cooler and a Fractal Design Pop XL Air Full ATX case, for excellent air flow and easy future upgrading. It will feature 32 GB of </a:t>
             </a:r>
             <a:r>
               <a:rPr lang="en-US" sz="1600" b="0" strike="noStrike" spc="197" dirty="0" err="1">
@@ -20061,7 +20081,7 @@
                 <a:latin typeface="Calibri"/>
                 <a:ea typeface="Calibri"/>
               </a:rPr>
-              <a:t> DDR4 3200 RAM, along with a 500 GB SSD drive for the OS, and 6 TB of HDD for applications, data storage, and games. The video card will be a Radeon RX 6600 with 8Gb of GDDR6 memory. </a:t>
+              <a:t> DDR4 3200 RAM, which should be plenty for multi-tasking even my most demanding applications. The OS will be installed on a super fast 500 GB SSD drive, and I will have a 6 TB HDD for applications, data storage, and games. The video card will be a Radeon RX 6600 with 8Gb of GDDR6 memory which should play AAA games at high quality for a few more years. </a:t>
             </a:r>
             <a:endParaRPr lang="en-US" sz="1600" b="0" strike="noStrike" spc="-1" dirty="0">
               <a:latin typeface="Arial"/>
@@ -20085,7 +20105,27 @@
                 <a:latin typeface="Calibri"/>
                 <a:ea typeface="Calibri"/>
               </a:rPr>
-              <a:t>		If I had stopped with the initial build, I would have successfully built the Desktop for a subtotal of slightly more than $1200, pre-Black Friday / Cyber-Monday deals. I added 2 monitors for a dual monitor setup and ended up spending another $400. The subtotal with the monitors is $1622.69 on the Newegg.com website. I will end up adding a mechanical keyboard and triple monitor mount to bring the subtotal up to $1900 or more eventually. </a:t>
+              <a:t>		If I had stopped with the initial build, I would have successfully built the Desktop for a subtotal of slightly more than </a:t>
+            </a:r>
+            <a:r>
+              <a:rPr lang="en-US" sz="1600" b="0" strike="noStrike" spc="197">
+                <a:solidFill>
+                  <a:srgbClr val="FFFFFF"/>
+                </a:solidFill>
+                <a:latin typeface="Calibri"/>
+                <a:ea typeface="Calibri"/>
+              </a:rPr>
+              <a:t>$1200. </a:t>
+            </a:r>
+            <a:r>
+              <a:rPr lang="en-US" sz="1600" b="0" strike="noStrike" spc="197" dirty="0">
+                <a:solidFill>
+                  <a:srgbClr val="FFFFFF"/>
+                </a:solidFill>
+                <a:latin typeface="Calibri"/>
+                <a:ea typeface="Calibri"/>
+              </a:rPr>
+              <a:t>I added 2 monitors for a dual monitor setup and ended up spending another $400. The subtotal with the monitors is $1622.69 on the Newegg.com website. I will end up adding a mechanical keyboard and triple monitor mount to bring the subtotal up to $1900 or more eventually. </a:t>
             </a:r>
             <a:endParaRPr lang="en-US" sz="1600" b="0" strike="noStrike" spc="-1" dirty="0">
               <a:latin typeface="Arial"/>
@@ -20152,7 +20192,7 @@
         <p:fade/>
       </p:transition>
     </mc:Choice>
-    <mc:Fallback xmlns="" xmlns:p15="http://schemas.microsoft.com/office/powerpoint/2012/main">
+    <mc:Fallback xmlns:p15="http://schemas.microsoft.com/office/powerpoint/2012/main" xmlns="">
       <p:transition spd="med">
         <p:fade/>
       </p:transition>
@@ -20482,7 +20522,7 @@
         <p:fade/>
       </p:transition>
     </mc:Choice>
-    <mc:Fallback xmlns="" xmlns:p15="http://schemas.microsoft.com/office/powerpoint/2012/main">
+    <mc:Fallback xmlns:p15="http://schemas.microsoft.com/office/powerpoint/2012/main" xmlns="">
       <p:transition spd="med">
         <p:fade/>
       </p:transition>
@@ -20653,7 +20693,7 @@
         <p:fade/>
       </p:transition>
     </mc:Choice>
-    <mc:Fallback xmlns="" xmlns:p15="http://schemas.microsoft.com/office/powerpoint/2012/main">
+    <mc:Fallback xmlns:p15="http://schemas.microsoft.com/office/powerpoint/2012/main" xmlns="">
       <p:transition spd="med">
         <p:fade/>
       </p:transition>
@@ -21017,7 +21057,7 @@
         <p:fade/>
       </p:transition>
     </mc:Choice>
-    <mc:Fallback xmlns="" xmlns:p15="http://schemas.microsoft.com/office/powerpoint/2012/main">
+    <mc:Fallback xmlns:p15="http://schemas.microsoft.com/office/powerpoint/2012/main" xmlns="">
       <p:transition spd="med">
         <p:fade/>
       </p:transition>
@@ -21508,7 +21548,7 @@
         <p:fade/>
       </p:transition>
     </mc:Choice>
-    <mc:Fallback xmlns="" xmlns:p15="http://schemas.microsoft.com/office/powerpoint/2012/main">
+    <mc:Fallback xmlns:p15="http://schemas.microsoft.com/office/powerpoint/2012/main" xmlns="">
       <p:transition spd="med">
         <p:fade/>
       </p:transition>
@@ -21829,7 +21869,7 @@
         <p:fade/>
       </p:transition>
     </mc:Choice>
-    <mc:Fallback xmlns="" xmlns:p15="http://schemas.microsoft.com/office/powerpoint/2012/main">
+    <mc:Fallback xmlns:p15="http://schemas.microsoft.com/office/powerpoint/2012/main" xmlns="">
       <p:transition spd="med">
         <p:fade/>
       </p:transition>
@@ -22163,7 +22203,7 @@
         <p:fade/>
       </p:transition>
     </mc:Choice>
-    <mc:Fallback xmlns="" xmlns:p15="http://schemas.microsoft.com/office/powerpoint/2012/main">
+    <mc:Fallback xmlns:p15="http://schemas.microsoft.com/office/powerpoint/2012/main" xmlns="">
       <p:transition spd="med">
         <p:fade/>
       </p:transition>
@@ -22439,7 +22479,7 @@
         <p:fade/>
       </p:transition>
     </mc:Choice>
-    <mc:Fallback xmlns="" xmlns:p15="http://schemas.microsoft.com/office/powerpoint/2012/main">
+    <mc:Fallback xmlns:p15="http://schemas.microsoft.com/office/powerpoint/2012/main" xmlns="">
       <p:transition spd="med">
         <p:fade/>
       </p:transition>
@@ -22755,7 +22795,7 @@
         <p:fade/>
       </p:transition>
     </mc:Choice>
-    <mc:Fallback xmlns="" xmlns:p15="http://schemas.microsoft.com/office/powerpoint/2012/main">
+    <mc:Fallback xmlns:p15="http://schemas.microsoft.com/office/powerpoint/2012/main" xmlns="">
       <p:transition spd="med">
         <p:fade/>
       </p:transition>

</xml_diff>

<commit_message>
pcbuild powerpoint worked on
</commit_message>
<xml_diff>
--- a/buildPC.pptx
+++ b/buildPC.pptx
@@ -25,6 +25,7 @@
     <p:sldId id="269" r:id="rId19"/>
     <p:sldId id="270" r:id="rId20"/>
     <p:sldId id="271" r:id="rId21"/>
+    <p:sldId id="272" r:id="rId22"/>
   </p:sldIdLst>
   <p:sldSz cx="12188825" cy="6858000"/>
   <p:notesSz cx="7772400" cy="10058400"/>
@@ -16967,7 +16968,7 @@
         <p:fade/>
       </p:transition>
     </mc:Choice>
-    <mc:Fallback xmlns:p15="http://schemas.microsoft.com/office/powerpoint/2012/main" xmlns="">
+    <mc:Fallback xmlns="" xmlns:p15="http://schemas.microsoft.com/office/powerpoint/2012/main">
       <p:transition spd="med">
         <p:fade/>
       </p:transition>
@@ -17317,7 +17318,7 @@
         <p:fade/>
       </p:transition>
     </mc:Choice>
-    <mc:Fallback xmlns:p15="http://schemas.microsoft.com/office/powerpoint/2012/main" xmlns="">
+    <mc:Fallback xmlns="" xmlns:p15="http://schemas.microsoft.com/office/powerpoint/2012/main">
       <p:transition spd="med">
         <p:fade/>
       </p:transition>
@@ -17758,7 +17759,7 @@
         <p:fade/>
       </p:transition>
     </mc:Choice>
-    <mc:Fallback xmlns:p15="http://schemas.microsoft.com/office/powerpoint/2012/main" xmlns="">
+    <mc:Fallback xmlns="" xmlns:p15="http://schemas.microsoft.com/office/powerpoint/2012/main">
       <p:transition spd="med">
         <p:fade/>
       </p:transition>
@@ -18064,7 +18065,7 @@
         <p:fade/>
       </p:transition>
     </mc:Choice>
-    <mc:Fallback xmlns:p15="http://schemas.microsoft.com/office/powerpoint/2012/main" xmlns="">
+    <mc:Fallback xmlns="" xmlns:p15="http://schemas.microsoft.com/office/powerpoint/2012/main">
       <p:transition spd="med">
         <p:fade/>
       </p:transition>
@@ -18505,7 +18506,7 @@
         <p:fade/>
       </p:transition>
     </mc:Choice>
-    <mc:Fallback xmlns:p15="http://schemas.microsoft.com/office/powerpoint/2012/main" xmlns="">
+    <mc:Fallback xmlns="" xmlns:p15="http://schemas.microsoft.com/office/powerpoint/2012/main">
       <p:transition spd="med">
         <p:fade/>
       </p:transition>
@@ -19053,7 +19054,7 @@
         <p:fade/>
       </p:transition>
     </mc:Choice>
-    <mc:Fallback xmlns:p15="http://schemas.microsoft.com/office/powerpoint/2012/main" xmlns="">
+    <mc:Fallback xmlns="" xmlns:p15="http://schemas.microsoft.com/office/powerpoint/2012/main">
       <p:transition spd="med">
         <p:fade/>
       </p:transition>
@@ -19499,7 +19500,7 @@
                 </a:solidFill>
                 <a:latin typeface="Calibri"/>
               </a:rPr>
-              <a:t>Corsair RM850 850 Watt	$114.99 </a:t>
+              <a:t>Corsair RM850 850 Watt		$114.99 </a:t>
             </a:r>
             <a:endParaRPr lang="en-US" sz="1600" b="0" strike="noStrike" spc="-1" dirty="0">
               <a:latin typeface="Arial"/>
@@ -19694,7 +19695,7 @@
                 </a:solidFill>
                 <a:latin typeface="Calibri"/>
               </a:rPr>
-              <a:t>GIGABYTE Radeon RX 6600	$219.99</a:t>
+              <a:t>GIGABYTE Radeon RX 6600		$219.99</a:t>
             </a:r>
             <a:endParaRPr lang="en-US" sz="1600" b="0" strike="noStrike" spc="-1" dirty="0">
               <a:latin typeface="Arial"/>
@@ -19767,7 +19768,7 @@
                 </a:solidFill>
                 <a:latin typeface="Calibri"/>
               </a:rPr>
-              <a:t> 27” Curved	$399.98</a:t>
+              <a:t> 27” Curved		$399.98</a:t>
             </a:r>
             <a:endParaRPr lang="en-US" sz="1600" b="0" strike="noStrike" spc="-1" dirty="0">
               <a:latin typeface="Arial"/>
@@ -19909,7 +19910,7 @@
         <p:fade/>
       </p:transition>
     </mc:Choice>
-    <mc:Fallback xmlns:p15="http://schemas.microsoft.com/office/powerpoint/2012/main" xmlns="">
+    <mc:Fallback xmlns="" xmlns:p15="http://schemas.microsoft.com/office/powerpoint/2012/main">
       <p:transition spd="med">
         <p:fade/>
       </p:transition>
@@ -20031,61 +20032,41 @@
                 <a:latin typeface="Calibri"/>
                 <a:ea typeface="Calibri"/>
               </a:rPr>
-              <a:t>		</a:t>
+              <a:t>	</a:t>
             </a:r>
             <a:r>
               <a:rPr lang="en-US" sz="1600" b="0" strike="noStrike" spc="197" dirty="0">
                 <a:solidFill>
-                  <a:srgbClr val="FFFFFF"/>
+                  <a:schemeClr val="bg1"/>
                 </a:solidFill>
-                <a:latin typeface="Calibri"/>
-                <a:ea typeface="Calibri"/>
-              </a:rPr>
-              <a:t>In this project I attempt to build a computer for Productivity, Virtualization, Entertainment, and Gaming for $1200. I chose a MSI B550 Tomahawk Motherboard with an 8-core AMD Ryzen 7 5800x CPU as the brains of the computer. I am personally a ‘Team Red’ member </a:t>
+                <a:latin typeface="Calibri" panose="020F0502020204030204" pitchFamily="34" charset="0"/>
+                <a:ea typeface="Calibri" panose="020F0502020204030204" pitchFamily="34" charset="0"/>
+                <a:cs typeface="Calibri" panose="020F0502020204030204" pitchFamily="34" charset="0"/>
+              </a:rPr>
+              <a:t>	In this project I attempt to build a computer for Productivity, Virtualization, Entertainment, and Gaming for $1200. I chose a MSI B550 Tomahawk Motherboard with an 8-core AMD Ryzen 7 5800x CPU as the brains of the computer. I am personally a ‘Team Red’ member </a:t>
             </a:r>
             <a:r>
               <a:rPr lang="en-US" sz="1600" spc="197" dirty="0">
                 <a:solidFill>
-                  <a:srgbClr val="FFFFFF"/>
+                  <a:schemeClr val="bg1"/>
                 </a:solidFill>
-                <a:latin typeface="Calibri"/>
-                <a:ea typeface="Calibri"/>
+                <a:latin typeface="Calibri" panose="020F0502020204030204" pitchFamily="34" charset="0"/>
+                <a:ea typeface="Calibri" panose="020F0502020204030204" pitchFamily="34" charset="0"/>
+                <a:cs typeface="Calibri" panose="020F0502020204030204" pitchFamily="34" charset="0"/>
               </a:rPr>
               <a:t>and normally purchase AMD chipsets. I chose the MSI B550 because I currently have an MSI B450 in a computer and have never had any issue with performance, so I like the MSI brand. </a:t>
             </a:r>
             <a:r>
               <a:rPr lang="en-US" sz="1600" b="0" strike="noStrike" spc="197" dirty="0">
                 <a:solidFill>
-                  <a:srgbClr val="FFFFFF"/>
+                  <a:schemeClr val="bg1"/>
                 </a:solidFill>
-                <a:latin typeface="Calibri"/>
-                <a:ea typeface="Calibri"/>
-              </a:rPr>
-              <a:t>The computer will feature a Cooler Master Hyper 212 CPU cooler and a Fractal Design Pop XL Air Full ATX case, for excellent air flow and easy future upgrading. It will feature 32 GB of </a:t>
-            </a:r>
-            <a:r>
-              <a:rPr lang="en-US" sz="1600" b="0" strike="noStrike" spc="197" dirty="0" err="1">
-                <a:solidFill>
-                  <a:srgbClr val="FFFFFF"/>
-                </a:solidFill>
-                <a:latin typeface="Calibri"/>
-                <a:ea typeface="Calibri"/>
-              </a:rPr>
-              <a:t>G.Skill</a:t>
-            </a:r>
-            <a:r>
-              <a:rPr lang="en-US" sz="1600" b="0" strike="noStrike" spc="197" dirty="0">
-                <a:solidFill>
-                  <a:srgbClr val="FFFFFF"/>
-                </a:solidFill>
-                <a:latin typeface="Calibri"/>
-                <a:ea typeface="Calibri"/>
-              </a:rPr>
-              <a:t> DDR4 3200 RAM, which should be plenty for multi-tasking even my most demanding applications. The OS will be installed on a super fast 500 GB SSD drive, and I will have a 6 TB HDD for applications, data storage, and games. The video card will be a Radeon RX 6600 with 8Gb of GDDR6 memory which should play AAA games at high quality for a few more years. </a:t>
-            </a:r>
-            <a:endParaRPr lang="en-US" sz="1600" b="0" strike="noStrike" spc="-1" dirty="0">
-              <a:latin typeface="Arial"/>
-            </a:endParaRPr>
+                <a:latin typeface="Calibri" panose="020F0502020204030204" pitchFamily="34" charset="0"/>
+                <a:ea typeface="Calibri" panose="020F0502020204030204" pitchFamily="34" charset="0"/>
+                <a:cs typeface="Calibri" panose="020F0502020204030204" pitchFamily="34" charset="0"/>
+              </a:rPr>
+              <a:t>The computer will feature a Cooler Master Hyper 212 CPU cooler and a Fractal Design Pop XL Air Full ATX case, for excellent air flow and easy future upgrading. </a:t>
+            </a:r>
           </a:p>
           <a:p>
             <a:pPr>
@@ -20098,37 +20079,78 @@
               </a:tabLst>
             </a:pPr>
             <a:r>
+              <a:rPr lang="en-US" sz="1600" spc="197" dirty="0">
+                <a:solidFill>
+                  <a:schemeClr val="bg1"/>
+                </a:solidFill>
+                <a:latin typeface="Calibri" panose="020F0502020204030204" pitchFamily="34" charset="0"/>
+                <a:ea typeface="Calibri" panose="020F0502020204030204" pitchFamily="34" charset="0"/>
+                <a:cs typeface="Calibri" panose="020F0502020204030204" pitchFamily="34" charset="0"/>
+              </a:rPr>
+              <a:t>		The PC</a:t>
+            </a:r>
+            <a:r>
               <a:rPr lang="en-US" sz="1600" b="0" strike="noStrike" spc="197" dirty="0">
                 <a:solidFill>
-                  <a:srgbClr val="FFFFFF"/>
+                  <a:schemeClr val="bg1"/>
                 </a:solidFill>
-                <a:latin typeface="Calibri"/>
-                <a:ea typeface="Calibri"/>
-              </a:rPr>
-              <a:t>		If I had stopped with the initial build, I would have successfully built the Desktop for a subtotal of slightly more than </a:t>
-            </a:r>
-            <a:r>
-              <a:rPr lang="en-US" sz="1600" b="0" strike="noStrike" spc="197">
+                <a:latin typeface="Calibri" panose="020F0502020204030204" pitchFamily="34" charset="0"/>
+                <a:ea typeface="Calibri" panose="020F0502020204030204" pitchFamily="34" charset="0"/>
+                <a:cs typeface="Calibri" panose="020F0502020204030204" pitchFamily="34" charset="0"/>
+              </a:rPr>
+              <a:t> will feature 32 GB of </a:t>
+            </a:r>
+            <a:r>
+              <a:rPr lang="en-US" sz="1600" b="0" strike="noStrike" spc="197" dirty="0" err="1">
                 <a:solidFill>
-                  <a:srgbClr val="FFFFFF"/>
+                  <a:schemeClr val="bg1"/>
                 </a:solidFill>
-                <a:latin typeface="Calibri"/>
-                <a:ea typeface="Calibri"/>
-              </a:rPr>
-              <a:t>$1200. </a:t>
+                <a:latin typeface="Calibri" panose="020F0502020204030204" pitchFamily="34" charset="0"/>
+                <a:ea typeface="Calibri" panose="020F0502020204030204" pitchFamily="34" charset="0"/>
+                <a:cs typeface="Calibri" panose="020F0502020204030204" pitchFamily="34" charset="0"/>
+              </a:rPr>
+              <a:t>G.Skill</a:t>
             </a:r>
             <a:r>
               <a:rPr lang="en-US" sz="1600" b="0" strike="noStrike" spc="197" dirty="0">
                 <a:solidFill>
-                  <a:srgbClr val="FFFFFF"/>
+                  <a:schemeClr val="bg1"/>
                 </a:solidFill>
-                <a:latin typeface="Calibri"/>
-                <a:ea typeface="Calibri"/>
-              </a:rPr>
-              <a:t>I added 2 monitors for a dual monitor setup and ended up spending another $400. The subtotal with the monitors is $1622.69 on the Newegg.com website. I will end up adding a mechanical keyboard and triple monitor mount to bring the subtotal up to $1900 or more eventually. </a:t>
+                <a:latin typeface="Calibri" panose="020F0502020204030204" pitchFamily="34" charset="0"/>
+                <a:ea typeface="Calibri" panose="020F0502020204030204" pitchFamily="34" charset="0"/>
+                <a:cs typeface="Calibri" panose="020F0502020204030204" pitchFamily="34" charset="0"/>
+              </a:rPr>
+              <a:t> DDR4 3200 RAM, which will be plenty for multi-tasking even my most demanding applications. The OS will be installed on a super fast 500 GB SSD drive, and I will have a 6 TB HDD for applications, data storage, and games. The video card will be a Radeon RX 6600 with 8Gb of GDDR6 memory which </a:t>
+            </a:r>
+            <a:r>
+              <a:rPr lang="en-US" sz="1600" spc="197" dirty="0">
+                <a:solidFill>
+                  <a:schemeClr val="bg1"/>
+                </a:solidFill>
+                <a:latin typeface="Calibri" panose="020F0502020204030204" pitchFamily="34" charset="0"/>
+                <a:ea typeface="Calibri" panose="020F0502020204030204" pitchFamily="34" charset="0"/>
+                <a:cs typeface="Calibri" panose="020F0502020204030204" pitchFamily="34" charset="0"/>
+              </a:rPr>
+              <a:t>will</a:t>
+            </a:r>
+            <a:r>
+              <a:rPr lang="en-US" sz="1600" b="0" strike="noStrike" spc="197" dirty="0">
+                <a:solidFill>
+                  <a:schemeClr val="bg1"/>
+                </a:solidFill>
+                <a:latin typeface="Calibri" panose="020F0502020204030204" pitchFamily="34" charset="0"/>
+                <a:ea typeface="Calibri" panose="020F0502020204030204" pitchFamily="34" charset="0"/>
+                <a:cs typeface="Calibri" panose="020F0502020204030204" pitchFamily="34" charset="0"/>
+              </a:rPr>
+              <a:t> play AAA games at high quality for a few years. </a:t>
             </a:r>
             <a:endParaRPr lang="en-US" sz="1600" b="0" strike="noStrike" spc="-1" dirty="0">
-              <a:latin typeface="Arial"/>
+              <a:solidFill>
+                <a:schemeClr val="bg1"/>
+              </a:solidFill>
+              <a:latin typeface="Calibri" panose="020F0502020204030204" pitchFamily="34" charset="0"/>
+              <a:ea typeface="Calibri" panose="020F0502020204030204" pitchFamily="34" charset="0"/>
+              <a:cs typeface="Calibri" panose="020F0502020204030204" pitchFamily="34" charset="0"/>
             </a:endParaRPr>
           </a:p>
           <a:p>
@@ -20144,15 +20166,51 @@
             <a:r>
               <a:rPr lang="en-US" sz="1600" b="0" strike="noStrike" spc="197" dirty="0">
                 <a:solidFill>
-                  <a:srgbClr val="FFFFFF"/>
+                  <a:schemeClr val="bg1"/>
                 </a:solidFill>
-                <a:latin typeface="Calibri"/>
-                <a:ea typeface="Calibri"/>
+                <a:latin typeface="Calibri" panose="020F0502020204030204" pitchFamily="34" charset="0"/>
+                <a:ea typeface="Calibri" panose="020F0502020204030204" pitchFamily="34" charset="0"/>
+                <a:cs typeface="Calibri" panose="020F0502020204030204" pitchFamily="34" charset="0"/>
+              </a:rPr>
+              <a:t>		If I stopped with the initial build, I would have successfully built the Desktop for a subtotal of slightly more than $1200. I added 2 monitors for a dual monitor setup and ended up spending another $400. The subtotal with the monitors is $1622.69 on the Newegg.com website. I will end up adding a mechanical keyboard and triple monitor mount to bring the subtotal up to $1900 or more eventually. </a:t>
+            </a:r>
+            <a:endParaRPr lang="en-US" sz="1600" b="0" strike="noStrike" spc="-1" dirty="0">
+              <a:solidFill>
+                <a:schemeClr val="bg1"/>
+              </a:solidFill>
+              <a:latin typeface="Calibri" panose="020F0502020204030204" pitchFamily="34" charset="0"/>
+              <a:ea typeface="Calibri" panose="020F0502020204030204" pitchFamily="34" charset="0"/>
+              <a:cs typeface="Calibri" panose="020F0502020204030204" pitchFamily="34" charset="0"/>
+            </a:endParaRPr>
+          </a:p>
+          <a:p>
+            <a:pPr>
+              <a:lnSpc>
+                <a:spcPct val="150000"/>
+              </a:lnSpc>
+              <a:buNone/>
+              <a:tabLst>
+                <a:tab pos="0" algn="l"/>
+              </a:tabLst>
+            </a:pPr>
+            <a:r>
+              <a:rPr lang="en-US" sz="1600" b="0" strike="noStrike" spc="197" dirty="0">
+                <a:solidFill>
+                  <a:schemeClr val="bg1"/>
+                </a:solidFill>
+                <a:latin typeface="Calibri" panose="020F0502020204030204" pitchFamily="34" charset="0"/>
+                <a:ea typeface="Calibri" panose="020F0502020204030204" pitchFamily="34" charset="0"/>
+                <a:cs typeface="Calibri" panose="020F0502020204030204" pitchFamily="34" charset="0"/>
               </a:rPr>
               <a:t>		I currently have 2 monitors and multiple keyboards and mice, so I can successfully build the desktop for a price within my budget (excluding Tax and Shipping). If I am to build this system, I will wait until Black Friday or Cyber Monday when many of these parts will be discounted.</a:t>
             </a:r>
             <a:endParaRPr lang="en-US" sz="1600" b="0" strike="noStrike" spc="-1" dirty="0">
-              <a:latin typeface="Arial"/>
+              <a:solidFill>
+                <a:schemeClr val="bg1"/>
+              </a:solidFill>
+              <a:latin typeface="Calibri" panose="020F0502020204030204" pitchFamily="34" charset="0"/>
+              <a:ea typeface="Calibri" panose="020F0502020204030204" pitchFamily="34" charset="0"/>
+              <a:cs typeface="Calibri" panose="020F0502020204030204" pitchFamily="34" charset="0"/>
             </a:endParaRPr>
           </a:p>
           <a:p>
@@ -20192,12 +20250,600 @@
         <p:fade/>
       </p:transition>
     </mc:Choice>
-    <mc:Fallback xmlns:p15="http://schemas.microsoft.com/office/powerpoint/2012/main" xmlns="">
+    <mc:Fallback xmlns="" xmlns:p15="http://schemas.microsoft.com/office/powerpoint/2012/main">
       <p:transition spd="med">
         <p:fade/>
       </p:transition>
     </mc:Fallback>
   </mc:AlternateContent>
+</p:sld>
+</file>
+
+<file path=ppt/slides/slide17.xml><?xml version="1.0" encoding="utf-8"?>
+<p:sld xmlns:a="http://schemas.openxmlformats.org/drawingml/2006/main" xmlns:r="http://schemas.openxmlformats.org/officeDocument/2006/relationships" xmlns:p="http://schemas.openxmlformats.org/presentationml/2006/main">
+  <p:cSld>
+    <p:spTree>
+      <p:nvGrpSpPr>
+        <p:cNvPr id="1" name=""/>
+        <p:cNvGrpSpPr/>
+        <p:nvPr/>
+      </p:nvGrpSpPr>
+      <p:grpSpPr>
+        <a:xfrm>
+          <a:off x="0" y="0"/>
+          <a:ext cx="0" cy="0"/>
+          <a:chOff x="0" y="0"/>
+          <a:chExt cx="0" cy="0"/>
+        </a:xfrm>
+      </p:grpSpPr>
+      <p:sp>
+        <p:nvSpPr>
+          <p:cNvPr id="2" name="Title 1">
+            <a:extLst>
+              <a:ext uri="{FF2B5EF4-FFF2-40B4-BE49-F238E27FC236}">
+                <a16:creationId xmlns:a16="http://schemas.microsoft.com/office/drawing/2014/main" id="{DD0C68E0-D4E2-3E1B-3F08-445E16404B80}"/>
+              </a:ext>
+            </a:extLst>
+          </p:cNvPr>
+          <p:cNvSpPr>
+            <a:spLocks noGrp="1"/>
+          </p:cNvSpPr>
+          <p:nvPr>
+            <p:ph type="title"/>
+          </p:nvPr>
+        </p:nvSpPr>
+        <p:spPr>
+          <a:xfrm>
+            <a:off x="969810" y="113736"/>
+            <a:ext cx="4951562" cy="582392"/>
+          </a:xfrm>
+        </p:spPr>
+        <p:txBody>
+          <a:bodyPr/>
+          <a:lstStyle/>
+          <a:p>
+            <a:r>
+              <a:rPr lang="en-US" dirty="0">
+                <a:solidFill>
+                  <a:schemeClr val="accent1"/>
+                </a:solidFill>
+              </a:rPr>
+              <a:t>PC Build Project:</a:t>
+            </a:r>
+          </a:p>
+        </p:txBody>
+      </p:sp>
+      <p:sp>
+        <p:nvSpPr>
+          <p:cNvPr id="3" name="Content Placeholder 2">
+            <a:extLst>
+              <a:ext uri="{FF2B5EF4-FFF2-40B4-BE49-F238E27FC236}">
+                <a16:creationId xmlns:a16="http://schemas.microsoft.com/office/drawing/2014/main" id="{B1950E4F-5AA7-8FEA-1906-D7326E95BD93}"/>
+              </a:ext>
+            </a:extLst>
+          </p:cNvPr>
+          <p:cNvSpPr>
+            <a:spLocks noGrp="1"/>
+          </p:cNvSpPr>
+          <p:nvPr>
+            <p:ph/>
+          </p:nvPr>
+        </p:nvSpPr>
+        <p:spPr>
+          <a:xfrm>
+            <a:off x="146649" y="696128"/>
+            <a:ext cx="11576649" cy="5612308"/>
+          </a:xfrm>
+        </p:spPr>
+        <p:txBody>
+          <a:bodyPr>
+            <a:noAutofit/>
+          </a:bodyPr>
+          <a:lstStyle/>
+          <a:p>
+            <a:pPr marL="0" indent="0">
+              <a:spcBef>
+                <a:spcPts val="400"/>
+              </a:spcBef>
+              <a:buNone/>
+            </a:pPr>
+            <a:r>
+              <a:rPr lang="en-US" sz="1100" dirty="0">
+                <a:solidFill>
+                  <a:schemeClr val="bg1"/>
+                </a:solidFill>
+                <a:latin typeface="Calibri" panose="020F0502020204030204" pitchFamily="34" charset="0"/>
+                <a:ea typeface="Calibri" panose="020F0502020204030204" pitchFamily="34" charset="0"/>
+                <a:cs typeface="Calibri" panose="020F0502020204030204" pitchFamily="34" charset="0"/>
+              </a:rPr>
+              <a:t>	I want to build a multi-core computer to use for school, office tasks, virtualization, digital art, personal entertainment, and gaming. I will create a machine that is faster than my current computer, which is an AMD Ryzen 5 2600 with 6 cores operating at 3.4GHz with 16GB of Ram. I do have a spare monitor and some keyboards and mice already, so I can save some money by building only the PC tower. I do not want to spend more than $1200 on the system.  I am not interested in RGB lights in my system, so I can save some money by purchasing parts based on performance value, not looks. </a:t>
+            </a:r>
+          </a:p>
+          <a:p>
+            <a:pPr marL="0" indent="0">
+              <a:spcBef>
+                <a:spcPts val="400"/>
+              </a:spcBef>
+              <a:buNone/>
+            </a:pPr>
+            <a:r>
+              <a:rPr lang="en-US" sz="1100" dirty="0">
+                <a:solidFill>
+                  <a:schemeClr val="bg1"/>
+                </a:solidFill>
+                <a:latin typeface="Calibri" panose="020F0502020204030204" pitchFamily="34" charset="0"/>
+                <a:ea typeface="Calibri" panose="020F0502020204030204" pitchFamily="34" charset="0"/>
+                <a:cs typeface="Calibri" panose="020F0502020204030204" pitchFamily="34" charset="0"/>
+              </a:rPr>
+              <a:t>	I am choosing an MSI Motherboard for use with AMD CPUs. I have always been a fan of AMD products and my current computer has an MSI motherboard which has served me well. I am choosing the MSI MAG Tomahawk B550 as the motherboard. The board features 3 x 6GB </a:t>
+            </a:r>
+            <a:r>
+              <a:rPr lang="en-US" sz="1100" dirty="0" err="1">
+                <a:solidFill>
+                  <a:schemeClr val="bg1"/>
+                </a:solidFill>
+                <a:latin typeface="Calibri" panose="020F0502020204030204" pitchFamily="34" charset="0"/>
+                <a:ea typeface="Calibri" panose="020F0502020204030204" pitchFamily="34" charset="0"/>
+                <a:cs typeface="Calibri" panose="020F0502020204030204" pitchFamily="34" charset="0"/>
+              </a:rPr>
+              <a:t>Sata</a:t>
+            </a:r>
+            <a:r>
+              <a:rPr lang="en-US" sz="1100" dirty="0">
+                <a:solidFill>
+                  <a:schemeClr val="bg1"/>
+                </a:solidFill>
+                <a:latin typeface="Calibri" panose="020F0502020204030204" pitchFamily="34" charset="0"/>
+                <a:ea typeface="Calibri" panose="020F0502020204030204" pitchFamily="34" charset="0"/>
+                <a:cs typeface="Calibri" panose="020F0502020204030204" pitchFamily="34" charset="0"/>
+              </a:rPr>
+              <a:t> connections, 2x M.2 connections on board, USB 3.2, 2.5 Gigabit Ethernet and support for 128GB DDR4 RAM. I found the board for $169.99 at NewEgg.com.</a:t>
+            </a:r>
+          </a:p>
+          <a:p>
+            <a:pPr marL="0" indent="0">
+              <a:spcBef>
+                <a:spcPts val="400"/>
+              </a:spcBef>
+              <a:buNone/>
+            </a:pPr>
+            <a:r>
+              <a:rPr lang="en-US" sz="1100" dirty="0">
+                <a:solidFill>
+                  <a:schemeClr val="bg1"/>
+                </a:solidFill>
+                <a:latin typeface="Calibri" panose="020F0502020204030204" pitchFamily="34" charset="0"/>
+                <a:ea typeface="Calibri" panose="020F0502020204030204" pitchFamily="34" charset="0"/>
+                <a:cs typeface="Calibri" panose="020F0502020204030204" pitchFamily="34" charset="0"/>
+              </a:rPr>
+              <a:t>	My desk has enough room for a full-size computer, so I will build the system in a Full ATX PC tower. I chose the Fractal Design Pop XL High-Airflow so that I will have negative air pressure with great ventilation in the system. I will have plenty of room to expand the system in the future. The case is available for $109.99 on </a:t>
+            </a:r>
+            <a:r>
+              <a:rPr lang="en-US" sz="1100" dirty="0" err="1">
+                <a:solidFill>
+                  <a:schemeClr val="bg1"/>
+                </a:solidFill>
+                <a:latin typeface="Calibri" panose="020F0502020204030204" pitchFamily="34" charset="0"/>
+                <a:ea typeface="Calibri" panose="020F0502020204030204" pitchFamily="34" charset="0"/>
+                <a:cs typeface="Calibri" panose="020F0502020204030204" pitchFamily="34" charset="0"/>
+              </a:rPr>
+              <a:t>NewEgg</a:t>
+            </a:r>
+            <a:r>
+              <a:rPr lang="en-US" sz="1100" dirty="0">
+                <a:solidFill>
+                  <a:schemeClr val="bg1"/>
+                </a:solidFill>
+                <a:latin typeface="Calibri" panose="020F0502020204030204" pitchFamily="34" charset="0"/>
+                <a:ea typeface="Calibri" panose="020F0502020204030204" pitchFamily="34" charset="0"/>
+                <a:cs typeface="Calibri" panose="020F0502020204030204" pitchFamily="34" charset="0"/>
+              </a:rPr>
+              <a:t>.</a:t>
+            </a:r>
+          </a:p>
+          <a:p>
+            <a:pPr marL="0" indent="0">
+              <a:spcBef>
+                <a:spcPts val="400"/>
+              </a:spcBef>
+              <a:buNone/>
+            </a:pPr>
+            <a:r>
+              <a:rPr lang="en-US" sz="1100" dirty="0">
+                <a:solidFill>
+                  <a:schemeClr val="bg1"/>
+                </a:solidFill>
+                <a:latin typeface="Calibri" panose="020F0502020204030204" pitchFamily="34" charset="0"/>
+                <a:ea typeface="Calibri" panose="020F0502020204030204" pitchFamily="34" charset="0"/>
+                <a:cs typeface="Calibri" panose="020F0502020204030204" pitchFamily="34" charset="0"/>
+              </a:rPr>
+              <a:t>	The Processor I chose is an AMD Ryzen 7 5800x which has 8 cores and 16 threads running at 3.8GHz, with a 4.7GHz boost. This processor is powerful enough to run the programs that I use without issue and should be a decent CPU for at least 5 years. The Ryzen 7 5800x is available at </a:t>
+            </a:r>
+            <a:r>
+              <a:rPr lang="en-US" sz="1100" dirty="0" err="1">
+                <a:solidFill>
+                  <a:schemeClr val="bg1"/>
+                </a:solidFill>
+                <a:latin typeface="Calibri" panose="020F0502020204030204" pitchFamily="34" charset="0"/>
+                <a:ea typeface="Calibri" panose="020F0502020204030204" pitchFamily="34" charset="0"/>
+                <a:cs typeface="Calibri" panose="020F0502020204030204" pitchFamily="34" charset="0"/>
+              </a:rPr>
+              <a:t>NewEgg</a:t>
+            </a:r>
+            <a:r>
+              <a:rPr lang="en-US" sz="1100" dirty="0">
+                <a:solidFill>
+                  <a:schemeClr val="bg1"/>
+                </a:solidFill>
+                <a:latin typeface="Calibri" panose="020F0502020204030204" pitchFamily="34" charset="0"/>
+                <a:ea typeface="Calibri" panose="020F0502020204030204" pitchFamily="34" charset="0"/>
+                <a:cs typeface="Calibri" panose="020F0502020204030204" pitchFamily="34" charset="0"/>
+              </a:rPr>
+              <a:t> for $248.00 making it a superb value.</a:t>
+            </a:r>
+          </a:p>
+          <a:p>
+            <a:pPr marL="0" indent="0">
+              <a:spcBef>
+                <a:spcPts val="400"/>
+              </a:spcBef>
+              <a:buNone/>
+            </a:pPr>
+            <a:r>
+              <a:rPr lang="en-US" sz="1100" dirty="0">
+                <a:solidFill>
+                  <a:schemeClr val="bg1"/>
+                </a:solidFill>
+                <a:latin typeface="Calibri" panose="020F0502020204030204" pitchFamily="34" charset="0"/>
+                <a:ea typeface="Calibri" panose="020F0502020204030204" pitchFamily="34" charset="0"/>
+                <a:cs typeface="Calibri" panose="020F0502020204030204" pitchFamily="34" charset="0"/>
+              </a:rPr>
+              <a:t>	 My system will contain 32GB of </a:t>
+            </a:r>
+            <a:r>
+              <a:rPr lang="en-US" sz="1100" dirty="0" err="1">
+                <a:solidFill>
+                  <a:schemeClr val="bg1"/>
+                </a:solidFill>
+                <a:latin typeface="Calibri" panose="020F0502020204030204" pitchFamily="34" charset="0"/>
+                <a:ea typeface="Calibri" panose="020F0502020204030204" pitchFamily="34" charset="0"/>
+                <a:cs typeface="Calibri" panose="020F0502020204030204" pitchFamily="34" charset="0"/>
+              </a:rPr>
+              <a:t>G.Skill</a:t>
+            </a:r>
+            <a:r>
+              <a:rPr lang="en-US" sz="1100" dirty="0">
+                <a:solidFill>
+                  <a:schemeClr val="bg1"/>
+                </a:solidFill>
+                <a:latin typeface="Calibri" panose="020F0502020204030204" pitchFamily="34" charset="0"/>
+                <a:ea typeface="Calibri" panose="020F0502020204030204" pitchFamily="34" charset="0"/>
+                <a:cs typeface="Calibri" panose="020F0502020204030204" pitchFamily="34" charset="0"/>
+              </a:rPr>
+              <a:t>  </a:t>
+            </a:r>
+            <a:r>
+              <a:rPr lang="en-US" sz="1100" dirty="0" err="1">
+                <a:solidFill>
+                  <a:schemeClr val="bg1"/>
+                </a:solidFill>
+                <a:latin typeface="Calibri" panose="020F0502020204030204" pitchFamily="34" charset="0"/>
+                <a:ea typeface="Calibri" panose="020F0502020204030204" pitchFamily="34" charset="0"/>
+                <a:cs typeface="Calibri" panose="020F0502020204030204" pitchFamily="34" charset="0"/>
+              </a:rPr>
+              <a:t>Ripjaw</a:t>
+            </a:r>
+            <a:r>
+              <a:rPr lang="en-US" sz="1100" dirty="0">
+                <a:solidFill>
+                  <a:schemeClr val="bg1"/>
+                </a:solidFill>
+                <a:latin typeface="Calibri" panose="020F0502020204030204" pitchFamily="34" charset="0"/>
+                <a:ea typeface="Calibri" panose="020F0502020204030204" pitchFamily="34" charset="0"/>
+                <a:cs typeface="Calibri" panose="020F0502020204030204" pitchFamily="34" charset="0"/>
+              </a:rPr>
+              <a:t> V series DDR4 3200 RAM. The motherboard supports up to 128GB, so I can easily add more RAM in the future and easily have 64 or 96GB without replacing these modules. The </a:t>
+            </a:r>
+            <a:r>
+              <a:rPr lang="en-US" sz="1100" dirty="0" err="1">
+                <a:solidFill>
+                  <a:schemeClr val="bg1"/>
+                </a:solidFill>
+                <a:latin typeface="Calibri" panose="020F0502020204030204" pitchFamily="34" charset="0"/>
+                <a:ea typeface="Calibri" panose="020F0502020204030204" pitchFamily="34" charset="0"/>
+                <a:cs typeface="Calibri" panose="020F0502020204030204" pitchFamily="34" charset="0"/>
+              </a:rPr>
+              <a:t>G.Skill</a:t>
+            </a:r>
+            <a:r>
+              <a:rPr lang="en-US" sz="1100" dirty="0">
+                <a:solidFill>
+                  <a:schemeClr val="bg1"/>
+                </a:solidFill>
+                <a:latin typeface="Calibri" panose="020F0502020204030204" pitchFamily="34" charset="0"/>
+                <a:ea typeface="Calibri" panose="020F0502020204030204" pitchFamily="34" charset="0"/>
+                <a:cs typeface="Calibri" panose="020F0502020204030204" pitchFamily="34" charset="0"/>
+              </a:rPr>
+              <a:t> is a ridiculously low $89.78 currently, at </a:t>
+            </a:r>
+            <a:r>
+              <a:rPr lang="en-US" sz="1100" dirty="0" err="1">
+                <a:solidFill>
+                  <a:schemeClr val="bg1"/>
+                </a:solidFill>
+                <a:latin typeface="Calibri" panose="020F0502020204030204" pitchFamily="34" charset="0"/>
+                <a:ea typeface="Calibri" panose="020F0502020204030204" pitchFamily="34" charset="0"/>
+                <a:cs typeface="Calibri" panose="020F0502020204030204" pitchFamily="34" charset="0"/>
+              </a:rPr>
+              <a:t>NewEgg</a:t>
+            </a:r>
+            <a:r>
+              <a:rPr lang="en-US" sz="1100" dirty="0">
+                <a:solidFill>
+                  <a:schemeClr val="bg1"/>
+                </a:solidFill>
+                <a:latin typeface="Calibri" panose="020F0502020204030204" pitchFamily="34" charset="0"/>
+                <a:ea typeface="Calibri" panose="020F0502020204030204" pitchFamily="34" charset="0"/>
+                <a:cs typeface="Calibri" panose="020F0502020204030204" pitchFamily="34" charset="0"/>
+              </a:rPr>
+              <a:t>.</a:t>
+            </a:r>
+          </a:p>
+          <a:p>
+            <a:pPr marL="0" indent="0">
+              <a:spcBef>
+                <a:spcPts val="400"/>
+              </a:spcBef>
+              <a:buNone/>
+            </a:pPr>
+            <a:r>
+              <a:rPr lang="en-US" sz="1100" dirty="0">
+                <a:solidFill>
+                  <a:schemeClr val="bg1"/>
+                </a:solidFill>
+                <a:latin typeface="Calibri" panose="020F0502020204030204" pitchFamily="34" charset="0"/>
+                <a:ea typeface="Calibri" panose="020F0502020204030204" pitchFamily="34" charset="0"/>
+                <a:cs typeface="Calibri" panose="020F0502020204030204" pitchFamily="34" charset="0"/>
+              </a:rPr>
+              <a:t>	AMD Processors tend to run hot, so I will get a decent CPU cooler. I will not spend extra for liquid cooling. I chose a Cooler Master Hyper 212, with no RGB, which saves a few dollars. The system will be powered by a Corsair RM850, which produces 850 Watts of power. I want a powerful PSU for the computer so that it will have ample energy to run any powered peripheral devices. The cooler costs $54.99 and the PSU runs $149.99, both at </a:t>
+            </a:r>
+            <a:r>
+              <a:rPr lang="en-US" sz="1100" dirty="0" err="1">
+                <a:solidFill>
+                  <a:schemeClr val="bg1"/>
+                </a:solidFill>
+                <a:latin typeface="Calibri" panose="020F0502020204030204" pitchFamily="34" charset="0"/>
+                <a:ea typeface="Calibri" panose="020F0502020204030204" pitchFamily="34" charset="0"/>
+                <a:cs typeface="Calibri" panose="020F0502020204030204" pitchFamily="34" charset="0"/>
+              </a:rPr>
+              <a:t>NewEgg</a:t>
+            </a:r>
+            <a:r>
+              <a:rPr lang="en-US" sz="1100" dirty="0">
+                <a:solidFill>
+                  <a:schemeClr val="bg1"/>
+                </a:solidFill>
+                <a:latin typeface="Calibri" panose="020F0502020204030204" pitchFamily="34" charset="0"/>
+                <a:ea typeface="Calibri" panose="020F0502020204030204" pitchFamily="34" charset="0"/>
+                <a:cs typeface="Calibri" panose="020F0502020204030204" pitchFamily="34" charset="0"/>
+              </a:rPr>
+              <a:t>.</a:t>
+            </a:r>
+          </a:p>
+          <a:p>
+            <a:pPr marL="0" indent="0">
+              <a:spcBef>
+                <a:spcPts val="400"/>
+              </a:spcBef>
+              <a:buNone/>
+            </a:pPr>
+            <a:r>
+              <a:rPr lang="en-US" sz="1100" dirty="0">
+                <a:solidFill>
+                  <a:schemeClr val="bg1"/>
+                </a:solidFill>
+                <a:latin typeface="Calibri" panose="020F0502020204030204" pitchFamily="34" charset="0"/>
+                <a:ea typeface="Calibri" panose="020F0502020204030204" pitchFamily="34" charset="0"/>
+                <a:cs typeface="Calibri" panose="020F0502020204030204" pitchFamily="34" charset="0"/>
+              </a:rPr>
+              <a:t>	For storage I chose a WD (Western Digital) Black SSD for the operating system and a 6TB Toshiba HDD for data and application use. The solid-state drive has extremely fast read speed of up to 7000MB/s through the motherboard’s PCIe 4 connection. The HDD will be used to hold application data, video, audio and games. The HDD runs at 7200 RPM and can transfer data at up to 6GB/s (6000MB/s) through it’s SATA 3 connection. I have 1 additional M.2 and 2 additional SATA 3 connections for future upgrading. Western Digital’s SSD can be purchased for $69.99 and the Toshiba Hard Disk Drive is $144.99, both from </a:t>
+            </a:r>
+            <a:r>
+              <a:rPr lang="en-US" sz="1100" dirty="0" err="1">
+                <a:solidFill>
+                  <a:schemeClr val="bg1"/>
+                </a:solidFill>
+                <a:latin typeface="Calibri" panose="020F0502020204030204" pitchFamily="34" charset="0"/>
+                <a:ea typeface="Calibri" panose="020F0502020204030204" pitchFamily="34" charset="0"/>
+                <a:cs typeface="Calibri" panose="020F0502020204030204" pitchFamily="34" charset="0"/>
+              </a:rPr>
+              <a:t>NewEgg</a:t>
+            </a:r>
+            <a:r>
+              <a:rPr lang="en-US" sz="1100" dirty="0">
+                <a:solidFill>
+                  <a:schemeClr val="bg1"/>
+                </a:solidFill>
+                <a:latin typeface="Calibri" panose="020F0502020204030204" pitchFamily="34" charset="0"/>
+                <a:ea typeface="Calibri" panose="020F0502020204030204" pitchFamily="34" charset="0"/>
+                <a:cs typeface="Calibri" panose="020F0502020204030204" pitchFamily="34" charset="0"/>
+              </a:rPr>
+              <a:t>.</a:t>
+            </a:r>
+          </a:p>
+          <a:p>
+            <a:pPr marL="0" indent="0">
+              <a:spcBef>
+                <a:spcPts val="400"/>
+              </a:spcBef>
+              <a:buNone/>
+            </a:pPr>
+            <a:r>
+              <a:rPr lang="en-US" sz="1100" dirty="0">
+                <a:solidFill>
+                  <a:schemeClr val="bg1"/>
+                </a:solidFill>
+                <a:latin typeface="Calibri" panose="020F0502020204030204" pitchFamily="34" charset="0"/>
+                <a:ea typeface="Calibri" panose="020F0502020204030204" pitchFamily="34" charset="0"/>
+                <a:cs typeface="Calibri" panose="020F0502020204030204" pitchFamily="34" charset="0"/>
+              </a:rPr>
+              <a:t>	I will add a Gigabyte AMD Radeon RX 6600 to one of the PCIe 4 expansion slots as my GPU. The card features 8GB or GDDR6 Memory and is considered an entry level to mid-range Graphics card. This will allow me to play AAA games for years. The Gigabyte Radeon RX 6600 can be purchased for $219.99 on </a:t>
+            </a:r>
+            <a:r>
+              <a:rPr lang="en-US" sz="1100" dirty="0" err="1">
+                <a:solidFill>
+                  <a:schemeClr val="bg1"/>
+                </a:solidFill>
+                <a:latin typeface="Calibri" panose="020F0502020204030204" pitchFamily="34" charset="0"/>
+                <a:ea typeface="Calibri" panose="020F0502020204030204" pitchFamily="34" charset="0"/>
+                <a:cs typeface="Calibri" panose="020F0502020204030204" pitchFamily="34" charset="0"/>
+              </a:rPr>
+              <a:t>NewEgg</a:t>
+            </a:r>
+            <a:r>
+              <a:rPr lang="en-US" sz="1100" dirty="0">
+                <a:solidFill>
+                  <a:schemeClr val="bg1"/>
+                </a:solidFill>
+                <a:latin typeface="Calibri" panose="020F0502020204030204" pitchFamily="34" charset="0"/>
+                <a:ea typeface="Calibri" panose="020F0502020204030204" pitchFamily="34" charset="0"/>
+                <a:cs typeface="Calibri" panose="020F0502020204030204" pitchFamily="34" charset="0"/>
+              </a:rPr>
+              <a:t>.</a:t>
+            </a:r>
+          </a:p>
+          <a:p>
+            <a:pPr marL="0" indent="0">
+              <a:spcBef>
+                <a:spcPts val="400"/>
+              </a:spcBef>
+              <a:buNone/>
+            </a:pPr>
+            <a:r>
+              <a:rPr lang="en-US" sz="1100" dirty="0">
+                <a:solidFill>
+                  <a:schemeClr val="bg1"/>
+                </a:solidFill>
+                <a:latin typeface="Calibri" panose="020F0502020204030204" pitchFamily="34" charset="0"/>
+                <a:ea typeface="Calibri" panose="020F0502020204030204" pitchFamily="34" charset="0"/>
+                <a:cs typeface="Calibri" panose="020F0502020204030204" pitchFamily="34" charset="0"/>
+              </a:rPr>
+              <a:t>	To create a dual display setup, I can upgrade my current monitors with 2 MSI </a:t>
+            </a:r>
+            <a:r>
+              <a:rPr lang="en-US" sz="1100" dirty="0" err="1">
+                <a:solidFill>
+                  <a:schemeClr val="bg1"/>
+                </a:solidFill>
+                <a:latin typeface="Calibri" panose="020F0502020204030204" pitchFamily="34" charset="0"/>
+                <a:ea typeface="Calibri" panose="020F0502020204030204" pitchFamily="34" charset="0"/>
+                <a:cs typeface="Calibri" panose="020F0502020204030204" pitchFamily="34" charset="0"/>
+              </a:rPr>
+              <a:t>Optix</a:t>
+            </a:r>
+            <a:r>
+              <a:rPr lang="en-US" sz="1100" dirty="0">
+                <a:solidFill>
+                  <a:schemeClr val="bg1"/>
+                </a:solidFill>
+                <a:latin typeface="Calibri" panose="020F0502020204030204" pitchFamily="34" charset="0"/>
+                <a:ea typeface="Calibri" panose="020F0502020204030204" pitchFamily="34" charset="0"/>
+                <a:cs typeface="Calibri" panose="020F0502020204030204" pitchFamily="34" charset="0"/>
+              </a:rPr>
+              <a:t> 27” Curved HD Monitors for $199.99 each. The monitors feature 1920x1080 display (HD) at up to 170 Hz with a 1 millisecond response time.</a:t>
+            </a:r>
+          </a:p>
+          <a:p>
+            <a:pPr marL="0" indent="0">
+              <a:spcBef>
+                <a:spcPts val="400"/>
+              </a:spcBef>
+              <a:buNone/>
+            </a:pPr>
+            <a:r>
+              <a:rPr lang="en-US" sz="1100" dirty="0">
+                <a:solidFill>
+                  <a:schemeClr val="bg1"/>
+                </a:solidFill>
+                <a:latin typeface="Calibri" panose="020F0502020204030204" pitchFamily="34" charset="0"/>
+                <a:ea typeface="Calibri" panose="020F0502020204030204" pitchFamily="34" charset="0"/>
+                <a:cs typeface="Calibri" panose="020F0502020204030204" pitchFamily="34" charset="0"/>
+              </a:rPr>
+              <a:t>	I will run Ubuntu on the machine and therefore save some money by using a free Linux Operating System. I use a digital art program called </a:t>
+            </a:r>
+            <a:r>
+              <a:rPr lang="en-US" sz="1100" dirty="0" err="1">
+                <a:solidFill>
+                  <a:schemeClr val="bg1"/>
+                </a:solidFill>
+                <a:latin typeface="Calibri" panose="020F0502020204030204" pitchFamily="34" charset="0"/>
+                <a:ea typeface="Calibri" panose="020F0502020204030204" pitchFamily="34" charset="0"/>
+                <a:cs typeface="Calibri" panose="020F0502020204030204" pitchFamily="34" charset="0"/>
+              </a:rPr>
+              <a:t>Krita</a:t>
+            </a:r>
+            <a:r>
+              <a:rPr lang="en-US" sz="1100" dirty="0">
+                <a:solidFill>
+                  <a:schemeClr val="bg1"/>
+                </a:solidFill>
+                <a:latin typeface="Calibri" panose="020F0502020204030204" pitchFamily="34" charset="0"/>
+                <a:ea typeface="Calibri" panose="020F0502020204030204" pitchFamily="34" charset="0"/>
+                <a:cs typeface="Calibri" panose="020F0502020204030204" pitchFamily="34" charset="0"/>
+              </a:rPr>
+              <a:t> and will install that on the system. Libre Office is a wonderful free alternative to Microsoft Office which can edit and save files in Microsoft Office formats. Another piece of freeware that I use often is GIMP for photo editing. I currently have a license for VMWare Workstation Pro and will install that onto the system for virtualization. Docker is a free application, also and I will download it to work with containers on the machine. </a:t>
+            </a:r>
+          </a:p>
+          <a:p>
+            <a:pPr marL="0" indent="0">
+              <a:spcBef>
+                <a:spcPts val="400"/>
+              </a:spcBef>
+              <a:buNone/>
+            </a:pPr>
+            <a:r>
+              <a:rPr lang="en-US" sz="1100" dirty="0">
+                <a:solidFill>
+                  <a:schemeClr val="bg1"/>
+                </a:solidFill>
+                <a:latin typeface="Calibri" panose="020F0502020204030204" pitchFamily="34" charset="0"/>
+                <a:ea typeface="Calibri" panose="020F0502020204030204" pitchFamily="34" charset="0"/>
+                <a:cs typeface="Calibri" panose="020F0502020204030204" pitchFamily="34" charset="0"/>
+              </a:rPr>
+              <a:t>	If I stopped with the initial build, I would have successfully built the Desktop for a subtotal of slightly more than $1200. I added 2 monitors for a dual monitor setup and ended up spending another $400. The subtotal with the monitors is $1622.69 on the Newegg.com website. I will end up adding a mechanical keyboard and triple monitor mount to bring the subtotal up to $1900 or more eventually. </a:t>
+            </a:r>
+          </a:p>
+          <a:p>
+            <a:pPr marL="0" indent="0">
+              <a:spcBef>
+                <a:spcPts val="400"/>
+              </a:spcBef>
+              <a:buNone/>
+            </a:pPr>
+            <a:r>
+              <a:rPr lang="en-US" sz="1100" dirty="0">
+                <a:solidFill>
+                  <a:schemeClr val="bg1"/>
+                </a:solidFill>
+                <a:latin typeface="Calibri" panose="020F0502020204030204" pitchFamily="34" charset="0"/>
+                <a:ea typeface="Calibri" panose="020F0502020204030204" pitchFamily="34" charset="0"/>
+                <a:cs typeface="Calibri" panose="020F0502020204030204" pitchFamily="34" charset="0"/>
+              </a:rPr>
+              <a:t>	I currently have 2 monitors and multiple keyboards and mice, so I can successfully build the desktop for a price within my budget (excluding Tax and Shipping). If I am to build this system, I will wait until Black Friday or Cyber Monday when many of these parts will be discounted.</a:t>
+            </a:r>
+          </a:p>
+        </p:txBody>
+      </p:sp>
+    </p:spTree>
+    <p:extLst>
+      <p:ext uri="{BB962C8B-B14F-4D97-AF65-F5344CB8AC3E}">
+        <p14:creationId xmlns:p14="http://schemas.microsoft.com/office/powerpoint/2010/main" val="1818065027"/>
+      </p:ext>
+    </p:extLst>
+  </p:cSld>
+  <p:clrMapOvr>
+    <a:masterClrMapping/>
+  </p:clrMapOvr>
 </p:sld>
 </file>
 
@@ -20522,7 +21168,7 @@
         <p:fade/>
       </p:transition>
     </mc:Choice>
-    <mc:Fallback xmlns:p15="http://schemas.microsoft.com/office/powerpoint/2012/main" xmlns="">
+    <mc:Fallback xmlns="" xmlns:p15="http://schemas.microsoft.com/office/powerpoint/2012/main">
       <p:transition spd="med">
         <p:fade/>
       </p:transition>
@@ -20693,7 +21339,7 @@
         <p:fade/>
       </p:transition>
     </mc:Choice>
-    <mc:Fallback xmlns:p15="http://schemas.microsoft.com/office/powerpoint/2012/main" xmlns="">
+    <mc:Fallback xmlns="" xmlns:p15="http://schemas.microsoft.com/office/powerpoint/2012/main">
       <p:transition spd="med">
         <p:fade/>
       </p:transition>
@@ -21057,7 +21703,7 @@
         <p:fade/>
       </p:transition>
     </mc:Choice>
-    <mc:Fallback xmlns:p15="http://schemas.microsoft.com/office/powerpoint/2012/main" xmlns="">
+    <mc:Fallback xmlns="" xmlns:p15="http://schemas.microsoft.com/office/powerpoint/2012/main">
       <p:transition spd="med">
         <p:fade/>
       </p:transition>
@@ -21548,7 +22194,7 @@
         <p:fade/>
       </p:transition>
     </mc:Choice>
-    <mc:Fallback xmlns:p15="http://schemas.microsoft.com/office/powerpoint/2012/main" xmlns="">
+    <mc:Fallback xmlns="" xmlns:p15="http://schemas.microsoft.com/office/powerpoint/2012/main">
       <p:transition spd="med">
         <p:fade/>
       </p:transition>
@@ -21869,7 +22515,7 @@
         <p:fade/>
       </p:transition>
     </mc:Choice>
-    <mc:Fallback xmlns:p15="http://schemas.microsoft.com/office/powerpoint/2012/main" xmlns="">
+    <mc:Fallback xmlns="" xmlns:p15="http://schemas.microsoft.com/office/powerpoint/2012/main">
       <p:transition spd="med">
         <p:fade/>
       </p:transition>
@@ -22203,7 +22849,7 @@
         <p:fade/>
       </p:transition>
     </mc:Choice>
-    <mc:Fallback xmlns:p15="http://schemas.microsoft.com/office/powerpoint/2012/main" xmlns="">
+    <mc:Fallback xmlns="" xmlns:p15="http://schemas.microsoft.com/office/powerpoint/2012/main">
       <p:transition spd="med">
         <p:fade/>
       </p:transition>
@@ -22479,7 +23125,7 @@
         <p:fade/>
       </p:transition>
     </mc:Choice>
-    <mc:Fallback xmlns:p15="http://schemas.microsoft.com/office/powerpoint/2012/main" xmlns="">
+    <mc:Fallback xmlns="" xmlns:p15="http://schemas.microsoft.com/office/powerpoint/2012/main">
       <p:transition spd="med">
         <p:fade/>
       </p:transition>
@@ -22795,7 +23441,7 @@
         <p:fade/>
       </p:transition>
     </mc:Choice>
-    <mc:Fallback xmlns:p15="http://schemas.microsoft.com/office/powerpoint/2012/main" xmlns="">
+    <mc:Fallback xmlns="" xmlns:p15="http://schemas.microsoft.com/office/powerpoint/2012/main">
       <p:transition spd="med">
         <p:fade/>
       </p:transition>

</xml_diff>

<commit_message>
powerpoint completed and ready for presentation
</commit_message>
<xml_diff>
--- a/buildPC.pptx
+++ b/buildPC.pptx
@@ -8,6 +8,9 @@
     <p:sldMasterId id="2147483687" r:id="rId4"/>
     <p:sldMasterId id="2147483700" r:id="rId5"/>
   </p:sldMasterIdLst>
+  <p:notesMasterIdLst>
+    <p:notesMasterId r:id="rId22"/>
+  </p:notesMasterIdLst>
   <p:sldIdLst>
     <p:sldId id="256" r:id="rId6"/>
     <p:sldId id="257" r:id="rId7"/>
@@ -25,7 +28,6 @@
     <p:sldId id="269" r:id="rId19"/>
     <p:sldId id="270" r:id="rId20"/>
     <p:sldId id="271" r:id="rId21"/>
-    <p:sldId id="272" r:id="rId22"/>
   </p:sldIdLst>
   <p:sldSz cx="12188825" cy="6858000"/>
   <p:notesSz cx="7772400" cy="10058400"/>
@@ -130,6 +132,2329 @@
     </p:ext>
   </p:extLst>
 </p:presentation>
+</file>
+
+<file path=ppt/notesMasters/notesMaster1.xml><?xml version="1.0" encoding="utf-8"?>
+<p:notesMaster xmlns:a="http://schemas.openxmlformats.org/drawingml/2006/main" xmlns:r="http://schemas.openxmlformats.org/officeDocument/2006/relationships" xmlns:p="http://schemas.openxmlformats.org/presentationml/2006/main">
+  <p:cSld>
+    <p:bg>
+      <p:bgRef idx="1001">
+        <a:schemeClr val="bg1"/>
+      </p:bgRef>
+    </p:bg>
+    <p:spTree>
+      <p:nvGrpSpPr>
+        <p:cNvPr id="1" name=""/>
+        <p:cNvGrpSpPr/>
+        <p:nvPr/>
+      </p:nvGrpSpPr>
+      <p:grpSpPr>
+        <a:xfrm>
+          <a:off x="0" y="0"/>
+          <a:ext cx="0" cy="0"/>
+          <a:chOff x="0" y="0"/>
+          <a:chExt cx="0" cy="0"/>
+        </a:xfrm>
+      </p:grpSpPr>
+      <p:sp>
+        <p:nvSpPr>
+          <p:cNvPr id="2" name="Header Placeholder 1"/>
+          <p:cNvSpPr>
+            <a:spLocks noGrp="1"/>
+          </p:cNvSpPr>
+          <p:nvPr>
+            <p:ph type="hdr" sz="quarter"/>
+          </p:nvPr>
+        </p:nvSpPr>
+        <p:spPr>
+          <a:xfrm>
+            <a:off x="0" y="0"/>
+            <a:ext cx="3368675" cy="504825"/>
+          </a:xfrm>
+          <a:prstGeom prst="rect">
+            <a:avLst/>
+          </a:prstGeom>
+        </p:spPr>
+        <p:txBody>
+          <a:bodyPr vert="horz" lIns="91440" tIns="45720" rIns="91440" bIns="45720" rtlCol="0"/>
+          <a:lstStyle>
+            <a:lvl1pPr algn="l">
+              <a:defRPr sz="1200"/>
+            </a:lvl1pPr>
+          </a:lstStyle>
+          <a:p>
+            <a:endParaRPr lang="en-US"/>
+          </a:p>
+        </p:txBody>
+      </p:sp>
+      <p:sp>
+        <p:nvSpPr>
+          <p:cNvPr id="3" name="Date Placeholder 2"/>
+          <p:cNvSpPr>
+            <a:spLocks noGrp="1"/>
+          </p:cNvSpPr>
+          <p:nvPr>
+            <p:ph type="dt" idx="1"/>
+          </p:nvPr>
+        </p:nvSpPr>
+        <p:spPr>
+          <a:xfrm>
+            <a:off x="4402138" y="0"/>
+            <a:ext cx="3368675" cy="504825"/>
+          </a:xfrm>
+          <a:prstGeom prst="rect">
+            <a:avLst/>
+          </a:prstGeom>
+        </p:spPr>
+        <p:txBody>
+          <a:bodyPr vert="horz" lIns="91440" tIns="45720" rIns="91440" bIns="45720" rtlCol="0"/>
+          <a:lstStyle>
+            <a:lvl1pPr algn="r">
+              <a:defRPr sz="1200"/>
+            </a:lvl1pPr>
+          </a:lstStyle>
+          <a:p>
+            <a:fld id="{EF7DE8D6-E024-406F-8EDA-3D28CBFC7CC2}" type="datetimeFigureOut">
+              <a:rPr lang="en-US" smtClean="0"/>
+              <a:t>11/10/2022</a:t>
+            </a:fld>
+            <a:endParaRPr lang="en-US"/>
+          </a:p>
+        </p:txBody>
+      </p:sp>
+      <p:sp>
+        <p:nvSpPr>
+          <p:cNvPr id="4" name="Slide Image Placeholder 3"/>
+          <p:cNvSpPr>
+            <a:spLocks noGrp="1" noRot="1" noChangeAspect="1"/>
+          </p:cNvSpPr>
+          <p:nvPr>
+            <p:ph type="sldImg" idx="2"/>
+          </p:nvPr>
+        </p:nvSpPr>
+        <p:spPr>
+          <a:xfrm>
+            <a:off x="869950" y="1257300"/>
+            <a:ext cx="6032500" cy="3394075"/>
+          </a:xfrm>
+          <a:prstGeom prst="rect">
+            <a:avLst/>
+          </a:prstGeom>
+          <a:noFill/>
+          <a:ln w="12700">
+            <a:solidFill>
+              <a:prstClr val="black"/>
+            </a:solidFill>
+          </a:ln>
+        </p:spPr>
+        <p:txBody>
+          <a:bodyPr vert="horz" lIns="91440" tIns="45720" rIns="91440" bIns="45720" rtlCol="0" anchor="ctr"/>
+          <a:lstStyle/>
+          <a:p>
+            <a:endParaRPr lang="en-US"/>
+          </a:p>
+        </p:txBody>
+      </p:sp>
+      <p:sp>
+        <p:nvSpPr>
+          <p:cNvPr id="5" name="Notes Placeholder 4"/>
+          <p:cNvSpPr>
+            <a:spLocks noGrp="1"/>
+          </p:cNvSpPr>
+          <p:nvPr>
+            <p:ph type="body" sz="quarter" idx="3"/>
+          </p:nvPr>
+        </p:nvSpPr>
+        <p:spPr>
+          <a:xfrm>
+            <a:off x="777875" y="4840288"/>
+            <a:ext cx="6216650" cy="3960812"/>
+          </a:xfrm>
+          <a:prstGeom prst="rect">
+            <a:avLst/>
+          </a:prstGeom>
+        </p:spPr>
+        <p:txBody>
+          <a:bodyPr vert="horz" lIns="91440" tIns="45720" rIns="91440" bIns="45720" rtlCol="0"/>
+          <a:lstStyle/>
+          <a:p>
+            <a:pPr lvl="0"/>
+            <a:r>
+              <a:rPr lang="en-US"/>
+              <a:t>Click to edit Master text styles</a:t>
+            </a:r>
+          </a:p>
+          <a:p>
+            <a:pPr lvl="1"/>
+            <a:r>
+              <a:rPr lang="en-US"/>
+              <a:t>Second level</a:t>
+            </a:r>
+          </a:p>
+          <a:p>
+            <a:pPr lvl="2"/>
+            <a:r>
+              <a:rPr lang="en-US"/>
+              <a:t>Third level</a:t>
+            </a:r>
+          </a:p>
+          <a:p>
+            <a:pPr lvl="3"/>
+            <a:r>
+              <a:rPr lang="en-US"/>
+              <a:t>Fourth level</a:t>
+            </a:r>
+          </a:p>
+          <a:p>
+            <a:pPr lvl="4"/>
+            <a:r>
+              <a:rPr lang="en-US"/>
+              <a:t>Fifth level</a:t>
+            </a:r>
+          </a:p>
+        </p:txBody>
+      </p:sp>
+      <p:sp>
+        <p:nvSpPr>
+          <p:cNvPr id="6" name="Footer Placeholder 5"/>
+          <p:cNvSpPr>
+            <a:spLocks noGrp="1"/>
+          </p:cNvSpPr>
+          <p:nvPr>
+            <p:ph type="ftr" sz="quarter" idx="4"/>
+          </p:nvPr>
+        </p:nvSpPr>
+        <p:spPr>
+          <a:xfrm>
+            <a:off x="0" y="9553575"/>
+            <a:ext cx="3368675" cy="504825"/>
+          </a:xfrm>
+          <a:prstGeom prst="rect">
+            <a:avLst/>
+          </a:prstGeom>
+        </p:spPr>
+        <p:txBody>
+          <a:bodyPr vert="horz" lIns="91440" tIns="45720" rIns="91440" bIns="45720" rtlCol="0" anchor="b"/>
+          <a:lstStyle>
+            <a:lvl1pPr algn="l">
+              <a:defRPr sz="1200"/>
+            </a:lvl1pPr>
+          </a:lstStyle>
+          <a:p>
+            <a:endParaRPr lang="en-US"/>
+          </a:p>
+        </p:txBody>
+      </p:sp>
+      <p:sp>
+        <p:nvSpPr>
+          <p:cNvPr id="7" name="Slide Number Placeholder 6"/>
+          <p:cNvSpPr>
+            <a:spLocks noGrp="1"/>
+          </p:cNvSpPr>
+          <p:nvPr>
+            <p:ph type="sldNum" sz="quarter" idx="5"/>
+          </p:nvPr>
+        </p:nvSpPr>
+        <p:spPr>
+          <a:xfrm>
+            <a:off x="4402138" y="9553575"/>
+            <a:ext cx="3368675" cy="504825"/>
+          </a:xfrm>
+          <a:prstGeom prst="rect">
+            <a:avLst/>
+          </a:prstGeom>
+        </p:spPr>
+        <p:txBody>
+          <a:bodyPr vert="horz" lIns="91440" tIns="45720" rIns="91440" bIns="45720" rtlCol="0" anchor="b"/>
+          <a:lstStyle>
+            <a:lvl1pPr algn="r">
+              <a:defRPr sz="1200"/>
+            </a:lvl1pPr>
+          </a:lstStyle>
+          <a:p>
+            <a:fld id="{C9C917E0-CCBB-49B5-B446-AD956E2D61E5}" type="slidenum">
+              <a:rPr lang="en-US" smtClean="0"/>
+              <a:t>‹#›</a:t>
+            </a:fld>
+            <a:endParaRPr lang="en-US"/>
+          </a:p>
+        </p:txBody>
+      </p:sp>
+    </p:spTree>
+    <p:extLst>
+      <p:ext uri="{BB962C8B-B14F-4D97-AF65-F5344CB8AC3E}">
+        <p14:creationId xmlns:p14="http://schemas.microsoft.com/office/powerpoint/2010/main" val="2518202100"/>
+      </p:ext>
+    </p:extLst>
+  </p:cSld>
+  <p:clrMap bg1="lt1" tx1="dk1" bg2="lt2" tx2="dk2" accent1="accent1" accent2="accent2" accent3="accent3" accent4="accent4" accent5="accent5" accent6="accent6" hlink="hlink" folHlink="folHlink"/>
+  <p:notesStyle>
+    <a:lvl1pPr marL="0" algn="l" defTabSz="914400" rtl="0" eaLnBrk="1" latinLnBrk="0" hangingPunct="1">
+      <a:defRPr sz="1200" kern="1200">
+        <a:solidFill>
+          <a:schemeClr val="tx1"/>
+        </a:solidFill>
+        <a:latin typeface="+mn-lt"/>
+        <a:ea typeface="+mn-ea"/>
+        <a:cs typeface="+mn-cs"/>
+      </a:defRPr>
+    </a:lvl1pPr>
+    <a:lvl2pPr marL="457200" algn="l" defTabSz="914400" rtl="0" eaLnBrk="1" latinLnBrk="0" hangingPunct="1">
+      <a:defRPr sz="1200" kern="1200">
+        <a:solidFill>
+          <a:schemeClr val="tx1"/>
+        </a:solidFill>
+        <a:latin typeface="+mn-lt"/>
+        <a:ea typeface="+mn-ea"/>
+        <a:cs typeface="+mn-cs"/>
+      </a:defRPr>
+    </a:lvl2pPr>
+    <a:lvl3pPr marL="914400" algn="l" defTabSz="914400" rtl="0" eaLnBrk="1" latinLnBrk="0" hangingPunct="1">
+      <a:defRPr sz="1200" kern="1200">
+        <a:solidFill>
+          <a:schemeClr val="tx1"/>
+        </a:solidFill>
+        <a:latin typeface="+mn-lt"/>
+        <a:ea typeface="+mn-ea"/>
+        <a:cs typeface="+mn-cs"/>
+      </a:defRPr>
+    </a:lvl3pPr>
+    <a:lvl4pPr marL="1371600" algn="l" defTabSz="914400" rtl="0" eaLnBrk="1" latinLnBrk="0" hangingPunct="1">
+      <a:defRPr sz="1200" kern="1200">
+        <a:solidFill>
+          <a:schemeClr val="tx1"/>
+        </a:solidFill>
+        <a:latin typeface="+mn-lt"/>
+        <a:ea typeface="+mn-ea"/>
+        <a:cs typeface="+mn-cs"/>
+      </a:defRPr>
+    </a:lvl4pPr>
+    <a:lvl5pPr marL="1828800" algn="l" defTabSz="914400" rtl="0" eaLnBrk="1" latinLnBrk="0" hangingPunct="1">
+      <a:defRPr sz="1200" kern="1200">
+        <a:solidFill>
+          <a:schemeClr val="tx1"/>
+        </a:solidFill>
+        <a:latin typeface="+mn-lt"/>
+        <a:ea typeface="+mn-ea"/>
+        <a:cs typeface="+mn-cs"/>
+      </a:defRPr>
+    </a:lvl5pPr>
+    <a:lvl6pPr marL="2286000" algn="l" defTabSz="914400" rtl="0" eaLnBrk="1" latinLnBrk="0" hangingPunct="1">
+      <a:defRPr sz="1200" kern="1200">
+        <a:solidFill>
+          <a:schemeClr val="tx1"/>
+        </a:solidFill>
+        <a:latin typeface="+mn-lt"/>
+        <a:ea typeface="+mn-ea"/>
+        <a:cs typeface="+mn-cs"/>
+      </a:defRPr>
+    </a:lvl6pPr>
+    <a:lvl7pPr marL="2743200" algn="l" defTabSz="914400" rtl="0" eaLnBrk="1" latinLnBrk="0" hangingPunct="1">
+      <a:defRPr sz="1200" kern="1200">
+        <a:solidFill>
+          <a:schemeClr val="tx1"/>
+        </a:solidFill>
+        <a:latin typeface="+mn-lt"/>
+        <a:ea typeface="+mn-ea"/>
+        <a:cs typeface="+mn-cs"/>
+      </a:defRPr>
+    </a:lvl7pPr>
+    <a:lvl8pPr marL="3200400" algn="l" defTabSz="914400" rtl="0" eaLnBrk="1" latinLnBrk="0" hangingPunct="1">
+      <a:defRPr sz="1200" kern="1200">
+        <a:solidFill>
+          <a:schemeClr val="tx1"/>
+        </a:solidFill>
+        <a:latin typeface="+mn-lt"/>
+        <a:ea typeface="+mn-ea"/>
+        <a:cs typeface="+mn-cs"/>
+      </a:defRPr>
+    </a:lvl8pPr>
+    <a:lvl9pPr marL="3657600" algn="l" defTabSz="914400" rtl="0" eaLnBrk="1" latinLnBrk="0" hangingPunct="1">
+      <a:defRPr sz="1200" kern="1200">
+        <a:solidFill>
+          <a:schemeClr val="tx1"/>
+        </a:solidFill>
+        <a:latin typeface="+mn-lt"/>
+        <a:ea typeface="+mn-ea"/>
+        <a:cs typeface="+mn-cs"/>
+      </a:defRPr>
+    </a:lvl9pPr>
+  </p:notesStyle>
+</p:notesMaster>
+</file>
+
+<file path=ppt/notesSlides/notesSlide1.xml><?xml version="1.0" encoding="utf-8"?>
+<p:notes xmlns:a="http://schemas.openxmlformats.org/drawingml/2006/main" xmlns:r="http://schemas.openxmlformats.org/officeDocument/2006/relationships" xmlns:p="http://schemas.openxmlformats.org/presentationml/2006/main">
+  <p:cSld>
+    <p:spTree>
+      <p:nvGrpSpPr>
+        <p:cNvPr id="1" name=""/>
+        <p:cNvGrpSpPr/>
+        <p:nvPr/>
+      </p:nvGrpSpPr>
+      <p:grpSpPr>
+        <a:xfrm>
+          <a:off x="0" y="0"/>
+          <a:ext cx="0" cy="0"/>
+          <a:chOff x="0" y="0"/>
+          <a:chExt cx="0" cy="0"/>
+        </a:xfrm>
+      </p:grpSpPr>
+      <p:sp>
+        <p:nvSpPr>
+          <p:cNvPr id="2" name="Slide Image Placeholder 1"/>
+          <p:cNvSpPr>
+            <a:spLocks noGrp="1" noRot="1" noChangeAspect="1"/>
+          </p:cNvSpPr>
+          <p:nvPr>
+            <p:ph type="sldImg"/>
+          </p:nvPr>
+        </p:nvSpPr>
+        <p:spPr/>
+      </p:sp>
+      <p:sp>
+        <p:nvSpPr>
+          <p:cNvPr id="3" name="Notes Placeholder 2"/>
+          <p:cNvSpPr>
+            <a:spLocks noGrp="1"/>
+          </p:cNvSpPr>
+          <p:nvPr>
+            <p:ph type="body" idx="1"/>
+          </p:nvPr>
+        </p:nvSpPr>
+        <p:spPr/>
+        <p:txBody>
+          <a:bodyPr/>
+          <a:lstStyle/>
+          <a:p>
+            <a:endParaRPr lang="en-US" dirty="0"/>
+          </a:p>
+        </p:txBody>
+      </p:sp>
+      <p:sp>
+        <p:nvSpPr>
+          <p:cNvPr id="4" name="Slide Number Placeholder 3"/>
+          <p:cNvSpPr>
+            <a:spLocks noGrp="1"/>
+          </p:cNvSpPr>
+          <p:nvPr>
+            <p:ph type="sldNum" sz="quarter" idx="5"/>
+          </p:nvPr>
+        </p:nvSpPr>
+        <p:spPr/>
+        <p:txBody>
+          <a:bodyPr/>
+          <a:lstStyle/>
+          <a:p>
+            <a:fld id="{C9C917E0-CCBB-49B5-B446-AD956E2D61E5}" type="slidenum">
+              <a:rPr lang="en-US" smtClean="0"/>
+              <a:t>1</a:t>
+            </a:fld>
+            <a:endParaRPr lang="en-US"/>
+          </a:p>
+        </p:txBody>
+      </p:sp>
+    </p:spTree>
+    <p:extLst>
+      <p:ext uri="{BB962C8B-B14F-4D97-AF65-F5344CB8AC3E}">
+        <p14:creationId xmlns:p14="http://schemas.microsoft.com/office/powerpoint/2010/main" val="2234689957"/>
+      </p:ext>
+    </p:extLst>
+  </p:cSld>
+  <p:clrMapOvr>
+    <a:masterClrMapping/>
+  </p:clrMapOvr>
+</p:notes>
+</file>
+
+<file path=ppt/notesSlides/notesSlide10.xml><?xml version="1.0" encoding="utf-8"?>
+<p:notes xmlns:a="http://schemas.openxmlformats.org/drawingml/2006/main" xmlns:r="http://schemas.openxmlformats.org/officeDocument/2006/relationships" xmlns:p="http://schemas.openxmlformats.org/presentationml/2006/main">
+  <p:cSld>
+    <p:spTree>
+      <p:nvGrpSpPr>
+        <p:cNvPr id="1" name=""/>
+        <p:cNvGrpSpPr/>
+        <p:nvPr/>
+      </p:nvGrpSpPr>
+      <p:grpSpPr>
+        <a:xfrm>
+          <a:off x="0" y="0"/>
+          <a:ext cx="0" cy="0"/>
+          <a:chOff x="0" y="0"/>
+          <a:chExt cx="0" cy="0"/>
+        </a:xfrm>
+      </p:grpSpPr>
+      <p:sp>
+        <p:nvSpPr>
+          <p:cNvPr id="2" name="Slide Image Placeholder 1"/>
+          <p:cNvSpPr>
+            <a:spLocks noGrp="1" noRot="1" noChangeAspect="1"/>
+          </p:cNvSpPr>
+          <p:nvPr>
+            <p:ph type="sldImg"/>
+          </p:nvPr>
+        </p:nvSpPr>
+        <p:spPr/>
+      </p:sp>
+      <p:sp>
+        <p:nvSpPr>
+          <p:cNvPr id="3" name="Notes Placeholder 2"/>
+          <p:cNvSpPr>
+            <a:spLocks noGrp="1"/>
+          </p:cNvSpPr>
+          <p:nvPr>
+            <p:ph type="body" idx="1"/>
+          </p:nvPr>
+        </p:nvSpPr>
+        <p:spPr/>
+        <p:txBody>
+          <a:bodyPr/>
+          <a:lstStyle/>
+          <a:p>
+            <a:pPr marL="0" marR="0" lvl="0" indent="0" algn="l" defTabSz="914400" rtl="0" eaLnBrk="1" fontAlgn="auto" latinLnBrk="0" hangingPunct="1">
+              <a:lnSpc>
+                <a:spcPct val="100000"/>
+              </a:lnSpc>
+              <a:spcBef>
+                <a:spcPts val="0"/>
+              </a:spcBef>
+              <a:spcAft>
+                <a:spcPts val="0"/>
+              </a:spcAft>
+              <a:buClrTx/>
+              <a:buSzTx/>
+              <a:buFontTx/>
+              <a:buNone/>
+              <a:tabLst/>
+              <a:defRPr/>
+            </a:pPr>
+            <a:r>
+              <a:rPr lang="en-US" sz="1200" dirty="0">
+                <a:solidFill>
+                  <a:schemeClr val="bg1"/>
+                </a:solidFill>
+                <a:latin typeface="Calibri" panose="020F0502020204030204" pitchFamily="34" charset="0"/>
+                <a:ea typeface="Calibri" panose="020F0502020204030204" pitchFamily="34" charset="0"/>
+                <a:cs typeface="Calibri" panose="020F0502020204030204" pitchFamily="34" charset="0"/>
+              </a:rPr>
+              <a:t>	For storage I chose a WD (Western Digital) Black SSD for the operating system and a 6TB Toshiba HDD for data and application use. The solid-state drive has extremely fast read speed of up to 7000MB/s through the motherboard’s PCIe 4 connection. </a:t>
+            </a:r>
+          </a:p>
+          <a:p>
+            <a:endParaRPr lang="en-US" dirty="0"/>
+          </a:p>
+        </p:txBody>
+      </p:sp>
+      <p:sp>
+        <p:nvSpPr>
+          <p:cNvPr id="4" name="Slide Number Placeholder 3"/>
+          <p:cNvSpPr>
+            <a:spLocks noGrp="1"/>
+          </p:cNvSpPr>
+          <p:nvPr>
+            <p:ph type="sldNum" sz="quarter" idx="5"/>
+          </p:nvPr>
+        </p:nvSpPr>
+        <p:spPr/>
+        <p:txBody>
+          <a:bodyPr/>
+          <a:lstStyle/>
+          <a:p>
+            <a:fld id="{C9C917E0-CCBB-49B5-B446-AD956E2D61E5}" type="slidenum">
+              <a:rPr lang="en-US" smtClean="0"/>
+              <a:t>10</a:t>
+            </a:fld>
+            <a:endParaRPr lang="en-US"/>
+          </a:p>
+        </p:txBody>
+      </p:sp>
+    </p:spTree>
+    <p:extLst>
+      <p:ext uri="{BB962C8B-B14F-4D97-AF65-F5344CB8AC3E}">
+        <p14:creationId xmlns:p14="http://schemas.microsoft.com/office/powerpoint/2010/main" val="1137807043"/>
+      </p:ext>
+    </p:extLst>
+  </p:cSld>
+  <p:clrMapOvr>
+    <a:masterClrMapping/>
+  </p:clrMapOvr>
+</p:notes>
+</file>
+
+<file path=ppt/notesSlides/notesSlide11.xml><?xml version="1.0" encoding="utf-8"?>
+<p:notes xmlns:a="http://schemas.openxmlformats.org/drawingml/2006/main" xmlns:r="http://schemas.openxmlformats.org/officeDocument/2006/relationships" xmlns:p="http://schemas.openxmlformats.org/presentationml/2006/main">
+  <p:cSld>
+    <p:spTree>
+      <p:nvGrpSpPr>
+        <p:cNvPr id="1" name=""/>
+        <p:cNvGrpSpPr/>
+        <p:nvPr/>
+      </p:nvGrpSpPr>
+      <p:grpSpPr>
+        <a:xfrm>
+          <a:off x="0" y="0"/>
+          <a:ext cx="0" cy="0"/>
+          <a:chOff x="0" y="0"/>
+          <a:chExt cx="0" cy="0"/>
+        </a:xfrm>
+      </p:grpSpPr>
+      <p:sp>
+        <p:nvSpPr>
+          <p:cNvPr id="2" name="Slide Image Placeholder 1"/>
+          <p:cNvSpPr>
+            <a:spLocks noGrp="1" noRot="1" noChangeAspect="1"/>
+          </p:cNvSpPr>
+          <p:nvPr>
+            <p:ph type="sldImg"/>
+          </p:nvPr>
+        </p:nvSpPr>
+        <p:spPr/>
+      </p:sp>
+      <p:sp>
+        <p:nvSpPr>
+          <p:cNvPr id="3" name="Notes Placeholder 2"/>
+          <p:cNvSpPr>
+            <a:spLocks noGrp="1"/>
+          </p:cNvSpPr>
+          <p:nvPr>
+            <p:ph type="body" idx="1"/>
+          </p:nvPr>
+        </p:nvSpPr>
+        <p:spPr/>
+        <p:txBody>
+          <a:bodyPr/>
+          <a:lstStyle/>
+          <a:p>
+            <a:r>
+              <a:rPr lang="en-US" sz="1200" dirty="0">
+                <a:solidFill>
+                  <a:schemeClr val="bg1"/>
+                </a:solidFill>
+                <a:latin typeface="Calibri" panose="020F0502020204030204" pitchFamily="34" charset="0"/>
+                <a:ea typeface="Calibri" panose="020F0502020204030204" pitchFamily="34" charset="0"/>
+                <a:cs typeface="Calibri" panose="020F0502020204030204" pitchFamily="34" charset="0"/>
+              </a:rPr>
+              <a:t>	The HDD will be used to hold application data, video and audio files, along with games. The HDD runs at 7200 RPM and can transfer data at up to 6GB/s (6000MB/s) through it’s SATA 3 connection. I have 1 additional M.2 and 2 additional SATA 3 connections for future upgrading. Western Digital’s SSD can be purchased for $69.99 and the Toshiba Hard Disk Drive is $144.99, both from </a:t>
+            </a:r>
+            <a:r>
+              <a:rPr lang="en-US" sz="1200" dirty="0" err="1">
+                <a:solidFill>
+                  <a:schemeClr val="bg1"/>
+                </a:solidFill>
+                <a:latin typeface="Calibri" panose="020F0502020204030204" pitchFamily="34" charset="0"/>
+                <a:ea typeface="Calibri" panose="020F0502020204030204" pitchFamily="34" charset="0"/>
+                <a:cs typeface="Calibri" panose="020F0502020204030204" pitchFamily="34" charset="0"/>
+              </a:rPr>
+              <a:t>NewEgg</a:t>
+            </a:r>
+            <a:r>
+              <a:rPr lang="en-US" sz="1200" dirty="0">
+                <a:solidFill>
+                  <a:schemeClr val="bg1"/>
+                </a:solidFill>
+                <a:latin typeface="Calibri" panose="020F0502020204030204" pitchFamily="34" charset="0"/>
+                <a:ea typeface="Calibri" panose="020F0502020204030204" pitchFamily="34" charset="0"/>
+                <a:cs typeface="Calibri" panose="020F0502020204030204" pitchFamily="34" charset="0"/>
+              </a:rPr>
+              <a:t>.</a:t>
+            </a:r>
+            <a:endParaRPr lang="en-US" dirty="0"/>
+          </a:p>
+        </p:txBody>
+      </p:sp>
+      <p:sp>
+        <p:nvSpPr>
+          <p:cNvPr id="4" name="Slide Number Placeholder 3"/>
+          <p:cNvSpPr>
+            <a:spLocks noGrp="1"/>
+          </p:cNvSpPr>
+          <p:nvPr>
+            <p:ph type="sldNum" sz="quarter" idx="5"/>
+          </p:nvPr>
+        </p:nvSpPr>
+        <p:spPr/>
+        <p:txBody>
+          <a:bodyPr/>
+          <a:lstStyle/>
+          <a:p>
+            <a:fld id="{C9C917E0-CCBB-49B5-B446-AD956E2D61E5}" type="slidenum">
+              <a:rPr lang="en-US" smtClean="0"/>
+              <a:t>11</a:t>
+            </a:fld>
+            <a:endParaRPr lang="en-US"/>
+          </a:p>
+        </p:txBody>
+      </p:sp>
+    </p:spTree>
+    <p:extLst>
+      <p:ext uri="{BB962C8B-B14F-4D97-AF65-F5344CB8AC3E}">
+        <p14:creationId xmlns:p14="http://schemas.microsoft.com/office/powerpoint/2010/main" val="575913278"/>
+      </p:ext>
+    </p:extLst>
+  </p:cSld>
+  <p:clrMapOvr>
+    <a:masterClrMapping/>
+  </p:clrMapOvr>
+</p:notes>
+</file>
+
+<file path=ppt/notesSlides/notesSlide12.xml><?xml version="1.0" encoding="utf-8"?>
+<p:notes xmlns:a="http://schemas.openxmlformats.org/drawingml/2006/main" xmlns:r="http://schemas.openxmlformats.org/officeDocument/2006/relationships" xmlns:p="http://schemas.openxmlformats.org/presentationml/2006/main">
+  <p:cSld>
+    <p:spTree>
+      <p:nvGrpSpPr>
+        <p:cNvPr id="1" name=""/>
+        <p:cNvGrpSpPr/>
+        <p:nvPr/>
+      </p:nvGrpSpPr>
+      <p:grpSpPr>
+        <a:xfrm>
+          <a:off x="0" y="0"/>
+          <a:ext cx="0" cy="0"/>
+          <a:chOff x="0" y="0"/>
+          <a:chExt cx="0" cy="0"/>
+        </a:xfrm>
+      </p:grpSpPr>
+      <p:sp>
+        <p:nvSpPr>
+          <p:cNvPr id="2" name="Slide Image Placeholder 1"/>
+          <p:cNvSpPr>
+            <a:spLocks noGrp="1" noRot="1" noChangeAspect="1"/>
+          </p:cNvSpPr>
+          <p:nvPr>
+            <p:ph type="sldImg"/>
+          </p:nvPr>
+        </p:nvSpPr>
+        <p:spPr/>
+      </p:sp>
+      <p:sp>
+        <p:nvSpPr>
+          <p:cNvPr id="3" name="Notes Placeholder 2"/>
+          <p:cNvSpPr>
+            <a:spLocks noGrp="1"/>
+          </p:cNvSpPr>
+          <p:nvPr>
+            <p:ph type="body" idx="1"/>
+          </p:nvPr>
+        </p:nvSpPr>
+        <p:spPr/>
+        <p:txBody>
+          <a:bodyPr/>
+          <a:lstStyle/>
+          <a:p>
+            <a:pPr marL="0" marR="0" lvl="0" indent="0" algn="l" defTabSz="914400" rtl="0" eaLnBrk="1" fontAlgn="auto" latinLnBrk="0" hangingPunct="1">
+              <a:lnSpc>
+                <a:spcPct val="100000"/>
+              </a:lnSpc>
+              <a:spcBef>
+                <a:spcPts val="0"/>
+              </a:spcBef>
+              <a:spcAft>
+                <a:spcPts val="0"/>
+              </a:spcAft>
+              <a:buClrTx/>
+              <a:buSzTx/>
+              <a:buFontTx/>
+              <a:buNone/>
+              <a:tabLst/>
+              <a:defRPr/>
+            </a:pPr>
+            <a:r>
+              <a:rPr lang="en-US" sz="1200" dirty="0">
+                <a:solidFill>
+                  <a:schemeClr val="bg1"/>
+                </a:solidFill>
+                <a:latin typeface="Calibri" panose="020F0502020204030204" pitchFamily="34" charset="0"/>
+                <a:ea typeface="Calibri" panose="020F0502020204030204" pitchFamily="34" charset="0"/>
+                <a:cs typeface="Calibri" panose="020F0502020204030204" pitchFamily="34" charset="0"/>
+              </a:rPr>
+              <a:t>	I will add a Gigabyte AMD Radeon RX 6600 to one of the PCIe 4 expansion slots as my GPU. The card features 8GB or GDDR6 Memory and is considered an entry level to mid-range Graphics card. This will allow me to play AAA games for years. The Gigabyte Radeon RX 6600 can be purchased for $219.99 on </a:t>
+            </a:r>
+            <a:r>
+              <a:rPr lang="en-US" sz="1200" dirty="0" err="1">
+                <a:solidFill>
+                  <a:schemeClr val="bg1"/>
+                </a:solidFill>
+                <a:latin typeface="Calibri" panose="020F0502020204030204" pitchFamily="34" charset="0"/>
+                <a:ea typeface="Calibri" panose="020F0502020204030204" pitchFamily="34" charset="0"/>
+                <a:cs typeface="Calibri" panose="020F0502020204030204" pitchFamily="34" charset="0"/>
+              </a:rPr>
+              <a:t>NewEgg</a:t>
+            </a:r>
+            <a:r>
+              <a:rPr lang="en-US" sz="1200" dirty="0">
+                <a:solidFill>
+                  <a:schemeClr val="bg1"/>
+                </a:solidFill>
+                <a:latin typeface="Calibri" panose="020F0502020204030204" pitchFamily="34" charset="0"/>
+                <a:ea typeface="Calibri" panose="020F0502020204030204" pitchFamily="34" charset="0"/>
+                <a:cs typeface="Calibri" panose="020F0502020204030204" pitchFamily="34" charset="0"/>
+              </a:rPr>
+              <a:t>.</a:t>
+            </a:r>
+          </a:p>
+        </p:txBody>
+      </p:sp>
+      <p:sp>
+        <p:nvSpPr>
+          <p:cNvPr id="4" name="Slide Number Placeholder 3"/>
+          <p:cNvSpPr>
+            <a:spLocks noGrp="1"/>
+          </p:cNvSpPr>
+          <p:nvPr>
+            <p:ph type="sldNum" sz="quarter" idx="5"/>
+          </p:nvPr>
+        </p:nvSpPr>
+        <p:spPr/>
+        <p:txBody>
+          <a:bodyPr/>
+          <a:lstStyle/>
+          <a:p>
+            <a:fld id="{C9C917E0-CCBB-49B5-B446-AD956E2D61E5}" type="slidenum">
+              <a:rPr lang="en-US" smtClean="0"/>
+              <a:t>12</a:t>
+            </a:fld>
+            <a:endParaRPr lang="en-US"/>
+          </a:p>
+        </p:txBody>
+      </p:sp>
+    </p:spTree>
+    <p:extLst>
+      <p:ext uri="{BB962C8B-B14F-4D97-AF65-F5344CB8AC3E}">
+        <p14:creationId xmlns:p14="http://schemas.microsoft.com/office/powerpoint/2010/main" val="3641242983"/>
+      </p:ext>
+    </p:extLst>
+  </p:cSld>
+  <p:clrMapOvr>
+    <a:masterClrMapping/>
+  </p:clrMapOvr>
+</p:notes>
+</file>
+
+<file path=ppt/notesSlides/notesSlide13.xml><?xml version="1.0" encoding="utf-8"?>
+<p:notes xmlns:a="http://schemas.openxmlformats.org/drawingml/2006/main" xmlns:r="http://schemas.openxmlformats.org/officeDocument/2006/relationships" xmlns:p="http://schemas.openxmlformats.org/presentationml/2006/main">
+  <p:cSld>
+    <p:spTree>
+      <p:nvGrpSpPr>
+        <p:cNvPr id="1" name=""/>
+        <p:cNvGrpSpPr/>
+        <p:nvPr/>
+      </p:nvGrpSpPr>
+      <p:grpSpPr>
+        <a:xfrm>
+          <a:off x="0" y="0"/>
+          <a:ext cx="0" cy="0"/>
+          <a:chOff x="0" y="0"/>
+          <a:chExt cx="0" cy="0"/>
+        </a:xfrm>
+      </p:grpSpPr>
+      <p:sp>
+        <p:nvSpPr>
+          <p:cNvPr id="2" name="Slide Image Placeholder 1"/>
+          <p:cNvSpPr>
+            <a:spLocks noGrp="1" noRot="1" noChangeAspect="1"/>
+          </p:cNvSpPr>
+          <p:nvPr>
+            <p:ph type="sldImg"/>
+          </p:nvPr>
+        </p:nvSpPr>
+        <p:spPr/>
+      </p:sp>
+      <p:sp>
+        <p:nvSpPr>
+          <p:cNvPr id="3" name="Notes Placeholder 2"/>
+          <p:cNvSpPr>
+            <a:spLocks noGrp="1"/>
+          </p:cNvSpPr>
+          <p:nvPr>
+            <p:ph type="body" idx="1"/>
+          </p:nvPr>
+        </p:nvSpPr>
+        <p:spPr/>
+        <p:txBody>
+          <a:bodyPr/>
+          <a:lstStyle/>
+          <a:p>
+            <a:pPr marL="0" marR="0" lvl="0" indent="0" algn="l" defTabSz="914400" rtl="0" eaLnBrk="1" fontAlgn="auto" latinLnBrk="0" hangingPunct="1">
+              <a:lnSpc>
+                <a:spcPct val="100000"/>
+              </a:lnSpc>
+              <a:spcBef>
+                <a:spcPts val="0"/>
+              </a:spcBef>
+              <a:spcAft>
+                <a:spcPts val="0"/>
+              </a:spcAft>
+              <a:buClrTx/>
+              <a:buSzTx/>
+              <a:buFontTx/>
+              <a:buNone/>
+              <a:tabLst/>
+              <a:defRPr/>
+            </a:pPr>
+            <a:r>
+              <a:rPr lang="en-US" sz="1200" dirty="0">
+                <a:solidFill>
+                  <a:schemeClr val="bg1"/>
+                </a:solidFill>
+                <a:latin typeface="Calibri" panose="020F0502020204030204" pitchFamily="34" charset="0"/>
+                <a:ea typeface="Calibri" panose="020F0502020204030204" pitchFamily="34" charset="0"/>
+                <a:cs typeface="Calibri" panose="020F0502020204030204" pitchFamily="34" charset="0"/>
+              </a:rPr>
+              <a:t>	To create a dual display setup, I can upgrade my current monitors with 2 MSI </a:t>
+            </a:r>
+            <a:r>
+              <a:rPr lang="en-US" sz="1200" dirty="0" err="1">
+                <a:solidFill>
+                  <a:schemeClr val="bg1"/>
+                </a:solidFill>
+                <a:latin typeface="Calibri" panose="020F0502020204030204" pitchFamily="34" charset="0"/>
+                <a:ea typeface="Calibri" panose="020F0502020204030204" pitchFamily="34" charset="0"/>
+                <a:cs typeface="Calibri" panose="020F0502020204030204" pitchFamily="34" charset="0"/>
+              </a:rPr>
+              <a:t>Optix</a:t>
+            </a:r>
+            <a:r>
+              <a:rPr lang="en-US" sz="1200" dirty="0">
+                <a:solidFill>
+                  <a:schemeClr val="bg1"/>
+                </a:solidFill>
+                <a:latin typeface="Calibri" panose="020F0502020204030204" pitchFamily="34" charset="0"/>
+                <a:ea typeface="Calibri" panose="020F0502020204030204" pitchFamily="34" charset="0"/>
+                <a:cs typeface="Calibri" panose="020F0502020204030204" pitchFamily="34" charset="0"/>
+              </a:rPr>
+              <a:t> 27” Curved HD Monitors for $199.99 each. The monitors feature 1920x1080 display (HD) at up to 170 Hz with a 1 millisecond response time.</a:t>
+            </a:r>
+          </a:p>
+        </p:txBody>
+      </p:sp>
+      <p:sp>
+        <p:nvSpPr>
+          <p:cNvPr id="4" name="Slide Number Placeholder 3"/>
+          <p:cNvSpPr>
+            <a:spLocks noGrp="1"/>
+          </p:cNvSpPr>
+          <p:nvPr>
+            <p:ph type="sldNum" sz="quarter" idx="5"/>
+          </p:nvPr>
+        </p:nvSpPr>
+        <p:spPr/>
+        <p:txBody>
+          <a:bodyPr/>
+          <a:lstStyle/>
+          <a:p>
+            <a:fld id="{C9C917E0-CCBB-49B5-B446-AD956E2D61E5}" type="slidenum">
+              <a:rPr lang="en-US" smtClean="0"/>
+              <a:t>13</a:t>
+            </a:fld>
+            <a:endParaRPr lang="en-US"/>
+          </a:p>
+        </p:txBody>
+      </p:sp>
+    </p:spTree>
+    <p:extLst>
+      <p:ext uri="{BB962C8B-B14F-4D97-AF65-F5344CB8AC3E}">
+        <p14:creationId xmlns:p14="http://schemas.microsoft.com/office/powerpoint/2010/main" val="3432607916"/>
+      </p:ext>
+    </p:extLst>
+  </p:cSld>
+  <p:clrMapOvr>
+    <a:masterClrMapping/>
+  </p:clrMapOvr>
+</p:notes>
+</file>
+
+<file path=ppt/notesSlides/notesSlide14.xml><?xml version="1.0" encoding="utf-8"?>
+<p:notes xmlns:a="http://schemas.openxmlformats.org/drawingml/2006/main" xmlns:r="http://schemas.openxmlformats.org/officeDocument/2006/relationships" xmlns:p="http://schemas.openxmlformats.org/presentationml/2006/main">
+  <p:cSld>
+    <p:spTree>
+      <p:nvGrpSpPr>
+        <p:cNvPr id="1" name=""/>
+        <p:cNvGrpSpPr/>
+        <p:nvPr/>
+      </p:nvGrpSpPr>
+      <p:grpSpPr>
+        <a:xfrm>
+          <a:off x="0" y="0"/>
+          <a:ext cx="0" cy="0"/>
+          <a:chOff x="0" y="0"/>
+          <a:chExt cx="0" cy="0"/>
+        </a:xfrm>
+      </p:grpSpPr>
+      <p:sp>
+        <p:nvSpPr>
+          <p:cNvPr id="2" name="Slide Image Placeholder 1"/>
+          <p:cNvSpPr>
+            <a:spLocks noGrp="1" noRot="1" noChangeAspect="1"/>
+          </p:cNvSpPr>
+          <p:nvPr>
+            <p:ph type="sldImg"/>
+          </p:nvPr>
+        </p:nvSpPr>
+        <p:spPr/>
+      </p:sp>
+      <p:sp>
+        <p:nvSpPr>
+          <p:cNvPr id="3" name="Notes Placeholder 2"/>
+          <p:cNvSpPr>
+            <a:spLocks noGrp="1"/>
+          </p:cNvSpPr>
+          <p:nvPr>
+            <p:ph type="body" idx="1"/>
+          </p:nvPr>
+        </p:nvSpPr>
+        <p:spPr/>
+        <p:txBody>
+          <a:bodyPr/>
+          <a:lstStyle/>
+          <a:p>
+            <a:r>
+              <a:rPr lang="en-US" sz="1200" dirty="0">
+                <a:solidFill>
+                  <a:schemeClr val="bg1"/>
+                </a:solidFill>
+                <a:latin typeface="Calibri" panose="020F0502020204030204" pitchFamily="34" charset="0"/>
+                <a:ea typeface="Calibri" panose="020F0502020204030204" pitchFamily="34" charset="0"/>
+                <a:cs typeface="Calibri" panose="020F0502020204030204" pitchFamily="34" charset="0"/>
+              </a:rPr>
+              <a:t>	I will run Ubuntu on the machine and therefore save some money by using a free Linux Operating System. I use a digital art program called </a:t>
+            </a:r>
+            <a:r>
+              <a:rPr lang="en-US" sz="1200" dirty="0" err="1">
+                <a:solidFill>
+                  <a:schemeClr val="bg1"/>
+                </a:solidFill>
+                <a:latin typeface="Calibri" panose="020F0502020204030204" pitchFamily="34" charset="0"/>
+                <a:ea typeface="Calibri" panose="020F0502020204030204" pitchFamily="34" charset="0"/>
+                <a:cs typeface="Calibri" panose="020F0502020204030204" pitchFamily="34" charset="0"/>
+              </a:rPr>
+              <a:t>Krita</a:t>
+            </a:r>
+            <a:r>
+              <a:rPr lang="en-US" sz="1200" dirty="0">
+                <a:solidFill>
+                  <a:schemeClr val="bg1"/>
+                </a:solidFill>
+                <a:latin typeface="Calibri" panose="020F0502020204030204" pitchFamily="34" charset="0"/>
+                <a:ea typeface="Calibri" panose="020F0502020204030204" pitchFamily="34" charset="0"/>
+                <a:cs typeface="Calibri" panose="020F0502020204030204" pitchFamily="34" charset="0"/>
+              </a:rPr>
+              <a:t> and will install that on the system. Libre Office is a wonderful free alternative to Microsoft Office which can edit and save files in Microsoft Office formats. Another piece of freeware that I use often is GIMP for photo editing. I currently have a license for VMWare Workstation Pro and will install that onto the system for virtualization. Docker is a free application, also and I will download it to work with containers on the machine. </a:t>
+            </a:r>
+            <a:endParaRPr lang="en-US" dirty="0"/>
+          </a:p>
+        </p:txBody>
+      </p:sp>
+      <p:sp>
+        <p:nvSpPr>
+          <p:cNvPr id="4" name="Slide Number Placeholder 3"/>
+          <p:cNvSpPr>
+            <a:spLocks noGrp="1"/>
+          </p:cNvSpPr>
+          <p:nvPr>
+            <p:ph type="sldNum" sz="quarter" idx="5"/>
+          </p:nvPr>
+        </p:nvSpPr>
+        <p:spPr/>
+        <p:txBody>
+          <a:bodyPr/>
+          <a:lstStyle/>
+          <a:p>
+            <a:fld id="{C9C917E0-CCBB-49B5-B446-AD956E2D61E5}" type="slidenum">
+              <a:rPr lang="en-US" smtClean="0"/>
+              <a:t>14</a:t>
+            </a:fld>
+            <a:endParaRPr lang="en-US"/>
+          </a:p>
+        </p:txBody>
+      </p:sp>
+    </p:spTree>
+    <p:extLst>
+      <p:ext uri="{BB962C8B-B14F-4D97-AF65-F5344CB8AC3E}">
+        <p14:creationId xmlns:p14="http://schemas.microsoft.com/office/powerpoint/2010/main" val="3082536827"/>
+      </p:ext>
+    </p:extLst>
+  </p:cSld>
+  <p:clrMapOvr>
+    <a:masterClrMapping/>
+  </p:clrMapOvr>
+</p:notes>
+</file>
+
+<file path=ppt/notesSlides/notesSlide15.xml><?xml version="1.0" encoding="utf-8"?>
+<p:notes xmlns:a="http://schemas.openxmlformats.org/drawingml/2006/main" xmlns:r="http://schemas.openxmlformats.org/officeDocument/2006/relationships" xmlns:p="http://schemas.openxmlformats.org/presentationml/2006/main">
+  <p:cSld>
+    <p:spTree>
+      <p:nvGrpSpPr>
+        <p:cNvPr id="1" name=""/>
+        <p:cNvGrpSpPr/>
+        <p:nvPr/>
+      </p:nvGrpSpPr>
+      <p:grpSpPr>
+        <a:xfrm>
+          <a:off x="0" y="0"/>
+          <a:ext cx="0" cy="0"/>
+          <a:chOff x="0" y="0"/>
+          <a:chExt cx="0" cy="0"/>
+        </a:xfrm>
+      </p:grpSpPr>
+      <p:sp>
+        <p:nvSpPr>
+          <p:cNvPr id="2" name="Slide Image Placeholder 1"/>
+          <p:cNvSpPr>
+            <a:spLocks noGrp="1" noRot="1" noChangeAspect="1"/>
+          </p:cNvSpPr>
+          <p:nvPr>
+            <p:ph type="sldImg"/>
+          </p:nvPr>
+        </p:nvSpPr>
+        <p:spPr/>
+      </p:sp>
+      <p:sp>
+        <p:nvSpPr>
+          <p:cNvPr id="3" name="Notes Placeholder 2"/>
+          <p:cNvSpPr>
+            <a:spLocks noGrp="1"/>
+          </p:cNvSpPr>
+          <p:nvPr>
+            <p:ph type="body" idx="1"/>
+          </p:nvPr>
+        </p:nvSpPr>
+        <p:spPr/>
+        <p:txBody>
+          <a:bodyPr/>
+          <a:lstStyle/>
+          <a:p>
+            <a:pPr marL="0" indent="0">
+              <a:spcBef>
+                <a:spcPts val="400"/>
+              </a:spcBef>
+              <a:buNone/>
+            </a:pPr>
+            <a:r>
+              <a:rPr lang="en-US" sz="1200" dirty="0">
+                <a:solidFill>
+                  <a:schemeClr val="bg1"/>
+                </a:solidFill>
+                <a:latin typeface="Calibri" panose="020F0502020204030204" pitchFamily="34" charset="0"/>
+                <a:ea typeface="Calibri" panose="020F0502020204030204" pitchFamily="34" charset="0"/>
+                <a:cs typeface="Calibri" panose="020F0502020204030204" pitchFamily="34" charset="0"/>
+              </a:rPr>
+              <a:t>	If I stopped with the initial build, I would have successfully built the Desktop for a subtotal of slightly more than $1200. I added 2 monitors for a dual monitor setup and ended up spending another $400. The subtotal with the monitors is $1622.69 on the Newegg.com website. </a:t>
+            </a:r>
+          </a:p>
+        </p:txBody>
+      </p:sp>
+      <p:sp>
+        <p:nvSpPr>
+          <p:cNvPr id="4" name="Slide Number Placeholder 3"/>
+          <p:cNvSpPr>
+            <a:spLocks noGrp="1"/>
+          </p:cNvSpPr>
+          <p:nvPr>
+            <p:ph type="sldNum" sz="quarter" idx="5"/>
+          </p:nvPr>
+        </p:nvSpPr>
+        <p:spPr/>
+        <p:txBody>
+          <a:bodyPr/>
+          <a:lstStyle/>
+          <a:p>
+            <a:fld id="{C9C917E0-CCBB-49B5-B446-AD956E2D61E5}" type="slidenum">
+              <a:rPr lang="en-US" smtClean="0"/>
+              <a:t>15</a:t>
+            </a:fld>
+            <a:endParaRPr lang="en-US"/>
+          </a:p>
+        </p:txBody>
+      </p:sp>
+    </p:spTree>
+    <p:extLst>
+      <p:ext uri="{BB962C8B-B14F-4D97-AF65-F5344CB8AC3E}">
+        <p14:creationId xmlns:p14="http://schemas.microsoft.com/office/powerpoint/2010/main" val="2662881425"/>
+      </p:ext>
+    </p:extLst>
+  </p:cSld>
+  <p:clrMapOvr>
+    <a:masterClrMapping/>
+  </p:clrMapOvr>
+</p:notes>
+</file>
+
+<file path=ppt/notesSlides/notesSlide16.xml><?xml version="1.0" encoding="utf-8"?>
+<p:notes xmlns:a="http://schemas.openxmlformats.org/drawingml/2006/main" xmlns:r="http://schemas.openxmlformats.org/officeDocument/2006/relationships" xmlns:p="http://schemas.openxmlformats.org/presentationml/2006/main">
+  <p:cSld>
+    <p:spTree>
+      <p:nvGrpSpPr>
+        <p:cNvPr id="1" name=""/>
+        <p:cNvGrpSpPr/>
+        <p:nvPr/>
+      </p:nvGrpSpPr>
+      <p:grpSpPr>
+        <a:xfrm>
+          <a:off x="0" y="0"/>
+          <a:ext cx="0" cy="0"/>
+          <a:chOff x="0" y="0"/>
+          <a:chExt cx="0" cy="0"/>
+        </a:xfrm>
+      </p:grpSpPr>
+      <p:sp>
+        <p:nvSpPr>
+          <p:cNvPr id="2" name="Slide Image Placeholder 1"/>
+          <p:cNvSpPr>
+            <a:spLocks noGrp="1" noRot="1" noChangeAspect="1"/>
+          </p:cNvSpPr>
+          <p:nvPr>
+            <p:ph type="sldImg"/>
+          </p:nvPr>
+        </p:nvSpPr>
+        <p:spPr/>
+      </p:sp>
+      <p:sp>
+        <p:nvSpPr>
+          <p:cNvPr id="3" name="Notes Placeholder 2"/>
+          <p:cNvSpPr>
+            <a:spLocks noGrp="1"/>
+          </p:cNvSpPr>
+          <p:nvPr>
+            <p:ph type="body" idx="1"/>
+          </p:nvPr>
+        </p:nvSpPr>
+        <p:spPr/>
+        <p:txBody>
+          <a:bodyPr/>
+          <a:lstStyle/>
+          <a:p>
+            <a:pPr marL="0" indent="0">
+              <a:spcBef>
+                <a:spcPts val="400"/>
+              </a:spcBef>
+              <a:buNone/>
+            </a:pPr>
+            <a:r>
+              <a:rPr lang="en-US" sz="1200" dirty="0">
+                <a:solidFill>
+                  <a:schemeClr val="bg1"/>
+                </a:solidFill>
+                <a:latin typeface="Calibri" panose="020F0502020204030204" pitchFamily="34" charset="0"/>
+                <a:ea typeface="Calibri" panose="020F0502020204030204" pitchFamily="34" charset="0"/>
+                <a:cs typeface="Calibri" panose="020F0502020204030204" pitchFamily="34" charset="0"/>
+              </a:rPr>
+              <a:t>	I currently have 2 monitors and multiple keyboards and mice, so I can successfully build the desktop for a price within my budget (excluding Tax and Shipping). If I am to build this system, I will wait until Black Friday or Cyber Monday when many of these parts will be discounted.</a:t>
+            </a:r>
+          </a:p>
+          <a:p>
+            <a:endParaRPr lang="en-US" dirty="0"/>
+          </a:p>
+        </p:txBody>
+      </p:sp>
+      <p:sp>
+        <p:nvSpPr>
+          <p:cNvPr id="4" name="Slide Number Placeholder 3"/>
+          <p:cNvSpPr>
+            <a:spLocks noGrp="1"/>
+          </p:cNvSpPr>
+          <p:nvPr>
+            <p:ph type="sldNum" sz="quarter" idx="5"/>
+          </p:nvPr>
+        </p:nvSpPr>
+        <p:spPr/>
+        <p:txBody>
+          <a:bodyPr/>
+          <a:lstStyle/>
+          <a:p>
+            <a:fld id="{C9C917E0-CCBB-49B5-B446-AD956E2D61E5}" type="slidenum">
+              <a:rPr lang="en-US" smtClean="0"/>
+              <a:t>16</a:t>
+            </a:fld>
+            <a:endParaRPr lang="en-US"/>
+          </a:p>
+        </p:txBody>
+      </p:sp>
+    </p:spTree>
+    <p:extLst>
+      <p:ext uri="{BB962C8B-B14F-4D97-AF65-F5344CB8AC3E}">
+        <p14:creationId xmlns:p14="http://schemas.microsoft.com/office/powerpoint/2010/main" val="3537554354"/>
+      </p:ext>
+    </p:extLst>
+  </p:cSld>
+  <p:clrMapOvr>
+    <a:masterClrMapping/>
+  </p:clrMapOvr>
+</p:notes>
+</file>
+
+<file path=ppt/notesSlides/notesSlide2.xml><?xml version="1.0" encoding="utf-8"?>
+<p:notes xmlns:a="http://schemas.openxmlformats.org/drawingml/2006/main" xmlns:r="http://schemas.openxmlformats.org/officeDocument/2006/relationships" xmlns:p="http://schemas.openxmlformats.org/presentationml/2006/main">
+  <p:cSld>
+    <p:spTree>
+      <p:nvGrpSpPr>
+        <p:cNvPr id="1" name=""/>
+        <p:cNvGrpSpPr/>
+        <p:nvPr/>
+      </p:nvGrpSpPr>
+      <p:grpSpPr>
+        <a:xfrm>
+          <a:off x="0" y="0"/>
+          <a:ext cx="0" cy="0"/>
+          <a:chOff x="0" y="0"/>
+          <a:chExt cx="0" cy="0"/>
+        </a:xfrm>
+      </p:grpSpPr>
+      <p:sp>
+        <p:nvSpPr>
+          <p:cNvPr id="2" name="Slide Image Placeholder 1"/>
+          <p:cNvSpPr>
+            <a:spLocks noGrp="1" noRot="1" noChangeAspect="1"/>
+          </p:cNvSpPr>
+          <p:nvPr>
+            <p:ph type="sldImg"/>
+          </p:nvPr>
+        </p:nvSpPr>
+        <p:spPr/>
+      </p:sp>
+      <p:sp>
+        <p:nvSpPr>
+          <p:cNvPr id="3" name="Notes Placeholder 2"/>
+          <p:cNvSpPr>
+            <a:spLocks noGrp="1"/>
+          </p:cNvSpPr>
+          <p:nvPr>
+            <p:ph type="body" idx="1"/>
+          </p:nvPr>
+        </p:nvSpPr>
+        <p:spPr/>
+        <p:txBody>
+          <a:bodyPr/>
+          <a:lstStyle/>
+          <a:p>
+            <a:pPr marL="0" marR="0" lvl="0" indent="0" algn="l" defTabSz="914400" rtl="0" eaLnBrk="1" fontAlgn="auto" latinLnBrk="0" hangingPunct="1">
+              <a:lnSpc>
+                <a:spcPct val="100000"/>
+              </a:lnSpc>
+              <a:spcBef>
+                <a:spcPts val="0"/>
+              </a:spcBef>
+              <a:spcAft>
+                <a:spcPts val="0"/>
+              </a:spcAft>
+              <a:buClrTx/>
+              <a:buSzTx/>
+              <a:buFontTx/>
+              <a:buNone/>
+              <a:tabLst/>
+              <a:defRPr/>
+            </a:pPr>
+            <a:r>
+              <a:rPr lang="en-US" sz="1200" dirty="0">
+                <a:solidFill>
+                  <a:schemeClr val="bg1"/>
+                </a:solidFill>
+                <a:latin typeface="Calibri" panose="020F0502020204030204" pitchFamily="34" charset="0"/>
+                <a:ea typeface="Calibri" panose="020F0502020204030204" pitchFamily="34" charset="0"/>
+                <a:cs typeface="Calibri" panose="020F0502020204030204" pitchFamily="34" charset="0"/>
+              </a:rPr>
+              <a:t>	I want to build a multi-core computer to use for school, office tasks, virtualization, digital art, personal entertainment, and gaming. I will create a machine that is faster than my current computer, which is an AMD Ryzen 5 2600 with 6 cores operating at 3.4GHz with 16GB of Ram. I do have a spare monitor and some keyboards and mice already, so I can save some money by building only the PC tower.</a:t>
+            </a:r>
+            <a:endParaRPr lang="en-US" dirty="0"/>
+          </a:p>
+        </p:txBody>
+      </p:sp>
+      <p:sp>
+        <p:nvSpPr>
+          <p:cNvPr id="4" name="Slide Number Placeholder 3"/>
+          <p:cNvSpPr>
+            <a:spLocks noGrp="1"/>
+          </p:cNvSpPr>
+          <p:nvPr>
+            <p:ph type="sldNum" sz="quarter" idx="5"/>
+          </p:nvPr>
+        </p:nvSpPr>
+        <p:spPr/>
+        <p:txBody>
+          <a:bodyPr/>
+          <a:lstStyle/>
+          <a:p>
+            <a:fld id="{C9C917E0-CCBB-49B5-B446-AD956E2D61E5}" type="slidenum">
+              <a:rPr lang="en-US" smtClean="0"/>
+              <a:t>2</a:t>
+            </a:fld>
+            <a:endParaRPr lang="en-US"/>
+          </a:p>
+        </p:txBody>
+      </p:sp>
+    </p:spTree>
+    <p:extLst>
+      <p:ext uri="{BB962C8B-B14F-4D97-AF65-F5344CB8AC3E}">
+        <p14:creationId xmlns:p14="http://schemas.microsoft.com/office/powerpoint/2010/main" val="1907515254"/>
+      </p:ext>
+    </p:extLst>
+  </p:cSld>
+  <p:clrMapOvr>
+    <a:masterClrMapping/>
+  </p:clrMapOvr>
+</p:notes>
+</file>
+
+<file path=ppt/notesSlides/notesSlide3.xml><?xml version="1.0" encoding="utf-8"?>
+<p:notes xmlns:a="http://schemas.openxmlformats.org/drawingml/2006/main" xmlns:r="http://schemas.openxmlformats.org/officeDocument/2006/relationships" xmlns:p="http://schemas.openxmlformats.org/presentationml/2006/main">
+  <p:cSld>
+    <p:spTree>
+      <p:nvGrpSpPr>
+        <p:cNvPr id="1" name=""/>
+        <p:cNvGrpSpPr/>
+        <p:nvPr/>
+      </p:nvGrpSpPr>
+      <p:grpSpPr>
+        <a:xfrm>
+          <a:off x="0" y="0"/>
+          <a:ext cx="0" cy="0"/>
+          <a:chOff x="0" y="0"/>
+          <a:chExt cx="0" cy="0"/>
+        </a:xfrm>
+      </p:grpSpPr>
+      <p:sp>
+        <p:nvSpPr>
+          <p:cNvPr id="2" name="Slide Image Placeholder 1"/>
+          <p:cNvSpPr>
+            <a:spLocks noGrp="1" noRot="1" noChangeAspect="1"/>
+          </p:cNvSpPr>
+          <p:nvPr>
+            <p:ph type="sldImg"/>
+          </p:nvPr>
+        </p:nvSpPr>
+        <p:spPr/>
+      </p:sp>
+      <p:sp>
+        <p:nvSpPr>
+          <p:cNvPr id="3" name="Notes Placeholder 2"/>
+          <p:cNvSpPr>
+            <a:spLocks noGrp="1"/>
+          </p:cNvSpPr>
+          <p:nvPr>
+            <p:ph type="body" idx="1"/>
+          </p:nvPr>
+        </p:nvSpPr>
+        <p:spPr/>
+        <p:txBody>
+          <a:bodyPr/>
+          <a:lstStyle/>
+          <a:p>
+            <a:pPr marL="0" marR="0" lvl="0" indent="0" algn="l" defTabSz="914400" rtl="0" eaLnBrk="1" fontAlgn="auto" latinLnBrk="0" hangingPunct="1">
+              <a:lnSpc>
+                <a:spcPct val="100000"/>
+              </a:lnSpc>
+              <a:spcBef>
+                <a:spcPts val="0"/>
+              </a:spcBef>
+              <a:spcAft>
+                <a:spcPts val="0"/>
+              </a:spcAft>
+              <a:buClrTx/>
+              <a:buSzTx/>
+              <a:buFontTx/>
+              <a:buNone/>
+              <a:tabLst/>
+              <a:defRPr/>
+            </a:pPr>
+            <a:r>
+              <a:rPr lang="en-US" sz="1200" dirty="0">
+                <a:solidFill>
+                  <a:schemeClr val="bg1"/>
+                </a:solidFill>
+                <a:latin typeface="Calibri" panose="020F0502020204030204" pitchFamily="34" charset="0"/>
+                <a:ea typeface="Calibri" panose="020F0502020204030204" pitchFamily="34" charset="0"/>
+                <a:cs typeface="Calibri" panose="020F0502020204030204" pitchFamily="34" charset="0"/>
+              </a:rPr>
+              <a:t>	I do not want to spend more than $1200 on the system.  I am not interested in RGB lights in my system, so I can save some money by purchasing parts based on performance value, not looks. </a:t>
+            </a:r>
+          </a:p>
+          <a:p>
+            <a:endParaRPr lang="en-US" dirty="0"/>
+          </a:p>
+        </p:txBody>
+      </p:sp>
+      <p:sp>
+        <p:nvSpPr>
+          <p:cNvPr id="4" name="Slide Number Placeholder 3"/>
+          <p:cNvSpPr>
+            <a:spLocks noGrp="1"/>
+          </p:cNvSpPr>
+          <p:nvPr>
+            <p:ph type="sldNum" sz="quarter" idx="5"/>
+          </p:nvPr>
+        </p:nvSpPr>
+        <p:spPr/>
+        <p:txBody>
+          <a:bodyPr/>
+          <a:lstStyle/>
+          <a:p>
+            <a:fld id="{C9C917E0-CCBB-49B5-B446-AD956E2D61E5}" type="slidenum">
+              <a:rPr lang="en-US" smtClean="0"/>
+              <a:t>3</a:t>
+            </a:fld>
+            <a:endParaRPr lang="en-US"/>
+          </a:p>
+        </p:txBody>
+      </p:sp>
+    </p:spTree>
+    <p:extLst>
+      <p:ext uri="{BB962C8B-B14F-4D97-AF65-F5344CB8AC3E}">
+        <p14:creationId xmlns:p14="http://schemas.microsoft.com/office/powerpoint/2010/main" val="2123772619"/>
+      </p:ext>
+    </p:extLst>
+  </p:cSld>
+  <p:clrMapOvr>
+    <a:masterClrMapping/>
+  </p:clrMapOvr>
+</p:notes>
+</file>
+
+<file path=ppt/notesSlides/notesSlide4.xml><?xml version="1.0" encoding="utf-8"?>
+<p:notes xmlns:a="http://schemas.openxmlformats.org/drawingml/2006/main" xmlns:r="http://schemas.openxmlformats.org/officeDocument/2006/relationships" xmlns:p="http://schemas.openxmlformats.org/presentationml/2006/main">
+  <p:cSld>
+    <p:spTree>
+      <p:nvGrpSpPr>
+        <p:cNvPr id="1" name=""/>
+        <p:cNvGrpSpPr/>
+        <p:nvPr/>
+      </p:nvGrpSpPr>
+      <p:grpSpPr>
+        <a:xfrm>
+          <a:off x="0" y="0"/>
+          <a:ext cx="0" cy="0"/>
+          <a:chOff x="0" y="0"/>
+          <a:chExt cx="0" cy="0"/>
+        </a:xfrm>
+      </p:grpSpPr>
+      <p:sp>
+        <p:nvSpPr>
+          <p:cNvPr id="2" name="Slide Image Placeholder 1"/>
+          <p:cNvSpPr>
+            <a:spLocks noGrp="1" noRot="1" noChangeAspect="1"/>
+          </p:cNvSpPr>
+          <p:nvPr>
+            <p:ph type="sldImg"/>
+          </p:nvPr>
+        </p:nvSpPr>
+        <p:spPr/>
+      </p:sp>
+      <p:sp>
+        <p:nvSpPr>
+          <p:cNvPr id="3" name="Notes Placeholder 2"/>
+          <p:cNvSpPr>
+            <a:spLocks noGrp="1"/>
+          </p:cNvSpPr>
+          <p:nvPr>
+            <p:ph type="body" idx="1"/>
+          </p:nvPr>
+        </p:nvSpPr>
+        <p:spPr/>
+        <p:txBody>
+          <a:bodyPr/>
+          <a:lstStyle/>
+          <a:p>
+            <a:pPr marL="0" marR="0" lvl="0" indent="0" algn="l" defTabSz="914400" rtl="0" eaLnBrk="1" fontAlgn="auto" latinLnBrk="0" hangingPunct="1">
+              <a:lnSpc>
+                <a:spcPct val="100000"/>
+              </a:lnSpc>
+              <a:spcBef>
+                <a:spcPts val="0"/>
+              </a:spcBef>
+              <a:spcAft>
+                <a:spcPts val="0"/>
+              </a:spcAft>
+              <a:buClrTx/>
+              <a:buSzTx/>
+              <a:buFontTx/>
+              <a:buNone/>
+              <a:tabLst/>
+              <a:defRPr/>
+            </a:pPr>
+            <a:r>
+              <a:rPr lang="en-US" sz="1200" dirty="0">
+                <a:solidFill>
+                  <a:schemeClr val="bg1"/>
+                </a:solidFill>
+                <a:latin typeface="Calibri" panose="020F0502020204030204" pitchFamily="34" charset="0"/>
+                <a:ea typeface="Calibri" panose="020F0502020204030204" pitchFamily="34" charset="0"/>
+                <a:cs typeface="Calibri" panose="020F0502020204030204" pitchFamily="34" charset="0"/>
+              </a:rPr>
+              <a:t>	I am choosing an MSI Motherboard for use with AMD CPUs. I have always been a fan of AMD products and my current computer has an MSI motherboard which has served me well. I am choosing the MSI MAG Tomahawk B550 as the motherboard. The board features 3 x 6GB </a:t>
+            </a:r>
+            <a:r>
+              <a:rPr lang="en-US" sz="1200" dirty="0" err="1">
+                <a:solidFill>
+                  <a:schemeClr val="bg1"/>
+                </a:solidFill>
+                <a:latin typeface="Calibri" panose="020F0502020204030204" pitchFamily="34" charset="0"/>
+                <a:ea typeface="Calibri" panose="020F0502020204030204" pitchFamily="34" charset="0"/>
+                <a:cs typeface="Calibri" panose="020F0502020204030204" pitchFamily="34" charset="0"/>
+              </a:rPr>
+              <a:t>Sata</a:t>
+            </a:r>
+            <a:r>
+              <a:rPr lang="en-US" sz="1200" dirty="0">
+                <a:solidFill>
+                  <a:schemeClr val="bg1"/>
+                </a:solidFill>
+                <a:latin typeface="Calibri" panose="020F0502020204030204" pitchFamily="34" charset="0"/>
+                <a:ea typeface="Calibri" panose="020F0502020204030204" pitchFamily="34" charset="0"/>
+                <a:cs typeface="Calibri" panose="020F0502020204030204" pitchFamily="34" charset="0"/>
+              </a:rPr>
+              <a:t> connections, USB 3.2, 1 and 2.5 Gigabit Ethernet, dual M.2 connections,  and support for 128GB DDR4 RAM. I found the board for $169.99 at NewEgg.com.</a:t>
+            </a:r>
+          </a:p>
+        </p:txBody>
+      </p:sp>
+      <p:sp>
+        <p:nvSpPr>
+          <p:cNvPr id="4" name="Slide Number Placeholder 3"/>
+          <p:cNvSpPr>
+            <a:spLocks noGrp="1"/>
+          </p:cNvSpPr>
+          <p:nvPr>
+            <p:ph type="sldNum" sz="quarter" idx="5"/>
+          </p:nvPr>
+        </p:nvSpPr>
+        <p:spPr/>
+        <p:txBody>
+          <a:bodyPr/>
+          <a:lstStyle/>
+          <a:p>
+            <a:fld id="{C9C917E0-CCBB-49B5-B446-AD956E2D61E5}" type="slidenum">
+              <a:rPr lang="en-US" smtClean="0"/>
+              <a:t>4</a:t>
+            </a:fld>
+            <a:endParaRPr lang="en-US"/>
+          </a:p>
+        </p:txBody>
+      </p:sp>
+    </p:spTree>
+    <p:extLst>
+      <p:ext uri="{BB962C8B-B14F-4D97-AF65-F5344CB8AC3E}">
+        <p14:creationId xmlns:p14="http://schemas.microsoft.com/office/powerpoint/2010/main" val="3649037654"/>
+      </p:ext>
+    </p:extLst>
+  </p:cSld>
+  <p:clrMapOvr>
+    <a:masterClrMapping/>
+  </p:clrMapOvr>
+</p:notes>
+</file>
+
+<file path=ppt/notesSlides/notesSlide5.xml><?xml version="1.0" encoding="utf-8"?>
+<p:notes xmlns:a="http://schemas.openxmlformats.org/drawingml/2006/main" xmlns:r="http://schemas.openxmlformats.org/officeDocument/2006/relationships" xmlns:p="http://schemas.openxmlformats.org/presentationml/2006/main">
+  <p:cSld>
+    <p:spTree>
+      <p:nvGrpSpPr>
+        <p:cNvPr id="1" name=""/>
+        <p:cNvGrpSpPr/>
+        <p:nvPr/>
+      </p:nvGrpSpPr>
+      <p:grpSpPr>
+        <a:xfrm>
+          <a:off x="0" y="0"/>
+          <a:ext cx="0" cy="0"/>
+          <a:chOff x="0" y="0"/>
+          <a:chExt cx="0" cy="0"/>
+        </a:xfrm>
+      </p:grpSpPr>
+      <p:sp>
+        <p:nvSpPr>
+          <p:cNvPr id="2" name="Slide Image Placeholder 1"/>
+          <p:cNvSpPr>
+            <a:spLocks noGrp="1" noRot="1" noChangeAspect="1"/>
+          </p:cNvSpPr>
+          <p:nvPr>
+            <p:ph type="sldImg"/>
+          </p:nvPr>
+        </p:nvSpPr>
+        <p:spPr/>
+      </p:sp>
+      <p:sp>
+        <p:nvSpPr>
+          <p:cNvPr id="3" name="Notes Placeholder 2"/>
+          <p:cNvSpPr>
+            <a:spLocks noGrp="1"/>
+          </p:cNvSpPr>
+          <p:nvPr>
+            <p:ph type="body" idx="1"/>
+          </p:nvPr>
+        </p:nvSpPr>
+        <p:spPr/>
+        <p:txBody>
+          <a:bodyPr/>
+          <a:lstStyle/>
+          <a:p>
+            <a:pPr marL="0" marR="0" lvl="0" indent="0" algn="l" defTabSz="914400" rtl="0" eaLnBrk="1" fontAlgn="auto" latinLnBrk="0" hangingPunct="1">
+              <a:lnSpc>
+                <a:spcPct val="100000"/>
+              </a:lnSpc>
+              <a:spcBef>
+                <a:spcPts val="0"/>
+              </a:spcBef>
+              <a:spcAft>
+                <a:spcPts val="0"/>
+              </a:spcAft>
+              <a:buClrTx/>
+              <a:buSzTx/>
+              <a:buFontTx/>
+              <a:buNone/>
+              <a:tabLst/>
+              <a:defRPr/>
+            </a:pPr>
+            <a:r>
+              <a:rPr lang="en-US" sz="1200" dirty="0">
+                <a:solidFill>
+                  <a:schemeClr val="bg1"/>
+                </a:solidFill>
+                <a:latin typeface="Calibri" panose="020F0502020204030204" pitchFamily="34" charset="0"/>
+                <a:ea typeface="Calibri" panose="020F0502020204030204" pitchFamily="34" charset="0"/>
+                <a:cs typeface="Calibri" panose="020F0502020204030204" pitchFamily="34" charset="0"/>
+              </a:rPr>
+              <a:t>	My desk has enough room for a full-size computer, so I will build the system in a Full ATX PC tower. I chose the Fractal Design Pop XL High-Airflow so that I will have negative air pressure with great ventilation in the system. I will have plenty of room to expand the system in the future. The case is available for $109.99 on </a:t>
+            </a:r>
+            <a:r>
+              <a:rPr lang="en-US" sz="1200" dirty="0" err="1">
+                <a:solidFill>
+                  <a:schemeClr val="bg1"/>
+                </a:solidFill>
+                <a:latin typeface="Calibri" panose="020F0502020204030204" pitchFamily="34" charset="0"/>
+                <a:ea typeface="Calibri" panose="020F0502020204030204" pitchFamily="34" charset="0"/>
+                <a:cs typeface="Calibri" panose="020F0502020204030204" pitchFamily="34" charset="0"/>
+              </a:rPr>
+              <a:t>NewEgg</a:t>
+            </a:r>
+            <a:r>
+              <a:rPr lang="en-US" sz="1200" dirty="0">
+                <a:solidFill>
+                  <a:schemeClr val="bg1"/>
+                </a:solidFill>
+                <a:latin typeface="Calibri" panose="020F0502020204030204" pitchFamily="34" charset="0"/>
+                <a:ea typeface="Calibri" panose="020F0502020204030204" pitchFamily="34" charset="0"/>
+                <a:cs typeface="Calibri" panose="020F0502020204030204" pitchFamily="34" charset="0"/>
+              </a:rPr>
+              <a:t>.</a:t>
+            </a:r>
+            <a:endParaRPr lang="en-US" dirty="0"/>
+          </a:p>
+        </p:txBody>
+      </p:sp>
+      <p:sp>
+        <p:nvSpPr>
+          <p:cNvPr id="4" name="Slide Number Placeholder 3"/>
+          <p:cNvSpPr>
+            <a:spLocks noGrp="1"/>
+          </p:cNvSpPr>
+          <p:nvPr>
+            <p:ph type="sldNum" sz="quarter" idx="5"/>
+          </p:nvPr>
+        </p:nvSpPr>
+        <p:spPr/>
+        <p:txBody>
+          <a:bodyPr/>
+          <a:lstStyle/>
+          <a:p>
+            <a:fld id="{C9C917E0-CCBB-49B5-B446-AD956E2D61E5}" type="slidenum">
+              <a:rPr lang="en-US" smtClean="0"/>
+              <a:t>5</a:t>
+            </a:fld>
+            <a:endParaRPr lang="en-US"/>
+          </a:p>
+        </p:txBody>
+      </p:sp>
+    </p:spTree>
+    <p:extLst>
+      <p:ext uri="{BB962C8B-B14F-4D97-AF65-F5344CB8AC3E}">
+        <p14:creationId xmlns:p14="http://schemas.microsoft.com/office/powerpoint/2010/main" val="137955928"/>
+      </p:ext>
+    </p:extLst>
+  </p:cSld>
+  <p:clrMapOvr>
+    <a:masterClrMapping/>
+  </p:clrMapOvr>
+</p:notes>
+</file>
+
+<file path=ppt/notesSlides/notesSlide6.xml><?xml version="1.0" encoding="utf-8"?>
+<p:notes xmlns:a="http://schemas.openxmlformats.org/drawingml/2006/main" xmlns:r="http://schemas.openxmlformats.org/officeDocument/2006/relationships" xmlns:p="http://schemas.openxmlformats.org/presentationml/2006/main">
+  <p:cSld>
+    <p:spTree>
+      <p:nvGrpSpPr>
+        <p:cNvPr id="1" name=""/>
+        <p:cNvGrpSpPr/>
+        <p:nvPr/>
+      </p:nvGrpSpPr>
+      <p:grpSpPr>
+        <a:xfrm>
+          <a:off x="0" y="0"/>
+          <a:ext cx="0" cy="0"/>
+          <a:chOff x="0" y="0"/>
+          <a:chExt cx="0" cy="0"/>
+        </a:xfrm>
+      </p:grpSpPr>
+      <p:sp>
+        <p:nvSpPr>
+          <p:cNvPr id="2" name="Slide Image Placeholder 1"/>
+          <p:cNvSpPr>
+            <a:spLocks noGrp="1" noRot="1" noChangeAspect="1"/>
+          </p:cNvSpPr>
+          <p:nvPr>
+            <p:ph type="sldImg"/>
+          </p:nvPr>
+        </p:nvSpPr>
+        <p:spPr/>
+      </p:sp>
+      <p:sp>
+        <p:nvSpPr>
+          <p:cNvPr id="3" name="Notes Placeholder 2"/>
+          <p:cNvSpPr>
+            <a:spLocks noGrp="1"/>
+          </p:cNvSpPr>
+          <p:nvPr>
+            <p:ph type="body" idx="1"/>
+          </p:nvPr>
+        </p:nvSpPr>
+        <p:spPr/>
+        <p:txBody>
+          <a:bodyPr/>
+          <a:lstStyle/>
+          <a:p>
+            <a:pPr marL="0" marR="0" lvl="0" indent="0" algn="l" defTabSz="914400" rtl="0" eaLnBrk="1" fontAlgn="auto" latinLnBrk="0" hangingPunct="1">
+              <a:lnSpc>
+                <a:spcPct val="100000"/>
+              </a:lnSpc>
+              <a:spcBef>
+                <a:spcPts val="0"/>
+              </a:spcBef>
+              <a:spcAft>
+                <a:spcPts val="0"/>
+              </a:spcAft>
+              <a:buClrTx/>
+              <a:buSzTx/>
+              <a:buFontTx/>
+              <a:buNone/>
+              <a:tabLst/>
+              <a:defRPr/>
+            </a:pPr>
+            <a:r>
+              <a:rPr lang="en-US" sz="1200" dirty="0">
+                <a:solidFill>
+                  <a:schemeClr val="bg1"/>
+                </a:solidFill>
+                <a:latin typeface="Calibri" panose="020F0502020204030204" pitchFamily="34" charset="0"/>
+                <a:ea typeface="Calibri" panose="020F0502020204030204" pitchFamily="34" charset="0"/>
+                <a:cs typeface="Calibri" panose="020F0502020204030204" pitchFamily="34" charset="0"/>
+              </a:rPr>
+              <a:t>	The Processor I chose is an AMD Ryzen 7 5800x which has 8 cores and 16 threads running at 3.8GHz, with a 4.7GHz boost. This processor is powerful enough to run the programs that I use without issue and should be a decent CPU for at least 5 years. The Ryzen 7 5800x is available at </a:t>
+            </a:r>
+            <a:r>
+              <a:rPr lang="en-US" sz="1200" dirty="0" err="1">
+                <a:solidFill>
+                  <a:schemeClr val="bg1"/>
+                </a:solidFill>
+                <a:latin typeface="Calibri" panose="020F0502020204030204" pitchFamily="34" charset="0"/>
+                <a:ea typeface="Calibri" panose="020F0502020204030204" pitchFamily="34" charset="0"/>
+                <a:cs typeface="Calibri" panose="020F0502020204030204" pitchFamily="34" charset="0"/>
+              </a:rPr>
+              <a:t>NewEgg</a:t>
+            </a:r>
+            <a:r>
+              <a:rPr lang="en-US" sz="1200" dirty="0">
+                <a:solidFill>
+                  <a:schemeClr val="bg1"/>
+                </a:solidFill>
+                <a:latin typeface="Calibri" panose="020F0502020204030204" pitchFamily="34" charset="0"/>
+                <a:ea typeface="Calibri" panose="020F0502020204030204" pitchFamily="34" charset="0"/>
+                <a:cs typeface="Calibri" panose="020F0502020204030204" pitchFamily="34" charset="0"/>
+              </a:rPr>
+              <a:t> for $248.00 making it a superb value.</a:t>
+            </a:r>
+          </a:p>
+          <a:p>
+            <a:endParaRPr lang="en-US" dirty="0"/>
+          </a:p>
+        </p:txBody>
+      </p:sp>
+      <p:sp>
+        <p:nvSpPr>
+          <p:cNvPr id="4" name="Slide Number Placeholder 3"/>
+          <p:cNvSpPr>
+            <a:spLocks noGrp="1"/>
+          </p:cNvSpPr>
+          <p:nvPr>
+            <p:ph type="sldNum" sz="quarter" idx="5"/>
+          </p:nvPr>
+        </p:nvSpPr>
+        <p:spPr/>
+        <p:txBody>
+          <a:bodyPr/>
+          <a:lstStyle/>
+          <a:p>
+            <a:fld id="{C9C917E0-CCBB-49B5-B446-AD956E2D61E5}" type="slidenum">
+              <a:rPr lang="en-US" smtClean="0"/>
+              <a:t>6</a:t>
+            </a:fld>
+            <a:endParaRPr lang="en-US"/>
+          </a:p>
+        </p:txBody>
+      </p:sp>
+    </p:spTree>
+    <p:extLst>
+      <p:ext uri="{BB962C8B-B14F-4D97-AF65-F5344CB8AC3E}">
+        <p14:creationId xmlns:p14="http://schemas.microsoft.com/office/powerpoint/2010/main" val="2851995928"/>
+      </p:ext>
+    </p:extLst>
+  </p:cSld>
+  <p:clrMapOvr>
+    <a:masterClrMapping/>
+  </p:clrMapOvr>
+</p:notes>
+</file>
+
+<file path=ppt/notesSlides/notesSlide7.xml><?xml version="1.0" encoding="utf-8"?>
+<p:notes xmlns:a="http://schemas.openxmlformats.org/drawingml/2006/main" xmlns:r="http://schemas.openxmlformats.org/officeDocument/2006/relationships" xmlns:p="http://schemas.openxmlformats.org/presentationml/2006/main">
+  <p:cSld>
+    <p:spTree>
+      <p:nvGrpSpPr>
+        <p:cNvPr id="1" name=""/>
+        <p:cNvGrpSpPr/>
+        <p:nvPr/>
+      </p:nvGrpSpPr>
+      <p:grpSpPr>
+        <a:xfrm>
+          <a:off x="0" y="0"/>
+          <a:ext cx="0" cy="0"/>
+          <a:chOff x="0" y="0"/>
+          <a:chExt cx="0" cy="0"/>
+        </a:xfrm>
+      </p:grpSpPr>
+      <p:sp>
+        <p:nvSpPr>
+          <p:cNvPr id="2" name="Slide Image Placeholder 1"/>
+          <p:cNvSpPr>
+            <a:spLocks noGrp="1" noRot="1" noChangeAspect="1"/>
+          </p:cNvSpPr>
+          <p:nvPr>
+            <p:ph type="sldImg"/>
+          </p:nvPr>
+        </p:nvSpPr>
+        <p:spPr/>
+      </p:sp>
+      <p:sp>
+        <p:nvSpPr>
+          <p:cNvPr id="3" name="Notes Placeholder 2"/>
+          <p:cNvSpPr>
+            <a:spLocks noGrp="1"/>
+          </p:cNvSpPr>
+          <p:nvPr>
+            <p:ph type="body" idx="1"/>
+          </p:nvPr>
+        </p:nvSpPr>
+        <p:spPr/>
+        <p:txBody>
+          <a:bodyPr/>
+          <a:lstStyle/>
+          <a:p>
+            <a:pPr marL="0" marR="0" lvl="0" indent="0" algn="l" defTabSz="914400" rtl="0" eaLnBrk="1" fontAlgn="auto" latinLnBrk="0" hangingPunct="1">
+              <a:lnSpc>
+                <a:spcPct val="100000"/>
+              </a:lnSpc>
+              <a:spcBef>
+                <a:spcPts val="0"/>
+              </a:spcBef>
+              <a:spcAft>
+                <a:spcPts val="0"/>
+              </a:spcAft>
+              <a:buClrTx/>
+              <a:buSzTx/>
+              <a:buFontTx/>
+              <a:buNone/>
+              <a:tabLst/>
+              <a:defRPr/>
+            </a:pPr>
+            <a:r>
+              <a:rPr lang="en-US" sz="1200" dirty="0">
+                <a:solidFill>
+                  <a:schemeClr val="bg1"/>
+                </a:solidFill>
+                <a:latin typeface="Calibri" panose="020F0502020204030204" pitchFamily="34" charset="0"/>
+                <a:ea typeface="Calibri" panose="020F0502020204030204" pitchFamily="34" charset="0"/>
+                <a:cs typeface="Calibri" panose="020F0502020204030204" pitchFamily="34" charset="0"/>
+              </a:rPr>
+              <a:t>	My system will contain 32GB of </a:t>
+            </a:r>
+            <a:r>
+              <a:rPr lang="en-US" sz="1200" dirty="0" err="1">
+                <a:solidFill>
+                  <a:schemeClr val="bg1"/>
+                </a:solidFill>
+                <a:latin typeface="Calibri" panose="020F0502020204030204" pitchFamily="34" charset="0"/>
+                <a:ea typeface="Calibri" panose="020F0502020204030204" pitchFamily="34" charset="0"/>
+                <a:cs typeface="Calibri" panose="020F0502020204030204" pitchFamily="34" charset="0"/>
+              </a:rPr>
+              <a:t>G.Skill</a:t>
+            </a:r>
+            <a:r>
+              <a:rPr lang="en-US" sz="1200" dirty="0">
+                <a:solidFill>
+                  <a:schemeClr val="bg1"/>
+                </a:solidFill>
+                <a:latin typeface="Calibri" panose="020F0502020204030204" pitchFamily="34" charset="0"/>
+                <a:ea typeface="Calibri" panose="020F0502020204030204" pitchFamily="34" charset="0"/>
+                <a:cs typeface="Calibri" panose="020F0502020204030204" pitchFamily="34" charset="0"/>
+              </a:rPr>
+              <a:t>  </a:t>
+            </a:r>
+            <a:r>
+              <a:rPr lang="en-US" sz="1200" dirty="0" err="1">
+                <a:solidFill>
+                  <a:schemeClr val="bg1"/>
+                </a:solidFill>
+                <a:latin typeface="Calibri" panose="020F0502020204030204" pitchFamily="34" charset="0"/>
+                <a:ea typeface="Calibri" panose="020F0502020204030204" pitchFamily="34" charset="0"/>
+                <a:cs typeface="Calibri" panose="020F0502020204030204" pitchFamily="34" charset="0"/>
+              </a:rPr>
+              <a:t>Ripjaw</a:t>
+            </a:r>
+            <a:r>
+              <a:rPr lang="en-US" sz="1200" dirty="0">
+                <a:solidFill>
+                  <a:schemeClr val="bg1"/>
+                </a:solidFill>
+                <a:latin typeface="Calibri" panose="020F0502020204030204" pitchFamily="34" charset="0"/>
+                <a:ea typeface="Calibri" panose="020F0502020204030204" pitchFamily="34" charset="0"/>
+                <a:cs typeface="Calibri" panose="020F0502020204030204" pitchFamily="34" charset="0"/>
+              </a:rPr>
+              <a:t> V series DDR4 3200 RAM. The motherboard supports up to 128GB, so I can easily add more RAM in the future and easily have 64 or 96GB without replacing these modules. The </a:t>
+            </a:r>
+            <a:r>
+              <a:rPr lang="en-US" sz="1200" dirty="0" err="1">
+                <a:solidFill>
+                  <a:schemeClr val="bg1"/>
+                </a:solidFill>
+                <a:latin typeface="Calibri" panose="020F0502020204030204" pitchFamily="34" charset="0"/>
+                <a:ea typeface="Calibri" panose="020F0502020204030204" pitchFamily="34" charset="0"/>
+                <a:cs typeface="Calibri" panose="020F0502020204030204" pitchFamily="34" charset="0"/>
+              </a:rPr>
+              <a:t>G.Skill</a:t>
+            </a:r>
+            <a:r>
+              <a:rPr lang="en-US" sz="1200" dirty="0">
+                <a:solidFill>
+                  <a:schemeClr val="bg1"/>
+                </a:solidFill>
+                <a:latin typeface="Calibri" panose="020F0502020204030204" pitchFamily="34" charset="0"/>
+                <a:ea typeface="Calibri" panose="020F0502020204030204" pitchFamily="34" charset="0"/>
+                <a:cs typeface="Calibri" panose="020F0502020204030204" pitchFamily="34" charset="0"/>
+              </a:rPr>
+              <a:t> is a ridiculously low $89.78 currently, at </a:t>
+            </a:r>
+            <a:r>
+              <a:rPr lang="en-US" sz="1200" dirty="0" err="1">
+                <a:solidFill>
+                  <a:schemeClr val="bg1"/>
+                </a:solidFill>
+                <a:latin typeface="Calibri" panose="020F0502020204030204" pitchFamily="34" charset="0"/>
+                <a:ea typeface="Calibri" panose="020F0502020204030204" pitchFamily="34" charset="0"/>
+                <a:cs typeface="Calibri" panose="020F0502020204030204" pitchFamily="34" charset="0"/>
+              </a:rPr>
+              <a:t>NewEgg</a:t>
+            </a:r>
+            <a:r>
+              <a:rPr lang="en-US" sz="1200" dirty="0">
+                <a:solidFill>
+                  <a:schemeClr val="bg1"/>
+                </a:solidFill>
+                <a:latin typeface="Calibri" panose="020F0502020204030204" pitchFamily="34" charset="0"/>
+                <a:ea typeface="Calibri" panose="020F0502020204030204" pitchFamily="34" charset="0"/>
+                <a:cs typeface="Calibri" panose="020F0502020204030204" pitchFamily="34" charset="0"/>
+              </a:rPr>
+              <a:t>.</a:t>
+            </a:r>
+          </a:p>
+        </p:txBody>
+      </p:sp>
+      <p:sp>
+        <p:nvSpPr>
+          <p:cNvPr id="4" name="Slide Number Placeholder 3"/>
+          <p:cNvSpPr>
+            <a:spLocks noGrp="1"/>
+          </p:cNvSpPr>
+          <p:nvPr>
+            <p:ph type="sldNum" sz="quarter" idx="5"/>
+          </p:nvPr>
+        </p:nvSpPr>
+        <p:spPr/>
+        <p:txBody>
+          <a:bodyPr/>
+          <a:lstStyle/>
+          <a:p>
+            <a:fld id="{C9C917E0-CCBB-49B5-B446-AD956E2D61E5}" type="slidenum">
+              <a:rPr lang="en-US" smtClean="0"/>
+              <a:t>7</a:t>
+            </a:fld>
+            <a:endParaRPr lang="en-US"/>
+          </a:p>
+        </p:txBody>
+      </p:sp>
+    </p:spTree>
+    <p:extLst>
+      <p:ext uri="{BB962C8B-B14F-4D97-AF65-F5344CB8AC3E}">
+        <p14:creationId xmlns:p14="http://schemas.microsoft.com/office/powerpoint/2010/main" val="3602691291"/>
+      </p:ext>
+    </p:extLst>
+  </p:cSld>
+  <p:clrMapOvr>
+    <a:masterClrMapping/>
+  </p:clrMapOvr>
+</p:notes>
+</file>
+
+<file path=ppt/notesSlides/notesSlide8.xml><?xml version="1.0" encoding="utf-8"?>
+<p:notes xmlns:a="http://schemas.openxmlformats.org/drawingml/2006/main" xmlns:r="http://schemas.openxmlformats.org/officeDocument/2006/relationships" xmlns:p="http://schemas.openxmlformats.org/presentationml/2006/main">
+  <p:cSld>
+    <p:spTree>
+      <p:nvGrpSpPr>
+        <p:cNvPr id="1" name=""/>
+        <p:cNvGrpSpPr/>
+        <p:nvPr/>
+      </p:nvGrpSpPr>
+      <p:grpSpPr>
+        <a:xfrm>
+          <a:off x="0" y="0"/>
+          <a:ext cx="0" cy="0"/>
+          <a:chOff x="0" y="0"/>
+          <a:chExt cx="0" cy="0"/>
+        </a:xfrm>
+      </p:grpSpPr>
+      <p:sp>
+        <p:nvSpPr>
+          <p:cNvPr id="2" name="Slide Image Placeholder 1"/>
+          <p:cNvSpPr>
+            <a:spLocks noGrp="1" noRot="1" noChangeAspect="1"/>
+          </p:cNvSpPr>
+          <p:nvPr>
+            <p:ph type="sldImg"/>
+          </p:nvPr>
+        </p:nvSpPr>
+        <p:spPr/>
+      </p:sp>
+      <p:sp>
+        <p:nvSpPr>
+          <p:cNvPr id="3" name="Notes Placeholder 2"/>
+          <p:cNvSpPr>
+            <a:spLocks noGrp="1"/>
+          </p:cNvSpPr>
+          <p:nvPr>
+            <p:ph type="body" idx="1"/>
+          </p:nvPr>
+        </p:nvSpPr>
+        <p:spPr/>
+        <p:txBody>
+          <a:bodyPr/>
+          <a:lstStyle/>
+          <a:p>
+            <a:pPr marL="0" marR="0" lvl="0" indent="0" algn="l" defTabSz="914400" rtl="0" eaLnBrk="1" fontAlgn="auto" latinLnBrk="0" hangingPunct="1">
+              <a:lnSpc>
+                <a:spcPct val="100000"/>
+              </a:lnSpc>
+              <a:spcBef>
+                <a:spcPts val="0"/>
+              </a:spcBef>
+              <a:spcAft>
+                <a:spcPts val="0"/>
+              </a:spcAft>
+              <a:buClrTx/>
+              <a:buSzTx/>
+              <a:buFontTx/>
+              <a:buNone/>
+              <a:tabLst/>
+              <a:defRPr/>
+            </a:pPr>
+            <a:r>
+              <a:rPr lang="en-US" sz="1200" dirty="0">
+                <a:solidFill>
+                  <a:schemeClr val="bg1"/>
+                </a:solidFill>
+                <a:latin typeface="Calibri" panose="020F0502020204030204" pitchFamily="34" charset="0"/>
+                <a:ea typeface="Calibri" panose="020F0502020204030204" pitchFamily="34" charset="0"/>
+                <a:cs typeface="Calibri" panose="020F0502020204030204" pitchFamily="34" charset="0"/>
+              </a:rPr>
+              <a:t>	AMD Processors tend to run hot, so I will get a decent CPU cooler. I will not spend extra for liquid cooling. I chose a Cooler Master Hyper 212, with no RGB, which saves a few dollars. </a:t>
+            </a:r>
+            <a:endParaRPr lang="en-US" dirty="0"/>
+          </a:p>
+        </p:txBody>
+      </p:sp>
+      <p:sp>
+        <p:nvSpPr>
+          <p:cNvPr id="4" name="Slide Number Placeholder 3"/>
+          <p:cNvSpPr>
+            <a:spLocks noGrp="1"/>
+          </p:cNvSpPr>
+          <p:nvPr>
+            <p:ph type="sldNum" sz="quarter" idx="5"/>
+          </p:nvPr>
+        </p:nvSpPr>
+        <p:spPr/>
+        <p:txBody>
+          <a:bodyPr/>
+          <a:lstStyle/>
+          <a:p>
+            <a:fld id="{C9C917E0-CCBB-49B5-B446-AD956E2D61E5}" type="slidenum">
+              <a:rPr lang="en-US" smtClean="0"/>
+              <a:t>8</a:t>
+            </a:fld>
+            <a:endParaRPr lang="en-US"/>
+          </a:p>
+        </p:txBody>
+      </p:sp>
+    </p:spTree>
+    <p:extLst>
+      <p:ext uri="{BB962C8B-B14F-4D97-AF65-F5344CB8AC3E}">
+        <p14:creationId xmlns:p14="http://schemas.microsoft.com/office/powerpoint/2010/main" val="1831636822"/>
+      </p:ext>
+    </p:extLst>
+  </p:cSld>
+  <p:clrMapOvr>
+    <a:masterClrMapping/>
+  </p:clrMapOvr>
+</p:notes>
+</file>
+
+<file path=ppt/notesSlides/notesSlide9.xml><?xml version="1.0" encoding="utf-8"?>
+<p:notes xmlns:a="http://schemas.openxmlformats.org/drawingml/2006/main" xmlns:r="http://schemas.openxmlformats.org/officeDocument/2006/relationships" xmlns:p="http://schemas.openxmlformats.org/presentationml/2006/main">
+  <p:cSld>
+    <p:spTree>
+      <p:nvGrpSpPr>
+        <p:cNvPr id="1" name=""/>
+        <p:cNvGrpSpPr/>
+        <p:nvPr/>
+      </p:nvGrpSpPr>
+      <p:grpSpPr>
+        <a:xfrm>
+          <a:off x="0" y="0"/>
+          <a:ext cx="0" cy="0"/>
+          <a:chOff x="0" y="0"/>
+          <a:chExt cx="0" cy="0"/>
+        </a:xfrm>
+      </p:grpSpPr>
+      <p:sp>
+        <p:nvSpPr>
+          <p:cNvPr id="2" name="Slide Image Placeholder 1"/>
+          <p:cNvSpPr>
+            <a:spLocks noGrp="1" noRot="1" noChangeAspect="1"/>
+          </p:cNvSpPr>
+          <p:nvPr>
+            <p:ph type="sldImg"/>
+          </p:nvPr>
+        </p:nvSpPr>
+        <p:spPr/>
+      </p:sp>
+      <p:sp>
+        <p:nvSpPr>
+          <p:cNvPr id="3" name="Notes Placeholder 2"/>
+          <p:cNvSpPr>
+            <a:spLocks noGrp="1"/>
+          </p:cNvSpPr>
+          <p:nvPr>
+            <p:ph type="body" idx="1"/>
+          </p:nvPr>
+        </p:nvSpPr>
+        <p:spPr/>
+        <p:txBody>
+          <a:bodyPr/>
+          <a:lstStyle/>
+          <a:p>
+            <a:pPr marL="0" marR="0" lvl="0" indent="0" algn="l" defTabSz="914400" rtl="0" eaLnBrk="1" fontAlgn="auto" latinLnBrk="0" hangingPunct="1">
+              <a:lnSpc>
+                <a:spcPct val="100000"/>
+              </a:lnSpc>
+              <a:spcBef>
+                <a:spcPts val="0"/>
+              </a:spcBef>
+              <a:spcAft>
+                <a:spcPts val="0"/>
+              </a:spcAft>
+              <a:buClrTx/>
+              <a:buSzTx/>
+              <a:buFontTx/>
+              <a:buNone/>
+              <a:tabLst/>
+              <a:defRPr/>
+            </a:pPr>
+            <a:r>
+              <a:rPr lang="en-US" sz="1200" dirty="0">
+                <a:solidFill>
+                  <a:schemeClr val="bg1"/>
+                </a:solidFill>
+                <a:latin typeface="Calibri" panose="020F0502020204030204" pitchFamily="34" charset="0"/>
+                <a:ea typeface="Calibri" panose="020F0502020204030204" pitchFamily="34" charset="0"/>
+                <a:cs typeface="Calibri" panose="020F0502020204030204" pitchFamily="34" charset="0"/>
+              </a:rPr>
+              <a:t>	The system will be powered by a Corsair RM850, which produces 850 Watts of power. I want a powerful PSU for the computer so that it will have ample energy to run any powered peripheral devices. The cooler costs $54.99 and the PSU runs $149.99, both at </a:t>
+            </a:r>
+            <a:r>
+              <a:rPr lang="en-US" sz="1200" dirty="0" err="1">
+                <a:solidFill>
+                  <a:schemeClr val="bg1"/>
+                </a:solidFill>
+                <a:latin typeface="Calibri" panose="020F0502020204030204" pitchFamily="34" charset="0"/>
+                <a:ea typeface="Calibri" panose="020F0502020204030204" pitchFamily="34" charset="0"/>
+                <a:cs typeface="Calibri" panose="020F0502020204030204" pitchFamily="34" charset="0"/>
+              </a:rPr>
+              <a:t>NewEgg</a:t>
+            </a:r>
+            <a:r>
+              <a:rPr lang="en-US" sz="1200" dirty="0">
+                <a:solidFill>
+                  <a:schemeClr val="bg1"/>
+                </a:solidFill>
+                <a:latin typeface="Calibri" panose="020F0502020204030204" pitchFamily="34" charset="0"/>
+                <a:ea typeface="Calibri" panose="020F0502020204030204" pitchFamily="34" charset="0"/>
+                <a:cs typeface="Calibri" panose="020F0502020204030204" pitchFamily="34" charset="0"/>
+              </a:rPr>
+              <a:t>.</a:t>
+            </a:r>
+          </a:p>
+        </p:txBody>
+      </p:sp>
+      <p:sp>
+        <p:nvSpPr>
+          <p:cNvPr id="4" name="Slide Number Placeholder 3"/>
+          <p:cNvSpPr>
+            <a:spLocks noGrp="1"/>
+          </p:cNvSpPr>
+          <p:nvPr>
+            <p:ph type="sldNum" sz="quarter" idx="5"/>
+          </p:nvPr>
+        </p:nvSpPr>
+        <p:spPr/>
+        <p:txBody>
+          <a:bodyPr/>
+          <a:lstStyle/>
+          <a:p>
+            <a:fld id="{C9C917E0-CCBB-49B5-B446-AD956E2D61E5}" type="slidenum">
+              <a:rPr lang="en-US" smtClean="0"/>
+              <a:t>9</a:t>
+            </a:fld>
+            <a:endParaRPr lang="en-US"/>
+          </a:p>
+        </p:txBody>
+      </p:sp>
+    </p:spTree>
+    <p:extLst>
+      <p:ext uri="{BB962C8B-B14F-4D97-AF65-F5344CB8AC3E}">
+        <p14:creationId xmlns:p14="http://schemas.microsoft.com/office/powerpoint/2010/main" val="3184989604"/>
+      </p:ext>
+    </p:extLst>
+  </p:cSld>
+  <p:clrMapOvr>
+    <a:masterClrMapping/>
+  </p:clrMapOvr>
+</p:notes>
 </file>
 
 <file path=ppt/slideLayouts/slideLayout1.xml><?xml version="1.0" encoding="utf-8"?>
@@ -16962,18 +19287,6 @@
   <p:clrMapOvr>
     <a:masterClrMapping/>
   </p:clrMapOvr>
-  <mc:AlternateContent xmlns:mc="http://schemas.openxmlformats.org/markup-compatibility/2006" xmlns:p14="http://schemas.microsoft.com/office/powerpoint/2010/main">
-    <mc:Choice Requires="p14">
-      <p:transition spd="med" p14:dur="700">
-        <p:fade/>
-      </p:transition>
-    </mc:Choice>
-    <mc:Fallback xmlns="" xmlns:p15="http://schemas.microsoft.com/office/powerpoint/2012/main">
-      <p:transition spd="med">
-        <p:fade/>
-      </p:transition>
-    </mc:Fallback>
-  </mc:AlternateContent>
 </p:sld>
 </file>
 
@@ -17290,7 +19603,7 @@
           <p:nvPr/>
         </p:nvPicPr>
         <p:blipFill>
-          <a:blip r:embed="rId2"/>
+          <a:blip r:embed="rId3"/>
           <a:srcRect l="4024" r="1383"/>
           <a:stretch/>
         </p:blipFill>
@@ -17312,18 +19625,9 @@
   <p:clrMapOvr>
     <a:masterClrMapping/>
   </p:clrMapOvr>
-  <mc:AlternateContent xmlns:mc="http://schemas.openxmlformats.org/markup-compatibility/2006" xmlns:p14="http://schemas.microsoft.com/office/powerpoint/2010/main">
-    <mc:Choice Requires="p14">
-      <p:transition spd="med" p14:dur="700">
-        <p:fade/>
-      </p:transition>
-    </mc:Choice>
-    <mc:Fallback xmlns="" xmlns:p15="http://schemas.microsoft.com/office/powerpoint/2012/main">
-      <p:transition spd="med">
-        <p:fade/>
-      </p:transition>
-    </mc:Fallback>
-  </mc:AlternateContent>
+  <p:transition spd="slow">
+    <p:wipe/>
+  </p:transition>
 </p:sld>
 </file>
 
@@ -17468,7 +19772,7 @@
           <p:nvPr/>
         </p:nvPicPr>
         <p:blipFill>
-          <a:blip r:embed="rId2"/>
+          <a:blip r:embed="rId3"/>
           <a:srcRect l="2777" r="2777"/>
           <a:stretch/>
         </p:blipFill>
@@ -17753,18 +20057,9 @@
   <p:clrMapOvr>
     <a:masterClrMapping/>
   </p:clrMapOvr>
-  <mc:AlternateContent xmlns:mc="http://schemas.openxmlformats.org/markup-compatibility/2006" xmlns:p14="http://schemas.microsoft.com/office/powerpoint/2010/main">
-    <mc:Choice Requires="p14">
-      <p:transition spd="med" p14:dur="700">
-        <p:fade/>
-      </p:transition>
-    </mc:Choice>
-    <mc:Fallback xmlns="" xmlns:p15="http://schemas.microsoft.com/office/powerpoint/2012/main">
-      <p:transition spd="med">
-        <p:fade/>
-      </p:transition>
-    </mc:Fallback>
-  </mc:AlternateContent>
+  <p:transition spd="slow">
+    <p:push dir="u"/>
+  </p:transition>
 </p:sld>
 </file>
 
@@ -18037,7 +20332,7 @@
           <p:nvPr/>
         </p:nvPicPr>
         <p:blipFill>
-          <a:blip r:embed="rId2"/>
+          <a:blip r:embed="rId3"/>
           <a:srcRect t="18710" b="18710"/>
           <a:stretch/>
         </p:blipFill>
@@ -18059,14 +20354,14 @@
   <p:clrMapOvr>
     <a:masterClrMapping/>
   </p:clrMapOvr>
-  <mc:AlternateContent xmlns:mc="http://schemas.openxmlformats.org/markup-compatibility/2006" xmlns:p14="http://schemas.microsoft.com/office/powerpoint/2010/main">
-    <mc:Choice Requires="p14">
-      <p:transition spd="med" p14:dur="700">
-        <p:fade/>
+  <mc:AlternateContent xmlns:mc="http://schemas.openxmlformats.org/markup-compatibility/2006">
+    <mc:Choice xmlns:p159="http://schemas.microsoft.com/office/powerpoint/2015/09/main" Requires="p159">
+      <p:transition xmlns:p14="http://schemas.microsoft.com/office/powerpoint/2010/main" spd="slow" p14:dur="2000">
+        <p159:morph option="byObject"/>
       </p:transition>
     </mc:Choice>
-    <mc:Fallback xmlns="" xmlns:p15="http://schemas.microsoft.com/office/powerpoint/2012/main">
-      <p:transition spd="med">
+    <mc:Fallback>
+      <p:transition spd="slow">
         <p:fade/>
       </p:transition>
     </mc:Fallback>
@@ -18472,7 +20767,7 @@
           <p:nvPr/>
         </p:nvPicPr>
         <p:blipFill>
-          <a:blip r:embed="rId2"/>
+          <a:blip r:embed="rId3"/>
           <a:stretch/>
         </p:blipFill>
         <p:spPr>
@@ -18500,15 +20795,15 @@
   <p:clrMapOvr>
     <a:masterClrMapping/>
   </p:clrMapOvr>
-  <mc:AlternateContent xmlns:mc="http://schemas.openxmlformats.org/markup-compatibility/2006" xmlns:p14="http://schemas.microsoft.com/office/powerpoint/2010/main">
-    <mc:Choice Requires="p14">
-      <p:transition spd="med" p14:dur="700">
-        <p:fade/>
+  <mc:AlternateContent xmlns:mc="http://schemas.openxmlformats.org/markup-compatibility/2006">
+    <mc:Choice xmlns:p14="http://schemas.microsoft.com/office/powerpoint/2010/main" Requires="p14">
+      <p:transition spd="slow" p14:dur="1500">
+        <p:split orient="vert"/>
       </p:transition>
     </mc:Choice>
-    <mc:Fallback xmlns="" xmlns:p15="http://schemas.microsoft.com/office/powerpoint/2012/main">
-      <p:transition spd="med">
-        <p:fade/>
+    <mc:Fallback>
+      <p:transition spd="slow">
+        <p:split orient="vert"/>
       </p:transition>
     </mc:Fallback>
   </mc:AlternateContent>
@@ -18829,7 +21124,7 @@
           <p:nvPr/>
         </p:nvPicPr>
         <p:blipFill>
-          <a:blip r:embed="rId2"/>
+          <a:blip r:embed="rId3"/>
           <a:stretch/>
         </p:blipFill>
         <p:spPr>
@@ -18896,7 +21191,7 @@
                 <a:uFillTx/>
                 <a:latin typeface="Calibri"/>
                 <a:ea typeface="DejaVu Sans"/>
-                <a:hlinkClick r:id="rId3"/>
+                <a:hlinkClick r:id="rId4"/>
               </a:rPr>
               <a:t>This Photo</a:t>
             </a:r>
@@ -18918,7 +21213,7 @@
                 <a:uFillTx/>
                 <a:latin typeface="Calibri"/>
                 <a:ea typeface="DejaVu Sans"/>
-                <a:hlinkClick r:id="rId4"/>
+                <a:hlinkClick r:id="rId5"/>
               </a:rPr>
               <a:t>CC BY-SA-NC</a:t>
             </a:r>
@@ -18935,7 +21230,7 @@
           <p:nvPr/>
         </p:nvPicPr>
         <p:blipFill>
-          <a:blip r:embed="rId5"/>
+          <a:blip r:embed="rId6"/>
           <a:stretch/>
         </p:blipFill>
         <p:spPr>
@@ -18958,7 +21253,7 @@
           <p:nvPr/>
         </p:nvPicPr>
         <p:blipFill>
-          <a:blip r:embed="rId6"/>
+          <a:blip r:embed="rId7"/>
           <a:stretch/>
         </p:blipFill>
         <p:spPr>
@@ -18981,7 +21276,7 @@
           <p:nvPr/>
         </p:nvPicPr>
         <p:blipFill>
-          <a:blip r:embed="rId7"/>
+          <a:blip r:embed="rId8"/>
           <a:stretch/>
         </p:blipFill>
         <p:spPr>
@@ -19004,7 +21299,7 @@
           <p:nvPr/>
         </p:nvPicPr>
         <p:blipFill>
-          <a:blip r:embed="rId8"/>
+          <a:blip r:embed="rId9"/>
           <a:stretch/>
         </p:blipFill>
         <p:spPr>
@@ -19027,7 +21322,7 @@
           <p:nvPr/>
         </p:nvPicPr>
         <p:blipFill>
-          <a:blip r:embed="rId9"/>
+          <a:blip r:embed="rId10"/>
           <a:stretch/>
         </p:blipFill>
         <p:spPr>
@@ -19048,18 +21343,9 @@
   <p:clrMapOvr>
     <a:masterClrMapping/>
   </p:clrMapOvr>
-  <mc:AlternateContent xmlns:mc="http://schemas.openxmlformats.org/markup-compatibility/2006" xmlns:p14="http://schemas.microsoft.com/office/powerpoint/2010/main">
-    <mc:Choice Requires="p14">
-      <p:transition spd="med" p14:dur="700">
-        <p:fade/>
-      </p:transition>
-    </mc:Choice>
-    <mc:Fallback xmlns="" xmlns:p15="http://schemas.microsoft.com/office/powerpoint/2012/main">
-      <p:transition spd="med">
-        <p:fade/>
-      </p:transition>
-    </mc:Fallback>
-  </mc:AlternateContent>
+  <p:transition spd="med">
+    <p:pull/>
+  </p:transition>
 </p:sld>
 </file>
 
@@ -19904,18 +22190,9 @@
   <p:clrMapOvr>
     <a:masterClrMapping/>
   </p:clrMapOvr>
-  <mc:AlternateContent xmlns:mc="http://schemas.openxmlformats.org/markup-compatibility/2006" xmlns:p14="http://schemas.microsoft.com/office/powerpoint/2010/main">
-    <mc:Choice Requires="p14">
-      <p:transition spd="med" p14:dur="700">
-        <p:fade/>
-      </p:transition>
-    </mc:Choice>
-    <mc:Fallback xmlns="" xmlns:p15="http://schemas.microsoft.com/office/powerpoint/2012/main">
-      <p:transition spd="med">
-        <p:fade/>
-      </p:transition>
-    </mc:Fallback>
-  </mc:AlternateContent>
+  <p:transition spd="slow">
+    <p:cover/>
+  </p:transition>
 </p:sld>
 </file>
 
@@ -20244,606 +22521,18 @@
   <p:clrMapOvr>
     <a:masterClrMapping/>
   </p:clrMapOvr>
-  <mc:AlternateContent xmlns:mc="http://schemas.openxmlformats.org/markup-compatibility/2006" xmlns:p14="http://schemas.microsoft.com/office/powerpoint/2010/main">
-    <mc:Choice Requires="p14">
-      <p:transition spd="med" p14:dur="700">
-        <p:fade/>
+  <mc:AlternateContent xmlns:mc="http://schemas.openxmlformats.org/markup-compatibility/2006">
+    <mc:Choice xmlns:p15="http://schemas.microsoft.com/office/powerpoint/2012/main" Requires="p15">
+      <p:transition xmlns:p14="http://schemas.microsoft.com/office/powerpoint/2010/main" spd="slow" p14:dur="2000">
+        <p15:prstTrans prst="fallOver"/>
       </p:transition>
     </mc:Choice>
-    <mc:Fallback xmlns="" xmlns:p15="http://schemas.microsoft.com/office/powerpoint/2012/main">
-      <p:transition spd="med">
+    <mc:Fallback>
+      <p:transition spd="slow">
         <p:fade/>
       </p:transition>
     </mc:Fallback>
   </mc:AlternateContent>
-</p:sld>
-</file>
-
-<file path=ppt/slides/slide17.xml><?xml version="1.0" encoding="utf-8"?>
-<p:sld xmlns:a="http://schemas.openxmlformats.org/drawingml/2006/main" xmlns:r="http://schemas.openxmlformats.org/officeDocument/2006/relationships" xmlns:p="http://schemas.openxmlformats.org/presentationml/2006/main">
-  <p:cSld>
-    <p:spTree>
-      <p:nvGrpSpPr>
-        <p:cNvPr id="1" name=""/>
-        <p:cNvGrpSpPr/>
-        <p:nvPr/>
-      </p:nvGrpSpPr>
-      <p:grpSpPr>
-        <a:xfrm>
-          <a:off x="0" y="0"/>
-          <a:ext cx="0" cy="0"/>
-          <a:chOff x="0" y="0"/>
-          <a:chExt cx="0" cy="0"/>
-        </a:xfrm>
-      </p:grpSpPr>
-      <p:sp>
-        <p:nvSpPr>
-          <p:cNvPr id="2" name="Title 1">
-            <a:extLst>
-              <a:ext uri="{FF2B5EF4-FFF2-40B4-BE49-F238E27FC236}">
-                <a16:creationId xmlns:a16="http://schemas.microsoft.com/office/drawing/2014/main" id="{DD0C68E0-D4E2-3E1B-3F08-445E16404B80}"/>
-              </a:ext>
-            </a:extLst>
-          </p:cNvPr>
-          <p:cNvSpPr>
-            <a:spLocks noGrp="1"/>
-          </p:cNvSpPr>
-          <p:nvPr>
-            <p:ph type="title"/>
-          </p:nvPr>
-        </p:nvSpPr>
-        <p:spPr>
-          <a:xfrm>
-            <a:off x="969810" y="113736"/>
-            <a:ext cx="4951562" cy="582392"/>
-          </a:xfrm>
-        </p:spPr>
-        <p:txBody>
-          <a:bodyPr/>
-          <a:lstStyle/>
-          <a:p>
-            <a:r>
-              <a:rPr lang="en-US" dirty="0">
-                <a:solidFill>
-                  <a:schemeClr val="accent1"/>
-                </a:solidFill>
-              </a:rPr>
-              <a:t>PC Build Project:</a:t>
-            </a:r>
-          </a:p>
-        </p:txBody>
-      </p:sp>
-      <p:sp>
-        <p:nvSpPr>
-          <p:cNvPr id="3" name="Content Placeholder 2">
-            <a:extLst>
-              <a:ext uri="{FF2B5EF4-FFF2-40B4-BE49-F238E27FC236}">
-                <a16:creationId xmlns:a16="http://schemas.microsoft.com/office/drawing/2014/main" id="{B1950E4F-5AA7-8FEA-1906-D7326E95BD93}"/>
-              </a:ext>
-            </a:extLst>
-          </p:cNvPr>
-          <p:cNvSpPr>
-            <a:spLocks noGrp="1"/>
-          </p:cNvSpPr>
-          <p:nvPr>
-            <p:ph/>
-          </p:nvPr>
-        </p:nvSpPr>
-        <p:spPr>
-          <a:xfrm>
-            <a:off x="146649" y="696128"/>
-            <a:ext cx="11576649" cy="5612308"/>
-          </a:xfrm>
-        </p:spPr>
-        <p:txBody>
-          <a:bodyPr>
-            <a:noAutofit/>
-          </a:bodyPr>
-          <a:lstStyle/>
-          <a:p>
-            <a:pPr marL="0" indent="0">
-              <a:spcBef>
-                <a:spcPts val="400"/>
-              </a:spcBef>
-              <a:buNone/>
-            </a:pPr>
-            <a:r>
-              <a:rPr lang="en-US" sz="1100" dirty="0">
-                <a:solidFill>
-                  <a:schemeClr val="bg1"/>
-                </a:solidFill>
-                <a:latin typeface="Calibri" panose="020F0502020204030204" pitchFamily="34" charset="0"/>
-                <a:ea typeface="Calibri" panose="020F0502020204030204" pitchFamily="34" charset="0"/>
-                <a:cs typeface="Calibri" panose="020F0502020204030204" pitchFamily="34" charset="0"/>
-              </a:rPr>
-              <a:t>	I want to build a multi-core computer to use for school, office tasks, virtualization, digital art, personal entertainment, and gaming. I will create a machine that is faster than my current computer, which is an AMD Ryzen 5 2600 with 6 cores operating at 3.4GHz with 16GB of Ram. I do have a spare monitor and some keyboards and mice already, so I can save some money by building only the PC tower. I do not want to spend more than $1200 on the system.  I am not interested in RGB lights in my system, so I can save some money by purchasing parts based on performance value, not looks. </a:t>
-            </a:r>
-          </a:p>
-          <a:p>
-            <a:pPr marL="0" indent="0">
-              <a:spcBef>
-                <a:spcPts val="400"/>
-              </a:spcBef>
-              <a:buNone/>
-            </a:pPr>
-            <a:r>
-              <a:rPr lang="en-US" sz="1100" dirty="0">
-                <a:solidFill>
-                  <a:schemeClr val="bg1"/>
-                </a:solidFill>
-                <a:latin typeface="Calibri" panose="020F0502020204030204" pitchFamily="34" charset="0"/>
-                <a:ea typeface="Calibri" panose="020F0502020204030204" pitchFamily="34" charset="0"/>
-                <a:cs typeface="Calibri" panose="020F0502020204030204" pitchFamily="34" charset="0"/>
-              </a:rPr>
-              <a:t>	I am choosing an MSI Motherboard for use with AMD CPUs. I have always been a fan of AMD products and my current computer has an MSI motherboard which has served me well. I am choosing the MSI MAG Tomahawk B550 as the motherboard. The board features 3 x 6GB </a:t>
-            </a:r>
-            <a:r>
-              <a:rPr lang="en-US" sz="1100" dirty="0" err="1">
-                <a:solidFill>
-                  <a:schemeClr val="bg1"/>
-                </a:solidFill>
-                <a:latin typeface="Calibri" panose="020F0502020204030204" pitchFamily="34" charset="0"/>
-                <a:ea typeface="Calibri" panose="020F0502020204030204" pitchFamily="34" charset="0"/>
-                <a:cs typeface="Calibri" panose="020F0502020204030204" pitchFamily="34" charset="0"/>
-              </a:rPr>
-              <a:t>Sata</a:t>
-            </a:r>
-            <a:r>
-              <a:rPr lang="en-US" sz="1100" dirty="0">
-                <a:solidFill>
-                  <a:schemeClr val="bg1"/>
-                </a:solidFill>
-                <a:latin typeface="Calibri" panose="020F0502020204030204" pitchFamily="34" charset="0"/>
-                <a:ea typeface="Calibri" panose="020F0502020204030204" pitchFamily="34" charset="0"/>
-                <a:cs typeface="Calibri" panose="020F0502020204030204" pitchFamily="34" charset="0"/>
-              </a:rPr>
-              <a:t> connections, 2x M.2 connections on board, USB 3.2, 2.5 Gigabit Ethernet and support for 128GB DDR4 RAM. I found the board for $169.99 at NewEgg.com.</a:t>
-            </a:r>
-          </a:p>
-          <a:p>
-            <a:pPr marL="0" indent="0">
-              <a:spcBef>
-                <a:spcPts val="400"/>
-              </a:spcBef>
-              <a:buNone/>
-            </a:pPr>
-            <a:r>
-              <a:rPr lang="en-US" sz="1100" dirty="0">
-                <a:solidFill>
-                  <a:schemeClr val="bg1"/>
-                </a:solidFill>
-                <a:latin typeface="Calibri" panose="020F0502020204030204" pitchFamily="34" charset="0"/>
-                <a:ea typeface="Calibri" panose="020F0502020204030204" pitchFamily="34" charset="0"/>
-                <a:cs typeface="Calibri" panose="020F0502020204030204" pitchFamily="34" charset="0"/>
-              </a:rPr>
-              <a:t>	My desk has enough room for a full-size computer, so I will build the system in a Full ATX PC tower. I chose the Fractal Design Pop XL High-Airflow so that I will have negative air pressure with great ventilation in the system. I will have plenty of room to expand the system in the future. The case is available for $109.99 on </a:t>
-            </a:r>
-            <a:r>
-              <a:rPr lang="en-US" sz="1100" dirty="0" err="1">
-                <a:solidFill>
-                  <a:schemeClr val="bg1"/>
-                </a:solidFill>
-                <a:latin typeface="Calibri" panose="020F0502020204030204" pitchFamily="34" charset="0"/>
-                <a:ea typeface="Calibri" panose="020F0502020204030204" pitchFamily="34" charset="0"/>
-                <a:cs typeface="Calibri" panose="020F0502020204030204" pitchFamily="34" charset="0"/>
-              </a:rPr>
-              <a:t>NewEgg</a:t>
-            </a:r>
-            <a:r>
-              <a:rPr lang="en-US" sz="1100" dirty="0">
-                <a:solidFill>
-                  <a:schemeClr val="bg1"/>
-                </a:solidFill>
-                <a:latin typeface="Calibri" panose="020F0502020204030204" pitchFamily="34" charset="0"/>
-                <a:ea typeface="Calibri" panose="020F0502020204030204" pitchFamily="34" charset="0"/>
-                <a:cs typeface="Calibri" panose="020F0502020204030204" pitchFamily="34" charset="0"/>
-              </a:rPr>
-              <a:t>.</a:t>
-            </a:r>
-          </a:p>
-          <a:p>
-            <a:pPr marL="0" indent="0">
-              <a:spcBef>
-                <a:spcPts val="400"/>
-              </a:spcBef>
-              <a:buNone/>
-            </a:pPr>
-            <a:r>
-              <a:rPr lang="en-US" sz="1100" dirty="0">
-                <a:solidFill>
-                  <a:schemeClr val="bg1"/>
-                </a:solidFill>
-                <a:latin typeface="Calibri" panose="020F0502020204030204" pitchFamily="34" charset="0"/>
-                <a:ea typeface="Calibri" panose="020F0502020204030204" pitchFamily="34" charset="0"/>
-                <a:cs typeface="Calibri" panose="020F0502020204030204" pitchFamily="34" charset="0"/>
-              </a:rPr>
-              <a:t>	The Processor I chose is an AMD Ryzen 7 5800x which has 8 cores and 16 threads running at 3.8GHz, with a 4.7GHz boost. This processor is powerful enough to run the programs that I use without issue and should be a decent CPU for at least 5 years. The Ryzen 7 5800x is available at </a:t>
-            </a:r>
-            <a:r>
-              <a:rPr lang="en-US" sz="1100" dirty="0" err="1">
-                <a:solidFill>
-                  <a:schemeClr val="bg1"/>
-                </a:solidFill>
-                <a:latin typeface="Calibri" panose="020F0502020204030204" pitchFamily="34" charset="0"/>
-                <a:ea typeface="Calibri" panose="020F0502020204030204" pitchFamily="34" charset="0"/>
-                <a:cs typeface="Calibri" panose="020F0502020204030204" pitchFamily="34" charset="0"/>
-              </a:rPr>
-              <a:t>NewEgg</a:t>
-            </a:r>
-            <a:r>
-              <a:rPr lang="en-US" sz="1100" dirty="0">
-                <a:solidFill>
-                  <a:schemeClr val="bg1"/>
-                </a:solidFill>
-                <a:latin typeface="Calibri" panose="020F0502020204030204" pitchFamily="34" charset="0"/>
-                <a:ea typeface="Calibri" panose="020F0502020204030204" pitchFamily="34" charset="0"/>
-                <a:cs typeface="Calibri" panose="020F0502020204030204" pitchFamily="34" charset="0"/>
-              </a:rPr>
-              <a:t> for $248.00 making it a superb value.</a:t>
-            </a:r>
-          </a:p>
-          <a:p>
-            <a:pPr marL="0" indent="0">
-              <a:spcBef>
-                <a:spcPts val="400"/>
-              </a:spcBef>
-              <a:buNone/>
-            </a:pPr>
-            <a:r>
-              <a:rPr lang="en-US" sz="1100" dirty="0">
-                <a:solidFill>
-                  <a:schemeClr val="bg1"/>
-                </a:solidFill>
-                <a:latin typeface="Calibri" panose="020F0502020204030204" pitchFamily="34" charset="0"/>
-                <a:ea typeface="Calibri" panose="020F0502020204030204" pitchFamily="34" charset="0"/>
-                <a:cs typeface="Calibri" panose="020F0502020204030204" pitchFamily="34" charset="0"/>
-              </a:rPr>
-              <a:t>	 My system will contain 32GB of </a:t>
-            </a:r>
-            <a:r>
-              <a:rPr lang="en-US" sz="1100" dirty="0" err="1">
-                <a:solidFill>
-                  <a:schemeClr val="bg1"/>
-                </a:solidFill>
-                <a:latin typeface="Calibri" panose="020F0502020204030204" pitchFamily="34" charset="0"/>
-                <a:ea typeface="Calibri" panose="020F0502020204030204" pitchFamily="34" charset="0"/>
-                <a:cs typeface="Calibri" panose="020F0502020204030204" pitchFamily="34" charset="0"/>
-              </a:rPr>
-              <a:t>G.Skill</a:t>
-            </a:r>
-            <a:r>
-              <a:rPr lang="en-US" sz="1100" dirty="0">
-                <a:solidFill>
-                  <a:schemeClr val="bg1"/>
-                </a:solidFill>
-                <a:latin typeface="Calibri" panose="020F0502020204030204" pitchFamily="34" charset="0"/>
-                <a:ea typeface="Calibri" panose="020F0502020204030204" pitchFamily="34" charset="0"/>
-                <a:cs typeface="Calibri" panose="020F0502020204030204" pitchFamily="34" charset="0"/>
-              </a:rPr>
-              <a:t>  </a:t>
-            </a:r>
-            <a:r>
-              <a:rPr lang="en-US" sz="1100" dirty="0" err="1">
-                <a:solidFill>
-                  <a:schemeClr val="bg1"/>
-                </a:solidFill>
-                <a:latin typeface="Calibri" panose="020F0502020204030204" pitchFamily="34" charset="0"/>
-                <a:ea typeface="Calibri" panose="020F0502020204030204" pitchFamily="34" charset="0"/>
-                <a:cs typeface="Calibri" panose="020F0502020204030204" pitchFamily="34" charset="0"/>
-              </a:rPr>
-              <a:t>Ripjaw</a:t>
-            </a:r>
-            <a:r>
-              <a:rPr lang="en-US" sz="1100" dirty="0">
-                <a:solidFill>
-                  <a:schemeClr val="bg1"/>
-                </a:solidFill>
-                <a:latin typeface="Calibri" panose="020F0502020204030204" pitchFamily="34" charset="0"/>
-                <a:ea typeface="Calibri" panose="020F0502020204030204" pitchFamily="34" charset="0"/>
-                <a:cs typeface="Calibri" panose="020F0502020204030204" pitchFamily="34" charset="0"/>
-              </a:rPr>
-              <a:t> V series DDR4 3200 RAM. The motherboard supports up to 128GB, so I can easily add more RAM in the future and easily have 64 or 96GB without replacing these modules. The </a:t>
-            </a:r>
-            <a:r>
-              <a:rPr lang="en-US" sz="1100" dirty="0" err="1">
-                <a:solidFill>
-                  <a:schemeClr val="bg1"/>
-                </a:solidFill>
-                <a:latin typeface="Calibri" panose="020F0502020204030204" pitchFamily="34" charset="0"/>
-                <a:ea typeface="Calibri" panose="020F0502020204030204" pitchFamily="34" charset="0"/>
-                <a:cs typeface="Calibri" panose="020F0502020204030204" pitchFamily="34" charset="0"/>
-              </a:rPr>
-              <a:t>G.Skill</a:t>
-            </a:r>
-            <a:r>
-              <a:rPr lang="en-US" sz="1100" dirty="0">
-                <a:solidFill>
-                  <a:schemeClr val="bg1"/>
-                </a:solidFill>
-                <a:latin typeface="Calibri" panose="020F0502020204030204" pitchFamily="34" charset="0"/>
-                <a:ea typeface="Calibri" panose="020F0502020204030204" pitchFamily="34" charset="0"/>
-                <a:cs typeface="Calibri" panose="020F0502020204030204" pitchFamily="34" charset="0"/>
-              </a:rPr>
-              <a:t> is a ridiculously low $89.78 currently, at </a:t>
-            </a:r>
-            <a:r>
-              <a:rPr lang="en-US" sz="1100" dirty="0" err="1">
-                <a:solidFill>
-                  <a:schemeClr val="bg1"/>
-                </a:solidFill>
-                <a:latin typeface="Calibri" panose="020F0502020204030204" pitchFamily="34" charset="0"/>
-                <a:ea typeface="Calibri" panose="020F0502020204030204" pitchFamily="34" charset="0"/>
-                <a:cs typeface="Calibri" panose="020F0502020204030204" pitchFamily="34" charset="0"/>
-              </a:rPr>
-              <a:t>NewEgg</a:t>
-            </a:r>
-            <a:r>
-              <a:rPr lang="en-US" sz="1100" dirty="0">
-                <a:solidFill>
-                  <a:schemeClr val="bg1"/>
-                </a:solidFill>
-                <a:latin typeface="Calibri" panose="020F0502020204030204" pitchFamily="34" charset="0"/>
-                <a:ea typeface="Calibri" panose="020F0502020204030204" pitchFamily="34" charset="0"/>
-                <a:cs typeface="Calibri" panose="020F0502020204030204" pitchFamily="34" charset="0"/>
-              </a:rPr>
-              <a:t>.</a:t>
-            </a:r>
-          </a:p>
-          <a:p>
-            <a:pPr marL="0" indent="0">
-              <a:spcBef>
-                <a:spcPts val="400"/>
-              </a:spcBef>
-              <a:buNone/>
-            </a:pPr>
-            <a:r>
-              <a:rPr lang="en-US" sz="1100" dirty="0">
-                <a:solidFill>
-                  <a:schemeClr val="bg1"/>
-                </a:solidFill>
-                <a:latin typeface="Calibri" panose="020F0502020204030204" pitchFamily="34" charset="0"/>
-                <a:ea typeface="Calibri" panose="020F0502020204030204" pitchFamily="34" charset="0"/>
-                <a:cs typeface="Calibri" panose="020F0502020204030204" pitchFamily="34" charset="0"/>
-              </a:rPr>
-              <a:t>	AMD Processors tend to run hot, so I will get a decent CPU cooler. I will not spend extra for liquid cooling. I chose a Cooler Master Hyper 212, with no RGB, which saves a few dollars. The system will be powered by a Corsair RM850, which produces 850 Watts of power. I want a powerful PSU for the computer so that it will have ample energy to run any powered peripheral devices. The cooler costs $54.99 and the PSU runs $149.99, both at </a:t>
-            </a:r>
-            <a:r>
-              <a:rPr lang="en-US" sz="1100" dirty="0" err="1">
-                <a:solidFill>
-                  <a:schemeClr val="bg1"/>
-                </a:solidFill>
-                <a:latin typeface="Calibri" panose="020F0502020204030204" pitchFamily="34" charset="0"/>
-                <a:ea typeface="Calibri" panose="020F0502020204030204" pitchFamily="34" charset="0"/>
-                <a:cs typeface="Calibri" panose="020F0502020204030204" pitchFamily="34" charset="0"/>
-              </a:rPr>
-              <a:t>NewEgg</a:t>
-            </a:r>
-            <a:r>
-              <a:rPr lang="en-US" sz="1100" dirty="0">
-                <a:solidFill>
-                  <a:schemeClr val="bg1"/>
-                </a:solidFill>
-                <a:latin typeface="Calibri" panose="020F0502020204030204" pitchFamily="34" charset="0"/>
-                <a:ea typeface="Calibri" panose="020F0502020204030204" pitchFamily="34" charset="0"/>
-                <a:cs typeface="Calibri" panose="020F0502020204030204" pitchFamily="34" charset="0"/>
-              </a:rPr>
-              <a:t>.</a:t>
-            </a:r>
-          </a:p>
-          <a:p>
-            <a:pPr marL="0" indent="0">
-              <a:spcBef>
-                <a:spcPts val="400"/>
-              </a:spcBef>
-              <a:buNone/>
-            </a:pPr>
-            <a:r>
-              <a:rPr lang="en-US" sz="1100" dirty="0">
-                <a:solidFill>
-                  <a:schemeClr val="bg1"/>
-                </a:solidFill>
-                <a:latin typeface="Calibri" panose="020F0502020204030204" pitchFamily="34" charset="0"/>
-                <a:ea typeface="Calibri" panose="020F0502020204030204" pitchFamily="34" charset="0"/>
-                <a:cs typeface="Calibri" panose="020F0502020204030204" pitchFamily="34" charset="0"/>
-              </a:rPr>
-              <a:t>	For storage I chose a WD (Western Digital) Black SSD for the operating system and a 6TB Toshiba HDD for data and application use. The solid-state drive has extremely fast read speed of up to 7000MB/s through the motherboard’s PCIe 4 connection. The HDD will be used to hold application data, video, audio and games. The HDD runs at 7200 RPM and can transfer data at up to 6GB/s (6000MB/s) through it’s SATA 3 connection. I have 1 additional M.2 and 2 additional SATA 3 connections for future upgrading. Western Digital’s SSD can be purchased for $69.99 and the Toshiba Hard Disk Drive is $144.99, both from </a:t>
-            </a:r>
-            <a:r>
-              <a:rPr lang="en-US" sz="1100" dirty="0" err="1">
-                <a:solidFill>
-                  <a:schemeClr val="bg1"/>
-                </a:solidFill>
-                <a:latin typeface="Calibri" panose="020F0502020204030204" pitchFamily="34" charset="0"/>
-                <a:ea typeface="Calibri" panose="020F0502020204030204" pitchFamily="34" charset="0"/>
-                <a:cs typeface="Calibri" panose="020F0502020204030204" pitchFamily="34" charset="0"/>
-              </a:rPr>
-              <a:t>NewEgg</a:t>
-            </a:r>
-            <a:r>
-              <a:rPr lang="en-US" sz="1100" dirty="0">
-                <a:solidFill>
-                  <a:schemeClr val="bg1"/>
-                </a:solidFill>
-                <a:latin typeface="Calibri" panose="020F0502020204030204" pitchFamily="34" charset="0"/>
-                <a:ea typeface="Calibri" panose="020F0502020204030204" pitchFamily="34" charset="0"/>
-                <a:cs typeface="Calibri" panose="020F0502020204030204" pitchFamily="34" charset="0"/>
-              </a:rPr>
-              <a:t>.</a:t>
-            </a:r>
-          </a:p>
-          <a:p>
-            <a:pPr marL="0" indent="0">
-              <a:spcBef>
-                <a:spcPts val="400"/>
-              </a:spcBef>
-              <a:buNone/>
-            </a:pPr>
-            <a:r>
-              <a:rPr lang="en-US" sz="1100" dirty="0">
-                <a:solidFill>
-                  <a:schemeClr val="bg1"/>
-                </a:solidFill>
-                <a:latin typeface="Calibri" panose="020F0502020204030204" pitchFamily="34" charset="0"/>
-                <a:ea typeface="Calibri" panose="020F0502020204030204" pitchFamily="34" charset="0"/>
-                <a:cs typeface="Calibri" panose="020F0502020204030204" pitchFamily="34" charset="0"/>
-              </a:rPr>
-              <a:t>	I will add a Gigabyte AMD Radeon RX 6600 to one of the PCIe 4 expansion slots as my GPU. The card features 8GB or GDDR6 Memory and is considered an entry level to mid-range Graphics card. This will allow me to play AAA games for years. The Gigabyte Radeon RX 6600 can be purchased for $219.99 on </a:t>
-            </a:r>
-            <a:r>
-              <a:rPr lang="en-US" sz="1100" dirty="0" err="1">
-                <a:solidFill>
-                  <a:schemeClr val="bg1"/>
-                </a:solidFill>
-                <a:latin typeface="Calibri" panose="020F0502020204030204" pitchFamily="34" charset="0"/>
-                <a:ea typeface="Calibri" panose="020F0502020204030204" pitchFamily="34" charset="0"/>
-                <a:cs typeface="Calibri" panose="020F0502020204030204" pitchFamily="34" charset="0"/>
-              </a:rPr>
-              <a:t>NewEgg</a:t>
-            </a:r>
-            <a:r>
-              <a:rPr lang="en-US" sz="1100" dirty="0">
-                <a:solidFill>
-                  <a:schemeClr val="bg1"/>
-                </a:solidFill>
-                <a:latin typeface="Calibri" panose="020F0502020204030204" pitchFamily="34" charset="0"/>
-                <a:ea typeface="Calibri" panose="020F0502020204030204" pitchFamily="34" charset="0"/>
-                <a:cs typeface="Calibri" panose="020F0502020204030204" pitchFamily="34" charset="0"/>
-              </a:rPr>
-              <a:t>.</a:t>
-            </a:r>
-          </a:p>
-          <a:p>
-            <a:pPr marL="0" indent="0">
-              <a:spcBef>
-                <a:spcPts val="400"/>
-              </a:spcBef>
-              <a:buNone/>
-            </a:pPr>
-            <a:r>
-              <a:rPr lang="en-US" sz="1100" dirty="0">
-                <a:solidFill>
-                  <a:schemeClr val="bg1"/>
-                </a:solidFill>
-                <a:latin typeface="Calibri" panose="020F0502020204030204" pitchFamily="34" charset="0"/>
-                <a:ea typeface="Calibri" panose="020F0502020204030204" pitchFamily="34" charset="0"/>
-                <a:cs typeface="Calibri" panose="020F0502020204030204" pitchFamily="34" charset="0"/>
-              </a:rPr>
-              <a:t>	To create a dual display setup, I can upgrade my current monitors with 2 MSI </a:t>
-            </a:r>
-            <a:r>
-              <a:rPr lang="en-US" sz="1100" dirty="0" err="1">
-                <a:solidFill>
-                  <a:schemeClr val="bg1"/>
-                </a:solidFill>
-                <a:latin typeface="Calibri" panose="020F0502020204030204" pitchFamily="34" charset="0"/>
-                <a:ea typeface="Calibri" panose="020F0502020204030204" pitchFamily="34" charset="0"/>
-                <a:cs typeface="Calibri" panose="020F0502020204030204" pitchFamily="34" charset="0"/>
-              </a:rPr>
-              <a:t>Optix</a:t>
-            </a:r>
-            <a:r>
-              <a:rPr lang="en-US" sz="1100" dirty="0">
-                <a:solidFill>
-                  <a:schemeClr val="bg1"/>
-                </a:solidFill>
-                <a:latin typeface="Calibri" panose="020F0502020204030204" pitchFamily="34" charset="0"/>
-                <a:ea typeface="Calibri" panose="020F0502020204030204" pitchFamily="34" charset="0"/>
-                <a:cs typeface="Calibri" panose="020F0502020204030204" pitchFamily="34" charset="0"/>
-              </a:rPr>
-              <a:t> 27” Curved HD Monitors for $199.99 each. The monitors feature 1920x1080 display (HD) at up to 170 Hz with a 1 millisecond response time.</a:t>
-            </a:r>
-          </a:p>
-          <a:p>
-            <a:pPr marL="0" indent="0">
-              <a:spcBef>
-                <a:spcPts val="400"/>
-              </a:spcBef>
-              <a:buNone/>
-            </a:pPr>
-            <a:r>
-              <a:rPr lang="en-US" sz="1100" dirty="0">
-                <a:solidFill>
-                  <a:schemeClr val="bg1"/>
-                </a:solidFill>
-                <a:latin typeface="Calibri" panose="020F0502020204030204" pitchFamily="34" charset="0"/>
-                <a:ea typeface="Calibri" panose="020F0502020204030204" pitchFamily="34" charset="0"/>
-                <a:cs typeface="Calibri" panose="020F0502020204030204" pitchFamily="34" charset="0"/>
-              </a:rPr>
-              <a:t>	I will run Ubuntu on the machine and therefore save some money by using a free Linux Operating System. I use a digital art program called </a:t>
-            </a:r>
-            <a:r>
-              <a:rPr lang="en-US" sz="1100" dirty="0" err="1">
-                <a:solidFill>
-                  <a:schemeClr val="bg1"/>
-                </a:solidFill>
-                <a:latin typeface="Calibri" panose="020F0502020204030204" pitchFamily="34" charset="0"/>
-                <a:ea typeface="Calibri" panose="020F0502020204030204" pitchFamily="34" charset="0"/>
-                <a:cs typeface="Calibri" panose="020F0502020204030204" pitchFamily="34" charset="0"/>
-              </a:rPr>
-              <a:t>Krita</a:t>
-            </a:r>
-            <a:r>
-              <a:rPr lang="en-US" sz="1100" dirty="0">
-                <a:solidFill>
-                  <a:schemeClr val="bg1"/>
-                </a:solidFill>
-                <a:latin typeface="Calibri" panose="020F0502020204030204" pitchFamily="34" charset="0"/>
-                <a:ea typeface="Calibri" panose="020F0502020204030204" pitchFamily="34" charset="0"/>
-                <a:cs typeface="Calibri" panose="020F0502020204030204" pitchFamily="34" charset="0"/>
-              </a:rPr>
-              <a:t> and will install that on the system. Libre Office is a wonderful free alternative to Microsoft Office which can edit and save files in Microsoft Office formats. Another piece of freeware that I use often is GIMP for photo editing. I currently have a license for VMWare Workstation Pro and will install that onto the system for virtualization. Docker is a free application, also and I will download it to work with containers on the machine. </a:t>
-            </a:r>
-          </a:p>
-          <a:p>
-            <a:pPr marL="0" indent="0">
-              <a:spcBef>
-                <a:spcPts val="400"/>
-              </a:spcBef>
-              <a:buNone/>
-            </a:pPr>
-            <a:r>
-              <a:rPr lang="en-US" sz="1100" dirty="0">
-                <a:solidFill>
-                  <a:schemeClr val="bg1"/>
-                </a:solidFill>
-                <a:latin typeface="Calibri" panose="020F0502020204030204" pitchFamily="34" charset="0"/>
-                <a:ea typeface="Calibri" panose="020F0502020204030204" pitchFamily="34" charset="0"/>
-                <a:cs typeface="Calibri" panose="020F0502020204030204" pitchFamily="34" charset="0"/>
-              </a:rPr>
-              <a:t>	If I stopped with the initial build, I would have successfully built the Desktop for a subtotal of slightly more than $1200. I added 2 monitors for a dual monitor setup and ended up spending another $400. The subtotal with the monitors is $1622.69 on the Newegg.com website. I will end up adding a mechanical keyboard and triple monitor mount to bring the subtotal up to $1900 or more eventually. </a:t>
-            </a:r>
-          </a:p>
-          <a:p>
-            <a:pPr marL="0" indent="0">
-              <a:spcBef>
-                <a:spcPts val="400"/>
-              </a:spcBef>
-              <a:buNone/>
-            </a:pPr>
-            <a:r>
-              <a:rPr lang="en-US" sz="1100" dirty="0">
-                <a:solidFill>
-                  <a:schemeClr val="bg1"/>
-                </a:solidFill>
-                <a:latin typeface="Calibri" panose="020F0502020204030204" pitchFamily="34" charset="0"/>
-                <a:ea typeface="Calibri" panose="020F0502020204030204" pitchFamily="34" charset="0"/>
-                <a:cs typeface="Calibri" panose="020F0502020204030204" pitchFamily="34" charset="0"/>
-              </a:rPr>
-              <a:t>	I currently have 2 monitors and multiple keyboards and mice, so I can successfully build the desktop for a price within my budget (excluding Tax and Shipping). If I am to build this system, I will wait until Black Friday or Cyber Monday when many of these parts will be discounted.</a:t>
-            </a:r>
-          </a:p>
-        </p:txBody>
-      </p:sp>
-    </p:spTree>
-    <p:extLst>
-      <p:ext uri="{BB962C8B-B14F-4D97-AF65-F5344CB8AC3E}">
-        <p14:creationId xmlns:p14="http://schemas.microsoft.com/office/powerpoint/2010/main" val="1818065027"/>
-      </p:ext>
-    </p:extLst>
-  </p:cSld>
-  <p:clrMapOvr>
-    <a:masterClrMapping/>
-  </p:clrMapOvr>
 </p:sld>
 </file>
 
@@ -20921,7 +22610,7 @@
           <p:nvPr/>
         </p:nvPicPr>
         <p:blipFill>
-          <a:blip r:embed="rId2"/>
+          <a:blip r:embed="rId3"/>
           <a:srcRect l="8246" r="16115"/>
           <a:stretch/>
         </p:blipFill>
@@ -21162,14 +22851,14 @@
   <p:clrMapOvr>
     <a:masterClrMapping/>
   </p:clrMapOvr>
-  <mc:AlternateContent xmlns:mc="http://schemas.openxmlformats.org/markup-compatibility/2006" xmlns:p14="http://schemas.microsoft.com/office/powerpoint/2010/main">
-    <mc:Choice Requires="p14">
-      <p:transition spd="med" p14:dur="700">
-        <p:fade/>
+  <mc:AlternateContent xmlns:mc="http://schemas.openxmlformats.org/markup-compatibility/2006" xmlns:p159="http://schemas.microsoft.com/office/powerpoint/2015/09/main">
+    <mc:Choice Requires="p159">
+      <p:transition xmlns:p14="http://schemas.microsoft.com/office/powerpoint/2010/main" spd="slow" p14:dur="2000">
+        <p159:morph option="byObject"/>
       </p:transition>
     </mc:Choice>
-    <mc:Fallback xmlns="" xmlns:p15="http://schemas.microsoft.com/office/powerpoint/2012/main">
-      <p:transition spd="med">
+    <mc:Fallback xmlns="">
+      <p:transition spd="slow">
         <p:fade/>
       </p:transition>
     </mc:Fallback>
@@ -21308,7 +22997,7 @@
           <p:nvPr/>
         </p:nvPicPr>
         <p:blipFill>
-          <a:blip r:embed="rId2"/>
+          <a:blip r:embed="rId3"/>
           <a:srcRect l="13646" r="13646"/>
           <a:stretch/>
         </p:blipFill>
@@ -21333,18 +23022,9 @@
   <p:clrMapOvr>
     <a:masterClrMapping/>
   </p:clrMapOvr>
-  <mc:AlternateContent xmlns:mc="http://schemas.openxmlformats.org/markup-compatibility/2006" xmlns:p14="http://schemas.microsoft.com/office/powerpoint/2010/main">
-    <mc:Choice Requires="p14">
-      <p:transition spd="med" p14:dur="700">
-        <p:fade/>
-      </p:transition>
-    </mc:Choice>
-    <mc:Fallback xmlns="" xmlns:p15="http://schemas.microsoft.com/office/powerpoint/2012/main">
-      <p:transition spd="med">
-        <p:fade/>
-      </p:transition>
-    </mc:Fallback>
-  </mc:AlternateContent>
+  <p:transition spd="slow">
+    <p:wipe/>
+  </p:transition>
 </p:sld>
 </file>
 
@@ -21676,7 +23356,7 @@
           <p:nvPr/>
         </p:nvPicPr>
         <p:blipFill>
-          <a:blip r:embed="rId2"/>
+          <a:blip r:embed="rId3"/>
           <a:stretch/>
         </p:blipFill>
         <p:spPr>
@@ -21699,12 +23379,12 @@
   </p:clrMapOvr>
   <mc:AlternateContent xmlns:mc="http://schemas.openxmlformats.org/markup-compatibility/2006" xmlns:p14="http://schemas.microsoft.com/office/powerpoint/2010/main">
     <mc:Choice Requires="p14">
-      <p:transition spd="med" p14:dur="700">
-        <p:fade/>
+      <p:transition spd="slow" p14:dur="3400">
+        <p14:reveal/>
       </p:transition>
     </mc:Choice>
-    <mc:Fallback xmlns="" xmlns:p15="http://schemas.microsoft.com/office/powerpoint/2012/main">
-      <p:transition spd="med">
+    <mc:Fallback xmlns="">
+      <p:transition spd="slow">
         <p:fade/>
       </p:transition>
     </mc:Fallback>
@@ -21903,7 +23583,7 @@
           <p:nvPr/>
         </p:nvPicPr>
         <p:blipFill>
-          <a:blip r:embed="rId2"/>
+          <a:blip r:embed="rId3"/>
           <a:srcRect l="9121" t="-815" r="8800" b="494"/>
           <a:stretch/>
         </p:blipFill>
@@ -22188,18 +23868,9 @@
   <p:clrMapOvr>
     <a:masterClrMapping/>
   </p:clrMapOvr>
-  <mc:AlternateContent xmlns:mc="http://schemas.openxmlformats.org/markup-compatibility/2006" xmlns:p14="http://schemas.microsoft.com/office/powerpoint/2010/main">
-    <mc:Choice Requires="p14">
-      <p:transition spd="med" p14:dur="700">
-        <p:fade/>
-      </p:transition>
-    </mc:Choice>
-    <mc:Fallback xmlns="" xmlns:p15="http://schemas.microsoft.com/office/powerpoint/2012/main">
-      <p:transition spd="med">
-        <p:fade/>
-      </p:transition>
-    </mc:Fallback>
-  </mc:AlternateContent>
+  <p:transition spd="slow">
+    <p:push dir="u"/>
+  </p:transition>
 </p:sld>
 </file>
 
@@ -22487,7 +24158,7 @@
           <p:nvPr/>
         </p:nvPicPr>
         <p:blipFill>
-          <a:blip r:embed="rId2"/>
+          <a:blip r:embed="rId3"/>
           <a:srcRect l="16001" t="4588" r="14968" b="5386"/>
           <a:stretch/>
         </p:blipFill>
@@ -22683,7 +24354,7 @@
           <p:nvPr/>
         </p:nvPicPr>
         <p:blipFill>
-          <a:blip r:embed="rId2"/>
+          <a:blip r:embed="rId3"/>
           <a:srcRect l="1366" t="12730" r="-913" b="12730"/>
           <a:stretch/>
         </p:blipFill>
@@ -22843,18 +24514,9 @@
   <p:clrMapOvr>
     <a:masterClrMapping/>
   </p:clrMapOvr>
-  <mc:AlternateContent xmlns:mc="http://schemas.openxmlformats.org/markup-compatibility/2006" xmlns:p14="http://schemas.microsoft.com/office/powerpoint/2010/main">
-    <mc:Choice Requires="p14">
-      <p:transition spd="med" p14:dur="700">
-        <p:fade/>
-      </p:transition>
-    </mc:Choice>
-    <mc:Fallback xmlns="" xmlns:p15="http://schemas.microsoft.com/office/powerpoint/2012/main">
-      <p:transition spd="med">
-        <p:fade/>
-      </p:transition>
-    </mc:Fallback>
-  </mc:AlternateContent>
+  <p:transition spd="slow">
+    <p:cover/>
+  </p:transition>
 </p:sld>
 </file>
 
@@ -23097,7 +24759,7 @@
           <p:nvPr/>
         </p:nvPicPr>
         <p:blipFill>
-          <a:blip r:embed="rId2"/>
+          <a:blip r:embed="rId3"/>
           <a:srcRect l="8696" t="5433" r="8696" b="1093"/>
           <a:stretch/>
         </p:blipFill>
@@ -23119,18 +24781,9 @@
   <p:clrMapOvr>
     <a:masterClrMapping/>
   </p:clrMapOvr>
-  <mc:AlternateContent xmlns:mc="http://schemas.openxmlformats.org/markup-compatibility/2006" xmlns:p14="http://schemas.microsoft.com/office/powerpoint/2010/main">
-    <mc:Choice Requires="p14">
-      <p:transition spd="med" p14:dur="700">
-        <p:fade/>
-      </p:transition>
-    </mc:Choice>
-    <mc:Fallback xmlns="" xmlns:p15="http://schemas.microsoft.com/office/powerpoint/2012/main">
-      <p:transition spd="med">
-        <p:fade/>
-      </p:transition>
-    </mc:Fallback>
-  </mc:AlternateContent>
+  <p:transition spd="med">
+    <p:pull/>
+  </p:transition>
 </p:sld>
 </file>
 
@@ -23275,7 +24928,7 @@
           <p:nvPr/>
         </p:nvPicPr>
         <p:blipFill>
-          <a:blip r:embed="rId2"/>
+          <a:blip r:embed="rId3"/>
           <a:srcRect l="4336" t="7978" r="9511" b="801"/>
           <a:stretch/>
         </p:blipFill>
@@ -23435,15 +25088,15 @@
   <p:clrMapOvr>
     <a:masterClrMapping/>
   </p:clrMapOvr>
-  <mc:AlternateContent xmlns:mc="http://schemas.openxmlformats.org/markup-compatibility/2006" xmlns:p14="http://schemas.microsoft.com/office/powerpoint/2010/main">
-    <mc:Choice Requires="p14">
-      <p:transition spd="med" p14:dur="700">
-        <p:fade/>
+  <mc:AlternateContent xmlns:mc="http://schemas.openxmlformats.org/markup-compatibility/2006">
+    <mc:Choice xmlns:p14="http://schemas.microsoft.com/office/powerpoint/2010/main" Requires="p14">
+      <p:transition spd="slow" p14:dur="1500">
+        <p:split orient="vert"/>
       </p:transition>
     </mc:Choice>
-    <mc:Fallback xmlns="" xmlns:p15="http://schemas.microsoft.com/office/powerpoint/2012/main">
-      <p:transition spd="med">
-        <p:fade/>
+    <mc:Fallback>
+      <p:transition spd="slow">
+        <p:split orient="vert"/>
       </p:transition>
     </mc:Fallback>
   </mc:AlternateContent>
@@ -24588,4 +26241,299 @@
   <a:objectDefaults/>
   <a:extraClrSchemeLst/>
 </a:theme>
+</file>
+
+<file path=ppt/theme/theme6.xml><?xml version="1.0" encoding="utf-8"?>
+<a:theme xmlns:a="http://schemas.openxmlformats.org/drawingml/2006/main" name="Office Theme">
+  <a:themeElements>
+    <a:clrScheme name="Office">
+      <a:dk1>
+        <a:sysClr val="windowText" lastClr="000000"/>
+      </a:dk1>
+      <a:lt1>
+        <a:sysClr val="window" lastClr="FFFFFF"/>
+      </a:lt1>
+      <a:dk2>
+        <a:srgbClr val="44546A"/>
+      </a:dk2>
+      <a:lt2>
+        <a:srgbClr val="E7E6E6"/>
+      </a:lt2>
+      <a:accent1>
+        <a:srgbClr val="4472C4"/>
+      </a:accent1>
+      <a:accent2>
+        <a:srgbClr val="ED7D31"/>
+      </a:accent2>
+      <a:accent3>
+        <a:srgbClr val="A5A5A5"/>
+      </a:accent3>
+      <a:accent4>
+        <a:srgbClr val="FFC000"/>
+      </a:accent4>
+      <a:accent5>
+        <a:srgbClr val="5B9BD5"/>
+      </a:accent5>
+      <a:accent6>
+        <a:srgbClr val="70AD47"/>
+      </a:accent6>
+      <a:hlink>
+        <a:srgbClr val="0563C1"/>
+      </a:hlink>
+      <a:folHlink>
+        <a:srgbClr val="954F72"/>
+      </a:folHlink>
+    </a:clrScheme>
+    <a:fontScheme name="Office">
+      <a:majorFont>
+        <a:latin typeface="Calibri Light" panose="020F0302020204030204"/>
+        <a:ea typeface=""/>
+        <a:cs typeface=""/>
+        <a:font script="Jpan" typeface="游ゴシック Light"/>
+        <a:font script="Hang" typeface="맑은 고딕"/>
+        <a:font script="Hans" typeface="等线 Light"/>
+        <a:font script="Hant" typeface="新細明體"/>
+        <a:font script="Arab" typeface="Times New Roman"/>
+        <a:font script="Hebr" typeface="Times New Roman"/>
+        <a:font script="Thai" typeface="Angsana New"/>
+        <a:font script="Ethi" typeface="Nyala"/>
+        <a:font script="Beng" typeface="Vrinda"/>
+        <a:font script="Gujr" typeface="Shruti"/>
+        <a:font script="Khmr" typeface="MoolBoran"/>
+        <a:font script="Knda" typeface="Tunga"/>
+        <a:font script="Guru" typeface="Raavi"/>
+        <a:font script="Cans" typeface="Euphemia"/>
+        <a:font script="Cher" typeface="Plantagenet Cherokee"/>
+        <a:font script="Yiii" typeface="Microsoft Yi Baiti"/>
+        <a:font script="Tibt" typeface="Microsoft Himalaya"/>
+        <a:font script="Thaa" typeface="MV Boli"/>
+        <a:font script="Deva" typeface="Mangal"/>
+        <a:font script="Telu" typeface="Gautami"/>
+        <a:font script="Taml" typeface="Latha"/>
+        <a:font script="Syrc" typeface="Estrangelo Edessa"/>
+        <a:font script="Orya" typeface="Kalinga"/>
+        <a:font script="Mlym" typeface="Kartika"/>
+        <a:font script="Laoo" typeface="DokChampa"/>
+        <a:font script="Sinh" typeface="Iskoola Pota"/>
+        <a:font script="Mong" typeface="Mongolian Baiti"/>
+        <a:font script="Viet" typeface="Times New Roman"/>
+        <a:font script="Uigh" typeface="Microsoft Uighur"/>
+        <a:font script="Geor" typeface="Sylfaen"/>
+        <a:font script="Armn" typeface="Arial"/>
+        <a:font script="Bugi" typeface="Leelawadee UI"/>
+        <a:font script="Bopo" typeface="Microsoft JhengHei"/>
+        <a:font script="Java" typeface="Javanese Text"/>
+        <a:font script="Lisu" typeface="Segoe UI"/>
+        <a:font script="Mymr" typeface="Myanmar Text"/>
+        <a:font script="Nkoo" typeface="Ebrima"/>
+        <a:font script="Olck" typeface="Nirmala UI"/>
+        <a:font script="Osma" typeface="Ebrima"/>
+        <a:font script="Phag" typeface="Phagspa"/>
+        <a:font script="Syrn" typeface="Estrangelo Edessa"/>
+        <a:font script="Syrj" typeface="Estrangelo Edessa"/>
+        <a:font script="Syre" typeface="Estrangelo Edessa"/>
+        <a:font script="Sora" typeface="Nirmala UI"/>
+        <a:font script="Tale" typeface="Microsoft Tai Le"/>
+        <a:font script="Talu" typeface="Microsoft New Tai Lue"/>
+        <a:font script="Tfng" typeface="Ebrima"/>
+      </a:majorFont>
+      <a:minorFont>
+        <a:latin typeface="Calibri" panose="020F0502020204030204"/>
+        <a:ea typeface=""/>
+        <a:cs typeface=""/>
+        <a:font script="Jpan" typeface="游ゴシック"/>
+        <a:font script="Hang" typeface="맑은 고딕"/>
+        <a:font script="Hans" typeface="等线"/>
+        <a:font script="Hant" typeface="新細明體"/>
+        <a:font script="Arab" typeface="Arial"/>
+        <a:font script="Hebr" typeface="Arial"/>
+        <a:font script="Thai" typeface="Cordia New"/>
+        <a:font script="Ethi" typeface="Nyala"/>
+        <a:font script="Beng" typeface="Vrinda"/>
+        <a:font script="Gujr" typeface="Shruti"/>
+        <a:font script="Khmr" typeface="DaunPenh"/>
+        <a:font script="Knda" typeface="Tunga"/>
+        <a:font script="Guru" typeface="Raavi"/>
+        <a:font script="Cans" typeface="Euphemia"/>
+        <a:font script="Cher" typeface="Plantagenet Cherokee"/>
+        <a:font script="Yiii" typeface="Microsoft Yi Baiti"/>
+        <a:font script="Tibt" typeface="Microsoft Himalaya"/>
+        <a:font script="Thaa" typeface="MV Boli"/>
+        <a:font script="Deva" typeface="Mangal"/>
+        <a:font script="Telu" typeface="Gautami"/>
+        <a:font script="Taml" typeface="Latha"/>
+        <a:font script="Syrc" typeface="Estrangelo Edessa"/>
+        <a:font script="Orya" typeface="Kalinga"/>
+        <a:font script="Mlym" typeface="Kartika"/>
+        <a:font script="Laoo" typeface="DokChampa"/>
+        <a:font script="Sinh" typeface="Iskoola Pota"/>
+        <a:font script="Mong" typeface="Mongolian Baiti"/>
+        <a:font script="Viet" typeface="Arial"/>
+        <a:font script="Uigh" typeface="Microsoft Uighur"/>
+        <a:font script="Geor" typeface="Sylfaen"/>
+        <a:font script="Armn" typeface="Arial"/>
+        <a:font script="Bugi" typeface="Leelawadee UI"/>
+        <a:font script="Bopo" typeface="Microsoft JhengHei"/>
+        <a:font script="Java" typeface="Javanese Text"/>
+        <a:font script="Lisu" typeface="Segoe UI"/>
+        <a:font script="Mymr" typeface="Myanmar Text"/>
+        <a:font script="Nkoo" typeface="Ebrima"/>
+        <a:font script="Olck" typeface="Nirmala UI"/>
+        <a:font script="Osma" typeface="Ebrima"/>
+        <a:font script="Phag" typeface="Phagspa"/>
+        <a:font script="Syrn" typeface="Estrangelo Edessa"/>
+        <a:font script="Syrj" typeface="Estrangelo Edessa"/>
+        <a:font script="Syre" typeface="Estrangelo Edessa"/>
+        <a:font script="Sora" typeface="Nirmala UI"/>
+        <a:font script="Tale" typeface="Microsoft Tai Le"/>
+        <a:font script="Talu" typeface="Microsoft New Tai Lue"/>
+        <a:font script="Tfng" typeface="Ebrima"/>
+      </a:minorFont>
+    </a:fontScheme>
+    <a:fmtScheme name="Office">
+      <a:fillStyleLst>
+        <a:solidFill>
+          <a:schemeClr val="phClr"/>
+        </a:solidFill>
+        <a:gradFill rotWithShape="1">
+          <a:gsLst>
+            <a:gs pos="0">
+              <a:schemeClr val="phClr">
+                <a:lumMod val="110000"/>
+                <a:satMod val="105000"/>
+                <a:tint val="67000"/>
+              </a:schemeClr>
+            </a:gs>
+            <a:gs pos="50000">
+              <a:schemeClr val="phClr">
+                <a:lumMod val="105000"/>
+                <a:satMod val="103000"/>
+                <a:tint val="73000"/>
+              </a:schemeClr>
+            </a:gs>
+            <a:gs pos="100000">
+              <a:schemeClr val="phClr">
+                <a:lumMod val="105000"/>
+                <a:satMod val="109000"/>
+                <a:tint val="81000"/>
+              </a:schemeClr>
+            </a:gs>
+          </a:gsLst>
+          <a:lin ang="5400000" scaled="0"/>
+        </a:gradFill>
+        <a:gradFill rotWithShape="1">
+          <a:gsLst>
+            <a:gs pos="0">
+              <a:schemeClr val="phClr">
+                <a:satMod val="103000"/>
+                <a:lumMod val="102000"/>
+                <a:tint val="94000"/>
+              </a:schemeClr>
+            </a:gs>
+            <a:gs pos="50000">
+              <a:schemeClr val="phClr">
+                <a:satMod val="110000"/>
+                <a:lumMod val="100000"/>
+                <a:shade val="100000"/>
+              </a:schemeClr>
+            </a:gs>
+            <a:gs pos="100000">
+              <a:schemeClr val="phClr">
+                <a:lumMod val="99000"/>
+                <a:satMod val="120000"/>
+                <a:shade val="78000"/>
+              </a:schemeClr>
+            </a:gs>
+          </a:gsLst>
+          <a:lin ang="5400000" scaled="0"/>
+        </a:gradFill>
+      </a:fillStyleLst>
+      <a:lnStyleLst>
+        <a:ln w="6350" cap="flat" cmpd="sng" algn="ctr">
+          <a:solidFill>
+            <a:schemeClr val="phClr"/>
+          </a:solidFill>
+          <a:prstDash val="solid"/>
+          <a:miter lim="800000"/>
+        </a:ln>
+        <a:ln w="12700" cap="flat" cmpd="sng" algn="ctr">
+          <a:solidFill>
+            <a:schemeClr val="phClr"/>
+          </a:solidFill>
+          <a:prstDash val="solid"/>
+          <a:miter lim="800000"/>
+        </a:ln>
+        <a:ln w="19050" cap="flat" cmpd="sng" algn="ctr">
+          <a:solidFill>
+            <a:schemeClr val="phClr"/>
+          </a:solidFill>
+          <a:prstDash val="solid"/>
+          <a:miter lim="800000"/>
+        </a:ln>
+      </a:lnStyleLst>
+      <a:effectStyleLst>
+        <a:effectStyle>
+          <a:effectLst/>
+        </a:effectStyle>
+        <a:effectStyle>
+          <a:effectLst/>
+        </a:effectStyle>
+        <a:effectStyle>
+          <a:effectLst>
+            <a:outerShdw blurRad="57150" dist="19050" dir="5400000" algn="ctr" rotWithShape="0">
+              <a:srgbClr val="000000">
+                <a:alpha val="63000"/>
+              </a:srgbClr>
+            </a:outerShdw>
+          </a:effectLst>
+        </a:effectStyle>
+      </a:effectStyleLst>
+      <a:bgFillStyleLst>
+        <a:solidFill>
+          <a:schemeClr val="phClr"/>
+        </a:solidFill>
+        <a:solidFill>
+          <a:schemeClr val="phClr">
+            <a:tint val="95000"/>
+            <a:satMod val="170000"/>
+          </a:schemeClr>
+        </a:solidFill>
+        <a:gradFill rotWithShape="1">
+          <a:gsLst>
+            <a:gs pos="0">
+              <a:schemeClr val="phClr">
+                <a:tint val="93000"/>
+                <a:satMod val="150000"/>
+                <a:shade val="98000"/>
+                <a:lumMod val="102000"/>
+              </a:schemeClr>
+            </a:gs>
+            <a:gs pos="50000">
+              <a:schemeClr val="phClr">
+                <a:tint val="98000"/>
+                <a:satMod val="130000"/>
+                <a:shade val="90000"/>
+                <a:lumMod val="103000"/>
+              </a:schemeClr>
+            </a:gs>
+            <a:gs pos="100000">
+              <a:schemeClr val="phClr">
+                <a:shade val="63000"/>
+                <a:satMod val="120000"/>
+              </a:schemeClr>
+            </a:gs>
+          </a:gsLst>
+          <a:lin ang="5400000" scaled="0"/>
+        </a:gradFill>
+      </a:bgFillStyleLst>
+    </a:fmtScheme>
+  </a:themeElements>
+  <a:objectDefaults/>
+  <a:extraClrSchemeLst/>
+  <a:extLst>
+    <a:ext uri="{05A4C25C-085E-4340-85A3-A5531E510DB2}">
+      <thm15:themeFamily xmlns:thm15="http://schemas.microsoft.com/office/thememl/2012/main" name="Office Theme" id="{62F939B6-93AF-4DB8-9C6B-D6C7DFDC589F}" vid="{4A3C46E8-61CC-4603-A589-7422A47A8E4A}"/>
+    </a:ext>
+  </a:extLst>
+</a:theme>
 </file>
</xml_diff>